<commit_message>
modify state machine diagram
</commit_message>
<xml_diff>
--- a/boost_training/msm/fig.pptx
+++ b/boost_training/msm/fig.pptx
@@ -5,13 +5,14 @@
     <p:sldMasterId id="2147483648" r:id="rId1"/>
   </p:sldMasterIdLst>
   <p:notesMasterIdLst>
-    <p:notesMasterId r:id="rId6"/>
+    <p:notesMasterId r:id="rId7"/>
   </p:notesMasterIdLst>
   <p:sldIdLst>
     <p:sldId id="257" r:id="rId2"/>
     <p:sldId id="259" r:id="rId3"/>
     <p:sldId id="260" r:id="rId4"/>
-    <p:sldId id="258" r:id="rId5"/>
+    <p:sldId id="261" r:id="rId5"/>
+    <p:sldId id="258" r:id="rId6"/>
   </p:sldIdLst>
   <p:sldSz cx="4321175" cy="3600450"/>
   <p:notesSz cx="6858000" cy="9144000"/>
@@ -195,7 +196,7 @@
           <a:p>
             <a:fld id="{33E477F9-361B-4780-B227-665A41208240}" type="datetimeFigureOut">
               <a:rPr kumimoji="1" lang="ja-JP" altLang="en-US" smtClean="0"/>
-              <a:t>2012/1/23</a:t>
+              <a:t>2012/1/24</a:t>
             </a:fld>
             <a:endParaRPr kumimoji="1" lang="ja-JP" altLang="en-US"/>
           </a:p>
@@ -851,6 +852,95 @@
 </p:notes>
 </file>
 
+<file path=ppt/notesSlides/notesSlide5.xml><?xml version="1.0" encoding="utf-8"?>
+<p:notes xmlns:a="http://schemas.openxmlformats.org/drawingml/2006/main" xmlns:r="http://schemas.openxmlformats.org/officeDocument/2006/relationships" xmlns:p="http://schemas.openxmlformats.org/presentationml/2006/main">
+  <p:cSld>
+    <p:spTree>
+      <p:nvGrpSpPr>
+        <p:cNvPr id="1" name=""/>
+        <p:cNvGrpSpPr/>
+        <p:nvPr/>
+      </p:nvGrpSpPr>
+      <p:grpSpPr>
+        <a:xfrm>
+          <a:off x="0" y="0"/>
+          <a:ext cx="0" cy="0"/>
+          <a:chOff x="0" y="0"/>
+          <a:chExt cx="0" cy="0"/>
+        </a:xfrm>
+      </p:grpSpPr>
+      <p:sp>
+        <p:nvSpPr>
+          <p:cNvPr id="2" name="スライド イメージ プレースホルダー 1"/>
+          <p:cNvSpPr>
+            <a:spLocks noGrp="1" noRot="1" noChangeAspect="1"/>
+          </p:cNvSpPr>
+          <p:nvPr>
+            <p:ph type="sldImg"/>
+          </p:nvPr>
+        </p:nvSpPr>
+        <p:spPr>
+          <a:xfrm>
+            <a:off x="1371600" y="685800"/>
+            <a:ext cx="4114800" cy="3429000"/>
+          </a:xfrm>
+        </p:spPr>
+      </p:sp>
+      <p:sp>
+        <p:nvSpPr>
+          <p:cNvPr id="3" name="ノート プレースホルダー 2"/>
+          <p:cNvSpPr>
+            <a:spLocks noGrp="1"/>
+          </p:cNvSpPr>
+          <p:nvPr>
+            <p:ph type="body" idx="1"/>
+          </p:nvPr>
+        </p:nvSpPr>
+        <p:spPr/>
+        <p:txBody>
+          <a:bodyPr/>
+          <a:lstStyle/>
+          <a:p>
+            <a:endParaRPr kumimoji="1" lang="ja-JP" altLang="en-US" dirty="0"/>
+          </a:p>
+        </p:txBody>
+      </p:sp>
+      <p:sp>
+        <p:nvSpPr>
+          <p:cNvPr id="4" name="スライド番号プレースホルダー 3"/>
+          <p:cNvSpPr>
+            <a:spLocks noGrp="1"/>
+          </p:cNvSpPr>
+          <p:nvPr>
+            <p:ph type="sldNum" sz="quarter" idx="10"/>
+          </p:nvPr>
+        </p:nvSpPr>
+        <p:spPr/>
+        <p:txBody>
+          <a:bodyPr/>
+          <a:lstStyle/>
+          <a:p>
+            <a:fld id="{528CE6EB-F52D-476C-B1B9-A71D981A6739}" type="slidenum">
+              <a:rPr kumimoji="1" lang="ja-JP" altLang="en-US" smtClean="0"/>
+              <a:t>5</a:t>
+            </a:fld>
+            <a:endParaRPr kumimoji="1" lang="ja-JP" altLang="en-US" dirty="0"/>
+          </a:p>
+        </p:txBody>
+      </p:sp>
+    </p:spTree>
+    <p:extLst>
+      <p:ext uri="{BB962C8B-B14F-4D97-AF65-F5344CB8AC3E}">
+        <p14:creationId xmlns:p14="http://schemas.microsoft.com/office/powerpoint/2010/main" val="421502639"/>
+      </p:ext>
+    </p:extLst>
+  </p:cSld>
+  <p:clrMapOvr>
+    <a:masterClrMapping/>
+  </p:clrMapOvr>
+</p:notes>
+</file>
+
 <file path=ppt/slideLayouts/slideLayout1.xml><?xml version="1.0" encoding="utf-8"?>
 <p:sldLayout xmlns:a="http://schemas.openxmlformats.org/drawingml/2006/main" xmlns:r="http://schemas.openxmlformats.org/officeDocument/2006/relationships" xmlns:p="http://schemas.openxmlformats.org/presentationml/2006/main" type="title" preserve="1">
   <p:cSld name="タイトル スライド">
@@ -1032,7 +1122,7 @@
           <a:p>
             <a:fld id="{E90ED720-0104-4369-84BC-D37694168613}" type="datetimeFigureOut">
               <a:rPr kumimoji="1" lang="ja-JP" altLang="en-US" smtClean="0"/>
-              <a:t>2012/1/23</a:t>
+              <a:t>2012/1/24</a:t>
             </a:fld>
             <a:endParaRPr kumimoji="1" lang="ja-JP" altLang="en-US"/>
           </a:p>
@@ -1229,7 +1319,7 @@
           <a:p>
             <a:fld id="{E90ED720-0104-4369-84BC-D37694168613}" type="datetimeFigureOut">
               <a:rPr kumimoji="1" lang="ja-JP" altLang="en-US" smtClean="0"/>
-              <a:t>2012/1/23</a:t>
+              <a:t>2012/1/24</a:t>
             </a:fld>
             <a:endParaRPr kumimoji="1" lang="ja-JP" altLang="en-US"/>
           </a:p>
@@ -1436,7 +1526,7 @@
           <a:p>
             <a:fld id="{E90ED720-0104-4369-84BC-D37694168613}" type="datetimeFigureOut">
               <a:rPr kumimoji="1" lang="ja-JP" altLang="en-US" smtClean="0"/>
-              <a:t>2012/1/23</a:t>
+              <a:t>2012/1/24</a:t>
             </a:fld>
             <a:endParaRPr kumimoji="1" lang="ja-JP" altLang="en-US"/>
           </a:p>
@@ -1633,7 +1723,7 @@
           <a:p>
             <a:fld id="{E90ED720-0104-4369-84BC-D37694168613}" type="datetimeFigureOut">
               <a:rPr kumimoji="1" lang="ja-JP" altLang="en-US" smtClean="0"/>
-              <a:t>2012/1/23</a:t>
+              <a:t>2012/1/24</a:t>
             </a:fld>
             <a:endParaRPr kumimoji="1" lang="ja-JP" altLang="en-US"/>
           </a:p>
@@ -1874,7 +1964,7 @@
           <a:p>
             <a:fld id="{E90ED720-0104-4369-84BC-D37694168613}" type="datetimeFigureOut">
               <a:rPr kumimoji="1" lang="ja-JP" altLang="en-US" smtClean="0"/>
-              <a:t>2012/1/23</a:t>
+              <a:t>2012/1/24</a:t>
             </a:fld>
             <a:endParaRPr kumimoji="1" lang="ja-JP" altLang="en-US"/>
           </a:p>
@@ -2221,7 +2311,7 @@
           <a:p>
             <a:fld id="{E90ED720-0104-4369-84BC-D37694168613}" type="datetimeFigureOut">
               <a:rPr kumimoji="1" lang="ja-JP" altLang="en-US" smtClean="0"/>
-              <a:t>2012/1/23</a:t>
+              <a:t>2012/1/24</a:t>
             </a:fld>
             <a:endParaRPr kumimoji="1" lang="ja-JP" altLang="en-US"/>
           </a:p>
@@ -2702,7 +2792,7 @@
           <a:p>
             <a:fld id="{E90ED720-0104-4369-84BC-D37694168613}" type="datetimeFigureOut">
               <a:rPr kumimoji="1" lang="ja-JP" altLang="en-US" smtClean="0"/>
-              <a:t>2012/1/23</a:t>
+              <a:t>2012/1/24</a:t>
             </a:fld>
             <a:endParaRPr kumimoji="1" lang="ja-JP" altLang="en-US"/>
           </a:p>
@@ -2815,7 +2905,7 @@
           <a:p>
             <a:fld id="{E90ED720-0104-4369-84BC-D37694168613}" type="datetimeFigureOut">
               <a:rPr kumimoji="1" lang="ja-JP" altLang="en-US" smtClean="0"/>
-              <a:t>2012/1/23</a:t>
+              <a:t>2012/1/24</a:t>
             </a:fld>
             <a:endParaRPr kumimoji="1" lang="ja-JP" altLang="en-US"/>
           </a:p>
@@ -2905,7 +2995,7 @@
           <a:p>
             <a:fld id="{E90ED720-0104-4369-84BC-D37694168613}" type="datetimeFigureOut">
               <a:rPr kumimoji="1" lang="ja-JP" altLang="en-US" smtClean="0"/>
-              <a:t>2012/1/23</a:t>
+              <a:t>2012/1/24</a:t>
             </a:fld>
             <a:endParaRPr kumimoji="1" lang="ja-JP" altLang="en-US"/>
           </a:p>
@@ -3209,7 +3299,7 @@
           <a:p>
             <a:fld id="{E90ED720-0104-4369-84BC-D37694168613}" type="datetimeFigureOut">
               <a:rPr kumimoji="1" lang="ja-JP" altLang="en-US" smtClean="0"/>
-              <a:t>2012/1/23</a:t>
+              <a:t>2012/1/24</a:t>
             </a:fld>
             <a:endParaRPr kumimoji="1" lang="ja-JP" altLang="en-US"/>
           </a:p>
@@ -3457,7 +3547,7 @@
           <a:p>
             <a:fld id="{E90ED720-0104-4369-84BC-D37694168613}" type="datetimeFigureOut">
               <a:rPr kumimoji="1" lang="ja-JP" altLang="en-US" smtClean="0"/>
-              <a:t>2012/1/23</a:t>
+              <a:t>2012/1/24</a:t>
             </a:fld>
             <a:endParaRPr kumimoji="1" lang="ja-JP" altLang="en-US"/>
           </a:p>
@@ -3697,7 +3787,7 @@
           <a:p>
             <a:fld id="{E90ED720-0104-4369-84BC-D37694168613}" type="datetimeFigureOut">
               <a:rPr kumimoji="1" lang="ja-JP" altLang="en-US" smtClean="0"/>
-              <a:t>2012/1/23</a:t>
+              <a:t>2012/1/24</a:t>
             </a:fld>
             <a:endParaRPr kumimoji="1" lang="ja-JP" altLang="en-US"/>
           </a:p>
@@ -4355,10 +4445,7 @@
               <a:rPr lang="en-US" altLang="ja-JP" sz="1000" dirty="0" err="1" smtClean="0"/>
               <a:t>on_entry</a:t>
             </a:r>
-            <a:r>
-              <a:rPr lang="en-US" altLang="ja-JP" sz="1000" dirty="0" smtClean="0"/>
-              <a:t>()</a:t>
-            </a:r>
+            <a:endParaRPr lang="en-US" altLang="ja-JP" sz="1000" dirty="0" smtClean="0"/>
           </a:p>
           <a:p>
             <a:r>
@@ -4368,10 +4455,6 @@
             <a:r>
               <a:rPr lang="en-US" altLang="ja-JP" sz="1000" dirty="0" err="1" smtClean="0"/>
               <a:t>on_exit</a:t>
-            </a:r>
-            <a:r>
-              <a:rPr lang="en-US" altLang="ja-JP" sz="1000" dirty="0" smtClean="0"/>
-              <a:t>()</a:t>
             </a:r>
             <a:endParaRPr lang="en-US" altLang="ja-JP" sz="1000" dirty="0"/>
           </a:p>
@@ -4929,10 +5012,7 @@
               <a:rPr lang="en-US" altLang="ja-JP" sz="1000" dirty="0" err="1" smtClean="0"/>
               <a:t>on_entry</a:t>
             </a:r>
-            <a:r>
-              <a:rPr lang="en-US" altLang="ja-JP" sz="1000" dirty="0" smtClean="0"/>
-              <a:t>()</a:t>
-            </a:r>
+            <a:endParaRPr lang="en-US" altLang="ja-JP" sz="1000" dirty="0" smtClean="0"/>
           </a:p>
           <a:p>
             <a:r>
@@ -4942,10 +5022,6 @@
             <a:r>
               <a:rPr lang="en-US" altLang="ja-JP" sz="1000" dirty="0" err="1" smtClean="0"/>
               <a:t>on_exit</a:t>
-            </a:r>
-            <a:r>
-              <a:rPr lang="en-US" altLang="ja-JP" sz="1000" dirty="0" smtClean="0"/>
-              <a:t>()</a:t>
             </a:r>
             <a:endParaRPr lang="en-US" altLang="ja-JP" sz="1000" dirty="0"/>
           </a:p>
@@ -5670,10 +5746,7 @@
               <a:rPr lang="en-US" altLang="ja-JP" sz="1000" dirty="0" err="1" smtClean="0"/>
               <a:t>on_entry</a:t>
             </a:r>
-            <a:r>
-              <a:rPr lang="en-US" altLang="ja-JP" sz="1000" dirty="0" smtClean="0"/>
-              <a:t>()</a:t>
-            </a:r>
+            <a:endParaRPr lang="en-US" altLang="ja-JP" sz="1000" dirty="0" smtClean="0"/>
           </a:p>
           <a:p>
             <a:r>
@@ -5683,10 +5756,6 @@
             <a:r>
               <a:rPr lang="en-US" altLang="ja-JP" sz="1000" dirty="0" err="1" smtClean="0"/>
               <a:t>on_exit</a:t>
-            </a:r>
-            <a:r>
-              <a:rPr lang="en-US" altLang="ja-JP" sz="1000" dirty="0" smtClean="0"/>
-              <a:t>()</a:t>
             </a:r>
             <a:endParaRPr lang="en-US" altLang="ja-JP" sz="1000" dirty="0"/>
           </a:p>
@@ -5755,6 +5824,472 @@
 </file>
 
 <file path=ppt/slides/slide4.xml><?xml version="1.0" encoding="utf-8"?>
+<p:sld xmlns:a="http://schemas.openxmlformats.org/drawingml/2006/main" xmlns:r="http://schemas.openxmlformats.org/officeDocument/2006/relationships" xmlns:p="http://schemas.openxmlformats.org/presentationml/2006/main">
+  <p:cSld>
+    <p:spTree>
+      <p:nvGrpSpPr>
+        <p:cNvPr id="1" name=""/>
+        <p:cNvGrpSpPr/>
+        <p:nvPr/>
+      </p:nvGrpSpPr>
+      <p:grpSpPr>
+        <a:xfrm>
+          <a:off x="0" y="0"/>
+          <a:ext cx="0" cy="0"/>
+          <a:chOff x="0" y="0"/>
+          <a:chExt cx="0" cy="0"/>
+        </a:xfrm>
+      </p:grpSpPr>
+      <p:cxnSp>
+        <p:nvCxnSpPr>
+          <p:cNvPr id="142" name="直線矢印コネクタ 28"/>
+          <p:cNvCxnSpPr>
+            <a:stCxn id="163" idx="4"/>
+            <a:endCxn id="153" idx="0"/>
+          </p:cNvCxnSpPr>
+          <p:nvPr/>
+        </p:nvCxnSpPr>
+        <p:spPr>
+          <a:xfrm flipH="1">
+            <a:off x="1554697" y="399927"/>
+            <a:ext cx="2380" cy="203130"/>
+          </a:xfrm>
+          <a:prstGeom prst="straightConnector1">
+            <a:avLst/>
+          </a:prstGeom>
+          <a:ln w="19050">
+            <a:solidFill>
+              <a:schemeClr val="tx1"/>
+            </a:solidFill>
+            <a:tailEnd type="arrow"/>
+          </a:ln>
+        </p:spPr>
+        <p:style>
+          <a:lnRef idx="1">
+            <a:schemeClr val="accent1"/>
+          </a:lnRef>
+          <a:fillRef idx="0">
+            <a:schemeClr val="accent1"/>
+          </a:fillRef>
+          <a:effectRef idx="0">
+            <a:schemeClr val="accent1"/>
+          </a:effectRef>
+          <a:fontRef idx="minor">
+            <a:schemeClr val="tx1"/>
+          </a:fontRef>
+        </p:style>
+      </p:cxnSp>
+      <p:sp>
+        <p:nvSpPr>
+          <p:cNvPr id="150" name="正方形/長方形 149"/>
+          <p:cNvSpPr/>
+          <p:nvPr/>
+        </p:nvSpPr>
+        <p:spPr>
+          <a:xfrm>
+            <a:off x="141678" y="165134"/>
+            <a:ext cx="2450956" cy="1707099"/>
+          </a:xfrm>
+          <a:prstGeom prst="rect">
+            <a:avLst/>
+          </a:prstGeom>
+          <a:noFill/>
+          <a:ln w="28575">
+            <a:solidFill>
+              <a:schemeClr val="tx1"/>
+            </a:solidFill>
+          </a:ln>
+        </p:spPr>
+        <p:style>
+          <a:lnRef idx="2">
+            <a:schemeClr val="accent1">
+              <a:shade val="50000"/>
+            </a:schemeClr>
+          </a:lnRef>
+          <a:fillRef idx="1">
+            <a:schemeClr val="accent1"/>
+          </a:fillRef>
+          <a:effectRef idx="0">
+            <a:schemeClr val="accent1"/>
+          </a:effectRef>
+          <a:fontRef idx="minor">
+            <a:schemeClr val="lt1"/>
+          </a:fontRef>
+        </p:style>
+        <p:txBody>
+          <a:bodyPr lIns="91439" tIns="45720" rIns="91439" bIns="45720" rtlCol="0" anchor="ctr"/>
+          <a:lstStyle/>
+          <a:p>
+            <a:pPr algn="ctr"/>
+            <a:endParaRPr kumimoji="1" lang="ja-JP" altLang="en-US"/>
+          </a:p>
+        </p:txBody>
+      </p:sp>
+      <p:sp>
+        <p:nvSpPr>
+          <p:cNvPr id="151" name="1 つの角を切り取った四角形 150"/>
+          <p:cNvSpPr/>
+          <p:nvPr/>
+        </p:nvSpPr>
+        <p:spPr>
+          <a:xfrm flipV="1">
+            <a:off x="141677" y="173126"/>
+            <a:ext cx="1041349" cy="305136"/>
+          </a:xfrm>
+          <a:prstGeom prst="snip1Rect">
+            <a:avLst>
+              <a:gd name="adj" fmla="val 34304"/>
+            </a:avLst>
+          </a:prstGeom>
+          <a:noFill/>
+          <a:ln w="19050">
+            <a:solidFill>
+              <a:schemeClr val="tx1"/>
+            </a:solidFill>
+          </a:ln>
+        </p:spPr>
+        <p:style>
+          <a:lnRef idx="2">
+            <a:schemeClr val="accent1">
+              <a:shade val="50000"/>
+            </a:schemeClr>
+          </a:lnRef>
+          <a:fillRef idx="1">
+            <a:schemeClr val="accent1"/>
+          </a:fillRef>
+          <a:effectRef idx="0">
+            <a:schemeClr val="accent1"/>
+          </a:effectRef>
+          <a:fontRef idx="minor">
+            <a:schemeClr val="lt1"/>
+          </a:fontRef>
+        </p:style>
+        <p:txBody>
+          <a:bodyPr lIns="91439" tIns="45720" rIns="91439" bIns="45720" rtlCol="0" anchor="ctr"/>
+          <a:lstStyle/>
+          <a:p>
+            <a:pPr algn="ctr"/>
+            <a:endParaRPr kumimoji="1" lang="ja-JP" altLang="en-US" sz="1000" dirty="0"/>
+          </a:p>
+        </p:txBody>
+      </p:sp>
+      <p:sp>
+        <p:nvSpPr>
+          <p:cNvPr id="152" name="正方形/長方形 151"/>
+          <p:cNvSpPr/>
+          <p:nvPr/>
+        </p:nvSpPr>
+        <p:spPr>
+          <a:xfrm>
+            <a:off x="141678" y="153706"/>
+            <a:ext cx="1154813" cy="246221"/>
+          </a:xfrm>
+          <a:prstGeom prst="rect">
+            <a:avLst/>
+          </a:prstGeom>
+        </p:spPr>
+        <p:txBody>
+          <a:bodyPr wrap="square" lIns="91439" tIns="45720" rIns="91439" bIns="45720">
+            <a:spAutoFit/>
+          </a:bodyPr>
+          <a:lstStyle/>
+          <a:p>
+            <a:r>
+              <a:rPr lang="en-US" altLang="ja-JP" sz="1000" dirty="0" smtClean="0"/>
+              <a:t>Internal and self</a:t>
+            </a:r>
+            <a:endParaRPr lang="ja-JP" altLang="en-US" sz="1000" dirty="0"/>
+          </a:p>
+        </p:txBody>
+      </p:sp>
+      <p:sp>
+        <p:nvSpPr>
+          <p:cNvPr id="153" name="角丸四角形 152"/>
+          <p:cNvSpPr/>
+          <p:nvPr/>
+        </p:nvSpPr>
+        <p:spPr>
+          <a:xfrm>
+            <a:off x="811357" y="603057"/>
+            <a:ext cx="1486679" cy="720080"/>
+          </a:xfrm>
+          <a:prstGeom prst="roundRect">
+            <a:avLst/>
+          </a:prstGeom>
+          <a:noFill/>
+          <a:ln w="19050">
+            <a:solidFill>
+              <a:schemeClr val="tx1"/>
+            </a:solidFill>
+          </a:ln>
+        </p:spPr>
+        <p:style>
+          <a:lnRef idx="2">
+            <a:schemeClr val="accent1">
+              <a:shade val="50000"/>
+            </a:schemeClr>
+          </a:lnRef>
+          <a:fillRef idx="1">
+            <a:schemeClr val="accent1"/>
+          </a:fillRef>
+          <a:effectRef idx="0">
+            <a:schemeClr val="accent1"/>
+          </a:effectRef>
+          <a:fontRef idx="minor">
+            <a:schemeClr val="lt1"/>
+          </a:fontRef>
+        </p:style>
+        <p:txBody>
+          <a:bodyPr lIns="91439" tIns="45720" rIns="91439" bIns="45720" rtlCol="0" anchor="t" anchorCtr="0"/>
+          <a:lstStyle/>
+          <a:p>
+            <a:pPr algn="ctr"/>
+            <a:r>
+              <a:rPr lang="en-US" altLang="ja-JP" sz="1000" dirty="0" smtClean="0">
+                <a:solidFill>
+                  <a:schemeClr val="tx1"/>
+                </a:solidFill>
+              </a:rPr>
+              <a:t>State1</a:t>
+            </a:r>
+            <a:endParaRPr lang="ja-JP" altLang="en-US" sz="1000" dirty="0">
+              <a:solidFill>
+                <a:schemeClr val="tx1"/>
+              </a:solidFill>
+            </a:endParaRPr>
+          </a:p>
+        </p:txBody>
+      </p:sp>
+      <p:cxnSp>
+        <p:nvCxnSpPr>
+          <p:cNvPr id="154" name="直線コネクタ 153"/>
+          <p:cNvCxnSpPr/>
+          <p:nvPr/>
+        </p:nvCxnSpPr>
+        <p:spPr>
+          <a:xfrm>
+            <a:off x="816118" y="857110"/>
+            <a:ext cx="1478787" cy="0"/>
+          </a:xfrm>
+          <a:prstGeom prst="line">
+            <a:avLst/>
+          </a:prstGeom>
+          <a:ln w="12700">
+            <a:solidFill>
+              <a:schemeClr val="tx1"/>
+            </a:solidFill>
+          </a:ln>
+        </p:spPr>
+        <p:style>
+          <a:lnRef idx="1">
+            <a:schemeClr val="accent1"/>
+          </a:lnRef>
+          <a:fillRef idx="0">
+            <a:schemeClr val="accent1"/>
+          </a:fillRef>
+          <a:effectRef idx="0">
+            <a:schemeClr val="accent1"/>
+          </a:effectRef>
+          <a:fontRef idx="minor">
+            <a:schemeClr val="tx1"/>
+          </a:fontRef>
+        </p:style>
+      </p:cxnSp>
+      <p:sp>
+        <p:nvSpPr>
+          <p:cNvPr id="155" name="テキスト ボックス 154"/>
+          <p:cNvSpPr txBox="1"/>
+          <p:nvPr/>
+        </p:nvSpPr>
+        <p:spPr>
+          <a:xfrm>
+            <a:off x="816118" y="823385"/>
+            <a:ext cx="1481918" cy="553998"/>
+          </a:xfrm>
+          <a:prstGeom prst="rect">
+            <a:avLst/>
+          </a:prstGeom>
+          <a:noFill/>
+          <a:ln>
+            <a:noFill/>
+          </a:ln>
+        </p:spPr>
+        <p:txBody>
+          <a:bodyPr wrap="square" lIns="91439" tIns="45720" rIns="91439" bIns="45720" rtlCol="0">
+            <a:spAutoFit/>
+          </a:bodyPr>
+          <a:lstStyle/>
+          <a:p>
+            <a:r>
+              <a:rPr lang="en-US" altLang="ja-JP" sz="1000" dirty="0"/>
+              <a:t>entry / </a:t>
+            </a:r>
+            <a:r>
+              <a:rPr lang="en-US" altLang="ja-JP" sz="1000" dirty="0" err="1" smtClean="0"/>
+              <a:t>on_entry</a:t>
+            </a:r>
+            <a:endParaRPr lang="en-US" altLang="ja-JP" sz="1000" dirty="0" smtClean="0"/>
+          </a:p>
+          <a:p>
+            <a:r>
+              <a:rPr lang="en-US" altLang="ja-JP" sz="1000" dirty="0" smtClean="0"/>
+              <a:t>exit / </a:t>
+            </a:r>
+            <a:r>
+              <a:rPr lang="en-US" altLang="ja-JP" sz="1000" dirty="0" err="1" smtClean="0"/>
+              <a:t>on_exit</a:t>
+            </a:r>
+            <a:endParaRPr lang="en-US" altLang="ja-JP" sz="1000" dirty="0" smtClean="0"/>
+          </a:p>
+          <a:p>
+            <a:r>
+              <a:rPr lang="en-US" altLang="ja-JP" sz="1000" dirty="0" smtClean="0"/>
+              <a:t>Event2 / Action2</a:t>
+            </a:r>
+            <a:endParaRPr lang="en-US" altLang="ja-JP" sz="1000" dirty="0"/>
+          </a:p>
+        </p:txBody>
+      </p:sp>
+      <p:sp>
+        <p:nvSpPr>
+          <p:cNvPr id="163" name="フローチャート : 結合子 162"/>
+          <p:cNvSpPr/>
+          <p:nvPr/>
+        </p:nvSpPr>
+        <p:spPr>
+          <a:xfrm>
+            <a:off x="1485066" y="255907"/>
+            <a:ext cx="144021" cy="144020"/>
+          </a:xfrm>
+          <a:prstGeom prst="flowChartConnector">
+            <a:avLst/>
+          </a:prstGeom>
+          <a:solidFill>
+            <a:schemeClr val="tx1"/>
+          </a:solidFill>
+          <a:ln w="19050">
+            <a:solidFill>
+              <a:schemeClr val="tx1"/>
+            </a:solidFill>
+          </a:ln>
+        </p:spPr>
+        <p:style>
+          <a:lnRef idx="2">
+            <a:schemeClr val="accent1">
+              <a:shade val="50000"/>
+            </a:schemeClr>
+          </a:lnRef>
+          <a:fillRef idx="1">
+            <a:schemeClr val="accent1"/>
+          </a:fillRef>
+          <a:effectRef idx="0">
+            <a:schemeClr val="accent1"/>
+          </a:effectRef>
+          <a:fontRef idx="minor">
+            <a:schemeClr val="lt1"/>
+          </a:fontRef>
+        </p:style>
+        <p:txBody>
+          <a:bodyPr lIns="91439" tIns="45720" rIns="91439" bIns="45720" rtlCol="0" anchor="ctr"/>
+          <a:lstStyle/>
+          <a:p>
+            <a:pPr algn="ctr"/>
+            <a:endParaRPr lang="ja-JP" altLang="en-US" sz="1000"/>
+          </a:p>
+        </p:txBody>
+      </p:sp>
+      <p:sp>
+        <p:nvSpPr>
+          <p:cNvPr id="164" name="正方形/長方形 163"/>
+          <p:cNvSpPr/>
+          <p:nvPr/>
+        </p:nvSpPr>
+        <p:spPr>
+          <a:xfrm>
+            <a:off x="1569973" y="1323137"/>
+            <a:ext cx="1022661" cy="246221"/>
+          </a:xfrm>
+          <a:prstGeom prst="rect">
+            <a:avLst/>
+          </a:prstGeom>
+        </p:spPr>
+        <p:txBody>
+          <a:bodyPr wrap="square" lIns="91439" tIns="45720" rIns="91439" bIns="45720">
+            <a:spAutoFit/>
+          </a:bodyPr>
+          <a:lstStyle/>
+          <a:p>
+            <a:r>
+              <a:rPr lang="en-US" altLang="ja-JP" sz="1000" dirty="0" smtClean="0"/>
+              <a:t>Event1/Action1 </a:t>
+            </a:r>
+            <a:endParaRPr lang="ja-JP" altLang="en-US" sz="1000" dirty="0"/>
+          </a:p>
+        </p:txBody>
+      </p:sp>
+      <p:cxnSp>
+        <p:nvCxnSpPr>
+          <p:cNvPr id="21" name="直線矢印コネクタ 28"/>
+          <p:cNvCxnSpPr>
+            <a:stCxn id="153" idx="2"/>
+            <a:endCxn id="153" idx="1"/>
+          </p:cNvCxnSpPr>
+          <p:nvPr/>
+        </p:nvCxnSpPr>
+        <p:spPr>
+          <a:xfrm rot="5400000" flipH="1">
+            <a:off x="1003007" y="771447"/>
+            <a:ext cx="360040" cy="743340"/>
+          </a:xfrm>
+          <a:prstGeom prst="bentConnector4">
+            <a:avLst>
+              <a:gd name="adj1" fmla="val -63493"/>
+              <a:gd name="adj2" fmla="val 130753"/>
+            </a:avLst>
+          </a:prstGeom>
+          <a:ln w="19050">
+            <a:solidFill>
+              <a:schemeClr val="tx1"/>
+            </a:solidFill>
+            <a:tailEnd type="arrow"/>
+          </a:ln>
+        </p:spPr>
+        <p:style>
+          <a:lnRef idx="1">
+            <a:schemeClr val="accent1"/>
+          </a:lnRef>
+          <a:fillRef idx="0">
+            <a:schemeClr val="accent1"/>
+          </a:fillRef>
+          <a:effectRef idx="0">
+            <a:schemeClr val="accent1"/>
+          </a:effectRef>
+          <a:fontRef idx="minor">
+            <a:schemeClr val="tx1"/>
+          </a:fontRef>
+        </p:style>
+      </p:cxnSp>
+    </p:spTree>
+    <p:extLst>
+      <p:ext uri="{BB962C8B-B14F-4D97-AF65-F5344CB8AC3E}">
+        <p14:creationId xmlns:p14="http://schemas.microsoft.com/office/powerpoint/2010/main" val="2266175217"/>
+      </p:ext>
+    </p:extLst>
+  </p:cSld>
+  <p:clrMapOvr>
+    <a:masterClrMapping/>
+  </p:clrMapOvr>
+  <p:timing>
+    <p:tnLst>
+      <p:par>
+        <p:cTn id="1" dur="indefinite" restart="never" nodeType="tmRoot"/>
+      </p:par>
+    </p:tnLst>
+  </p:timing>
+</p:sld>
+</file>
+
+<file path=ppt/slides/slide5.xml><?xml version="1.0" encoding="utf-8"?>
 <p:sld xmlns:a="http://schemas.openxmlformats.org/drawingml/2006/main" xmlns:r="http://schemas.openxmlformats.org/officeDocument/2006/relationships" xmlns:p="http://schemas.openxmlformats.org/presentationml/2006/main">
   <p:cSld>
     <p:spTree>

</xml_diff>

<commit_message>
Add junction pseudo state example.
</commit_message>
<xml_diff>
--- a/boost_training/msm/fig.pptx
+++ b/boost_training/msm/fig.pptx
@@ -5,14 +5,16 @@
     <p:sldMasterId id="2147483648" r:id="rId1"/>
   </p:sldMasterIdLst>
   <p:notesMasterIdLst>
-    <p:notesMasterId r:id="rId7"/>
+    <p:notesMasterId r:id="rId9"/>
   </p:notesMasterIdLst>
   <p:sldIdLst>
     <p:sldId id="257" r:id="rId2"/>
     <p:sldId id="259" r:id="rId3"/>
     <p:sldId id="260" r:id="rId4"/>
     <p:sldId id="261" r:id="rId5"/>
-    <p:sldId id="258" r:id="rId6"/>
+    <p:sldId id="262" r:id="rId6"/>
+    <p:sldId id="263" r:id="rId7"/>
+    <p:sldId id="258" r:id="rId8"/>
   </p:sldIdLst>
   <p:sldSz cx="4321175" cy="3600450"/>
   <p:notesSz cx="6858000" cy="9144000"/>
@@ -196,7 +198,7 @@
           <a:p>
             <a:fld id="{33E477F9-361B-4780-B227-665A41208240}" type="datetimeFigureOut">
               <a:rPr kumimoji="1" lang="ja-JP" altLang="en-US" smtClean="0"/>
-              <a:t>2012/1/24</a:t>
+              <a:t>2012/2/13</a:t>
             </a:fld>
             <a:endParaRPr kumimoji="1" lang="ja-JP" altLang="en-US"/>
           </a:p>
@@ -941,6 +943,184 @@
 </p:notes>
 </file>
 
+<file path=ppt/notesSlides/notesSlide6.xml><?xml version="1.0" encoding="utf-8"?>
+<p:notes xmlns:a="http://schemas.openxmlformats.org/drawingml/2006/main" xmlns:r="http://schemas.openxmlformats.org/officeDocument/2006/relationships" xmlns:p="http://schemas.openxmlformats.org/presentationml/2006/main">
+  <p:cSld>
+    <p:spTree>
+      <p:nvGrpSpPr>
+        <p:cNvPr id="1" name=""/>
+        <p:cNvGrpSpPr/>
+        <p:nvPr/>
+      </p:nvGrpSpPr>
+      <p:grpSpPr>
+        <a:xfrm>
+          <a:off x="0" y="0"/>
+          <a:ext cx="0" cy="0"/>
+          <a:chOff x="0" y="0"/>
+          <a:chExt cx="0" cy="0"/>
+        </a:xfrm>
+      </p:grpSpPr>
+      <p:sp>
+        <p:nvSpPr>
+          <p:cNvPr id="2" name="スライド イメージ プレースホルダー 1"/>
+          <p:cNvSpPr>
+            <a:spLocks noGrp="1" noRot="1" noChangeAspect="1"/>
+          </p:cNvSpPr>
+          <p:nvPr>
+            <p:ph type="sldImg"/>
+          </p:nvPr>
+        </p:nvSpPr>
+        <p:spPr>
+          <a:xfrm>
+            <a:off x="1371600" y="685800"/>
+            <a:ext cx="4114800" cy="3429000"/>
+          </a:xfrm>
+        </p:spPr>
+      </p:sp>
+      <p:sp>
+        <p:nvSpPr>
+          <p:cNvPr id="3" name="ノート プレースホルダー 2"/>
+          <p:cNvSpPr>
+            <a:spLocks noGrp="1"/>
+          </p:cNvSpPr>
+          <p:nvPr>
+            <p:ph type="body" idx="1"/>
+          </p:nvPr>
+        </p:nvSpPr>
+        <p:spPr/>
+        <p:txBody>
+          <a:bodyPr/>
+          <a:lstStyle/>
+          <a:p>
+            <a:endParaRPr kumimoji="1" lang="ja-JP" altLang="en-US" dirty="0"/>
+          </a:p>
+        </p:txBody>
+      </p:sp>
+      <p:sp>
+        <p:nvSpPr>
+          <p:cNvPr id="4" name="スライド番号プレースホルダー 3"/>
+          <p:cNvSpPr>
+            <a:spLocks noGrp="1"/>
+          </p:cNvSpPr>
+          <p:nvPr>
+            <p:ph type="sldNum" sz="quarter" idx="10"/>
+          </p:nvPr>
+        </p:nvSpPr>
+        <p:spPr/>
+        <p:txBody>
+          <a:bodyPr/>
+          <a:lstStyle/>
+          <a:p>
+            <a:fld id="{528CE6EB-F52D-476C-B1B9-A71D981A6739}" type="slidenum">
+              <a:rPr kumimoji="1" lang="ja-JP" altLang="en-US" smtClean="0"/>
+              <a:t>6</a:t>
+            </a:fld>
+            <a:endParaRPr kumimoji="1" lang="ja-JP" altLang="en-US" dirty="0"/>
+          </a:p>
+        </p:txBody>
+      </p:sp>
+    </p:spTree>
+    <p:extLst>
+      <p:ext uri="{BB962C8B-B14F-4D97-AF65-F5344CB8AC3E}">
+        <p14:creationId xmlns:p14="http://schemas.microsoft.com/office/powerpoint/2010/main" val="421502639"/>
+      </p:ext>
+    </p:extLst>
+  </p:cSld>
+  <p:clrMapOvr>
+    <a:masterClrMapping/>
+  </p:clrMapOvr>
+</p:notes>
+</file>
+
+<file path=ppt/notesSlides/notesSlide7.xml><?xml version="1.0" encoding="utf-8"?>
+<p:notes xmlns:a="http://schemas.openxmlformats.org/drawingml/2006/main" xmlns:r="http://schemas.openxmlformats.org/officeDocument/2006/relationships" xmlns:p="http://schemas.openxmlformats.org/presentationml/2006/main">
+  <p:cSld>
+    <p:spTree>
+      <p:nvGrpSpPr>
+        <p:cNvPr id="1" name=""/>
+        <p:cNvGrpSpPr/>
+        <p:nvPr/>
+      </p:nvGrpSpPr>
+      <p:grpSpPr>
+        <a:xfrm>
+          <a:off x="0" y="0"/>
+          <a:ext cx="0" cy="0"/>
+          <a:chOff x="0" y="0"/>
+          <a:chExt cx="0" cy="0"/>
+        </a:xfrm>
+      </p:grpSpPr>
+      <p:sp>
+        <p:nvSpPr>
+          <p:cNvPr id="2" name="スライド イメージ プレースホルダー 1"/>
+          <p:cNvSpPr>
+            <a:spLocks noGrp="1" noRot="1" noChangeAspect="1"/>
+          </p:cNvSpPr>
+          <p:nvPr>
+            <p:ph type="sldImg"/>
+          </p:nvPr>
+        </p:nvSpPr>
+        <p:spPr>
+          <a:xfrm>
+            <a:off x="1371600" y="685800"/>
+            <a:ext cx="4114800" cy="3429000"/>
+          </a:xfrm>
+        </p:spPr>
+      </p:sp>
+      <p:sp>
+        <p:nvSpPr>
+          <p:cNvPr id="3" name="ノート プレースホルダー 2"/>
+          <p:cNvSpPr>
+            <a:spLocks noGrp="1"/>
+          </p:cNvSpPr>
+          <p:nvPr>
+            <p:ph type="body" idx="1"/>
+          </p:nvPr>
+        </p:nvSpPr>
+        <p:spPr/>
+        <p:txBody>
+          <a:bodyPr/>
+          <a:lstStyle/>
+          <a:p>
+            <a:endParaRPr kumimoji="1" lang="ja-JP" altLang="en-US" dirty="0"/>
+          </a:p>
+        </p:txBody>
+      </p:sp>
+      <p:sp>
+        <p:nvSpPr>
+          <p:cNvPr id="4" name="スライド番号プレースホルダー 3"/>
+          <p:cNvSpPr>
+            <a:spLocks noGrp="1"/>
+          </p:cNvSpPr>
+          <p:nvPr>
+            <p:ph type="sldNum" sz="quarter" idx="10"/>
+          </p:nvPr>
+        </p:nvSpPr>
+        <p:spPr/>
+        <p:txBody>
+          <a:bodyPr/>
+          <a:lstStyle/>
+          <a:p>
+            <a:fld id="{528CE6EB-F52D-476C-B1B9-A71D981A6739}" type="slidenum">
+              <a:rPr kumimoji="1" lang="ja-JP" altLang="en-US" smtClean="0"/>
+              <a:t>7</a:t>
+            </a:fld>
+            <a:endParaRPr kumimoji="1" lang="ja-JP" altLang="en-US" dirty="0"/>
+          </a:p>
+        </p:txBody>
+      </p:sp>
+    </p:spTree>
+    <p:extLst>
+      <p:ext uri="{BB962C8B-B14F-4D97-AF65-F5344CB8AC3E}">
+        <p14:creationId xmlns:p14="http://schemas.microsoft.com/office/powerpoint/2010/main" val="421502639"/>
+      </p:ext>
+    </p:extLst>
+  </p:cSld>
+  <p:clrMapOvr>
+    <a:masterClrMapping/>
+  </p:clrMapOvr>
+</p:notes>
+</file>
+
 <file path=ppt/slideLayouts/slideLayout1.xml><?xml version="1.0" encoding="utf-8"?>
 <p:sldLayout xmlns:a="http://schemas.openxmlformats.org/drawingml/2006/main" xmlns:r="http://schemas.openxmlformats.org/officeDocument/2006/relationships" xmlns:p="http://schemas.openxmlformats.org/presentationml/2006/main" type="title" preserve="1">
   <p:cSld name="タイトル スライド">
@@ -1122,7 +1302,7 @@
           <a:p>
             <a:fld id="{E90ED720-0104-4369-84BC-D37694168613}" type="datetimeFigureOut">
               <a:rPr kumimoji="1" lang="ja-JP" altLang="en-US" smtClean="0"/>
-              <a:t>2012/1/24</a:t>
+              <a:t>2012/2/13</a:t>
             </a:fld>
             <a:endParaRPr kumimoji="1" lang="ja-JP" altLang="en-US"/>
           </a:p>
@@ -1319,7 +1499,7 @@
           <a:p>
             <a:fld id="{E90ED720-0104-4369-84BC-D37694168613}" type="datetimeFigureOut">
               <a:rPr kumimoji="1" lang="ja-JP" altLang="en-US" smtClean="0"/>
-              <a:t>2012/1/24</a:t>
+              <a:t>2012/2/13</a:t>
             </a:fld>
             <a:endParaRPr kumimoji="1" lang="ja-JP" altLang="en-US"/>
           </a:p>
@@ -1526,7 +1706,7 @@
           <a:p>
             <a:fld id="{E90ED720-0104-4369-84BC-D37694168613}" type="datetimeFigureOut">
               <a:rPr kumimoji="1" lang="ja-JP" altLang="en-US" smtClean="0"/>
-              <a:t>2012/1/24</a:t>
+              <a:t>2012/2/13</a:t>
             </a:fld>
             <a:endParaRPr kumimoji="1" lang="ja-JP" altLang="en-US"/>
           </a:p>
@@ -1723,7 +1903,7 @@
           <a:p>
             <a:fld id="{E90ED720-0104-4369-84BC-D37694168613}" type="datetimeFigureOut">
               <a:rPr kumimoji="1" lang="ja-JP" altLang="en-US" smtClean="0"/>
-              <a:t>2012/1/24</a:t>
+              <a:t>2012/2/13</a:t>
             </a:fld>
             <a:endParaRPr kumimoji="1" lang="ja-JP" altLang="en-US"/>
           </a:p>
@@ -1964,7 +2144,7 @@
           <a:p>
             <a:fld id="{E90ED720-0104-4369-84BC-D37694168613}" type="datetimeFigureOut">
               <a:rPr kumimoji="1" lang="ja-JP" altLang="en-US" smtClean="0"/>
-              <a:t>2012/1/24</a:t>
+              <a:t>2012/2/13</a:t>
             </a:fld>
             <a:endParaRPr kumimoji="1" lang="ja-JP" altLang="en-US"/>
           </a:p>
@@ -2311,7 +2491,7 @@
           <a:p>
             <a:fld id="{E90ED720-0104-4369-84BC-D37694168613}" type="datetimeFigureOut">
               <a:rPr kumimoji="1" lang="ja-JP" altLang="en-US" smtClean="0"/>
-              <a:t>2012/1/24</a:t>
+              <a:t>2012/2/13</a:t>
             </a:fld>
             <a:endParaRPr kumimoji="1" lang="ja-JP" altLang="en-US"/>
           </a:p>
@@ -2792,7 +2972,7 @@
           <a:p>
             <a:fld id="{E90ED720-0104-4369-84BC-D37694168613}" type="datetimeFigureOut">
               <a:rPr kumimoji="1" lang="ja-JP" altLang="en-US" smtClean="0"/>
-              <a:t>2012/1/24</a:t>
+              <a:t>2012/2/13</a:t>
             </a:fld>
             <a:endParaRPr kumimoji="1" lang="ja-JP" altLang="en-US"/>
           </a:p>
@@ -2905,7 +3085,7 @@
           <a:p>
             <a:fld id="{E90ED720-0104-4369-84BC-D37694168613}" type="datetimeFigureOut">
               <a:rPr kumimoji="1" lang="ja-JP" altLang="en-US" smtClean="0"/>
-              <a:t>2012/1/24</a:t>
+              <a:t>2012/2/13</a:t>
             </a:fld>
             <a:endParaRPr kumimoji="1" lang="ja-JP" altLang="en-US"/>
           </a:p>
@@ -2995,7 +3175,7 @@
           <a:p>
             <a:fld id="{E90ED720-0104-4369-84BC-D37694168613}" type="datetimeFigureOut">
               <a:rPr kumimoji="1" lang="ja-JP" altLang="en-US" smtClean="0"/>
-              <a:t>2012/1/24</a:t>
+              <a:t>2012/2/13</a:t>
             </a:fld>
             <a:endParaRPr kumimoji="1" lang="ja-JP" altLang="en-US"/>
           </a:p>
@@ -3299,7 +3479,7 @@
           <a:p>
             <a:fld id="{E90ED720-0104-4369-84BC-D37694168613}" type="datetimeFigureOut">
               <a:rPr kumimoji="1" lang="ja-JP" altLang="en-US" smtClean="0"/>
-              <a:t>2012/1/24</a:t>
+              <a:t>2012/2/13</a:t>
             </a:fld>
             <a:endParaRPr kumimoji="1" lang="ja-JP" altLang="en-US"/>
           </a:p>
@@ -3547,7 +3727,7 @@
           <a:p>
             <a:fld id="{E90ED720-0104-4369-84BC-D37694168613}" type="datetimeFigureOut">
               <a:rPr kumimoji="1" lang="ja-JP" altLang="en-US" smtClean="0"/>
-              <a:t>2012/1/24</a:t>
+              <a:t>2012/2/13</a:t>
             </a:fld>
             <a:endParaRPr kumimoji="1" lang="ja-JP" altLang="en-US"/>
           </a:p>
@@ -3787,7 +3967,7 @@
           <a:p>
             <a:fld id="{E90ED720-0104-4369-84BC-D37694168613}" type="datetimeFigureOut">
               <a:rPr kumimoji="1" lang="ja-JP" altLang="en-US" smtClean="0"/>
-              <a:t>2012/1/24</a:t>
+              <a:t>2012/2/13</a:t>
             </a:fld>
             <a:endParaRPr kumimoji="1" lang="ja-JP" altLang="en-US"/>
           </a:p>
@@ -6290,6 +6470,1152 @@
 </file>
 
 <file path=ppt/slides/slide5.xml><?xml version="1.0" encoding="utf-8"?>
+<p:sld xmlns:a="http://schemas.openxmlformats.org/drawingml/2006/main" xmlns:r="http://schemas.openxmlformats.org/officeDocument/2006/relationships" xmlns:p="http://schemas.openxmlformats.org/presentationml/2006/main">
+  <p:cSld>
+    <p:spTree>
+      <p:nvGrpSpPr>
+        <p:cNvPr id="1" name=""/>
+        <p:cNvGrpSpPr/>
+        <p:nvPr/>
+      </p:nvGrpSpPr>
+      <p:grpSpPr>
+        <a:xfrm>
+          <a:off x="0" y="0"/>
+          <a:ext cx="0" cy="0"/>
+          <a:chOff x="0" y="0"/>
+          <a:chExt cx="0" cy="0"/>
+        </a:xfrm>
+      </p:grpSpPr>
+      <p:cxnSp>
+        <p:nvCxnSpPr>
+          <p:cNvPr id="142" name="直線矢印コネクタ 28"/>
+          <p:cNvCxnSpPr>
+            <a:stCxn id="163" idx="4"/>
+            <a:endCxn id="153" idx="0"/>
+          </p:cNvCxnSpPr>
+          <p:nvPr/>
+        </p:nvCxnSpPr>
+        <p:spPr>
+          <a:xfrm flipH="1">
+            <a:off x="1554697" y="399927"/>
+            <a:ext cx="2380" cy="203130"/>
+          </a:xfrm>
+          <a:prstGeom prst="straightConnector1">
+            <a:avLst/>
+          </a:prstGeom>
+          <a:ln w="19050">
+            <a:solidFill>
+              <a:schemeClr val="tx1"/>
+            </a:solidFill>
+            <a:tailEnd type="arrow"/>
+          </a:ln>
+        </p:spPr>
+        <p:style>
+          <a:lnRef idx="1">
+            <a:schemeClr val="accent1"/>
+          </a:lnRef>
+          <a:fillRef idx="0">
+            <a:schemeClr val="accent1"/>
+          </a:fillRef>
+          <a:effectRef idx="0">
+            <a:schemeClr val="accent1"/>
+          </a:effectRef>
+          <a:fontRef idx="minor">
+            <a:schemeClr val="tx1"/>
+          </a:fontRef>
+        </p:style>
+      </p:cxnSp>
+      <p:sp>
+        <p:nvSpPr>
+          <p:cNvPr id="150" name="正方形/長方形 149"/>
+          <p:cNvSpPr/>
+          <p:nvPr/>
+        </p:nvSpPr>
+        <p:spPr>
+          <a:xfrm>
+            <a:off x="141677" y="165134"/>
+            <a:ext cx="2810997" cy="1707099"/>
+          </a:xfrm>
+          <a:prstGeom prst="rect">
+            <a:avLst/>
+          </a:prstGeom>
+          <a:noFill/>
+          <a:ln w="28575">
+            <a:solidFill>
+              <a:schemeClr val="tx1"/>
+            </a:solidFill>
+          </a:ln>
+        </p:spPr>
+        <p:style>
+          <a:lnRef idx="2">
+            <a:schemeClr val="accent1">
+              <a:shade val="50000"/>
+            </a:schemeClr>
+          </a:lnRef>
+          <a:fillRef idx="1">
+            <a:schemeClr val="accent1"/>
+          </a:fillRef>
+          <a:effectRef idx="0">
+            <a:schemeClr val="accent1"/>
+          </a:effectRef>
+          <a:fontRef idx="minor">
+            <a:schemeClr val="lt1"/>
+          </a:fontRef>
+        </p:style>
+        <p:txBody>
+          <a:bodyPr lIns="91439" tIns="45720" rIns="91439" bIns="45720" rtlCol="0" anchor="ctr"/>
+          <a:lstStyle/>
+          <a:p>
+            <a:pPr algn="ctr"/>
+            <a:endParaRPr kumimoji="1" lang="ja-JP" altLang="en-US"/>
+          </a:p>
+        </p:txBody>
+      </p:sp>
+      <p:sp>
+        <p:nvSpPr>
+          <p:cNvPr id="151" name="1 つの角を切り取った四角形 150"/>
+          <p:cNvSpPr/>
+          <p:nvPr/>
+        </p:nvSpPr>
+        <p:spPr>
+          <a:xfrm flipV="1">
+            <a:off x="141677" y="173126"/>
+            <a:ext cx="1298830" cy="305136"/>
+          </a:xfrm>
+          <a:prstGeom prst="snip1Rect">
+            <a:avLst>
+              <a:gd name="adj" fmla="val 34304"/>
+            </a:avLst>
+          </a:prstGeom>
+          <a:noFill/>
+          <a:ln w="19050">
+            <a:solidFill>
+              <a:schemeClr val="tx1"/>
+            </a:solidFill>
+          </a:ln>
+        </p:spPr>
+        <p:style>
+          <a:lnRef idx="2">
+            <a:schemeClr val="accent1">
+              <a:shade val="50000"/>
+            </a:schemeClr>
+          </a:lnRef>
+          <a:fillRef idx="1">
+            <a:schemeClr val="accent1"/>
+          </a:fillRef>
+          <a:effectRef idx="0">
+            <a:schemeClr val="accent1"/>
+          </a:effectRef>
+          <a:fontRef idx="minor">
+            <a:schemeClr val="lt1"/>
+          </a:fontRef>
+        </p:style>
+        <p:txBody>
+          <a:bodyPr lIns="91439" tIns="45720" rIns="91439" bIns="45720" rtlCol="0" anchor="ctr"/>
+          <a:lstStyle/>
+          <a:p>
+            <a:pPr algn="ctr"/>
+            <a:endParaRPr kumimoji="1" lang="ja-JP" altLang="en-US" sz="1000" dirty="0"/>
+          </a:p>
+        </p:txBody>
+      </p:sp>
+      <p:sp>
+        <p:nvSpPr>
+          <p:cNvPr id="152" name="正方形/長方形 151"/>
+          <p:cNvSpPr/>
+          <p:nvPr/>
+        </p:nvSpPr>
+        <p:spPr>
+          <a:xfrm>
+            <a:off x="141678" y="153706"/>
+            <a:ext cx="1658869" cy="246221"/>
+          </a:xfrm>
+          <a:prstGeom prst="rect">
+            <a:avLst/>
+          </a:prstGeom>
+        </p:spPr>
+        <p:txBody>
+          <a:bodyPr wrap="square" lIns="91439" tIns="45720" rIns="91439" bIns="45720">
+            <a:spAutoFit/>
+          </a:bodyPr>
+          <a:lstStyle/>
+          <a:p>
+            <a:r>
+              <a:rPr lang="en-US" altLang="ja-JP" sz="1000" dirty="0" smtClean="0"/>
+              <a:t>Junction pseudo state</a:t>
+            </a:r>
+            <a:endParaRPr lang="ja-JP" altLang="en-US" sz="1000" dirty="0"/>
+          </a:p>
+        </p:txBody>
+      </p:sp>
+      <p:sp>
+        <p:nvSpPr>
+          <p:cNvPr id="153" name="角丸四角形 152"/>
+          <p:cNvSpPr/>
+          <p:nvPr/>
+        </p:nvSpPr>
+        <p:spPr>
+          <a:xfrm>
+            <a:off x="811357" y="603057"/>
+            <a:ext cx="1486679" cy="415626"/>
+          </a:xfrm>
+          <a:prstGeom prst="roundRect">
+            <a:avLst/>
+          </a:prstGeom>
+          <a:noFill/>
+          <a:ln w="19050">
+            <a:solidFill>
+              <a:schemeClr val="tx1"/>
+            </a:solidFill>
+          </a:ln>
+        </p:spPr>
+        <p:style>
+          <a:lnRef idx="2">
+            <a:schemeClr val="accent1">
+              <a:shade val="50000"/>
+            </a:schemeClr>
+          </a:lnRef>
+          <a:fillRef idx="1">
+            <a:schemeClr val="accent1"/>
+          </a:fillRef>
+          <a:effectRef idx="0">
+            <a:schemeClr val="accent1"/>
+          </a:effectRef>
+          <a:fontRef idx="minor">
+            <a:schemeClr val="lt1"/>
+          </a:fontRef>
+        </p:style>
+        <p:txBody>
+          <a:bodyPr lIns="91439" tIns="45720" rIns="91439" bIns="45720" rtlCol="0" anchor="t" anchorCtr="0"/>
+          <a:lstStyle/>
+          <a:p>
+            <a:pPr algn="ctr"/>
+            <a:r>
+              <a:rPr lang="en-US" altLang="ja-JP" sz="1000" dirty="0" smtClean="0">
+                <a:solidFill>
+                  <a:schemeClr val="tx1"/>
+                </a:solidFill>
+              </a:rPr>
+              <a:t>State1</a:t>
+            </a:r>
+            <a:endParaRPr lang="ja-JP" altLang="en-US" sz="1000" dirty="0">
+              <a:solidFill>
+                <a:schemeClr val="tx1"/>
+              </a:solidFill>
+            </a:endParaRPr>
+          </a:p>
+        </p:txBody>
+      </p:sp>
+      <p:cxnSp>
+        <p:nvCxnSpPr>
+          <p:cNvPr id="154" name="直線コネクタ 153"/>
+          <p:cNvCxnSpPr/>
+          <p:nvPr/>
+        </p:nvCxnSpPr>
+        <p:spPr>
+          <a:xfrm>
+            <a:off x="816118" y="857110"/>
+            <a:ext cx="1478787" cy="0"/>
+          </a:xfrm>
+          <a:prstGeom prst="line">
+            <a:avLst/>
+          </a:prstGeom>
+          <a:ln w="12700">
+            <a:solidFill>
+              <a:schemeClr val="tx1"/>
+            </a:solidFill>
+          </a:ln>
+        </p:spPr>
+        <p:style>
+          <a:lnRef idx="1">
+            <a:schemeClr val="accent1"/>
+          </a:lnRef>
+          <a:fillRef idx="0">
+            <a:schemeClr val="accent1"/>
+          </a:fillRef>
+          <a:effectRef idx="0">
+            <a:schemeClr val="accent1"/>
+          </a:effectRef>
+          <a:fontRef idx="minor">
+            <a:schemeClr val="tx1"/>
+          </a:fontRef>
+        </p:style>
+      </p:cxnSp>
+      <p:sp>
+        <p:nvSpPr>
+          <p:cNvPr id="163" name="フローチャート : 結合子 162"/>
+          <p:cNvSpPr/>
+          <p:nvPr/>
+        </p:nvSpPr>
+        <p:spPr>
+          <a:xfrm>
+            <a:off x="1485066" y="255907"/>
+            <a:ext cx="144021" cy="144020"/>
+          </a:xfrm>
+          <a:prstGeom prst="flowChartConnector">
+            <a:avLst/>
+          </a:prstGeom>
+          <a:solidFill>
+            <a:schemeClr val="tx1"/>
+          </a:solidFill>
+          <a:ln w="19050">
+            <a:solidFill>
+              <a:schemeClr val="tx1"/>
+            </a:solidFill>
+          </a:ln>
+        </p:spPr>
+        <p:style>
+          <a:lnRef idx="2">
+            <a:schemeClr val="accent1">
+              <a:shade val="50000"/>
+            </a:schemeClr>
+          </a:lnRef>
+          <a:fillRef idx="1">
+            <a:schemeClr val="accent1"/>
+          </a:fillRef>
+          <a:effectRef idx="0">
+            <a:schemeClr val="accent1"/>
+          </a:effectRef>
+          <a:fontRef idx="minor">
+            <a:schemeClr val="lt1"/>
+          </a:fontRef>
+        </p:style>
+        <p:txBody>
+          <a:bodyPr lIns="91439" tIns="45720" rIns="91439" bIns="45720" rtlCol="0" anchor="ctr"/>
+          <a:lstStyle/>
+          <a:p>
+            <a:pPr algn="ctr"/>
+            <a:endParaRPr lang="ja-JP" altLang="en-US" sz="1000"/>
+          </a:p>
+        </p:txBody>
+      </p:sp>
+      <p:sp>
+        <p:nvSpPr>
+          <p:cNvPr id="164" name="正方形/長方形 163"/>
+          <p:cNvSpPr/>
+          <p:nvPr/>
+        </p:nvSpPr>
+        <p:spPr>
+          <a:xfrm>
+            <a:off x="1629087" y="1376816"/>
+            <a:ext cx="1107569" cy="246221"/>
+          </a:xfrm>
+          <a:prstGeom prst="rect">
+            <a:avLst/>
+          </a:prstGeom>
+        </p:spPr>
+        <p:txBody>
+          <a:bodyPr wrap="square" lIns="91439" tIns="45720" rIns="91439" bIns="45720">
+            <a:spAutoFit/>
+          </a:bodyPr>
+          <a:lstStyle/>
+          <a:p>
+            <a:r>
+              <a:rPr lang="en-US" altLang="ja-JP" sz="1000" dirty="0" smtClean="0"/>
+              <a:t>[Gurad1]/Action1 </a:t>
+            </a:r>
+            <a:endParaRPr lang="ja-JP" altLang="en-US" sz="1000" dirty="0"/>
+          </a:p>
+        </p:txBody>
+      </p:sp>
+      <p:cxnSp>
+        <p:nvCxnSpPr>
+          <p:cNvPr id="21" name="直線矢印コネクタ 28"/>
+          <p:cNvCxnSpPr>
+            <a:stCxn id="153" idx="2"/>
+            <a:endCxn id="15" idx="0"/>
+          </p:cNvCxnSpPr>
+          <p:nvPr/>
+        </p:nvCxnSpPr>
+        <p:spPr>
+          <a:xfrm rot="5400000">
+            <a:off x="1388400" y="1184980"/>
+            <a:ext cx="332595" cy="1"/>
+          </a:xfrm>
+          <a:prstGeom prst="bentConnector3">
+            <a:avLst>
+              <a:gd name="adj1" fmla="val 50000"/>
+            </a:avLst>
+          </a:prstGeom>
+          <a:ln w="19050">
+            <a:solidFill>
+              <a:schemeClr val="tx1"/>
+            </a:solidFill>
+            <a:tailEnd type="arrow"/>
+          </a:ln>
+        </p:spPr>
+        <p:style>
+          <a:lnRef idx="1">
+            <a:schemeClr val="accent1"/>
+          </a:lnRef>
+          <a:fillRef idx="0">
+            <a:schemeClr val="accent1"/>
+          </a:fillRef>
+          <a:effectRef idx="0">
+            <a:schemeClr val="accent1"/>
+          </a:effectRef>
+          <a:fontRef idx="minor">
+            <a:schemeClr val="tx1"/>
+          </a:fontRef>
+        </p:style>
+      </p:cxnSp>
+      <p:sp>
+        <p:nvSpPr>
+          <p:cNvPr id="15" name="フローチャート : 結合子 14"/>
+          <p:cNvSpPr/>
+          <p:nvPr/>
+        </p:nvSpPr>
+        <p:spPr>
+          <a:xfrm>
+            <a:off x="1518690" y="1351278"/>
+            <a:ext cx="72012" cy="72011"/>
+          </a:xfrm>
+          <a:prstGeom prst="flowChartConnector">
+            <a:avLst/>
+          </a:prstGeom>
+          <a:solidFill>
+            <a:schemeClr val="tx1"/>
+          </a:solidFill>
+          <a:ln w="19050">
+            <a:solidFill>
+              <a:schemeClr val="tx1"/>
+            </a:solidFill>
+          </a:ln>
+        </p:spPr>
+        <p:style>
+          <a:lnRef idx="2">
+            <a:schemeClr val="accent1">
+              <a:shade val="50000"/>
+            </a:schemeClr>
+          </a:lnRef>
+          <a:fillRef idx="1">
+            <a:schemeClr val="accent1"/>
+          </a:fillRef>
+          <a:effectRef idx="0">
+            <a:schemeClr val="accent1"/>
+          </a:effectRef>
+          <a:fontRef idx="minor">
+            <a:schemeClr val="lt1"/>
+          </a:fontRef>
+        </p:style>
+        <p:txBody>
+          <a:bodyPr lIns="91439" tIns="45720" rIns="91439" bIns="45720" rtlCol="0" anchor="ctr"/>
+          <a:lstStyle/>
+          <a:p>
+            <a:pPr algn="ctr"/>
+            <a:endParaRPr lang="ja-JP" altLang="en-US" sz="1000"/>
+          </a:p>
+        </p:txBody>
+      </p:sp>
+      <p:cxnSp>
+        <p:nvCxnSpPr>
+          <p:cNvPr id="19" name="直線矢印コネクタ 28"/>
+          <p:cNvCxnSpPr>
+            <a:stCxn id="15" idx="2"/>
+            <a:endCxn id="153" idx="1"/>
+          </p:cNvCxnSpPr>
+          <p:nvPr/>
+        </p:nvCxnSpPr>
+        <p:spPr>
+          <a:xfrm rot="10800000">
+            <a:off x="811358" y="810870"/>
+            <a:ext cx="707333" cy="576414"/>
+          </a:xfrm>
+          <a:prstGeom prst="bentConnector3">
+            <a:avLst>
+              <a:gd name="adj1" fmla="val 132319"/>
+            </a:avLst>
+          </a:prstGeom>
+          <a:ln w="19050">
+            <a:solidFill>
+              <a:schemeClr val="tx1"/>
+            </a:solidFill>
+            <a:tailEnd type="arrow"/>
+          </a:ln>
+        </p:spPr>
+        <p:style>
+          <a:lnRef idx="1">
+            <a:schemeClr val="accent1"/>
+          </a:lnRef>
+          <a:fillRef idx="0">
+            <a:schemeClr val="accent1"/>
+          </a:fillRef>
+          <a:effectRef idx="0">
+            <a:schemeClr val="accent1"/>
+          </a:effectRef>
+          <a:fontRef idx="minor">
+            <a:schemeClr val="tx1"/>
+          </a:fontRef>
+        </p:style>
+      </p:cxnSp>
+      <p:cxnSp>
+        <p:nvCxnSpPr>
+          <p:cNvPr id="29" name="直線矢印コネクタ 28"/>
+          <p:cNvCxnSpPr>
+            <a:stCxn id="15" idx="6"/>
+            <a:endCxn id="153" idx="3"/>
+          </p:cNvCxnSpPr>
+          <p:nvPr/>
+        </p:nvCxnSpPr>
+        <p:spPr>
+          <a:xfrm flipV="1">
+            <a:off x="1590702" y="810870"/>
+            <a:ext cx="707334" cy="576414"/>
+          </a:xfrm>
+          <a:prstGeom prst="bentConnector3">
+            <a:avLst>
+              <a:gd name="adj1" fmla="val 132319"/>
+            </a:avLst>
+          </a:prstGeom>
+          <a:ln w="19050">
+            <a:solidFill>
+              <a:schemeClr val="tx1"/>
+            </a:solidFill>
+            <a:tailEnd type="arrow"/>
+          </a:ln>
+        </p:spPr>
+        <p:style>
+          <a:lnRef idx="1">
+            <a:schemeClr val="accent1"/>
+          </a:lnRef>
+          <a:fillRef idx="0">
+            <a:schemeClr val="accent1"/>
+          </a:fillRef>
+          <a:effectRef idx="0">
+            <a:schemeClr val="accent1"/>
+          </a:effectRef>
+          <a:fontRef idx="minor">
+            <a:schemeClr val="tx1"/>
+          </a:fontRef>
+        </p:style>
+      </p:cxnSp>
+      <p:sp>
+        <p:nvSpPr>
+          <p:cNvPr id="33" name="正方形/長方形 32"/>
+          <p:cNvSpPr/>
+          <p:nvPr/>
+        </p:nvSpPr>
+        <p:spPr>
+          <a:xfrm>
+            <a:off x="1550387" y="1032261"/>
+            <a:ext cx="610199" cy="246221"/>
+          </a:xfrm>
+          <a:prstGeom prst="rect">
+            <a:avLst/>
+          </a:prstGeom>
+        </p:spPr>
+        <p:txBody>
+          <a:bodyPr wrap="square" lIns="91439" tIns="45720" rIns="91439" bIns="45720">
+            <a:noAutofit/>
+          </a:bodyPr>
+          <a:lstStyle/>
+          <a:p>
+            <a:r>
+              <a:rPr lang="en-US" altLang="ja-JP" sz="1000" dirty="0" smtClean="0"/>
+              <a:t>Event1</a:t>
+            </a:r>
+            <a:endParaRPr lang="ja-JP" altLang="en-US" sz="1000" dirty="0"/>
+          </a:p>
+        </p:txBody>
+      </p:sp>
+      <p:sp>
+        <p:nvSpPr>
+          <p:cNvPr id="34" name="正方形/長方形 33"/>
+          <p:cNvSpPr/>
+          <p:nvPr/>
+        </p:nvSpPr>
+        <p:spPr>
+          <a:xfrm>
+            <a:off x="398614" y="1376816"/>
+            <a:ext cx="1107569" cy="246221"/>
+          </a:xfrm>
+          <a:prstGeom prst="rect">
+            <a:avLst/>
+          </a:prstGeom>
+        </p:spPr>
+        <p:txBody>
+          <a:bodyPr wrap="square" lIns="91439" tIns="45720" rIns="91439" bIns="45720">
+            <a:spAutoFit/>
+          </a:bodyPr>
+          <a:lstStyle/>
+          <a:p>
+            <a:r>
+              <a:rPr lang="en-US" altLang="ja-JP" sz="1000" dirty="0" smtClean="0"/>
+              <a:t>[Gurad2]/Action2</a:t>
+            </a:r>
+            <a:endParaRPr lang="ja-JP" altLang="en-US" sz="1000" dirty="0"/>
+          </a:p>
+        </p:txBody>
+      </p:sp>
+    </p:spTree>
+    <p:extLst>
+      <p:ext uri="{BB962C8B-B14F-4D97-AF65-F5344CB8AC3E}">
+        <p14:creationId xmlns:p14="http://schemas.microsoft.com/office/powerpoint/2010/main" val="2670608950"/>
+      </p:ext>
+    </p:extLst>
+  </p:cSld>
+  <p:clrMapOvr>
+    <a:masterClrMapping/>
+  </p:clrMapOvr>
+  <p:timing>
+    <p:tnLst>
+      <p:par>
+        <p:cTn id="1" dur="indefinite" restart="never" nodeType="tmRoot"/>
+      </p:par>
+    </p:tnLst>
+  </p:timing>
+</p:sld>
+</file>
+
+<file path=ppt/slides/slide6.xml><?xml version="1.0" encoding="utf-8"?>
+<p:sld xmlns:a="http://schemas.openxmlformats.org/drawingml/2006/main" xmlns:r="http://schemas.openxmlformats.org/officeDocument/2006/relationships" xmlns:p="http://schemas.openxmlformats.org/presentationml/2006/main">
+  <p:cSld>
+    <p:spTree>
+      <p:nvGrpSpPr>
+        <p:cNvPr id="1" name=""/>
+        <p:cNvGrpSpPr/>
+        <p:nvPr/>
+      </p:nvGrpSpPr>
+      <p:grpSpPr>
+        <a:xfrm>
+          <a:off x="0" y="0"/>
+          <a:ext cx="0" cy="0"/>
+          <a:chOff x="0" y="0"/>
+          <a:chExt cx="0" cy="0"/>
+        </a:xfrm>
+      </p:grpSpPr>
+      <p:cxnSp>
+        <p:nvCxnSpPr>
+          <p:cNvPr id="142" name="直線矢印コネクタ 28"/>
+          <p:cNvCxnSpPr>
+            <a:stCxn id="163" idx="4"/>
+            <a:endCxn id="153" idx="0"/>
+          </p:cNvCxnSpPr>
+          <p:nvPr/>
+        </p:nvCxnSpPr>
+        <p:spPr>
+          <a:xfrm flipH="1">
+            <a:off x="1554697" y="399927"/>
+            <a:ext cx="2380" cy="203130"/>
+          </a:xfrm>
+          <a:prstGeom prst="straightConnector1">
+            <a:avLst/>
+          </a:prstGeom>
+          <a:ln w="19050">
+            <a:solidFill>
+              <a:schemeClr val="tx1"/>
+            </a:solidFill>
+            <a:tailEnd type="arrow"/>
+          </a:ln>
+        </p:spPr>
+        <p:style>
+          <a:lnRef idx="1">
+            <a:schemeClr val="accent1"/>
+          </a:lnRef>
+          <a:fillRef idx="0">
+            <a:schemeClr val="accent1"/>
+          </a:fillRef>
+          <a:effectRef idx="0">
+            <a:schemeClr val="accent1"/>
+          </a:effectRef>
+          <a:fontRef idx="minor">
+            <a:schemeClr val="tx1"/>
+          </a:fontRef>
+        </p:style>
+      </p:cxnSp>
+      <p:sp>
+        <p:nvSpPr>
+          <p:cNvPr id="150" name="正方形/長方形 149"/>
+          <p:cNvSpPr/>
+          <p:nvPr/>
+        </p:nvSpPr>
+        <p:spPr>
+          <a:xfrm>
+            <a:off x="141677" y="165134"/>
+            <a:ext cx="3027022" cy="1707099"/>
+          </a:xfrm>
+          <a:prstGeom prst="rect">
+            <a:avLst/>
+          </a:prstGeom>
+          <a:noFill/>
+          <a:ln w="28575">
+            <a:solidFill>
+              <a:schemeClr val="tx1"/>
+            </a:solidFill>
+          </a:ln>
+        </p:spPr>
+        <p:style>
+          <a:lnRef idx="2">
+            <a:schemeClr val="accent1">
+              <a:shade val="50000"/>
+            </a:schemeClr>
+          </a:lnRef>
+          <a:fillRef idx="1">
+            <a:schemeClr val="accent1"/>
+          </a:fillRef>
+          <a:effectRef idx="0">
+            <a:schemeClr val="accent1"/>
+          </a:effectRef>
+          <a:fontRef idx="minor">
+            <a:schemeClr val="lt1"/>
+          </a:fontRef>
+        </p:style>
+        <p:txBody>
+          <a:bodyPr lIns="91439" tIns="45720" rIns="91439" bIns="45720" rtlCol="0" anchor="ctr"/>
+          <a:lstStyle/>
+          <a:p>
+            <a:pPr algn="ctr"/>
+            <a:endParaRPr kumimoji="1" lang="ja-JP" altLang="en-US"/>
+          </a:p>
+        </p:txBody>
+      </p:sp>
+      <p:sp>
+        <p:nvSpPr>
+          <p:cNvPr id="151" name="1 つの角を切り取った四角形 150"/>
+          <p:cNvSpPr/>
+          <p:nvPr/>
+        </p:nvSpPr>
+        <p:spPr>
+          <a:xfrm flipV="1">
+            <a:off x="141677" y="173126"/>
+            <a:ext cx="1298830" cy="305136"/>
+          </a:xfrm>
+          <a:prstGeom prst="snip1Rect">
+            <a:avLst>
+              <a:gd name="adj" fmla="val 34304"/>
+            </a:avLst>
+          </a:prstGeom>
+          <a:noFill/>
+          <a:ln w="19050">
+            <a:solidFill>
+              <a:schemeClr val="tx1"/>
+            </a:solidFill>
+          </a:ln>
+        </p:spPr>
+        <p:style>
+          <a:lnRef idx="2">
+            <a:schemeClr val="accent1">
+              <a:shade val="50000"/>
+            </a:schemeClr>
+          </a:lnRef>
+          <a:fillRef idx="1">
+            <a:schemeClr val="accent1"/>
+          </a:fillRef>
+          <a:effectRef idx="0">
+            <a:schemeClr val="accent1"/>
+          </a:effectRef>
+          <a:fontRef idx="minor">
+            <a:schemeClr val="lt1"/>
+          </a:fontRef>
+        </p:style>
+        <p:txBody>
+          <a:bodyPr lIns="91439" tIns="45720" rIns="91439" bIns="45720" rtlCol="0" anchor="ctr"/>
+          <a:lstStyle/>
+          <a:p>
+            <a:pPr algn="ctr"/>
+            <a:endParaRPr kumimoji="1" lang="ja-JP" altLang="en-US" sz="1000" dirty="0"/>
+          </a:p>
+        </p:txBody>
+      </p:sp>
+      <p:sp>
+        <p:nvSpPr>
+          <p:cNvPr id="152" name="正方形/長方形 151"/>
+          <p:cNvSpPr/>
+          <p:nvPr/>
+        </p:nvSpPr>
+        <p:spPr>
+          <a:xfrm>
+            <a:off x="141678" y="153706"/>
+            <a:ext cx="1658869" cy="246221"/>
+          </a:xfrm>
+          <a:prstGeom prst="rect">
+            <a:avLst/>
+          </a:prstGeom>
+        </p:spPr>
+        <p:txBody>
+          <a:bodyPr wrap="square" lIns="91439" tIns="45720" rIns="91439" bIns="45720">
+            <a:spAutoFit/>
+          </a:bodyPr>
+          <a:lstStyle/>
+          <a:p>
+            <a:r>
+              <a:rPr lang="en-US" altLang="ja-JP" sz="1000" dirty="0" smtClean="0"/>
+              <a:t>Junction pseudo state</a:t>
+            </a:r>
+            <a:endParaRPr lang="ja-JP" altLang="en-US" sz="1000" dirty="0"/>
+          </a:p>
+        </p:txBody>
+      </p:sp>
+      <p:sp>
+        <p:nvSpPr>
+          <p:cNvPr id="153" name="角丸四角形 152"/>
+          <p:cNvSpPr/>
+          <p:nvPr/>
+        </p:nvSpPr>
+        <p:spPr>
+          <a:xfrm>
+            <a:off x="811357" y="603057"/>
+            <a:ext cx="1486679" cy="415626"/>
+          </a:xfrm>
+          <a:prstGeom prst="roundRect">
+            <a:avLst/>
+          </a:prstGeom>
+          <a:noFill/>
+          <a:ln w="19050">
+            <a:solidFill>
+              <a:schemeClr val="tx1"/>
+            </a:solidFill>
+          </a:ln>
+        </p:spPr>
+        <p:style>
+          <a:lnRef idx="2">
+            <a:schemeClr val="accent1">
+              <a:shade val="50000"/>
+            </a:schemeClr>
+          </a:lnRef>
+          <a:fillRef idx="1">
+            <a:schemeClr val="accent1"/>
+          </a:fillRef>
+          <a:effectRef idx="0">
+            <a:schemeClr val="accent1"/>
+          </a:effectRef>
+          <a:fontRef idx="minor">
+            <a:schemeClr val="lt1"/>
+          </a:fontRef>
+        </p:style>
+        <p:txBody>
+          <a:bodyPr lIns="91439" tIns="45720" rIns="91439" bIns="45720" rtlCol="0" anchor="t" anchorCtr="0"/>
+          <a:lstStyle/>
+          <a:p>
+            <a:pPr algn="ctr"/>
+            <a:r>
+              <a:rPr lang="en-US" altLang="ja-JP" sz="1000" dirty="0" smtClean="0">
+                <a:solidFill>
+                  <a:schemeClr val="tx1"/>
+                </a:solidFill>
+              </a:rPr>
+              <a:t>State1</a:t>
+            </a:r>
+            <a:endParaRPr lang="ja-JP" altLang="en-US" sz="1000" dirty="0">
+              <a:solidFill>
+                <a:schemeClr val="tx1"/>
+              </a:solidFill>
+            </a:endParaRPr>
+          </a:p>
+        </p:txBody>
+      </p:sp>
+      <p:cxnSp>
+        <p:nvCxnSpPr>
+          <p:cNvPr id="154" name="直線コネクタ 153"/>
+          <p:cNvCxnSpPr/>
+          <p:nvPr/>
+        </p:nvCxnSpPr>
+        <p:spPr>
+          <a:xfrm>
+            <a:off x="816118" y="857110"/>
+            <a:ext cx="1478787" cy="0"/>
+          </a:xfrm>
+          <a:prstGeom prst="line">
+            <a:avLst/>
+          </a:prstGeom>
+          <a:ln w="12700">
+            <a:solidFill>
+              <a:schemeClr val="tx1"/>
+            </a:solidFill>
+          </a:ln>
+        </p:spPr>
+        <p:style>
+          <a:lnRef idx="1">
+            <a:schemeClr val="accent1"/>
+          </a:lnRef>
+          <a:fillRef idx="0">
+            <a:schemeClr val="accent1"/>
+          </a:fillRef>
+          <a:effectRef idx="0">
+            <a:schemeClr val="accent1"/>
+          </a:effectRef>
+          <a:fontRef idx="minor">
+            <a:schemeClr val="tx1"/>
+          </a:fontRef>
+        </p:style>
+      </p:cxnSp>
+      <p:sp>
+        <p:nvSpPr>
+          <p:cNvPr id="163" name="フローチャート : 結合子 162"/>
+          <p:cNvSpPr/>
+          <p:nvPr/>
+        </p:nvSpPr>
+        <p:spPr>
+          <a:xfrm>
+            <a:off x="1485066" y="255907"/>
+            <a:ext cx="144021" cy="144020"/>
+          </a:xfrm>
+          <a:prstGeom prst="flowChartConnector">
+            <a:avLst/>
+          </a:prstGeom>
+          <a:solidFill>
+            <a:schemeClr val="tx1"/>
+          </a:solidFill>
+          <a:ln w="19050">
+            <a:solidFill>
+              <a:schemeClr val="tx1"/>
+            </a:solidFill>
+          </a:ln>
+        </p:spPr>
+        <p:style>
+          <a:lnRef idx="2">
+            <a:schemeClr val="accent1">
+              <a:shade val="50000"/>
+            </a:schemeClr>
+          </a:lnRef>
+          <a:fillRef idx="1">
+            <a:schemeClr val="accent1"/>
+          </a:fillRef>
+          <a:effectRef idx="0">
+            <a:schemeClr val="accent1"/>
+          </a:effectRef>
+          <a:fontRef idx="minor">
+            <a:schemeClr val="lt1"/>
+          </a:fontRef>
+        </p:style>
+        <p:txBody>
+          <a:bodyPr lIns="91439" tIns="45720" rIns="91439" bIns="45720" rtlCol="0" anchor="ctr"/>
+          <a:lstStyle/>
+          <a:p>
+            <a:pPr algn="ctr"/>
+            <a:endParaRPr lang="ja-JP" altLang="en-US" sz="1000"/>
+          </a:p>
+        </p:txBody>
+      </p:sp>
+      <p:sp>
+        <p:nvSpPr>
+          <p:cNvPr id="164" name="正方形/長方形 163"/>
+          <p:cNvSpPr/>
+          <p:nvPr/>
+        </p:nvSpPr>
+        <p:spPr>
+          <a:xfrm>
+            <a:off x="1656531" y="1296171"/>
+            <a:ext cx="1611620" cy="246221"/>
+          </a:xfrm>
+          <a:prstGeom prst="rect">
+            <a:avLst/>
+          </a:prstGeom>
+        </p:spPr>
+        <p:txBody>
+          <a:bodyPr wrap="square" lIns="91439" tIns="45720" rIns="91439" bIns="45720">
+            <a:spAutoFit/>
+          </a:bodyPr>
+          <a:lstStyle/>
+          <a:p>
+            <a:r>
+              <a:rPr lang="en-US" altLang="ja-JP" sz="1000" dirty="0" smtClean="0"/>
+              <a:t>Event1[Gurad1]/Action1 </a:t>
+            </a:r>
+            <a:endParaRPr lang="ja-JP" altLang="en-US" sz="1000" dirty="0"/>
+          </a:p>
+        </p:txBody>
+      </p:sp>
+      <p:cxnSp>
+        <p:nvCxnSpPr>
+          <p:cNvPr id="19" name="直線矢印コネクタ 28"/>
+          <p:cNvCxnSpPr>
+            <a:endCxn id="153" idx="1"/>
+          </p:cNvCxnSpPr>
+          <p:nvPr/>
+        </p:nvCxnSpPr>
+        <p:spPr>
+          <a:xfrm rot="10800000">
+            <a:off x="811357" y="810871"/>
+            <a:ext cx="629150" cy="485299"/>
+          </a:xfrm>
+          <a:prstGeom prst="bentConnector3">
+            <a:avLst>
+              <a:gd name="adj1" fmla="val 136335"/>
+            </a:avLst>
+          </a:prstGeom>
+          <a:ln w="19050">
+            <a:solidFill>
+              <a:schemeClr val="tx1"/>
+            </a:solidFill>
+            <a:tailEnd type="arrow"/>
+          </a:ln>
+        </p:spPr>
+        <p:style>
+          <a:lnRef idx="1">
+            <a:schemeClr val="accent1"/>
+          </a:lnRef>
+          <a:fillRef idx="0">
+            <a:schemeClr val="accent1"/>
+          </a:fillRef>
+          <a:effectRef idx="0">
+            <a:schemeClr val="accent1"/>
+          </a:effectRef>
+          <a:fontRef idx="minor">
+            <a:schemeClr val="tx1"/>
+          </a:fontRef>
+        </p:style>
+      </p:cxnSp>
+      <p:cxnSp>
+        <p:nvCxnSpPr>
+          <p:cNvPr id="29" name="直線矢印コネクタ 28"/>
+          <p:cNvCxnSpPr>
+            <a:endCxn id="153" idx="3"/>
+          </p:cNvCxnSpPr>
+          <p:nvPr/>
+        </p:nvCxnSpPr>
+        <p:spPr>
+          <a:xfrm flipV="1">
+            <a:off x="1728541" y="810870"/>
+            <a:ext cx="569495" cy="485299"/>
+          </a:xfrm>
+          <a:prstGeom prst="bentConnector3">
+            <a:avLst>
+              <a:gd name="adj1" fmla="val 140141"/>
+            </a:avLst>
+          </a:prstGeom>
+          <a:ln w="19050">
+            <a:solidFill>
+              <a:schemeClr val="tx1"/>
+            </a:solidFill>
+            <a:tailEnd type="arrow"/>
+          </a:ln>
+        </p:spPr>
+        <p:style>
+          <a:lnRef idx="1">
+            <a:schemeClr val="accent1"/>
+          </a:lnRef>
+          <a:fillRef idx="0">
+            <a:schemeClr val="accent1"/>
+          </a:fillRef>
+          <a:effectRef idx="0">
+            <a:schemeClr val="accent1"/>
+          </a:effectRef>
+          <a:fontRef idx="minor">
+            <a:schemeClr val="tx1"/>
+          </a:fontRef>
+        </p:style>
+      </p:cxnSp>
+      <p:sp>
+        <p:nvSpPr>
+          <p:cNvPr id="34" name="正方形/長方形 33"/>
+          <p:cNvSpPr/>
+          <p:nvPr/>
+        </p:nvSpPr>
+        <p:spPr>
+          <a:xfrm>
+            <a:off x="216371" y="1296171"/>
+            <a:ext cx="1735241" cy="246221"/>
+          </a:xfrm>
+          <a:prstGeom prst="rect">
+            <a:avLst/>
+          </a:prstGeom>
+        </p:spPr>
+        <p:txBody>
+          <a:bodyPr wrap="square" lIns="91439" tIns="45720" rIns="91439" bIns="45720">
+            <a:spAutoFit/>
+          </a:bodyPr>
+          <a:lstStyle/>
+          <a:p>
+            <a:r>
+              <a:rPr lang="en-US" altLang="ja-JP" sz="1000" dirty="0" smtClean="0"/>
+              <a:t>Event1[Gurad2]/Action2</a:t>
+            </a:r>
+            <a:endParaRPr lang="ja-JP" altLang="en-US" sz="1000" dirty="0"/>
+          </a:p>
+        </p:txBody>
+      </p:sp>
+      <p:cxnSp>
+        <p:nvCxnSpPr>
+          <p:cNvPr id="10" name="直線コネクタ 9"/>
+          <p:cNvCxnSpPr/>
+          <p:nvPr/>
+        </p:nvCxnSpPr>
+        <p:spPr>
+          <a:xfrm>
+            <a:off x="1728541" y="1018685"/>
+            <a:ext cx="0" cy="277486"/>
+          </a:xfrm>
+          <a:prstGeom prst="line">
+            <a:avLst/>
+          </a:prstGeom>
+          <a:ln w="19050">
+            <a:solidFill>
+              <a:schemeClr val="tx1"/>
+            </a:solidFill>
+          </a:ln>
+        </p:spPr>
+        <p:style>
+          <a:lnRef idx="1">
+            <a:schemeClr val="accent1"/>
+          </a:lnRef>
+          <a:fillRef idx="0">
+            <a:schemeClr val="accent1"/>
+          </a:fillRef>
+          <a:effectRef idx="0">
+            <a:schemeClr val="accent1"/>
+          </a:effectRef>
+          <a:fontRef idx="minor">
+            <a:schemeClr val="tx1"/>
+          </a:fontRef>
+        </p:style>
+      </p:cxnSp>
+      <p:cxnSp>
+        <p:nvCxnSpPr>
+          <p:cNvPr id="25" name="直線コネクタ 24"/>
+          <p:cNvCxnSpPr/>
+          <p:nvPr/>
+        </p:nvCxnSpPr>
+        <p:spPr>
+          <a:xfrm>
+            <a:off x="1440507" y="1018683"/>
+            <a:ext cx="0" cy="277486"/>
+          </a:xfrm>
+          <a:prstGeom prst="line">
+            <a:avLst/>
+          </a:prstGeom>
+          <a:ln w="19050">
+            <a:solidFill>
+              <a:schemeClr val="tx1"/>
+            </a:solidFill>
+          </a:ln>
+        </p:spPr>
+        <p:style>
+          <a:lnRef idx="1">
+            <a:schemeClr val="accent1"/>
+          </a:lnRef>
+          <a:fillRef idx="0">
+            <a:schemeClr val="accent1"/>
+          </a:fillRef>
+          <a:effectRef idx="0">
+            <a:schemeClr val="accent1"/>
+          </a:effectRef>
+          <a:fontRef idx="minor">
+            <a:schemeClr val="tx1"/>
+          </a:fontRef>
+        </p:style>
+      </p:cxnSp>
+    </p:spTree>
+    <p:extLst>
+      <p:ext uri="{BB962C8B-B14F-4D97-AF65-F5344CB8AC3E}">
+        <p14:creationId xmlns:p14="http://schemas.microsoft.com/office/powerpoint/2010/main" val="3748996356"/>
+      </p:ext>
+    </p:extLst>
+  </p:cSld>
+  <p:clrMapOvr>
+    <a:masterClrMapping/>
+  </p:clrMapOvr>
+  <p:timing>
+    <p:tnLst>
+      <p:par>
+        <p:cTn id="1" dur="indefinite" restart="never" nodeType="tmRoot"/>
+      </p:par>
+    </p:tnLst>
+  </p:timing>
+</p:sld>
+</file>
+
+<file path=ppt/slides/slide7.xml><?xml version="1.0" encoding="utf-8"?>
 <p:sld xmlns:a="http://schemas.openxmlformats.org/drawingml/2006/main" xmlns:r="http://schemas.openxmlformats.org/officeDocument/2006/relationships" xmlns:p="http://schemas.openxmlformats.org/presentationml/2006/main">
   <p:cSld>
     <p:spTree>

</xml_diff>

<commit_message>
Add defer event examples.
</commit_message>
<xml_diff>
--- a/boost_training/msm/fig.pptx
+++ b/boost_training/msm/fig.pptx
@@ -5,7 +5,7 @@
     <p:sldMasterId id="2147483648" r:id="rId1"/>
   </p:sldMasterIdLst>
   <p:notesMasterIdLst>
-    <p:notesMasterId r:id="rId13"/>
+    <p:notesMasterId r:id="rId15"/>
   </p:notesMasterIdLst>
   <p:sldIdLst>
     <p:sldId id="257" r:id="rId2"/>
@@ -18,7 +18,9 @@
     <p:sldId id="265" r:id="rId9"/>
     <p:sldId id="267" r:id="rId10"/>
     <p:sldId id="268" r:id="rId11"/>
-    <p:sldId id="258" r:id="rId12"/>
+    <p:sldId id="269" r:id="rId12"/>
+    <p:sldId id="270" r:id="rId13"/>
+    <p:sldId id="258" r:id="rId14"/>
   </p:sldIdLst>
   <p:sldSz cx="4321175" cy="3600450"/>
   <p:notesSz cx="6858000" cy="9144000"/>
@@ -202,7 +204,7 @@
           <a:p>
             <a:fld id="{33E477F9-361B-4780-B227-665A41208240}" type="datetimeFigureOut">
               <a:rPr kumimoji="1" lang="ja-JP" altLang="en-US" smtClean="0"/>
-              <a:t>2012/2/15</a:t>
+              <a:t>2012/2/20</a:t>
             </a:fld>
             <a:endParaRPr kumimoji="1" lang="ja-JP" altLang="en-US"/>
           </a:p>
@@ -769,6 +771,184 @@
 </p:notes>
 </file>
 
+<file path=ppt/notesSlides/notesSlide12.xml><?xml version="1.0" encoding="utf-8"?>
+<p:notes xmlns:a="http://schemas.openxmlformats.org/drawingml/2006/main" xmlns:r="http://schemas.openxmlformats.org/officeDocument/2006/relationships" xmlns:p="http://schemas.openxmlformats.org/presentationml/2006/main">
+  <p:cSld>
+    <p:spTree>
+      <p:nvGrpSpPr>
+        <p:cNvPr id="1" name=""/>
+        <p:cNvGrpSpPr/>
+        <p:nvPr/>
+      </p:nvGrpSpPr>
+      <p:grpSpPr>
+        <a:xfrm>
+          <a:off x="0" y="0"/>
+          <a:ext cx="0" cy="0"/>
+          <a:chOff x="0" y="0"/>
+          <a:chExt cx="0" cy="0"/>
+        </a:xfrm>
+      </p:grpSpPr>
+      <p:sp>
+        <p:nvSpPr>
+          <p:cNvPr id="2" name="スライド イメージ プレースホルダー 1"/>
+          <p:cNvSpPr>
+            <a:spLocks noGrp="1" noRot="1" noChangeAspect="1"/>
+          </p:cNvSpPr>
+          <p:nvPr>
+            <p:ph type="sldImg"/>
+          </p:nvPr>
+        </p:nvSpPr>
+        <p:spPr>
+          <a:xfrm>
+            <a:off x="1371600" y="685800"/>
+            <a:ext cx="4114800" cy="3429000"/>
+          </a:xfrm>
+        </p:spPr>
+      </p:sp>
+      <p:sp>
+        <p:nvSpPr>
+          <p:cNvPr id="3" name="ノート プレースホルダー 2"/>
+          <p:cNvSpPr>
+            <a:spLocks noGrp="1"/>
+          </p:cNvSpPr>
+          <p:nvPr>
+            <p:ph type="body" idx="1"/>
+          </p:nvPr>
+        </p:nvSpPr>
+        <p:spPr/>
+        <p:txBody>
+          <a:bodyPr/>
+          <a:lstStyle/>
+          <a:p>
+            <a:endParaRPr kumimoji="1" lang="ja-JP" altLang="en-US" dirty="0"/>
+          </a:p>
+        </p:txBody>
+      </p:sp>
+      <p:sp>
+        <p:nvSpPr>
+          <p:cNvPr id="4" name="スライド番号プレースホルダー 3"/>
+          <p:cNvSpPr>
+            <a:spLocks noGrp="1"/>
+          </p:cNvSpPr>
+          <p:nvPr>
+            <p:ph type="sldNum" sz="quarter" idx="10"/>
+          </p:nvPr>
+        </p:nvSpPr>
+        <p:spPr/>
+        <p:txBody>
+          <a:bodyPr/>
+          <a:lstStyle/>
+          <a:p>
+            <a:fld id="{528CE6EB-F52D-476C-B1B9-A71D981A6739}" type="slidenum">
+              <a:rPr kumimoji="1" lang="ja-JP" altLang="en-US" smtClean="0"/>
+              <a:t>12</a:t>
+            </a:fld>
+            <a:endParaRPr kumimoji="1" lang="ja-JP" altLang="en-US" dirty="0"/>
+          </a:p>
+        </p:txBody>
+      </p:sp>
+    </p:spTree>
+    <p:extLst>
+      <p:ext uri="{BB962C8B-B14F-4D97-AF65-F5344CB8AC3E}">
+        <p14:creationId xmlns:p14="http://schemas.microsoft.com/office/powerpoint/2010/main" val="421502639"/>
+      </p:ext>
+    </p:extLst>
+  </p:cSld>
+  <p:clrMapOvr>
+    <a:masterClrMapping/>
+  </p:clrMapOvr>
+</p:notes>
+</file>
+
+<file path=ppt/notesSlides/notesSlide13.xml><?xml version="1.0" encoding="utf-8"?>
+<p:notes xmlns:a="http://schemas.openxmlformats.org/drawingml/2006/main" xmlns:r="http://schemas.openxmlformats.org/officeDocument/2006/relationships" xmlns:p="http://schemas.openxmlformats.org/presentationml/2006/main">
+  <p:cSld>
+    <p:spTree>
+      <p:nvGrpSpPr>
+        <p:cNvPr id="1" name=""/>
+        <p:cNvGrpSpPr/>
+        <p:nvPr/>
+      </p:nvGrpSpPr>
+      <p:grpSpPr>
+        <a:xfrm>
+          <a:off x="0" y="0"/>
+          <a:ext cx="0" cy="0"/>
+          <a:chOff x="0" y="0"/>
+          <a:chExt cx="0" cy="0"/>
+        </a:xfrm>
+      </p:grpSpPr>
+      <p:sp>
+        <p:nvSpPr>
+          <p:cNvPr id="2" name="スライド イメージ プレースホルダー 1"/>
+          <p:cNvSpPr>
+            <a:spLocks noGrp="1" noRot="1" noChangeAspect="1"/>
+          </p:cNvSpPr>
+          <p:nvPr>
+            <p:ph type="sldImg"/>
+          </p:nvPr>
+        </p:nvSpPr>
+        <p:spPr>
+          <a:xfrm>
+            <a:off x="1371600" y="685800"/>
+            <a:ext cx="4114800" cy="3429000"/>
+          </a:xfrm>
+        </p:spPr>
+      </p:sp>
+      <p:sp>
+        <p:nvSpPr>
+          <p:cNvPr id="3" name="ノート プレースホルダー 2"/>
+          <p:cNvSpPr>
+            <a:spLocks noGrp="1"/>
+          </p:cNvSpPr>
+          <p:nvPr>
+            <p:ph type="body" idx="1"/>
+          </p:nvPr>
+        </p:nvSpPr>
+        <p:spPr/>
+        <p:txBody>
+          <a:bodyPr/>
+          <a:lstStyle/>
+          <a:p>
+            <a:endParaRPr kumimoji="1" lang="ja-JP" altLang="en-US" dirty="0"/>
+          </a:p>
+        </p:txBody>
+      </p:sp>
+      <p:sp>
+        <p:nvSpPr>
+          <p:cNvPr id="4" name="スライド番号プレースホルダー 3"/>
+          <p:cNvSpPr>
+            <a:spLocks noGrp="1"/>
+          </p:cNvSpPr>
+          <p:nvPr>
+            <p:ph type="sldNum" sz="quarter" idx="10"/>
+          </p:nvPr>
+        </p:nvSpPr>
+        <p:spPr/>
+        <p:txBody>
+          <a:bodyPr/>
+          <a:lstStyle/>
+          <a:p>
+            <a:fld id="{528CE6EB-F52D-476C-B1B9-A71D981A6739}" type="slidenum">
+              <a:rPr kumimoji="1" lang="ja-JP" altLang="en-US" smtClean="0"/>
+              <a:t>13</a:t>
+            </a:fld>
+            <a:endParaRPr kumimoji="1" lang="ja-JP" altLang="en-US" dirty="0"/>
+          </a:p>
+        </p:txBody>
+      </p:sp>
+    </p:spTree>
+    <p:extLst>
+      <p:ext uri="{BB962C8B-B14F-4D97-AF65-F5344CB8AC3E}">
+        <p14:creationId xmlns:p14="http://schemas.microsoft.com/office/powerpoint/2010/main" val="421502639"/>
+      </p:ext>
+    </p:extLst>
+  </p:cSld>
+  <p:clrMapOvr>
+    <a:masterClrMapping/>
+  </p:clrMapOvr>
+</p:notes>
+</file>
+
 <file path=ppt/notesSlides/notesSlide2.xml><?xml version="1.0" encoding="utf-8"?>
 <p:notes xmlns:a="http://schemas.openxmlformats.org/drawingml/2006/main" xmlns:r="http://schemas.openxmlformats.org/officeDocument/2006/relationships" xmlns:p="http://schemas.openxmlformats.org/presentationml/2006/main">
   <p:cSld>
@@ -1662,7 +1842,7 @@
           <a:p>
             <a:fld id="{E90ED720-0104-4369-84BC-D37694168613}" type="datetimeFigureOut">
               <a:rPr kumimoji="1" lang="ja-JP" altLang="en-US" smtClean="0"/>
-              <a:t>2012/2/15</a:t>
+              <a:t>2012/2/20</a:t>
             </a:fld>
             <a:endParaRPr kumimoji="1" lang="ja-JP" altLang="en-US"/>
           </a:p>
@@ -1859,7 +2039,7 @@
           <a:p>
             <a:fld id="{E90ED720-0104-4369-84BC-D37694168613}" type="datetimeFigureOut">
               <a:rPr kumimoji="1" lang="ja-JP" altLang="en-US" smtClean="0"/>
-              <a:t>2012/2/15</a:t>
+              <a:t>2012/2/20</a:t>
             </a:fld>
             <a:endParaRPr kumimoji="1" lang="ja-JP" altLang="en-US"/>
           </a:p>
@@ -2066,7 +2246,7 @@
           <a:p>
             <a:fld id="{E90ED720-0104-4369-84BC-D37694168613}" type="datetimeFigureOut">
               <a:rPr kumimoji="1" lang="ja-JP" altLang="en-US" smtClean="0"/>
-              <a:t>2012/2/15</a:t>
+              <a:t>2012/2/20</a:t>
             </a:fld>
             <a:endParaRPr kumimoji="1" lang="ja-JP" altLang="en-US"/>
           </a:p>
@@ -2263,7 +2443,7 @@
           <a:p>
             <a:fld id="{E90ED720-0104-4369-84BC-D37694168613}" type="datetimeFigureOut">
               <a:rPr kumimoji="1" lang="ja-JP" altLang="en-US" smtClean="0"/>
-              <a:t>2012/2/15</a:t>
+              <a:t>2012/2/20</a:t>
             </a:fld>
             <a:endParaRPr kumimoji="1" lang="ja-JP" altLang="en-US"/>
           </a:p>
@@ -2504,7 +2684,7 @@
           <a:p>
             <a:fld id="{E90ED720-0104-4369-84BC-D37694168613}" type="datetimeFigureOut">
               <a:rPr kumimoji="1" lang="ja-JP" altLang="en-US" smtClean="0"/>
-              <a:t>2012/2/15</a:t>
+              <a:t>2012/2/20</a:t>
             </a:fld>
             <a:endParaRPr kumimoji="1" lang="ja-JP" altLang="en-US"/>
           </a:p>
@@ -2851,7 +3031,7 @@
           <a:p>
             <a:fld id="{E90ED720-0104-4369-84BC-D37694168613}" type="datetimeFigureOut">
               <a:rPr kumimoji="1" lang="ja-JP" altLang="en-US" smtClean="0"/>
-              <a:t>2012/2/15</a:t>
+              <a:t>2012/2/20</a:t>
             </a:fld>
             <a:endParaRPr kumimoji="1" lang="ja-JP" altLang="en-US"/>
           </a:p>
@@ -3332,7 +3512,7 @@
           <a:p>
             <a:fld id="{E90ED720-0104-4369-84BC-D37694168613}" type="datetimeFigureOut">
               <a:rPr kumimoji="1" lang="ja-JP" altLang="en-US" smtClean="0"/>
-              <a:t>2012/2/15</a:t>
+              <a:t>2012/2/20</a:t>
             </a:fld>
             <a:endParaRPr kumimoji="1" lang="ja-JP" altLang="en-US"/>
           </a:p>
@@ -3445,7 +3625,7 @@
           <a:p>
             <a:fld id="{E90ED720-0104-4369-84BC-D37694168613}" type="datetimeFigureOut">
               <a:rPr kumimoji="1" lang="ja-JP" altLang="en-US" smtClean="0"/>
-              <a:t>2012/2/15</a:t>
+              <a:t>2012/2/20</a:t>
             </a:fld>
             <a:endParaRPr kumimoji="1" lang="ja-JP" altLang="en-US"/>
           </a:p>
@@ -3535,7 +3715,7 @@
           <a:p>
             <a:fld id="{E90ED720-0104-4369-84BC-D37694168613}" type="datetimeFigureOut">
               <a:rPr kumimoji="1" lang="ja-JP" altLang="en-US" smtClean="0"/>
-              <a:t>2012/2/15</a:t>
+              <a:t>2012/2/20</a:t>
             </a:fld>
             <a:endParaRPr kumimoji="1" lang="ja-JP" altLang="en-US"/>
           </a:p>
@@ -3839,7 +4019,7 @@
           <a:p>
             <a:fld id="{E90ED720-0104-4369-84BC-D37694168613}" type="datetimeFigureOut">
               <a:rPr kumimoji="1" lang="ja-JP" altLang="en-US" smtClean="0"/>
-              <a:t>2012/2/15</a:t>
+              <a:t>2012/2/20</a:t>
             </a:fld>
             <a:endParaRPr kumimoji="1" lang="ja-JP" altLang="en-US"/>
           </a:p>
@@ -4087,7 +4267,7 @@
           <a:p>
             <a:fld id="{E90ED720-0104-4369-84BC-D37694168613}" type="datetimeFigureOut">
               <a:rPr kumimoji="1" lang="ja-JP" altLang="en-US" smtClean="0"/>
-              <a:t>2012/2/15</a:t>
+              <a:t>2012/2/20</a:t>
             </a:fld>
             <a:endParaRPr kumimoji="1" lang="ja-JP" altLang="en-US"/>
           </a:p>
@@ -4327,7 +4507,7 @@
           <a:p>
             <a:fld id="{E90ED720-0104-4369-84BC-D37694168613}" type="datetimeFigureOut">
               <a:rPr kumimoji="1" lang="ja-JP" altLang="en-US" smtClean="0"/>
-              <a:t>2012/2/15</a:t>
+              <a:t>2012/2/20</a:t>
             </a:fld>
             <a:endParaRPr kumimoji="1" lang="ja-JP" altLang="en-US"/>
           </a:p>
@@ -5946,6 +6126,2407 @@
 </file>
 
 <file path=ppt/slides/slide11.xml><?xml version="1.0" encoding="utf-8"?>
+<p:sld xmlns:a="http://schemas.openxmlformats.org/drawingml/2006/main" xmlns:r="http://schemas.openxmlformats.org/officeDocument/2006/relationships" xmlns:p="http://schemas.openxmlformats.org/presentationml/2006/main">
+  <p:cSld>
+    <p:spTree>
+      <p:nvGrpSpPr>
+        <p:cNvPr id="1" name=""/>
+        <p:cNvGrpSpPr/>
+        <p:nvPr/>
+      </p:nvGrpSpPr>
+      <p:grpSpPr>
+        <a:xfrm>
+          <a:off x="0" y="0"/>
+          <a:ext cx="0" cy="0"/>
+          <a:chOff x="0" y="0"/>
+          <a:chExt cx="0" cy="0"/>
+        </a:xfrm>
+      </p:grpSpPr>
+      <p:cxnSp>
+        <p:nvCxnSpPr>
+          <p:cNvPr id="142" name="直線矢印コネクタ 28"/>
+          <p:cNvCxnSpPr>
+            <a:stCxn id="163" idx="4"/>
+            <a:endCxn id="153" idx="0"/>
+          </p:cNvCxnSpPr>
+          <p:nvPr/>
+        </p:nvCxnSpPr>
+        <p:spPr>
+          <a:xfrm>
+            <a:off x="1631004" y="646148"/>
+            <a:ext cx="1" cy="203130"/>
+          </a:xfrm>
+          <a:prstGeom prst="straightConnector1">
+            <a:avLst/>
+          </a:prstGeom>
+          <a:ln w="19050">
+            <a:solidFill>
+              <a:schemeClr val="tx1"/>
+            </a:solidFill>
+            <a:tailEnd type="arrow"/>
+          </a:ln>
+        </p:spPr>
+        <p:style>
+          <a:lnRef idx="1">
+            <a:schemeClr val="accent1"/>
+          </a:lnRef>
+          <a:fillRef idx="0">
+            <a:schemeClr val="accent1"/>
+          </a:fillRef>
+          <a:effectRef idx="0">
+            <a:schemeClr val="accent1"/>
+          </a:effectRef>
+          <a:fontRef idx="minor">
+            <a:schemeClr val="tx1"/>
+          </a:fontRef>
+        </p:style>
+      </p:cxnSp>
+      <p:sp>
+        <p:nvSpPr>
+          <p:cNvPr id="150" name="正方形/長方形 149"/>
+          <p:cNvSpPr/>
+          <p:nvPr/>
+        </p:nvSpPr>
+        <p:spPr>
+          <a:xfrm>
+            <a:off x="141677" y="165134"/>
+            <a:ext cx="4035134" cy="3291275"/>
+          </a:xfrm>
+          <a:prstGeom prst="rect">
+            <a:avLst/>
+          </a:prstGeom>
+          <a:noFill/>
+          <a:ln w="28575">
+            <a:solidFill>
+              <a:schemeClr val="tx1"/>
+            </a:solidFill>
+          </a:ln>
+        </p:spPr>
+        <p:style>
+          <a:lnRef idx="2">
+            <a:schemeClr val="accent1">
+              <a:shade val="50000"/>
+            </a:schemeClr>
+          </a:lnRef>
+          <a:fillRef idx="1">
+            <a:schemeClr val="accent1"/>
+          </a:fillRef>
+          <a:effectRef idx="0">
+            <a:schemeClr val="accent1"/>
+          </a:effectRef>
+          <a:fontRef idx="minor">
+            <a:schemeClr val="lt1"/>
+          </a:fontRef>
+        </p:style>
+        <p:txBody>
+          <a:bodyPr lIns="91439" tIns="45720" rIns="91439" bIns="45720" rtlCol="0" anchor="ctr"/>
+          <a:lstStyle/>
+          <a:p>
+            <a:pPr algn="ctr"/>
+            <a:endParaRPr kumimoji="1" lang="ja-JP" altLang="en-US"/>
+          </a:p>
+        </p:txBody>
+      </p:sp>
+      <p:sp>
+        <p:nvSpPr>
+          <p:cNvPr id="151" name="1 つの角を切り取った四角形 150"/>
+          <p:cNvSpPr/>
+          <p:nvPr/>
+        </p:nvSpPr>
+        <p:spPr>
+          <a:xfrm flipV="1">
+            <a:off x="141677" y="173126"/>
+            <a:ext cx="1298830" cy="305136"/>
+          </a:xfrm>
+          <a:prstGeom prst="snip1Rect">
+            <a:avLst>
+              <a:gd name="adj" fmla="val 34304"/>
+            </a:avLst>
+          </a:prstGeom>
+          <a:noFill/>
+          <a:ln w="19050">
+            <a:solidFill>
+              <a:schemeClr val="tx1"/>
+            </a:solidFill>
+          </a:ln>
+        </p:spPr>
+        <p:style>
+          <a:lnRef idx="2">
+            <a:schemeClr val="accent1">
+              <a:shade val="50000"/>
+            </a:schemeClr>
+          </a:lnRef>
+          <a:fillRef idx="1">
+            <a:schemeClr val="accent1"/>
+          </a:fillRef>
+          <a:effectRef idx="0">
+            <a:schemeClr val="accent1"/>
+          </a:effectRef>
+          <a:fontRef idx="minor">
+            <a:schemeClr val="lt1"/>
+          </a:fontRef>
+        </p:style>
+        <p:txBody>
+          <a:bodyPr lIns="91439" tIns="45720" rIns="91439" bIns="45720" rtlCol="0" anchor="ctr"/>
+          <a:lstStyle/>
+          <a:p>
+            <a:pPr algn="ctr"/>
+            <a:endParaRPr kumimoji="1" lang="ja-JP" altLang="en-US" sz="1000" dirty="0"/>
+          </a:p>
+        </p:txBody>
+      </p:sp>
+      <p:sp>
+        <p:nvSpPr>
+          <p:cNvPr id="152" name="正方形/長方形 151"/>
+          <p:cNvSpPr/>
+          <p:nvPr/>
+        </p:nvSpPr>
+        <p:spPr>
+          <a:xfrm>
+            <a:off x="141678" y="153706"/>
+            <a:ext cx="1658869" cy="246221"/>
+          </a:xfrm>
+          <a:prstGeom prst="rect">
+            <a:avLst/>
+          </a:prstGeom>
+        </p:spPr>
+        <p:txBody>
+          <a:bodyPr wrap="square" lIns="91439" tIns="45720" rIns="91439" bIns="45720">
+            <a:spAutoFit/>
+          </a:bodyPr>
+          <a:lstStyle/>
+          <a:p>
+            <a:r>
+              <a:rPr lang="en-US" altLang="ja-JP" sz="1000" dirty="0" smtClean="0"/>
+              <a:t>Defer event</a:t>
+            </a:r>
+            <a:endParaRPr lang="ja-JP" altLang="en-US" sz="1000" dirty="0"/>
+          </a:p>
+        </p:txBody>
+      </p:sp>
+      <p:sp>
+        <p:nvSpPr>
+          <p:cNvPr id="153" name="角丸四角形 152"/>
+          <p:cNvSpPr/>
+          <p:nvPr/>
+        </p:nvSpPr>
+        <p:spPr>
+          <a:xfrm>
+            <a:off x="1097264" y="849278"/>
+            <a:ext cx="1067481" cy="538736"/>
+          </a:xfrm>
+          <a:prstGeom prst="roundRect">
+            <a:avLst/>
+          </a:prstGeom>
+          <a:noFill/>
+          <a:ln w="19050">
+            <a:solidFill>
+              <a:schemeClr val="tx1"/>
+            </a:solidFill>
+          </a:ln>
+        </p:spPr>
+        <p:style>
+          <a:lnRef idx="2">
+            <a:schemeClr val="accent1">
+              <a:shade val="50000"/>
+            </a:schemeClr>
+          </a:lnRef>
+          <a:fillRef idx="1">
+            <a:schemeClr val="accent1"/>
+          </a:fillRef>
+          <a:effectRef idx="0">
+            <a:schemeClr val="accent1"/>
+          </a:effectRef>
+          <a:fontRef idx="minor">
+            <a:schemeClr val="lt1"/>
+          </a:fontRef>
+        </p:style>
+        <p:txBody>
+          <a:bodyPr lIns="91439" tIns="45720" rIns="91439" bIns="45720" rtlCol="0" anchor="t" anchorCtr="0"/>
+          <a:lstStyle/>
+          <a:p>
+            <a:pPr algn="ctr"/>
+            <a:r>
+              <a:rPr lang="en-US" altLang="ja-JP" sz="1000" dirty="0" smtClean="0">
+                <a:solidFill>
+                  <a:schemeClr val="tx1"/>
+                </a:solidFill>
+              </a:rPr>
+              <a:t>State1</a:t>
+            </a:r>
+            <a:endParaRPr lang="ja-JP" altLang="en-US" sz="1000" dirty="0">
+              <a:solidFill>
+                <a:schemeClr val="tx1"/>
+              </a:solidFill>
+            </a:endParaRPr>
+          </a:p>
+        </p:txBody>
+      </p:sp>
+      <p:cxnSp>
+        <p:nvCxnSpPr>
+          <p:cNvPr id="154" name="直線コネクタ 153"/>
+          <p:cNvCxnSpPr/>
+          <p:nvPr/>
+        </p:nvCxnSpPr>
+        <p:spPr>
+          <a:xfrm>
+            <a:off x="1102025" y="1103331"/>
+            <a:ext cx="1058562" cy="0"/>
+          </a:xfrm>
+          <a:prstGeom prst="line">
+            <a:avLst/>
+          </a:prstGeom>
+          <a:ln w="12700">
+            <a:solidFill>
+              <a:schemeClr val="tx1"/>
+            </a:solidFill>
+          </a:ln>
+        </p:spPr>
+        <p:style>
+          <a:lnRef idx="1">
+            <a:schemeClr val="accent1"/>
+          </a:lnRef>
+          <a:fillRef idx="0">
+            <a:schemeClr val="accent1"/>
+          </a:fillRef>
+          <a:effectRef idx="0">
+            <a:schemeClr val="accent1"/>
+          </a:effectRef>
+          <a:fontRef idx="minor">
+            <a:schemeClr val="tx1"/>
+          </a:fontRef>
+        </p:style>
+      </p:cxnSp>
+      <p:sp>
+        <p:nvSpPr>
+          <p:cNvPr id="163" name="フローチャート : 結合子 162"/>
+          <p:cNvSpPr/>
+          <p:nvPr/>
+        </p:nvSpPr>
+        <p:spPr>
+          <a:xfrm>
+            <a:off x="1558993" y="502128"/>
+            <a:ext cx="144021" cy="144020"/>
+          </a:xfrm>
+          <a:prstGeom prst="flowChartConnector">
+            <a:avLst/>
+          </a:prstGeom>
+          <a:solidFill>
+            <a:schemeClr val="tx1"/>
+          </a:solidFill>
+          <a:ln w="19050">
+            <a:solidFill>
+              <a:schemeClr val="tx1"/>
+            </a:solidFill>
+          </a:ln>
+        </p:spPr>
+        <p:style>
+          <a:lnRef idx="2">
+            <a:schemeClr val="accent1">
+              <a:shade val="50000"/>
+            </a:schemeClr>
+          </a:lnRef>
+          <a:fillRef idx="1">
+            <a:schemeClr val="accent1"/>
+          </a:fillRef>
+          <a:effectRef idx="0">
+            <a:schemeClr val="accent1"/>
+          </a:effectRef>
+          <a:fontRef idx="minor">
+            <a:schemeClr val="lt1"/>
+          </a:fontRef>
+        </p:style>
+        <p:txBody>
+          <a:bodyPr lIns="91439" tIns="45720" rIns="91439" bIns="45720" rtlCol="0" anchor="ctr"/>
+          <a:lstStyle/>
+          <a:p>
+            <a:pPr algn="ctr"/>
+            <a:endParaRPr lang="ja-JP" altLang="en-US" sz="1000"/>
+          </a:p>
+        </p:txBody>
+      </p:sp>
+      <p:cxnSp>
+        <p:nvCxnSpPr>
+          <p:cNvPr id="21" name="直線矢印コネクタ 28"/>
+          <p:cNvCxnSpPr>
+            <a:stCxn id="153" idx="2"/>
+            <a:endCxn id="27" idx="0"/>
+          </p:cNvCxnSpPr>
+          <p:nvPr/>
+        </p:nvCxnSpPr>
+        <p:spPr>
+          <a:xfrm>
+            <a:off x="1631005" y="1388014"/>
+            <a:ext cx="4761" cy="268195"/>
+          </a:xfrm>
+          <a:prstGeom prst="straightConnector1">
+            <a:avLst/>
+          </a:prstGeom>
+          <a:ln w="19050">
+            <a:solidFill>
+              <a:schemeClr val="tx1"/>
+            </a:solidFill>
+            <a:tailEnd type="arrow"/>
+          </a:ln>
+        </p:spPr>
+        <p:style>
+          <a:lnRef idx="1">
+            <a:schemeClr val="accent1"/>
+          </a:lnRef>
+          <a:fillRef idx="0">
+            <a:schemeClr val="accent1"/>
+          </a:fillRef>
+          <a:effectRef idx="0">
+            <a:schemeClr val="accent1"/>
+          </a:effectRef>
+          <a:fontRef idx="minor">
+            <a:schemeClr val="tx1"/>
+          </a:fontRef>
+        </p:style>
+      </p:cxnSp>
+      <p:sp>
+        <p:nvSpPr>
+          <p:cNvPr id="34" name="正方形/長方形 33"/>
+          <p:cNvSpPr/>
+          <p:nvPr/>
+        </p:nvSpPr>
+        <p:spPr>
+          <a:xfrm>
+            <a:off x="1130152" y="1368177"/>
+            <a:ext cx="670395" cy="246221"/>
+          </a:xfrm>
+          <a:prstGeom prst="rect">
+            <a:avLst/>
+          </a:prstGeom>
+        </p:spPr>
+        <p:txBody>
+          <a:bodyPr wrap="square" lIns="91439" tIns="45720" rIns="91439" bIns="45720">
+            <a:spAutoFit/>
+          </a:bodyPr>
+          <a:lstStyle/>
+          <a:p>
+            <a:r>
+              <a:rPr lang="en-US" altLang="ja-JP" sz="1000" dirty="0" smtClean="0"/>
+              <a:t>Event2</a:t>
+            </a:r>
+            <a:endParaRPr lang="ja-JP" altLang="en-US" sz="1000" dirty="0"/>
+          </a:p>
+        </p:txBody>
+      </p:sp>
+      <p:sp>
+        <p:nvSpPr>
+          <p:cNvPr id="26" name="正方形/長方形 25"/>
+          <p:cNvSpPr/>
+          <p:nvPr/>
+        </p:nvSpPr>
+        <p:spPr>
+          <a:xfrm>
+            <a:off x="1097264" y="1103331"/>
+            <a:ext cx="1150005" cy="161573"/>
+          </a:xfrm>
+          <a:prstGeom prst="rect">
+            <a:avLst/>
+          </a:prstGeom>
+        </p:spPr>
+        <p:txBody>
+          <a:bodyPr wrap="square" lIns="91439" tIns="45720" rIns="91439" bIns="45720">
+            <a:noAutofit/>
+          </a:bodyPr>
+          <a:lstStyle/>
+          <a:p>
+            <a:r>
+              <a:rPr lang="en-US" altLang="ja-JP" sz="1000" dirty="0" smtClean="0"/>
+              <a:t>Event1/defer</a:t>
+            </a:r>
+            <a:endParaRPr lang="ja-JP" altLang="en-US" sz="1000" dirty="0"/>
+          </a:p>
+        </p:txBody>
+      </p:sp>
+      <p:sp>
+        <p:nvSpPr>
+          <p:cNvPr id="27" name="角丸四角形 26"/>
+          <p:cNvSpPr/>
+          <p:nvPr/>
+        </p:nvSpPr>
+        <p:spPr>
+          <a:xfrm>
+            <a:off x="1102025" y="1656209"/>
+            <a:ext cx="1067481" cy="538736"/>
+          </a:xfrm>
+          <a:prstGeom prst="roundRect">
+            <a:avLst/>
+          </a:prstGeom>
+          <a:noFill/>
+          <a:ln w="19050">
+            <a:solidFill>
+              <a:schemeClr val="tx1"/>
+            </a:solidFill>
+          </a:ln>
+        </p:spPr>
+        <p:style>
+          <a:lnRef idx="2">
+            <a:schemeClr val="accent1">
+              <a:shade val="50000"/>
+            </a:schemeClr>
+          </a:lnRef>
+          <a:fillRef idx="1">
+            <a:schemeClr val="accent1"/>
+          </a:fillRef>
+          <a:effectRef idx="0">
+            <a:schemeClr val="accent1"/>
+          </a:effectRef>
+          <a:fontRef idx="minor">
+            <a:schemeClr val="lt1"/>
+          </a:fontRef>
+        </p:style>
+        <p:txBody>
+          <a:bodyPr lIns="91439" tIns="45720" rIns="91439" bIns="45720" rtlCol="0" anchor="t" anchorCtr="0"/>
+          <a:lstStyle/>
+          <a:p>
+            <a:pPr algn="ctr"/>
+            <a:r>
+              <a:rPr lang="en-US" altLang="ja-JP" sz="1000" dirty="0" smtClean="0">
+                <a:solidFill>
+                  <a:schemeClr val="tx1"/>
+                </a:solidFill>
+              </a:rPr>
+              <a:t>State2</a:t>
+            </a:r>
+            <a:endParaRPr lang="ja-JP" altLang="en-US" sz="1000" dirty="0">
+              <a:solidFill>
+                <a:schemeClr val="tx1"/>
+              </a:solidFill>
+            </a:endParaRPr>
+          </a:p>
+        </p:txBody>
+      </p:sp>
+      <p:cxnSp>
+        <p:nvCxnSpPr>
+          <p:cNvPr id="28" name="直線コネクタ 27"/>
+          <p:cNvCxnSpPr/>
+          <p:nvPr/>
+        </p:nvCxnSpPr>
+        <p:spPr>
+          <a:xfrm>
+            <a:off x="1106786" y="1910262"/>
+            <a:ext cx="1058562" cy="0"/>
+          </a:xfrm>
+          <a:prstGeom prst="line">
+            <a:avLst/>
+          </a:prstGeom>
+          <a:ln w="12700">
+            <a:solidFill>
+              <a:schemeClr val="tx1"/>
+            </a:solidFill>
+          </a:ln>
+        </p:spPr>
+        <p:style>
+          <a:lnRef idx="1">
+            <a:schemeClr val="accent1"/>
+          </a:lnRef>
+          <a:fillRef idx="0">
+            <a:schemeClr val="accent1"/>
+          </a:fillRef>
+          <a:effectRef idx="0">
+            <a:schemeClr val="accent1"/>
+          </a:effectRef>
+          <a:fontRef idx="minor">
+            <a:schemeClr val="tx1"/>
+          </a:fontRef>
+        </p:style>
+      </p:cxnSp>
+      <p:sp>
+        <p:nvSpPr>
+          <p:cNvPr id="30" name="正方形/長方形 29"/>
+          <p:cNvSpPr/>
+          <p:nvPr/>
+        </p:nvSpPr>
+        <p:spPr>
+          <a:xfrm>
+            <a:off x="1102025" y="1910262"/>
+            <a:ext cx="1150005" cy="161573"/>
+          </a:xfrm>
+          <a:prstGeom prst="rect">
+            <a:avLst/>
+          </a:prstGeom>
+        </p:spPr>
+        <p:txBody>
+          <a:bodyPr wrap="square" lIns="91439" tIns="45720" rIns="91439" bIns="45720">
+            <a:noAutofit/>
+          </a:bodyPr>
+          <a:lstStyle/>
+          <a:p>
+            <a:r>
+              <a:rPr lang="en-US" altLang="ja-JP" sz="1000" dirty="0" smtClean="0"/>
+              <a:t>Event1/defer</a:t>
+            </a:r>
+            <a:endParaRPr lang="ja-JP" altLang="en-US" sz="1000" dirty="0"/>
+          </a:p>
+        </p:txBody>
+      </p:sp>
+      <p:sp>
+        <p:nvSpPr>
+          <p:cNvPr id="31" name="角丸四角形 30"/>
+          <p:cNvSpPr/>
+          <p:nvPr/>
+        </p:nvSpPr>
+        <p:spPr>
+          <a:xfrm>
+            <a:off x="1102326" y="2470869"/>
+            <a:ext cx="1067481" cy="538736"/>
+          </a:xfrm>
+          <a:prstGeom prst="roundRect">
+            <a:avLst/>
+          </a:prstGeom>
+          <a:noFill/>
+          <a:ln w="19050">
+            <a:solidFill>
+              <a:schemeClr val="tx1"/>
+            </a:solidFill>
+          </a:ln>
+        </p:spPr>
+        <p:style>
+          <a:lnRef idx="2">
+            <a:schemeClr val="accent1">
+              <a:shade val="50000"/>
+            </a:schemeClr>
+          </a:lnRef>
+          <a:fillRef idx="1">
+            <a:schemeClr val="accent1"/>
+          </a:fillRef>
+          <a:effectRef idx="0">
+            <a:schemeClr val="accent1"/>
+          </a:effectRef>
+          <a:fontRef idx="minor">
+            <a:schemeClr val="lt1"/>
+          </a:fontRef>
+        </p:style>
+        <p:txBody>
+          <a:bodyPr lIns="91439" tIns="45720" rIns="91439" bIns="45720" rtlCol="0" anchor="t" anchorCtr="0"/>
+          <a:lstStyle/>
+          <a:p>
+            <a:pPr algn="ctr"/>
+            <a:r>
+              <a:rPr lang="en-US" altLang="ja-JP" sz="1000" dirty="0" smtClean="0">
+                <a:solidFill>
+                  <a:schemeClr val="tx1"/>
+                </a:solidFill>
+              </a:rPr>
+              <a:t>State3</a:t>
+            </a:r>
+            <a:endParaRPr lang="ja-JP" altLang="en-US" sz="1000" dirty="0">
+              <a:solidFill>
+                <a:schemeClr val="tx1"/>
+              </a:solidFill>
+            </a:endParaRPr>
+          </a:p>
+        </p:txBody>
+      </p:sp>
+      <p:cxnSp>
+        <p:nvCxnSpPr>
+          <p:cNvPr id="32" name="直線コネクタ 31"/>
+          <p:cNvCxnSpPr/>
+          <p:nvPr/>
+        </p:nvCxnSpPr>
+        <p:spPr>
+          <a:xfrm>
+            <a:off x="1107087" y="2724922"/>
+            <a:ext cx="1058562" cy="0"/>
+          </a:xfrm>
+          <a:prstGeom prst="line">
+            <a:avLst/>
+          </a:prstGeom>
+          <a:ln w="12700">
+            <a:solidFill>
+              <a:schemeClr val="tx1"/>
+            </a:solidFill>
+          </a:ln>
+        </p:spPr>
+        <p:style>
+          <a:lnRef idx="1">
+            <a:schemeClr val="accent1"/>
+          </a:lnRef>
+          <a:fillRef idx="0">
+            <a:schemeClr val="accent1"/>
+          </a:fillRef>
+          <a:effectRef idx="0">
+            <a:schemeClr val="accent1"/>
+          </a:effectRef>
+          <a:fontRef idx="minor">
+            <a:schemeClr val="tx1"/>
+          </a:fontRef>
+        </p:style>
+      </p:cxnSp>
+      <p:sp>
+        <p:nvSpPr>
+          <p:cNvPr id="35" name="正方形/長方形 34"/>
+          <p:cNvSpPr/>
+          <p:nvPr/>
+        </p:nvSpPr>
+        <p:spPr>
+          <a:xfrm>
+            <a:off x="1102326" y="2724922"/>
+            <a:ext cx="1150005" cy="161573"/>
+          </a:xfrm>
+          <a:prstGeom prst="rect">
+            <a:avLst/>
+          </a:prstGeom>
+        </p:spPr>
+        <p:txBody>
+          <a:bodyPr wrap="square" lIns="91439" tIns="45720" rIns="91439" bIns="45720">
+            <a:noAutofit/>
+          </a:bodyPr>
+          <a:lstStyle/>
+          <a:p>
+            <a:endParaRPr lang="ja-JP" altLang="en-US" sz="1000" dirty="0"/>
+          </a:p>
+        </p:txBody>
+      </p:sp>
+      <p:cxnSp>
+        <p:nvCxnSpPr>
+          <p:cNvPr id="36" name="直線矢印コネクタ 28"/>
+          <p:cNvCxnSpPr>
+            <a:stCxn id="27" idx="2"/>
+            <a:endCxn id="31" idx="0"/>
+          </p:cNvCxnSpPr>
+          <p:nvPr/>
+        </p:nvCxnSpPr>
+        <p:spPr>
+          <a:xfrm>
+            <a:off x="1635766" y="2194945"/>
+            <a:ext cx="301" cy="275924"/>
+          </a:xfrm>
+          <a:prstGeom prst="straightConnector1">
+            <a:avLst/>
+          </a:prstGeom>
+          <a:ln w="19050">
+            <a:solidFill>
+              <a:schemeClr val="tx1"/>
+            </a:solidFill>
+            <a:tailEnd type="arrow"/>
+          </a:ln>
+        </p:spPr>
+        <p:style>
+          <a:lnRef idx="1">
+            <a:schemeClr val="accent1"/>
+          </a:lnRef>
+          <a:fillRef idx="0">
+            <a:schemeClr val="accent1"/>
+          </a:fillRef>
+          <a:effectRef idx="0">
+            <a:schemeClr val="accent1"/>
+          </a:effectRef>
+          <a:fontRef idx="minor">
+            <a:schemeClr val="tx1"/>
+          </a:fontRef>
+        </p:style>
+      </p:cxnSp>
+      <p:sp>
+        <p:nvSpPr>
+          <p:cNvPr id="44" name="角丸四角形 43"/>
+          <p:cNvSpPr/>
+          <p:nvPr/>
+        </p:nvSpPr>
+        <p:spPr>
+          <a:xfrm>
+            <a:off x="2805588" y="2470869"/>
+            <a:ext cx="1067481" cy="538736"/>
+          </a:xfrm>
+          <a:prstGeom prst="roundRect">
+            <a:avLst/>
+          </a:prstGeom>
+          <a:noFill/>
+          <a:ln w="19050">
+            <a:solidFill>
+              <a:schemeClr val="tx1"/>
+            </a:solidFill>
+          </a:ln>
+        </p:spPr>
+        <p:style>
+          <a:lnRef idx="2">
+            <a:schemeClr val="accent1">
+              <a:shade val="50000"/>
+            </a:schemeClr>
+          </a:lnRef>
+          <a:fillRef idx="1">
+            <a:schemeClr val="accent1"/>
+          </a:fillRef>
+          <a:effectRef idx="0">
+            <a:schemeClr val="accent1"/>
+          </a:effectRef>
+          <a:fontRef idx="minor">
+            <a:schemeClr val="lt1"/>
+          </a:fontRef>
+        </p:style>
+        <p:txBody>
+          <a:bodyPr lIns="91439" tIns="45720" rIns="91439" bIns="45720" rtlCol="0" anchor="t" anchorCtr="0"/>
+          <a:lstStyle/>
+          <a:p>
+            <a:pPr algn="ctr"/>
+            <a:r>
+              <a:rPr lang="en-US" altLang="ja-JP" sz="1000" dirty="0" smtClean="0">
+                <a:solidFill>
+                  <a:schemeClr val="tx1"/>
+                </a:solidFill>
+              </a:rPr>
+              <a:t>State4</a:t>
+            </a:r>
+            <a:endParaRPr lang="ja-JP" altLang="en-US" sz="1000" dirty="0">
+              <a:solidFill>
+                <a:schemeClr val="tx1"/>
+              </a:solidFill>
+            </a:endParaRPr>
+          </a:p>
+        </p:txBody>
+      </p:sp>
+      <p:cxnSp>
+        <p:nvCxnSpPr>
+          <p:cNvPr id="45" name="直線コネクタ 44"/>
+          <p:cNvCxnSpPr/>
+          <p:nvPr/>
+        </p:nvCxnSpPr>
+        <p:spPr>
+          <a:xfrm>
+            <a:off x="2810349" y="2724922"/>
+            <a:ext cx="1058562" cy="0"/>
+          </a:xfrm>
+          <a:prstGeom prst="line">
+            <a:avLst/>
+          </a:prstGeom>
+          <a:ln w="12700">
+            <a:solidFill>
+              <a:schemeClr val="tx1"/>
+            </a:solidFill>
+          </a:ln>
+        </p:spPr>
+        <p:style>
+          <a:lnRef idx="1">
+            <a:schemeClr val="accent1"/>
+          </a:lnRef>
+          <a:fillRef idx="0">
+            <a:schemeClr val="accent1"/>
+          </a:fillRef>
+          <a:effectRef idx="0">
+            <a:schemeClr val="accent1"/>
+          </a:effectRef>
+          <a:fontRef idx="minor">
+            <a:schemeClr val="tx1"/>
+          </a:fontRef>
+        </p:style>
+      </p:cxnSp>
+      <p:sp>
+        <p:nvSpPr>
+          <p:cNvPr id="46" name="正方形/長方形 45"/>
+          <p:cNvSpPr/>
+          <p:nvPr/>
+        </p:nvSpPr>
+        <p:spPr>
+          <a:xfrm>
+            <a:off x="2805588" y="2724922"/>
+            <a:ext cx="1150005" cy="161573"/>
+          </a:xfrm>
+          <a:prstGeom prst="rect">
+            <a:avLst/>
+          </a:prstGeom>
+        </p:spPr>
+        <p:txBody>
+          <a:bodyPr wrap="square" lIns="91439" tIns="45720" rIns="91439" bIns="45720">
+            <a:noAutofit/>
+          </a:bodyPr>
+          <a:lstStyle/>
+          <a:p>
+            <a:endParaRPr lang="ja-JP" altLang="en-US" sz="1000" dirty="0"/>
+          </a:p>
+        </p:txBody>
+      </p:sp>
+      <p:cxnSp>
+        <p:nvCxnSpPr>
+          <p:cNvPr id="47" name="直線矢印コネクタ 28"/>
+          <p:cNvCxnSpPr>
+            <a:stCxn id="31" idx="3"/>
+            <a:endCxn id="44" idx="1"/>
+          </p:cNvCxnSpPr>
+          <p:nvPr/>
+        </p:nvCxnSpPr>
+        <p:spPr>
+          <a:xfrm>
+            <a:off x="2169807" y="2740237"/>
+            <a:ext cx="635781" cy="0"/>
+          </a:xfrm>
+          <a:prstGeom prst="straightConnector1">
+            <a:avLst/>
+          </a:prstGeom>
+          <a:ln w="19050">
+            <a:solidFill>
+              <a:schemeClr val="tx1"/>
+            </a:solidFill>
+            <a:tailEnd type="arrow"/>
+          </a:ln>
+        </p:spPr>
+        <p:style>
+          <a:lnRef idx="1">
+            <a:schemeClr val="accent1"/>
+          </a:lnRef>
+          <a:fillRef idx="0">
+            <a:schemeClr val="accent1"/>
+          </a:fillRef>
+          <a:effectRef idx="0">
+            <a:schemeClr val="accent1"/>
+          </a:effectRef>
+          <a:fontRef idx="minor">
+            <a:schemeClr val="tx1"/>
+          </a:fontRef>
+        </p:style>
+      </p:cxnSp>
+      <p:sp>
+        <p:nvSpPr>
+          <p:cNvPr id="50" name="正方形/長方形 49"/>
+          <p:cNvSpPr/>
+          <p:nvPr/>
+        </p:nvSpPr>
+        <p:spPr>
+          <a:xfrm>
+            <a:off x="1130152" y="2194945"/>
+            <a:ext cx="670395" cy="246221"/>
+          </a:xfrm>
+          <a:prstGeom prst="rect">
+            <a:avLst/>
+          </a:prstGeom>
+        </p:spPr>
+        <p:txBody>
+          <a:bodyPr wrap="square" lIns="91439" tIns="45720" rIns="91439" bIns="45720">
+            <a:spAutoFit/>
+          </a:bodyPr>
+          <a:lstStyle/>
+          <a:p>
+            <a:r>
+              <a:rPr lang="en-US" altLang="ja-JP" sz="1000" dirty="0" smtClean="0"/>
+              <a:t>Event2</a:t>
+            </a:r>
+            <a:endParaRPr lang="ja-JP" altLang="en-US" sz="1000" dirty="0"/>
+          </a:p>
+        </p:txBody>
+      </p:sp>
+      <p:sp>
+        <p:nvSpPr>
+          <p:cNvPr id="51" name="正方形/長方形 50"/>
+          <p:cNvSpPr/>
+          <p:nvPr/>
+        </p:nvSpPr>
+        <p:spPr>
+          <a:xfrm>
+            <a:off x="2169807" y="2471391"/>
+            <a:ext cx="670395" cy="246221"/>
+          </a:xfrm>
+          <a:prstGeom prst="rect">
+            <a:avLst/>
+          </a:prstGeom>
+        </p:spPr>
+        <p:txBody>
+          <a:bodyPr wrap="square" lIns="91439" tIns="45720" rIns="91439" bIns="45720">
+            <a:spAutoFit/>
+          </a:bodyPr>
+          <a:lstStyle/>
+          <a:p>
+            <a:r>
+              <a:rPr lang="en-US" altLang="ja-JP" sz="1000" dirty="0" smtClean="0"/>
+              <a:t>Event1</a:t>
+            </a:r>
+            <a:endParaRPr lang="ja-JP" altLang="en-US" sz="1000" dirty="0"/>
+          </a:p>
+        </p:txBody>
+      </p:sp>
+      <p:sp>
+        <p:nvSpPr>
+          <p:cNvPr id="58" name="角丸四角形 57"/>
+          <p:cNvSpPr/>
+          <p:nvPr/>
+        </p:nvSpPr>
+        <p:spPr>
+          <a:xfrm>
+            <a:off x="2805588" y="1656209"/>
+            <a:ext cx="1067481" cy="538736"/>
+          </a:xfrm>
+          <a:prstGeom prst="roundRect">
+            <a:avLst/>
+          </a:prstGeom>
+          <a:noFill/>
+          <a:ln w="19050">
+            <a:solidFill>
+              <a:schemeClr val="tx1"/>
+            </a:solidFill>
+          </a:ln>
+        </p:spPr>
+        <p:style>
+          <a:lnRef idx="2">
+            <a:schemeClr val="accent1">
+              <a:shade val="50000"/>
+            </a:schemeClr>
+          </a:lnRef>
+          <a:fillRef idx="1">
+            <a:schemeClr val="accent1"/>
+          </a:fillRef>
+          <a:effectRef idx="0">
+            <a:schemeClr val="accent1"/>
+          </a:effectRef>
+          <a:fontRef idx="minor">
+            <a:schemeClr val="lt1"/>
+          </a:fontRef>
+        </p:style>
+        <p:txBody>
+          <a:bodyPr lIns="91439" tIns="45720" rIns="91439" bIns="45720" rtlCol="0" anchor="t" anchorCtr="0"/>
+          <a:lstStyle/>
+          <a:p>
+            <a:pPr algn="ctr"/>
+            <a:r>
+              <a:rPr lang="en-US" altLang="ja-JP" sz="1000" dirty="0" smtClean="0">
+                <a:solidFill>
+                  <a:schemeClr val="tx1"/>
+                </a:solidFill>
+              </a:rPr>
+              <a:t>State5</a:t>
+            </a:r>
+            <a:endParaRPr lang="ja-JP" altLang="en-US" sz="1000" dirty="0">
+              <a:solidFill>
+                <a:schemeClr val="tx1"/>
+              </a:solidFill>
+            </a:endParaRPr>
+          </a:p>
+        </p:txBody>
+      </p:sp>
+      <p:cxnSp>
+        <p:nvCxnSpPr>
+          <p:cNvPr id="59" name="直線コネクタ 58"/>
+          <p:cNvCxnSpPr/>
+          <p:nvPr/>
+        </p:nvCxnSpPr>
+        <p:spPr>
+          <a:xfrm>
+            <a:off x="2810349" y="1910262"/>
+            <a:ext cx="1058562" cy="0"/>
+          </a:xfrm>
+          <a:prstGeom prst="line">
+            <a:avLst/>
+          </a:prstGeom>
+          <a:ln w="12700">
+            <a:solidFill>
+              <a:schemeClr val="tx1"/>
+            </a:solidFill>
+          </a:ln>
+        </p:spPr>
+        <p:style>
+          <a:lnRef idx="1">
+            <a:schemeClr val="accent1"/>
+          </a:lnRef>
+          <a:fillRef idx="0">
+            <a:schemeClr val="accent1"/>
+          </a:fillRef>
+          <a:effectRef idx="0">
+            <a:schemeClr val="accent1"/>
+          </a:effectRef>
+          <a:fontRef idx="minor">
+            <a:schemeClr val="tx1"/>
+          </a:fontRef>
+        </p:style>
+      </p:cxnSp>
+      <p:sp>
+        <p:nvSpPr>
+          <p:cNvPr id="60" name="正方形/長方形 59"/>
+          <p:cNvSpPr/>
+          <p:nvPr/>
+        </p:nvSpPr>
+        <p:spPr>
+          <a:xfrm>
+            <a:off x="2805588" y="1910262"/>
+            <a:ext cx="1150005" cy="161573"/>
+          </a:xfrm>
+          <a:prstGeom prst="rect">
+            <a:avLst/>
+          </a:prstGeom>
+        </p:spPr>
+        <p:txBody>
+          <a:bodyPr wrap="square" lIns="91439" tIns="45720" rIns="91439" bIns="45720">
+            <a:noAutofit/>
+          </a:bodyPr>
+          <a:lstStyle/>
+          <a:p>
+            <a:endParaRPr lang="ja-JP" altLang="en-US" sz="1000" dirty="0"/>
+          </a:p>
+        </p:txBody>
+      </p:sp>
+      <p:cxnSp>
+        <p:nvCxnSpPr>
+          <p:cNvPr id="61" name="直線矢印コネクタ 28"/>
+          <p:cNvCxnSpPr>
+            <a:stCxn id="44" idx="0"/>
+            <a:endCxn id="58" idx="2"/>
+          </p:cNvCxnSpPr>
+          <p:nvPr/>
+        </p:nvCxnSpPr>
+        <p:spPr>
+          <a:xfrm flipV="1">
+            <a:off x="3339329" y="2194945"/>
+            <a:ext cx="0" cy="275924"/>
+          </a:xfrm>
+          <a:prstGeom prst="straightConnector1">
+            <a:avLst/>
+          </a:prstGeom>
+          <a:ln w="19050">
+            <a:solidFill>
+              <a:schemeClr val="tx1"/>
+            </a:solidFill>
+            <a:tailEnd type="arrow"/>
+          </a:ln>
+        </p:spPr>
+        <p:style>
+          <a:lnRef idx="1">
+            <a:schemeClr val="accent1"/>
+          </a:lnRef>
+          <a:fillRef idx="0">
+            <a:schemeClr val="accent1"/>
+          </a:fillRef>
+          <a:effectRef idx="0">
+            <a:schemeClr val="accent1"/>
+          </a:effectRef>
+          <a:fontRef idx="minor">
+            <a:schemeClr val="tx1"/>
+          </a:fontRef>
+        </p:style>
+      </p:cxnSp>
+      <p:sp>
+        <p:nvSpPr>
+          <p:cNvPr id="64" name="正方形/長方形 63"/>
+          <p:cNvSpPr/>
+          <p:nvPr/>
+        </p:nvSpPr>
+        <p:spPr>
+          <a:xfrm>
+            <a:off x="2786336" y="2195189"/>
+            <a:ext cx="670395" cy="246221"/>
+          </a:xfrm>
+          <a:prstGeom prst="rect">
+            <a:avLst/>
+          </a:prstGeom>
+        </p:spPr>
+        <p:txBody>
+          <a:bodyPr wrap="square" lIns="91439" tIns="45720" rIns="91439" bIns="45720">
+            <a:spAutoFit/>
+          </a:bodyPr>
+          <a:lstStyle/>
+          <a:p>
+            <a:r>
+              <a:rPr lang="en-US" altLang="ja-JP" sz="1000" dirty="0" smtClean="0"/>
+              <a:t>Event1</a:t>
+            </a:r>
+            <a:endParaRPr lang="ja-JP" altLang="en-US" sz="1000" dirty="0"/>
+          </a:p>
+        </p:txBody>
+      </p:sp>
+      <p:sp>
+        <p:nvSpPr>
+          <p:cNvPr id="65" name="角丸四角形 64"/>
+          <p:cNvSpPr/>
+          <p:nvPr/>
+        </p:nvSpPr>
+        <p:spPr>
+          <a:xfrm>
+            <a:off x="2805588" y="849278"/>
+            <a:ext cx="1067481" cy="538736"/>
+          </a:xfrm>
+          <a:prstGeom prst="roundRect">
+            <a:avLst/>
+          </a:prstGeom>
+          <a:noFill/>
+          <a:ln w="19050">
+            <a:solidFill>
+              <a:schemeClr val="tx1"/>
+            </a:solidFill>
+          </a:ln>
+        </p:spPr>
+        <p:style>
+          <a:lnRef idx="2">
+            <a:schemeClr val="accent1">
+              <a:shade val="50000"/>
+            </a:schemeClr>
+          </a:lnRef>
+          <a:fillRef idx="1">
+            <a:schemeClr val="accent1"/>
+          </a:fillRef>
+          <a:effectRef idx="0">
+            <a:schemeClr val="accent1"/>
+          </a:effectRef>
+          <a:fontRef idx="minor">
+            <a:schemeClr val="lt1"/>
+          </a:fontRef>
+        </p:style>
+        <p:txBody>
+          <a:bodyPr lIns="91439" tIns="45720" rIns="91439" bIns="45720" rtlCol="0" anchor="t" anchorCtr="0"/>
+          <a:lstStyle/>
+          <a:p>
+            <a:pPr algn="ctr"/>
+            <a:r>
+              <a:rPr lang="en-US" altLang="ja-JP" sz="1000" dirty="0" smtClean="0">
+                <a:solidFill>
+                  <a:schemeClr val="tx1"/>
+                </a:solidFill>
+              </a:rPr>
+              <a:t>State6</a:t>
+            </a:r>
+            <a:endParaRPr lang="ja-JP" altLang="en-US" sz="1000" dirty="0">
+              <a:solidFill>
+                <a:schemeClr val="tx1"/>
+              </a:solidFill>
+            </a:endParaRPr>
+          </a:p>
+        </p:txBody>
+      </p:sp>
+      <p:cxnSp>
+        <p:nvCxnSpPr>
+          <p:cNvPr id="66" name="直線コネクタ 65"/>
+          <p:cNvCxnSpPr/>
+          <p:nvPr/>
+        </p:nvCxnSpPr>
+        <p:spPr>
+          <a:xfrm>
+            <a:off x="2810349" y="1103331"/>
+            <a:ext cx="1058562" cy="0"/>
+          </a:xfrm>
+          <a:prstGeom prst="line">
+            <a:avLst/>
+          </a:prstGeom>
+          <a:ln w="12700">
+            <a:solidFill>
+              <a:schemeClr val="tx1"/>
+            </a:solidFill>
+          </a:ln>
+        </p:spPr>
+        <p:style>
+          <a:lnRef idx="1">
+            <a:schemeClr val="accent1"/>
+          </a:lnRef>
+          <a:fillRef idx="0">
+            <a:schemeClr val="accent1"/>
+          </a:fillRef>
+          <a:effectRef idx="0">
+            <a:schemeClr val="accent1"/>
+          </a:effectRef>
+          <a:fontRef idx="minor">
+            <a:schemeClr val="tx1"/>
+          </a:fontRef>
+        </p:style>
+      </p:cxnSp>
+      <p:sp>
+        <p:nvSpPr>
+          <p:cNvPr id="67" name="正方形/長方形 66"/>
+          <p:cNvSpPr/>
+          <p:nvPr/>
+        </p:nvSpPr>
+        <p:spPr>
+          <a:xfrm>
+            <a:off x="2805588" y="1103331"/>
+            <a:ext cx="1150005" cy="161573"/>
+          </a:xfrm>
+          <a:prstGeom prst="rect">
+            <a:avLst/>
+          </a:prstGeom>
+        </p:spPr>
+        <p:txBody>
+          <a:bodyPr wrap="square" lIns="91439" tIns="45720" rIns="91439" bIns="45720">
+            <a:noAutofit/>
+          </a:bodyPr>
+          <a:lstStyle/>
+          <a:p>
+            <a:endParaRPr lang="ja-JP" altLang="en-US" sz="1000" dirty="0"/>
+          </a:p>
+        </p:txBody>
+      </p:sp>
+      <p:cxnSp>
+        <p:nvCxnSpPr>
+          <p:cNvPr id="68" name="直線矢印コネクタ 28"/>
+          <p:cNvCxnSpPr>
+            <a:stCxn id="58" idx="0"/>
+            <a:endCxn id="65" idx="2"/>
+          </p:cNvCxnSpPr>
+          <p:nvPr/>
+        </p:nvCxnSpPr>
+        <p:spPr>
+          <a:xfrm flipV="1">
+            <a:off x="3339329" y="1388014"/>
+            <a:ext cx="0" cy="268195"/>
+          </a:xfrm>
+          <a:prstGeom prst="straightConnector1">
+            <a:avLst/>
+          </a:prstGeom>
+          <a:ln w="19050">
+            <a:solidFill>
+              <a:schemeClr val="tx1"/>
+            </a:solidFill>
+            <a:tailEnd type="arrow"/>
+          </a:ln>
+        </p:spPr>
+        <p:style>
+          <a:lnRef idx="1">
+            <a:schemeClr val="accent1"/>
+          </a:lnRef>
+          <a:fillRef idx="0">
+            <a:schemeClr val="accent1"/>
+          </a:fillRef>
+          <a:effectRef idx="0">
+            <a:schemeClr val="accent1"/>
+          </a:effectRef>
+          <a:fontRef idx="minor">
+            <a:schemeClr val="tx1"/>
+          </a:fontRef>
+        </p:style>
+      </p:cxnSp>
+      <p:sp>
+        <p:nvSpPr>
+          <p:cNvPr id="69" name="正方形/長方形 68"/>
+          <p:cNvSpPr/>
+          <p:nvPr/>
+        </p:nvSpPr>
+        <p:spPr>
+          <a:xfrm>
+            <a:off x="2786336" y="1356715"/>
+            <a:ext cx="670395" cy="246221"/>
+          </a:xfrm>
+          <a:prstGeom prst="rect">
+            <a:avLst/>
+          </a:prstGeom>
+        </p:spPr>
+        <p:txBody>
+          <a:bodyPr wrap="square" lIns="91439" tIns="45720" rIns="91439" bIns="45720">
+            <a:spAutoFit/>
+          </a:bodyPr>
+          <a:lstStyle/>
+          <a:p>
+            <a:r>
+              <a:rPr lang="en-US" altLang="ja-JP" sz="1000" dirty="0" smtClean="0"/>
+              <a:t>Event1</a:t>
+            </a:r>
+            <a:endParaRPr lang="ja-JP" altLang="en-US" sz="1000" dirty="0"/>
+          </a:p>
+        </p:txBody>
+      </p:sp>
+    </p:spTree>
+    <p:extLst>
+      <p:ext uri="{BB962C8B-B14F-4D97-AF65-F5344CB8AC3E}">
+        <p14:creationId xmlns:p14="http://schemas.microsoft.com/office/powerpoint/2010/main" val="1831243324"/>
+      </p:ext>
+    </p:extLst>
+  </p:cSld>
+  <p:clrMapOvr>
+    <a:masterClrMapping/>
+  </p:clrMapOvr>
+  <p:timing>
+    <p:tnLst>
+      <p:par>
+        <p:cTn id="1" dur="indefinite" restart="never" nodeType="tmRoot"/>
+      </p:par>
+    </p:tnLst>
+  </p:timing>
+</p:sld>
+</file>
+
+<file path=ppt/slides/slide12.xml><?xml version="1.0" encoding="utf-8"?>
+<p:sld xmlns:a="http://schemas.openxmlformats.org/drawingml/2006/main" xmlns:r="http://schemas.openxmlformats.org/officeDocument/2006/relationships" xmlns:p="http://schemas.openxmlformats.org/presentationml/2006/main">
+  <p:cSld>
+    <p:spTree>
+      <p:nvGrpSpPr>
+        <p:cNvPr id="1" name=""/>
+        <p:cNvGrpSpPr/>
+        <p:nvPr/>
+      </p:nvGrpSpPr>
+      <p:grpSpPr>
+        <a:xfrm>
+          <a:off x="0" y="0"/>
+          <a:ext cx="0" cy="0"/>
+          <a:chOff x="0" y="0"/>
+          <a:chExt cx="0" cy="0"/>
+        </a:xfrm>
+      </p:grpSpPr>
+      <p:cxnSp>
+        <p:nvCxnSpPr>
+          <p:cNvPr id="142" name="直線矢印コネクタ 28"/>
+          <p:cNvCxnSpPr>
+            <a:stCxn id="163" idx="4"/>
+            <a:endCxn id="153" idx="0"/>
+          </p:cNvCxnSpPr>
+          <p:nvPr/>
+        </p:nvCxnSpPr>
+        <p:spPr>
+          <a:xfrm>
+            <a:off x="1631004" y="646148"/>
+            <a:ext cx="1" cy="203130"/>
+          </a:xfrm>
+          <a:prstGeom prst="straightConnector1">
+            <a:avLst/>
+          </a:prstGeom>
+          <a:ln w="19050">
+            <a:solidFill>
+              <a:schemeClr val="tx1"/>
+            </a:solidFill>
+            <a:tailEnd type="arrow"/>
+          </a:ln>
+        </p:spPr>
+        <p:style>
+          <a:lnRef idx="1">
+            <a:schemeClr val="accent1"/>
+          </a:lnRef>
+          <a:fillRef idx="0">
+            <a:schemeClr val="accent1"/>
+          </a:fillRef>
+          <a:effectRef idx="0">
+            <a:schemeClr val="accent1"/>
+          </a:effectRef>
+          <a:fontRef idx="minor">
+            <a:schemeClr val="tx1"/>
+          </a:fontRef>
+        </p:style>
+      </p:cxnSp>
+      <p:sp>
+        <p:nvSpPr>
+          <p:cNvPr id="150" name="正方形/長方形 149"/>
+          <p:cNvSpPr/>
+          <p:nvPr/>
+        </p:nvSpPr>
+        <p:spPr>
+          <a:xfrm>
+            <a:off x="141677" y="165134"/>
+            <a:ext cx="4035134" cy="3291275"/>
+          </a:xfrm>
+          <a:prstGeom prst="rect">
+            <a:avLst/>
+          </a:prstGeom>
+          <a:noFill/>
+          <a:ln w="28575">
+            <a:solidFill>
+              <a:schemeClr val="tx1"/>
+            </a:solidFill>
+          </a:ln>
+        </p:spPr>
+        <p:style>
+          <a:lnRef idx="2">
+            <a:schemeClr val="accent1">
+              <a:shade val="50000"/>
+            </a:schemeClr>
+          </a:lnRef>
+          <a:fillRef idx="1">
+            <a:schemeClr val="accent1"/>
+          </a:fillRef>
+          <a:effectRef idx="0">
+            <a:schemeClr val="accent1"/>
+          </a:effectRef>
+          <a:fontRef idx="minor">
+            <a:schemeClr val="lt1"/>
+          </a:fontRef>
+        </p:style>
+        <p:txBody>
+          <a:bodyPr lIns="91439" tIns="45720" rIns="91439" bIns="45720" rtlCol="0" anchor="ctr"/>
+          <a:lstStyle/>
+          <a:p>
+            <a:pPr algn="ctr"/>
+            <a:endParaRPr kumimoji="1" lang="ja-JP" altLang="en-US"/>
+          </a:p>
+        </p:txBody>
+      </p:sp>
+      <p:sp>
+        <p:nvSpPr>
+          <p:cNvPr id="151" name="1 つの角を切り取った四角形 150"/>
+          <p:cNvSpPr/>
+          <p:nvPr/>
+        </p:nvSpPr>
+        <p:spPr>
+          <a:xfrm flipV="1">
+            <a:off x="141677" y="173126"/>
+            <a:ext cx="2345870" cy="305136"/>
+          </a:xfrm>
+          <a:prstGeom prst="snip1Rect">
+            <a:avLst>
+              <a:gd name="adj" fmla="val 34304"/>
+            </a:avLst>
+          </a:prstGeom>
+          <a:noFill/>
+          <a:ln w="19050">
+            <a:solidFill>
+              <a:schemeClr val="tx1"/>
+            </a:solidFill>
+          </a:ln>
+        </p:spPr>
+        <p:style>
+          <a:lnRef idx="2">
+            <a:schemeClr val="accent1">
+              <a:shade val="50000"/>
+            </a:schemeClr>
+          </a:lnRef>
+          <a:fillRef idx="1">
+            <a:schemeClr val="accent1"/>
+          </a:fillRef>
+          <a:effectRef idx="0">
+            <a:schemeClr val="accent1"/>
+          </a:effectRef>
+          <a:fontRef idx="minor">
+            <a:schemeClr val="lt1"/>
+          </a:fontRef>
+        </p:style>
+        <p:txBody>
+          <a:bodyPr lIns="91439" tIns="45720" rIns="91439" bIns="45720" rtlCol="0" anchor="ctr"/>
+          <a:lstStyle/>
+          <a:p>
+            <a:pPr algn="ctr"/>
+            <a:endParaRPr kumimoji="1" lang="ja-JP" altLang="en-US" sz="1000" dirty="0"/>
+          </a:p>
+        </p:txBody>
+      </p:sp>
+      <p:sp>
+        <p:nvSpPr>
+          <p:cNvPr id="152" name="正方形/長方形 151"/>
+          <p:cNvSpPr/>
+          <p:nvPr/>
+        </p:nvSpPr>
+        <p:spPr>
+          <a:xfrm>
+            <a:off x="141678" y="153706"/>
+            <a:ext cx="2346019" cy="246221"/>
+          </a:xfrm>
+          <a:prstGeom prst="rect">
+            <a:avLst/>
+          </a:prstGeom>
+        </p:spPr>
+        <p:txBody>
+          <a:bodyPr wrap="square" lIns="91439" tIns="45720" rIns="91439" bIns="45720">
+            <a:spAutoFit/>
+          </a:bodyPr>
+          <a:lstStyle/>
+          <a:p>
+            <a:r>
+              <a:rPr lang="en-US" altLang="ja-JP" sz="1000" dirty="0" smtClean="0"/>
+              <a:t>Defer event and anonymous transition</a:t>
+            </a:r>
+            <a:endParaRPr lang="ja-JP" altLang="en-US" sz="1000" dirty="0"/>
+          </a:p>
+        </p:txBody>
+      </p:sp>
+      <p:sp>
+        <p:nvSpPr>
+          <p:cNvPr id="153" name="角丸四角形 152"/>
+          <p:cNvSpPr/>
+          <p:nvPr/>
+        </p:nvSpPr>
+        <p:spPr>
+          <a:xfrm>
+            <a:off x="1097264" y="849278"/>
+            <a:ext cx="1067481" cy="538736"/>
+          </a:xfrm>
+          <a:prstGeom prst="roundRect">
+            <a:avLst/>
+          </a:prstGeom>
+          <a:noFill/>
+          <a:ln w="19050">
+            <a:solidFill>
+              <a:schemeClr val="tx1"/>
+            </a:solidFill>
+          </a:ln>
+        </p:spPr>
+        <p:style>
+          <a:lnRef idx="2">
+            <a:schemeClr val="accent1">
+              <a:shade val="50000"/>
+            </a:schemeClr>
+          </a:lnRef>
+          <a:fillRef idx="1">
+            <a:schemeClr val="accent1"/>
+          </a:fillRef>
+          <a:effectRef idx="0">
+            <a:schemeClr val="accent1"/>
+          </a:effectRef>
+          <a:fontRef idx="minor">
+            <a:schemeClr val="lt1"/>
+          </a:fontRef>
+        </p:style>
+        <p:txBody>
+          <a:bodyPr lIns="91439" tIns="45720" rIns="91439" bIns="45720" rtlCol="0" anchor="t" anchorCtr="0"/>
+          <a:lstStyle/>
+          <a:p>
+            <a:pPr algn="ctr"/>
+            <a:r>
+              <a:rPr lang="en-US" altLang="ja-JP" sz="1000" dirty="0" smtClean="0">
+                <a:solidFill>
+                  <a:schemeClr val="tx1"/>
+                </a:solidFill>
+              </a:rPr>
+              <a:t>State1</a:t>
+            </a:r>
+            <a:endParaRPr lang="ja-JP" altLang="en-US" sz="1000" dirty="0">
+              <a:solidFill>
+                <a:schemeClr val="tx1"/>
+              </a:solidFill>
+            </a:endParaRPr>
+          </a:p>
+        </p:txBody>
+      </p:sp>
+      <p:cxnSp>
+        <p:nvCxnSpPr>
+          <p:cNvPr id="154" name="直線コネクタ 153"/>
+          <p:cNvCxnSpPr/>
+          <p:nvPr/>
+        </p:nvCxnSpPr>
+        <p:spPr>
+          <a:xfrm>
+            <a:off x="1102025" y="1103331"/>
+            <a:ext cx="1058562" cy="0"/>
+          </a:xfrm>
+          <a:prstGeom prst="line">
+            <a:avLst/>
+          </a:prstGeom>
+          <a:ln w="12700">
+            <a:solidFill>
+              <a:schemeClr val="tx1"/>
+            </a:solidFill>
+          </a:ln>
+        </p:spPr>
+        <p:style>
+          <a:lnRef idx="1">
+            <a:schemeClr val="accent1"/>
+          </a:lnRef>
+          <a:fillRef idx="0">
+            <a:schemeClr val="accent1"/>
+          </a:fillRef>
+          <a:effectRef idx="0">
+            <a:schemeClr val="accent1"/>
+          </a:effectRef>
+          <a:fontRef idx="minor">
+            <a:schemeClr val="tx1"/>
+          </a:fontRef>
+        </p:style>
+      </p:cxnSp>
+      <p:sp>
+        <p:nvSpPr>
+          <p:cNvPr id="163" name="フローチャート : 結合子 162"/>
+          <p:cNvSpPr/>
+          <p:nvPr/>
+        </p:nvSpPr>
+        <p:spPr>
+          <a:xfrm>
+            <a:off x="1558993" y="502128"/>
+            <a:ext cx="144021" cy="144020"/>
+          </a:xfrm>
+          <a:prstGeom prst="flowChartConnector">
+            <a:avLst/>
+          </a:prstGeom>
+          <a:solidFill>
+            <a:schemeClr val="tx1"/>
+          </a:solidFill>
+          <a:ln w="19050">
+            <a:solidFill>
+              <a:schemeClr val="tx1"/>
+            </a:solidFill>
+          </a:ln>
+        </p:spPr>
+        <p:style>
+          <a:lnRef idx="2">
+            <a:schemeClr val="accent1">
+              <a:shade val="50000"/>
+            </a:schemeClr>
+          </a:lnRef>
+          <a:fillRef idx="1">
+            <a:schemeClr val="accent1"/>
+          </a:fillRef>
+          <a:effectRef idx="0">
+            <a:schemeClr val="accent1"/>
+          </a:effectRef>
+          <a:fontRef idx="minor">
+            <a:schemeClr val="lt1"/>
+          </a:fontRef>
+        </p:style>
+        <p:txBody>
+          <a:bodyPr lIns="91439" tIns="45720" rIns="91439" bIns="45720" rtlCol="0" anchor="ctr"/>
+          <a:lstStyle/>
+          <a:p>
+            <a:pPr algn="ctr"/>
+            <a:endParaRPr lang="ja-JP" altLang="en-US" sz="1000"/>
+          </a:p>
+        </p:txBody>
+      </p:sp>
+      <p:cxnSp>
+        <p:nvCxnSpPr>
+          <p:cNvPr id="21" name="直線矢印コネクタ 28"/>
+          <p:cNvCxnSpPr>
+            <a:stCxn id="153" idx="2"/>
+            <a:endCxn id="27" idx="0"/>
+          </p:cNvCxnSpPr>
+          <p:nvPr/>
+        </p:nvCxnSpPr>
+        <p:spPr>
+          <a:xfrm>
+            <a:off x="1631005" y="1388014"/>
+            <a:ext cx="4761" cy="268195"/>
+          </a:xfrm>
+          <a:prstGeom prst="straightConnector1">
+            <a:avLst/>
+          </a:prstGeom>
+          <a:ln w="19050">
+            <a:solidFill>
+              <a:schemeClr val="tx1"/>
+            </a:solidFill>
+            <a:tailEnd type="arrow"/>
+          </a:ln>
+        </p:spPr>
+        <p:style>
+          <a:lnRef idx="1">
+            <a:schemeClr val="accent1"/>
+          </a:lnRef>
+          <a:fillRef idx="0">
+            <a:schemeClr val="accent1"/>
+          </a:fillRef>
+          <a:effectRef idx="0">
+            <a:schemeClr val="accent1"/>
+          </a:effectRef>
+          <a:fontRef idx="minor">
+            <a:schemeClr val="tx1"/>
+          </a:fontRef>
+        </p:style>
+      </p:cxnSp>
+      <p:sp>
+        <p:nvSpPr>
+          <p:cNvPr id="34" name="正方形/長方形 33"/>
+          <p:cNvSpPr/>
+          <p:nvPr/>
+        </p:nvSpPr>
+        <p:spPr>
+          <a:xfrm>
+            <a:off x="1130152" y="1368177"/>
+            <a:ext cx="670395" cy="246221"/>
+          </a:xfrm>
+          <a:prstGeom prst="rect">
+            <a:avLst/>
+          </a:prstGeom>
+        </p:spPr>
+        <p:txBody>
+          <a:bodyPr wrap="square" lIns="91439" tIns="45720" rIns="91439" bIns="45720">
+            <a:spAutoFit/>
+          </a:bodyPr>
+          <a:lstStyle/>
+          <a:p>
+            <a:r>
+              <a:rPr lang="en-US" altLang="ja-JP" sz="1000" dirty="0" smtClean="0"/>
+              <a:t>Event2</a:t>
+            </a:r>
+            <a:endParaRPr lang="ja-JP" altLang="en-US" sz="1000" dirty="0"/>
+          </a:p>
+        </p:txBody>
+      </p:sp>
+      <p:sp>
+        <p:nvSpPr>
+          <p:cNvPr id="26" name="正方形/長方形 25"/>
+          <p:cNvSpPr/>
+          <p:nvPr/>
+        </p:nvSpPr>
+        <p:spPr>
+          <a:xfrm>
+            <a:off x="1097264" y="1103331"/>
+            <a:ext cx="1150005" cy="161573"/>
+          </a:xfrm>
+          <a:prstGeom prst="rect">
+            <a:avLst/>
+          </a:prstGeom>
+        </p:spPr>
+        <p:txBody>
+          <a:bodyPr wrap="square" lIns="91439" tIns="45720" rIns="91439" bIns="45720">
+            <a:noAutofit/>
+          </a:bodyPr>
+          <a:lstStyle/>
+          <a:p>
+            <a:r>
+              <a:rPr lang="en-US" altLang="ja-JP" sz="1000" dirty="0" smtClean="0"/>
+              <a:t>Event1/defer</a:t>
+            </a:r>
+            <a:endParaRPr lang="ja-JP" altLang="en-US" sz="1000" dirty="0"/>
+          </a:p>
+        </p:txBody>
+      </p:sp>
+      <p:sp>
+        <p:nvSpPr>
+          <p:cNvPr id="27" name="角丸四角形 26"/>
+          <p:cNvSpPr/>
+          <p:nvPr/>
+        </p:nvSpPr>
+        <p:spPr>
+          <a:xfrm>
+            <a:off x="1102025" y="1656209"/>
+            <a:ext cx="1067481" cy="538736"/>
+          </a:xfrm>
+          <a:prstGeom prst="roundRect">
+            <a:avLst/>
+          </a:prstGeom>
+          <a:noFill/>
+          <a:ln w="19050">
+            <a:solidFill>
+              <a:schemeClr val="tx1"/>
+            </a:solidFill>
+          </a:ln>
+        </p:spPr>
+        <p:style>
+          <a:lnRef idx="2">
+            <a:schemeClr val="accent1">
+              <a:shade val="50000"/>
+            </a:schemeClr>
+          </a:lnRef>
+          <a:fillRef idx="1">
+            <a:schemeClr val="accent1"/>
+          </a:fillRef>
+          <a:effectRef idx="0">
+            <a:schemeClr val="accent1"/>
+          </a:effectRef>
+          <a:fontRef idx="minor">
+            <a:schemeClr val="lt1"/>
+          </a:fontRef>
+        </p:style>
+        <p:txBody>
+          <a:bodyPr lIns="91439" tIns="45720" rIns="91439" bIns="45720" rtlCol="0" anchor="t" anchorCtr="0"/>
+          <a:lstStyle/>
+          <a:p>
+            <a:pPr algn="ctr"/>
+            <a:r>
+              <a:rPr lang="en-US" altLang="ja-JP" sz="1000" dirty="0" smtClean="0">
+                <a:solidFill>
+                  <a:schemeClr val="tx1"/>
+                </a:solidFill>
+              </a:rPr>
+              <a:t>State2</a:t>
+            </a:r>
+            <a:endParaRPr lang="ja-JP" altLang="en-US" sz="1000" dirty="0">
+              <a:solidFill>
+                <a:schemeClr val="tx1"/>
+              </a:solidFill>
+            </a:endParaRPr>
+          </a:p>
+        </p:txBody>
+      </p:sp>
+      <p:cxnSp>
+        <p:nvCxnSpPr>
+          <p:cNvPr id="28" name="直線コネクタ 27"/>
+          <p:cNvCxnSpPr/>
+          <p:nvPr/>
+        </p:nvCxnSpPr>
+        <p:spPr>
+          <a:xfrm>
+            <a:off x="1106786" y="1910262"/>
+            <a:ext cx="1058562" cy="0"/>
+          </a:xfrm>
+          <a:prstGeom prst="line">
+            <a:avLst/>
+          </a:prstGeom>
+          <a:ln w="12700">
+            <a:solidFill>
+              <a:schemeClr val="tx1"/>
+            </a:solidFill>
+          </a:ln>
+        </p:spPr>
+        <p:style>
+          <a:lnRef idx="1">
+            <a:schemeClr val="accent1"/>
+          </a:lnRef>
+          <a:fillRef idx="0">
+            <a:schemeClr val="accent1"/>
+          </a:fillRef>
+          <a:effectRef idx="0">
+            <a:schemeClr val="accent1"/>
+          </a:effectRef>
+          <a:fontRef idx="minor">
+            <a:schemeClr val="tx1"/>
+          </a:fontRef>
+        </p:style>
+      </p:cxnSp>
+      <p:sp>
+        <p:nvSpPr>
+          <p:cNvPr id="31" name="角丸四角形 30"/>
+          <p:cNvSpPr/>
+          <p:nvPr/>
+        </p:nvSpPr>
+        <p:spPr>
+          <a:xfrm>
+            <a:off x="1102326" y="2470869"/>
+            <a:ext cx="1067481" cy="538736"/>
+          </a:xfrm>
+          <a:prstGeom prst="roundRect">
+            <a:avLst/>
+          </a:prstGeom>
+          <a:noFill/>
+          <a:ln w="19050">
+            <a:solidFill>
+              <a:schemeClr val="tx1"/>
+            </a:solidFill>
+          </a:ln>
+        </p:spPr>
+        <p:style>
+          <a:lnRef idx="2">
+            <a:schemeClr val="accent1">
+              <a:shade val="50000"/>
+            </a:schemeClr>
+          </a:lnRef>
+          <a:fillRef idx="1">
+            <a:schemeClr val="accent1"/>
+          </a:fillRef>
+          <a:effectRef idx="0">
+            <a:schemeClr val="accent1"/>
+          </a:effectRef>
+          <a:fontRef idx="minor">
+            <a:schemeClr val="lt1"/>
+          </a:fontRef>
+        </p:style>
+        <p:txBody>
+          <a:bodyPr lIns="91439" tIns="45720" rIns="91439" bIns="45720" rtlCol="0" anchor="t" anchorCtr="0"/>
+          <a:lstStyle/>
+          <a:p>
+            <a:pPr algn="ctr"/>
+            <a:r>
+              <a:rPr lang="en-US" altLang="ja-JP" sz="1000" dirty="0" smtClean="0">
+                <a:solidFill>
+                  <a:schemeClr val="tx1"/>
+                </a:solidFill>
+              </a:rPr>
+              <a:t>State3</a:t>
+            </a:r>
+            <a:endParaRPr lang="ja-JP" altLang="en-US" sz="1000" dirty="0">
+              <a:solidFill>
+                <a:schemeClr val="tx1"/>
+              </a:solidFill>
+            </a:endParaRPr>
+          </a:p>
+        </p:txBody>
+      </p:sp>
+      <p:cxnSp>
+        <p:nvCxnSpPr>
+          <p:cNvPr id="32" name="直線コネクタ 31"/>
+          <p:cNvCxnSpPr/>
+          <p:nvPr/>
+        </p:nvCxnSpPr>
+        <p:spPr>
+          <a:xfrm>
+            <a:off x="1107087" y="2724922"/>
+            <a:ext cx="1058562" cy="0"/>
+          </a:xfrm>
+          <a:prstGeom prst="line">
+            <a:avLst/>
+          </a:prstGeom>
+          <a:ln w="12700">
+            <a:solidFill>
+              <a:schemeClr val="tx1"/>
+            </a:solidFill>
+          </a:ln>
+        </p:spPr>
+        <p:style>
+          <a:lnRef idx="1">
+            <a:schemeClr val="accent1"/>
+          </a:lnRef>
+          <a:fillRef idx="0">
+            <a:schemeClr val="accent1"/>
+          </a:fillRef>
+          <a:effectRef idx="0">
+            <a:schemeClr val="accent1"/>
+          </a:effectRef>
+          <a:fontRef idx="minor">
+            <a:schemeClr val="tx1"/>
+          </a:fontRef>
+        </p:style>
+      </p:cxnSp>
+      <p:sp>
+        <p:nvSpPr>
+          <p:cNvPr id="35" name="正方形/長方形 34"/>
+          <p:cNvSpPr/>
+          <p:nvPr/>
+        </p:nvSpPr>
+        <p:spPr>
+          <a:xfrm>
+            <a:off x="1102326" y="2724922"/>
+            <a:ext cx="1150005" cy="161573"/>
+          </a:xfrm>
+          <a:prstGeom prst="rect">
+            <a:avLst/>
+          </a:prstGeom>
+        </p:spPr>
+        <p:txBody>
+          <a:bodyPr wrap="square" lIns="91439" tIns="45720" rIns="91439" bIns="45720">
+            <a:noAutofit/>
+          </a:bodyPr>
+          <a:lstStyle/>
+          <a:p>
+            <a:endParaRPr lang="ja-JP" altLang="en-US" sz="1000" dirty="0"/>
+          </a:p>
+        </p:txBody>
+      </p:sp>
+      <p:cxnSp>
+        <p:nvCxnSpPr>
+          <p:cNvPr id="36" name="直線矢印コネクタ 28"/>
+          <p:cNvCxnSpPr>
+            <a:stCxn id="27" idx="2"/>
+            <a:endCxn id="31" idx="0"/>
+          </p:cNvCxnSpPr>
+          <p:nvPr/>
+        </p:nvCxnSpPr>
+        <p:spPr>
+          <a:xfrm>
+            <a:off x="1635766" y="2194945"/>
+            <a:ext cx="301" cy="275924"/>
+          </a:xfrm>
+          <a:prstGeom prst="straightConnector1">
+            <a:avLst/>
+          </a:prstGeom>
+          <a:ln w="19050">
+            <a:solidFill>
+              <a:schemeClr val="tx1"/>
+            </a:solidFill>
+            <a:tailEnd type="arrow"/>
+          </a:ln>
+        </p:spPr>
+        <p:style>
+          <a:lnRef idx="1">
+            <a:schemeClr val="accent1"/>
+          </a:lnRef>
+          <a:fillRef idx="0">
+            <a:schemeClr val="accent1"/>
+          </a:fillRef>
+          <a:effectRef idx="0">
+            <a:schemeClr val="accent1"/>
+          </a:effectRef>
+          <a:fontRef idx="minor">
+            <a:schemeClr val="tx1"/>
+          </a:fontRef>
+        </p:style>
+      </p:cxnSp>
+      <p:sp>
+        <p:nvSpPr>
+          <p:cNvPr id="44" name="角丸四角形 43"/>
+          <p:cNvSpPr/>
+          <p:nvPr/>
+        </p:nvSpPr>
+        <p:spPr>
+          <a:xfrm>
+            <a:off x="2805588" y="2470869"/>
+            <a:ext cx="1067481" cy="538736"/>
+          </a:xfrm>
+          <a:prstGeom prst="roundRect">
+            <a:avLst/>
+          </a:prstGeom>
+          <a:noFill/>
+          <a:ln w="19050">
+            <a:solidFill>
+              <a:schemeClr val="tx1"/>
+            </a:solidFill>
+          </a:ln>
+        </p:spPr>
+        <p:style>
+          <a:lnRef idx="2">
+            <a:schemeClr val="accent1">
+              <a:shade val="50000"/>
+            </a:schemeClr>
+          </a:lnRef>
+          <a:fillRef idx="1">
+            <a:schemeClr val="accent1"/>
+          </a:fillRef>
+          <a:effectRef idx="0">
+            <a:schemeClr val="accent1"/>
+          </a:effectRef>
+          <a:fontRef idx="minor">
+            <a:schemeClr val="lt1"/>
+          </a:fontRef>
+        </p:style>
+        <p:txBody>
+          <a:bodyPr lIns="91439" tIns="45720" rIns="91439" bIns="45720" rtlCol="0" anchor="t" anchorCtr="0"/>
+          <a:lstStyle/>
+          <a:p>
+            <a:pPr algn="ctr"/>
+            <a:r>
+              <a:rPr lang="en-US" altLang="ja-JP" sz="1000" dirty="0" smtClean="0">
+                <a:solidFill>
+                  <a:schemeClr val="tx1"/>
+                </a:solidFill>
+              </a:rPr>
+              <a:t>State4</a:t>
+            </a:r>
+            <a:endParaRPr lang="ja-JP" altLang="en-US" sz="1000" dirty="0">
+              <a:solidFill>
+                <a:schemeClr val="tx1"/>
+              </a:solidFill>
+            </a:endParaRPr>
+          </a:p>
+        </p:txBody>
+      </p:sp>
+      <p:cxnSp>
+        <p:nvCxnSpPr>
+          <p:cNvPr id="45" name="直線コネクタ 44"/>
+          <p:cNvCxnSpPr/>
+          <p:nvPr/>
+        </p:nvCxnSpPr>
+        <p:spPr>
+          <a:xfrm>
+            <a:off x="2810349" y="2724922"/>
+            <a:ext cx="1058562" cy="0"/>
+          </a:xfrm>
+          <a:prstGeom prst="line">
+            <a:avLst/>
+          </a:prstGeom>
+          <a:ln w="12700">
+            <a:solidFill>
+              <a:schemeClr val="tx1"/>
+            </a:solidFill>
+          </a:ln>
+        </p:spPr>
+        <p:style>
+          <a:lnRef idx="1">
+            <a:schemeClr val="accent1"/>
+          </a:lnRef>
+          <a:fillRef idx="0">
+            <a:schemeClr val="accent1"/>
+          </a:fillRef>
+          <a:effectRef idx="0">
+            <a:schemeClr val="accent1"/>
+          </a:effectRef>
+          <a:fontRef idx="minor">
+            <a:schemeClr val="tx1"/>
+          </a:fontRef>
+        </p:style>
+      </p:cxnSp>
+      <p:sp>
+        <p:nvSpPr>
+          <p:cNvPr id="46" name="正方形/長方形 45"/>
+          <p:cNvSpPr/>
+          <p:nvPr/>
+        </p:nvSpPr>
+        <p:spPr>
+          <a:xfrm>
+            <a:off x="2805588" y="2724922"/>
+            <a:ext cx="1150005" cy="161573"/>
+          </a:xfrm>
+          <a:prstGeom prst="rect">
+            <a:avLst/>
+          </a:prstGeom>
+        </p:spPr>
+        <p:txBody>
+          <a:bodyPr wrap="square" lIns="91439" tIns="45720" rIns="91439" bIns="45720">
+            <a:noAutofit/>
+          </a:bodyPr>
+          <a:lstStyle/>
+          <a:p>
+            <a:endParaRPr lang="ja-JP" altLang="en-US" sz="1000" dirty="0"/>
+          </a:p>
+        </p:txBody>
+      </p:sp>
+      <p:cxnSp>
+        <p:nvCxnSpPr>
+          <p:cNvPr id="47" name="直線矢印コネクタ 28"/>
+          <p:cNvCxnSpPr>
+            <a:stCxn id="31" idx="3"/>
+            <a:endCxn id="44" idx="1"/>
+          </p:cNvCxnSpPr>
+          <p:nvPr/>
+        </p:nvCxnSpPr>
+        <p:spPr>
+          <a:xfrm>
+            <a:off x="2169807" y="2740237"/>
+            <a:ext cx="635781" cy="0"/>
+          </a:xfrm>
+          <a:prstGeom prst="straightConnector1">
+            <a:avLst/>
+          </a:prstGeom>
+          <a:ln w="19050">
+            <a:solidFill>
+              <a:schemeClr val="tx1"/>
+            </a:solidFill>
+            <a:tailEnd type="arrow"/>
+          </a:ln>
+        </p:spPr>
+        <p:style>
+          <a:lnRef idx="1">
+            <a:schemeClr val="accent1"/>
+          </a:lnRef>
+          <a:fillRef idx="0">
+            <a:schemeClr val="accent1"/>
+          </a:fillRef>
+          <a:effectRef idx="0">
+            <a:schemeClr val="accent1"/>
+          </a:effectRef>
+          <a:fontRef idx="minor">
+            <a:schemeClr val="tx1"/>
+          </a:fontRef>
+        </p:style>
+      </p:cxnSp>
+      <p:sp>
+        <p:nvSpPr>
+          <p:cNvPr id="51" name="正方形/長方形 50"/>
+          <p:cNvSpPr/>
+          <p:nvPr/>
+        </p:nvSpPr>
+        <p:spPr>
+          <a:xfrm>
+            <a:off x="2169807" y="2471391"/>
+            <a:ext cx="670395" cy="246221"/>
+          </a:xfrm>
+          <a:prstGeom prst="rect">
+            <a:avLst/>
+          </a:prstGeom>
+        </p:spPr>
+        <p:txBody>
+          <a:bodyPr wrap="square" lIns="91439" tIns="45720" rIns="91439" bIns="45720">
+            <a:spAutoFit/>
+          </a:bodyPr>
+          <a:lstStyle/>
+          <a:p>
+            <a:r>
+              <a:rPr lang="en-US" altLang="ja-JP" sz="1000" dirty="0" smtClean="0"/>
+              <a:t>Event1</a:t>
+            </a:r>
+            <a:endParaRPr lang="ja-JP" altLang="en-US" sz="1000" dirty="0"/>
+          </a:p>
+        </p:txBody>
+      </p:sp>
+      <p:sp>
+        <p:nvSpPr>
+          <p:cNvPr id="58" name="角丸四角形 57"/>
+          <p:cNvSpPr/>
+          <p:nvPr/>
+        </p:nvSpPr>
+        <p:spPr>
+          <a:xfrm>
+            <a:off x="2805588" y="1656209"/>
+            <a:ext cx="1067481" cy="538736"/>
+          </a:xfrm>
+          <a:prstGeom prst="roundRect">
+            <a:avLst/>
+          </a:prstGeom>
+          <a:noFill/>
+          <a:ln w="19050">
+            <a:solidFill>
+              <a:schemeClr val="tx1"/>
+            </a:solidFill>
+          </a:ln>
+        </p:spPr>
+        <p:style>
+          <a:lnRef idx="2">
+            <a:schemeClr val="accent1">
+              <a:shade val="50000"/>
+            </a:schemeClr>
+          </a:lnRef>
+          <a:fillRef idx="1">
+            <a:schemeClr val="accent1"/>
+          </a:fillRef>
+          <a:effectRef idx="0">
+            <a:schemeClr val="accent1"/>
+          </a:effectRef>
+          <a:fontRef idx="minor">
+            <a:schemeClr val="lt1"/>
+          </a:fontRef>
+        </p:style>
+        <p:txBody>
+          <a:bodyPr lIns="91439" tIns="45720" rIns="91439" bIns="45720" rtlCol="0" anchor="t" anchorCtr="0"/>
+          <a:lstStyle/>
+          <a:p>
+            <a:pPr algn="ctr"/>
+            <a:r>
+              <a:rPr lang="en-US" altLang="ja-JP" sz="1000" dirty="0" smtClean="0">
+                <a:solidFill>
+                  <a:schemeClr val="tx1"/>
+                </a:solidFill>
+              </a:rPr>
+              <a:t>State5</a:t>
+            </a:r>
+            <a:endParaRPr lang="ja-JP" altLang="en-US" sz="1000" dirty="0">
+              <a:solidFill>
+                <a:schemeClr val="tx1"/>
+              </a:solidFill>
+            </a:endParaRPr>
+          </a:p>
+        </p:txBody>
+      </p:sp>
+      <p:cxnSp>
+        <p:nvCxnSpPr>
+          <p:cNvPr id="59" name="直線コネクタ 58"/>
+          <p:cNvCxnSpPr/>
+          <p:nvPr/>
+        </p:nvCxnSpPr>
+        <p:spPr>
+          <a:xfrm>
+            <a:off x="2810349" y="1910262"/>
+            <a:ext cx="1058562" cy="0"/>
+          </a:xfrm>
+          <a:prstGeom prst="line">
+            <a:avLst/>
+          </a:prstGeom>
+          <a:ln w="12700">
+            <a:solidFill>
+              <a:schemeClr val="tx1"/>
+            </a:solidFill>
+          </a:ln>
+        </p:spPr>
+        <p:style>
+          <a:lnRef idx="1">
+            <a:schemeClr val="accent1"/>
+          </a:lnRef>
+          <a:fillRef idx="0">
+            <a:schemeClr val="accent1"/>
+          </a:fillRef>
+          <a:effectRef idx="0">
+            <a:schemeClr val="accent1"/>
+          </a:effectRef>
+          <a:fontRef idx="minor">
+            <a:schemeClr val="tx1"/>
+          </a:fontRef>
+        </p:style>
+      </p:cxnSp>
+      <p:sp>
+        <p:nvSpPr>
+          <p:cNvPr id="60" name="正方形/長方形 59"/>
+          <p:cNvSpPr/>
+          <p:nvPr/>
+        </p:nvSpPr>
+        <p:spPr>
+          <a:xfrm>
+            <a:off x="2805588" y="1910262"/>
+            <a:ext cx="1150005" cy="161573"/>
+          </a:xfrm>
+          <a:prstGeom prst="rect">
+            <a:avLst/>
+          </a:prstGeom>
+        </p:spPr>
+        <p:txBody>
+          <a:bodyPr wrap="square" lIns="91439" tIns="45720" rIns="91439" bIns="45720">
+            <a:noAutofit/>
+          </a:bodyPr>
+          <a:lstStyle/>
+          <a:p>
+            <a:endParaRPr lang="ja-JP" altLang="en-US" sz="1000" dirty="0"/>
+          </a:p>
+        </p:txBody>
+      </p:sp>
+      <p:cxnSp>
+        <p:nvCxnSpPr>
+          <p:cNvPr id="61" name="直線矢印コネクタ 28"/>
+          <p:cNvCxnSpPr>
+            <a:stCxn id="44" idx="0"/>
+            <a:endCxn id="58" idx="2"/>
+          </p:cNvCxnSpPr>
+          <p:nvPr/>
+        </p:nvCxnSpPr>
+        <p:spPr>
+          <a:xfrm flipV="1">
+            <a:off x="3339329" y="2194945"/>
+            <a:ext cx="0" cy="275924"/>
+          </a:xfrm>
+          <a:prstGeom prst="straightConnector1">
+            <a:avLst/>
+          </a:prstGeom>
+          <a:ln w="19050">
+            <a:solidFill>
+              <a:schemeClr val="tx1"/>
+            </a:solidFill>
+            <a:tailEnd type="arrow"/>
+          </a:ln>
+        </p:spPr>
+        <p:style>
+          <a:lnRef idx="1">
+            <a:schemeClr val="accent1"/>
+          </a:lnRef>
+          <a:fillRef idx="0">
+            <a:schemeClr val="accent1"/>
+          </a:fillRef>
+          <a:effectRef idx="0">
+            <a:schemeClr val="accent1"/>
+          </a:effectRef>
+          <a:fontRef idx="minor">
+            <a:schemeClr val="tx1"/>
+          </a:fontRef>
+        </p:style>
+      </p:cxnSp>
+      <p:sp>
+        <p:nvSpPr>
+          <p:cNvPr id="64" name="正方形/長方形 63"/>
+          <p:cNvSpPr/>
+          <p:nvPr/>
+        </p:nvSpPr>
+        <p:spPr>
+          <a:xfrm>
+            <a:off x="2175806" y="1656700"/>
+            <a:ext cx="670395" cy="246221"/>
+          </a:xfrm>
+          <a:prstGeom prst="rect">
+            <a:avLst/>
+          </a:prstGeom>
+        </p:spPr>
+        <p:txBody>
+          <a:bodyPr wrap="square" lIns="91439" tIns="45720" rIns="91439" bIns="45720">
+            <a:spAutoFit/>
+          </a:bodyPr>
+          <a:lstStyle/>
+          <a:p>
+            <a:r>
+              <a:rPr lang="en-US" altLang="ja-JP" sz="1000" dirty="0" smtClean="0"/>
+              <a:t>Event1</a:t>
+            </a:r>
+            <a:endParaRPr lang="ja-JP" altLang="en-US" sz="1000" dirty="0"/>
+          </a:p>
+        </p:txBody>
+      </p:sp>
+      <p:cxnSp>
+        <p:nvCxnSpPr>
+          <p:cNvPr id="37" name="直線矢印コネクタ 28"/>
+          <p:cNvCxnSpPr>
+            <a:stCxn id="27" idx="3"/>
+            <a:endCxn id="58" idx="1"/>
+          </p:cNvCxnSpPr>
+          <p:nvPr/>
+        </p:nvCxnSpPr>
+        <p:spPr>
+          <a:xfrm>
+            <a:off x="2169506" y="1925577"/>
+            <a:ext cx="636082" cy="0"/>
+          </a:xfrm>
+          <a:prstGeom prst="straightConnector1">
+            <a:avLst/>
+          </a:prstGeom>
+          <a:ln w="19050">
+            <a:solidFill>
+              <a:schemeClr val="tx1"/>
+            </a:solidFill>
+            <a:tailEnd type="arrow"/>
+          </a:ln>
+        </p:spPr>
+        <p:style>
+          <a:lnRef idx="1">
+            <a:schemeClr val="accent1"/>
+          </a:lnRef>
+          <a:fillRef idx="0">
+            <a:schemeClr val="accent1"/>
+          </a:fillRef>
+          <a:effectRef idx="0">
+            <a:schemeClr val="accent1"/>
+          </a:effectRef>
+          <a:fontRef idx="minor">
+            <a:schemeClr val="tx1"/>
+          </a:fontRef>
+        </p:style>
+      </p:cxnSp>
+    </p:spTree>
+    <p:extLst>
+      <p:ext uri="{BB962C8B-B14F-4D97-AF65-F5344CB8AC3E}">
+        <p14:creationId xmlns:p14="http://schemas.microsoft.com/office/powerpoint/2010/main" val="3231772819"/>
+      </p:ext>
+    </p:extLst>
+  </p:cSld>
+  <p:clrMapOvr>
+    <a:masterClrMapping/>
+  </p:clrMapOvr>
+  <p:timing>
+    <p:tnLst>
+      <p:par>
+        <p:cTn id="1" dur="indefinite" restart="never" nodeType="tmRoot"/>
+      </p:par>
+    </p:tnLst>
+  </p:timing>
+</p:sld>
+</file>
+
+<file path=ppt/slides/slide13.xml><?xml version="1.0" encoding="utf-8"?>
 <p:sld xmlns:a="http://schemas.openxmlformats.org/drawingml/2006/main" xmlns:r="http://schemas.openxmlformats.org/officeDocument/2006/relationships" xmlns:p="http://schemas.openxmlformats.org/presentationml/2006/main">
   <p:cSld>
     <p:spTree>

</xml_diff>

<commit_message>
Add anonymous transition and deferred events.
</commit_message>
<xml_diff>
--- a/boost_training/msm/fig.pptx
+++ b/boost_training/msm/fig.pptx
@@ -204,7 +204,7 @@
           <a:p>
             <a:fld id="{33E477F9-361B-4780-B227-665A41208240}" type="datetimeFigureOut">
               <a:rPr kumimoji="1" lang="ja-JP" altLang="en-US" smtClean="0"/>
-              <a:t>2012/2/20</a:t>
+              <a:t>2012/2/22</a:t>
             </a:fld>
             <a:endParaRPr kumimoji="1" lang="ja-JP" altLang="en-US"/>
           </a:p>
@@ -1842,7 +1842,7 @@
           <a:p>
             <a:fld id="{E90ED720-0104-4369-84BC-D37694168613}" type="datetimeFigureOut">
               <a:rPr kumimoji="1" lang="ja-JP" altLang="en-US" smtClean="0"/>
-              <a:t>2012/2/20</a:t>
+              <a:t>2012/2/22</a:t>
             </a:fld>
             <a:endParaRPr kumimoji="1" lang="ja-JP" altLang="en-US"/>
           </a:p>
@@ -2039,7 +2039,7 @@
           <a:p>
             <a:fld id="{E90ED720-0104-4369-84BC-D37694168613}" type="datetimeFigureOut">
               <a:rPr kumimoji="1" lang="ja-JP" altLang="en-US" smtClean="0"/>
-              <a:t>2012/2/20</a:t>
+              <a:t>2012/2/22</a:t>
             </a:fld>
             <a:endParaRPr kumimoji="1" lang="ja-JP" altLang="en-US"/>
           </a:p>
@@ -2246,7 +2246,7 @@
           <a:p>
             <a:fld id="{E90ED720-0104-4369-84BC-D37694168613}" type="datetimeFigureOut">
               <a:rPr kumimoji="1" lang="ja-JP" altLang="en-US" smtClean="0"/>
-              <a:t>2012/2/20</a:t>
+              <a:t>2012/2/22</a:t>
             </a:fld>
             <a:endParaRPr kumimoji="1" lang="ja-JP" altLang="en-US"/>
           </a:p>
@@ -2443,7 +2443,7 @@
           <a:p>
             <a:fld id="{E90ED720-0104-4369-84BC-D37694168613}" type="datetimeFigureOut">
               <a:rPr kumimoji="1" lang="ja-JP" altLang="en-US" smtClean="0"/>
-              <a:t>2012/2/20</a:t>
+              <a:t>2012/2/22</a:t>
             </a:fld>
             <a:endParaRPr kumimoji="1" lang="ja-JP" altLang="en-US"/>
           </a:p>
@@ -2684,7 +2684,7 @@
           <a:p>
             <a:fld id="{E90ED720-0104-4369-84BC-D37694168613}" type="datetimeFigureOut">
               <a:rPr kumimoji="1" lang="ja-JP" altLang="en-US" smtClean="0"/>
-              <a:t>2012/2/20</a:t>
+              <a:t>2012/2/22</a:t>
             </a:fld>
             <a:endParaRPr kumimoji="1" lang="ja-JP" altLang="en-US"/>
           </a:p>
@@ -3031,7 +3031,7 @@
           <a:p>
             <a:fld id="{E90ED720-0104-4369-84BC-D37694168613}" type="datetimeFigureOut">
               <a:rPr kumimoji="1" lang="ja-JP" altLang="en-US" smtClean="0"/>
-              <a:t>2012/2/20</a:t>
+              <a:t>2012/2/22</a:t>
             </a:fld>
             <a:endParaRPr kumimoji="1" lang="ja-JP" altLang="en-US"/>
           </a:p>
@@ -3512,7 +3512,7 @@
           <a:p>
             <a:fld id="{E90ED720-0104-4369-84BC-D37694168613}" type="datetimeFigureOut">
               <a:rPr kumimoji="1" lang="ja-JP" altLang="en-US" smtClean="0"/>
-              <a:t>2012/2/20</a:t>
+              <a:t>2012/2/22</a:t>
             </a:fld>
             <a:endParaRPr kumimoji="1" lang="ja-JP" altLang="en-US"/>
           </a:p>
@@ -3625,7 +3625,7 @@
           <a:p>
             <a:fld id="{E90ED720-0104-4369-84BC-D37694168613}" type="datetimeFigureOut">
               <a:rPr kumimoji="1" lang="ja-JP" altLang="en-US" smtClean="0"/>
-              <a:t>2012/2/20</a:t>
+              <a:t>2012/2/22</a:t>
             </a:fld>
             <a:endParaRPr kumimoji="1" lang="ja-JP" altLang="en-US"/>
           </a:p>
@@ -3715,7 +3715,7 @@
           <a:p>
             <a:fld id="{E90ED720-0104-4369-84BC-D37694168613}" type="datetimeFigureOut">
               <a:rPr kumimoji="1" lang="ja-JP" altLang="en-US" smtClean="0"/>
-              <a:t>2012/2/20</a:t>
+              <a:t>2012/2/22</a:t>
             </a:fld>
             <a:endParaRPr kumimoji="1" lang="ja-JP" altLang="en-US"/>
           </a:p>
@@ -4019,7 +4019,7 @@
           <a:p>
             <a:fld id="{E90ED720-0104-4369-84BC-D37694168613}" type="datetimeFigureOut">
               <a:rPr kumimoji="1" lang="ja-JP" altLang="en-US" smtClean="0"/>
-              <a:t>2012/2/20</a:t>
+              <a:t>2012/2/22</a:t>
             </a:fld>
             <a:endParaRPr kumimoji="1" lang="ja-JP" altLang="en-US"/>
           </a:p>
@@ -4267,7 +4267,7 @@
           <a:p>
             <a:fld id="{E90ED720-0104-4369-84BC-D37694168613}" type="datetimeFigureOut">
               <a:rPr kumimoji="1" lang="ja-JP" altLang="en-US" smtClean="0"/>
-              <a:t>2012/2/20</a:t>
+              <a:t>2012/2/22</a:t>
             </a:fld>
             <a:endParaRPr kumimoji="1" lang="ja-JP" altLang="en-US"/>
           </a:p>
@@ -4507,7 +4507,7 @@
           <a:p>
             <a:fld id="{E90ED720-0104-4369-84BC-D37694168613}" type="datetimeFigureOut">
               <a:rPr kumimoji="1" lang="ja-JP" altLang="en-US" smtClean="0"/>
-              <a:t>2012/2/20</a:t>
+              <a:t>2012/2/22</a:t>
             </a:fld>
             <a:endParaRPr kumimoji="1" lang="ja-JP" altLang="en-US"/>
           </a:p>
@@ -8399,45 +8399,6 @@
           </a:p>
         </p:txBody>
       </p:sp>
-      <p:cxnSp>
-        <p:nvCxnSpPr>
-          <p:cNvPr id="61" name="直線矢印コネクタ 28"/>
-          <p:cNvCxnSpPr>
-            <a:stCxn id="44" idx="0"/>
-            <a:endCxn id="58" idx="2"/>
-          </p:cNvCxnSpPr>
-          <p:nvPr/>
-        </p:nvCxnSpPr>
-        <p:spPr>
-          <a:xfrm flipV="1">
-            <a:off x="3339329" y="2194945"/>
-            <a:ext cx="0" cy="275924"/>
-          </a:xfrm>
-          <a:prstGeom prst="straightConnector1">
-            <a:avLst/>
-          </a:prstGeom>
-          <a:ln w="19050">
-            <a:solidFill>
-              <a:schemeClr val="tx1"/>
-            </a:solidFill>
-            <a:tailEnd type="arrow"/>
-          </a:ln>
-        </p:spPr>
-        <p:style>
-          <a:lnRef idx="1">
-            <a:schemeClr val="accent1"/>
-          </a:lnRef>
-          <a:fillRef idx="0">
-            <a:schemeClr val="accent1"/>
-          </a:fillRef>
-          <a:effectRef idx="0">
-            <a:schemeClr val="accent1"/>
-          </a:effectRef>
-          <a:fontRef idx="minor">
-            <a:schemeClr val="tx1"/>
-          </a:fontRef>
-        </p:style>
-      </p:cxnSp>
       <p:sp>
         <p:nvSpPr>
           <p:cNvPr id="64" name="正方形/長方形 63"/>

</xml_diff>

<commit_message>
Added sumbachine state model.
</commit_message>
<xml_diff>
--- a/boost_training/msm/fig.pptx
+++ b/boost_training/msm/fig.pptx
@@ -5,7 +5,7 @@
     <p:sldMasterId id="2147483648" r:id="rId1"/>
   </p:sldMasterIdLst>
   <p:notesMasterIdLst>
-    <p:notesMasterId r:id="rId15"/>
+    <p:notesMasterId r:id="rId17"/>
   </p:notesMasterIdLst>
   <p:sldIdLst>
     <p:sldId id="257" r:id="rId2"/>
@@ -20,7 +20,9 @@
     <p:sldId id="268" r:id="rId11"/>
     <p:sldId id="269" r:id="rId12"/>
     <p:sldId id="270" r:id="rId13"/>
-    <p:sldId id="258" r:id="rId14"/>
+    <p:sldId id="271" r:id="rId14"/>
+    <p:sldId id="272" r:id="rId15"/>
+    <p:sldId id="258" r:id="rId16"/>
   </p:sldIdLst>
   <p:sldSz cx="4321175" cy="3600450"/>
   <p:notesSz cx="6858000" cy="9144000"/>
@@ -204,7 +206,7 @@
           <a:p>
             <a:fld id="{33E477F9-361B-4780-B227-665A41208240}" type="datetimeFigureOut">
               <a:rPr kumimoji="1" lang="ja-JP" altLang="en-US" smtClean="0"/>
-              <a:t>2012/2/22</a:t>
+              <a:t>2012/2/24</a:t>
             </a:fld>
             <a:endParaRPr kumimoji="1" lang="ja-JP" altLang="en-US"/>
           </a:p>
@@ -949,6 +951,184 @@
 </p:notes>
 </file>
 
+<file path=ppt/notesSlides/notesSlide14.xml><?xml version="1.0" encoding="utf-8"?>
+<p:notes xmlns:a="http://schemas.openxmlformats.org/drawingml/2006/main" xmlns:r="http://schemas.openxmlformats.org/officeDocument/2006/relationships" xmlns:p="http://schemas.openxmlformats.org/presentationml/2006/main">
+  <p:cSld>
+    <p:spTree>
+      <p:nvGrpSpPr>
+        <p:cNvPr id="1" name=""/>
+        <p:cNvGrpSpPr/>
+        <p:nvPr/>
+      </p:nvGrpSpPr>
+      <p:grpSpPr>
+        <a:xfrm>
+          <a:off x="0" y="0"/>
+          <a:ext cx="0" cy="0"/>
+          <a:chOff x="0" y="0"/>
+          <a:chExt cx="0" cy="0"/>
+        </a:xfrm>
+      </p:grpSpPr>
+      <p:sp>
+        <p:nvSpPr>
+          <p:cNvPr id="2" name="スライド イメージ プレースホルダー 1"/>
+          <p:cNvSpPr>
+            <a:spLocks noGrp="1" noRot="1" noChangeAspect="1"/>
+          </p:cNvSpPr>
+          <p:nvPr>
+            <p:ph type="sldImg"/>
+          </p:nvPr>
+        </p:nvSpPr>
+        <p:spPr>
+          <a:xfrm>
+            <a:off x="1371600" y="685800"/>
+            <a:ext cx="4114800" cy="3429000"/>
+          </a:xfrm>
+        </p:spPr>
+      </p:sp>
+      <p:sp>
+        <p:nvSpPr>
+          <p:cNvPr id="3" name="ノート プレースホルダー 2"/>
+          <p:cNvSpPr>
+            <a:spLocks noGrp="1"/>
+          </p:cNvSpPr>
+          <p:nvPr>
+            <p:ph type="body" idx="1"/>
+          </p:nvPr>
+        </p:nvSpPr>
+        <p:spPr/>
+        <p:txBody>
+          <a:bodyPr/>
+          <a:lstStyle/>
+          <a:p>
+            <a:endParaRPr kumimoji="1" lang="ja-JP" altLang="en-US" dirty="0"/>
+          </a:p>
+        </p:txBody>
+      </p:sp>
+      <p:sp>
+        <p:nvSpPr>
+          <p:cNvPr id="4" name="スライド番号プレースホルダー 3"/>
+          <p:cNvSpPr>
+            <a:spLocks noGrp="1"/>
+          </p:cNvSpPr>
+          <p:nvPr>
+            <p:ph type="sldNum" sz="quarter" idx="10"/>
+          </p:nvPr>
+        </p:nvSpPr>
+        <p:spPr/>
+        <p:txBody>
+          <a:bodyPr/>
+          <a:lstStyle/>
+          <a:p>
+            <a:fld id="{528CE6EB-F52D-476C-B1B9-A71D981A6739}" type="slidenum">
+              <a:rPr kumimoji="1" lang="ja-JP" altLang="en-US" smtClean="0"/>
+              <a:t>14</a:t>
+            </a:fld>
+            <a:endParaRPr kumimoji="1" lang="ja-JP" altLang="en-US" dirty="0"/>
+          </a:p>
+        </p:txBody>
+      </p:sp>
+    </p:spTree>
+    <p:extLst>
+      <p:ext uri="{BB962C8B-B14F-4D97-AF65-F5344CB8AC3E}">
+        <p14:creationId xmlns:p14="http://schemas.microsoft.com/office/powerpoint/2010/main" val="421502639"/>
+      </p:ext>
+    </p:extLst>
+  </p:cSld>
+  <p:clrMapOvr>
+    <a:masterClrMapping/>
+  </p:clrMapOvr>
+</p:notes>
+</file>
+
+<file path=ppt/notesSlides/notesSlide15.xml><?xml version="1.0" encoding="utf-8"?>
+<p:notes xmlns:a="http://schemas.openxmlformats.org/drawingml/2006/main" xmlns:r="http://schemas.openxmlformats.org/officeDocument/2006/relationships" xmlns:p="http://schemas.openxmlformats.org/presentationml/2006/main">
+  <p:cSld>
+    <p:spTree>
+      <p:nvGrpSpPr>
+        <p:cNvPr id="1" name=""/>
+        <p:cNvGrpSpPr/>
+        <p:nvPr/>
+      </p:nvGrpSpPr>
+      <p:grpSpPr>
+        <a:xfrm>
+          <a:off x="0" y="0"/>
+          <a:ext cx="0" cy="0"/>
+          <a:chOff x="0" y="0"/>
+          <a:chExt cx="0" cy="0"/>
+        </a:xfrm>
+      </p:grpSpPr>
+      <p:sp>
+        <p:nvSpPr>
+          <p:cNvPr id="2" name="スライド イメージ プレースホルダー 1"/>
+          <p:cNvSpPr>
+            <a:spLocks noGrp="1" noRot="1" noChangeAspect="1"/>
+          </p:cNvSpPr>
+          <p:nvPr>
+            <p:ph type="sldImg"/>
+          </p:nvPr>
+        </p:nvSpPr>
+        <p:spPr>
+          <a:xfrm>
+            <a:off x="1371600" y="685800"/>
+            <a:ext cx="4114800" cy="3429000"/>
+          </a:xfrm>
+        </p:spPr>
+      </p:sp>
+      <p:sp>
+        <p:nvSpPr>
+          <p:cNvPr id="3" name="ノート プレースホルダー 2"/>
+          <p:cNvSpPr>
+            <a:spLocks noGrp="1"/>
+          </p:cNvSpPr>
+          <p:nvPr>
+            <p:ph type="body" idx="1"/>
+          </p:nvPr>
+        </p:nvSpPr>
+        <p:spPr/>
+        <p:txBody>
+          <a:bodyPr/>
+          <a:lstStyle/>
+          <a:p>
+            <a:endParaRPr kumimoji="1" lang="ja-JP" altLang="en-US" dirty="0"/>
+          </a:p>
+        </p:txBody>
+      </p:sp>
+      <p:sp>
+        <p:nvSpPr>
+          <p:cNvPr id="4" name="スライド番号プレースホルダー 3"/>
+          <p:cNvSpPr>
+            <a:spLocks noGrp="1"/>
+          </p:cNvSpPr>
+          <p:nvPr>
+            <p:ph type="sldNum" sz="quarter" idx="10"/>
+          </p:nvPr>
+        </p:nvSpPr>
+        <p:spPr/>
+        <p:txBody>
+          <a:bodyPr/>
+          <a:lstStyle/>
+          <a:p>
+            <a:fld id="{528CE6EB-F52D-476C-B1B9-A71D981A6739}" type="slidenum">
+              <a:rPr kumimoji="1" lang="ja-JP" altLang="en-US" smtClean="0"/>
+              <a:t>15</a:t>
+            </a:fld>
+            <a:endParaRPr kumimoji="1" lang="ja-JP" altLang="en-US" dirty="0"/>
+          </a:p>
+        </p:txBody>
+      </p:sp>
+    </p:spTree>
+    <p:extLst>
+      <p:ext uri="{BB962C8B-B14F-4D97-AF65-F5344CB8AC3E}">
+        <p14:creationId xmlns:p14="http://schemas.microsoft.com/office/powerpoint/2010/main" val="421502639"/>
+      </p:ext>
+    </p:extLst>
+  </p:cSld>
+  <p:clrMapOvr>
+    <a:masterClrMapping/>
+  </p:clrMapOvr>
+</p:notes>
+</file>
+
 <file path=ppt/notesSlides/notesSlide2.xml><?xml version="1.0" encoding="utf-8"?>
 <p:notes xmlns:a="http://schemas.openxmlformats.org/drawingml/2006/main" xmlns:r="http://schemas.openxmlformats.org/officeDocument/2006/relationships" xmlns:p="http://schemas.openxmlformats.org/presentationml/2006/main">
   <p:cSld>
@@ -1842,7 +2022,7 @@
           <a:p>
             <a:fld id="{E90ED720-0104-4369-84BC-D37694168613}" type="datetimeFigureOut">
               <a:rPr kumimoji="1" lang="ja-JP" altLang="en-US" smtClean="0"/>
-              <a:t>2012/2/22</a:t>
+              <a:t>2012/2/24</a:t>
             </a:fld>
             <a:endParaRPr kumimoji="1" lang="ja-JP" altLang="en-US"/>
           </a:p>
@@ -2039,7 +2219,7 @@
           <a:p>
             <a:fld id="{E90ED720-0104-4369-84BC-D37694168613}" type="datetimeFigureOut">
               <a:rPr kumimoji="1" lang="ja-JP" altLang="en-US" smtClean="0"/>
-              <a:t>2012/2/22</a:t>
+              <a:t>2012/2/24</a:t>
             </a:fld>
             <a:endParaRPr kumimoji="1" lang="ja-JP" altLang="en-US"/>
           </a:p>
@@ -2246,7 +2426,7 @@
           <a:p>
             <a:fld id="{E90ED720-0104-4369-84BC-D37694168613}" type="datetimeFigureOut">
               <a:rPr kumimoji="1" lang="ja-JP" altLang="en-US" smtClean="0"/>
-              <a:t>2012/2/22</a:t>
+              <a:t>2012/2/24</a:t>
             </a:fld>
             <a:endParaRPr kumimoji="1" lang="ja-JP" altLang="en-US"/>
           </a:p>
@@ -2443,7 +2623,7 @@
           <a:p>
             <a:fld id="{E90ED720-0104-4369-84BC-D37694168613}" type="datetimeFigureOut">
               <a:rPr kumimoji="1" lang="ja-JP" altLang="en-US" smtClean="0"/>
-              <a:t>2012/2/22</a:t>
+              <a:t>2012/2/24</a:t>
             </a:fld>
             <a:endParaRPr kumimoji="1" lang="ja-JP" altLang="en-US"/>
           </a:p>
@@ -2684,7 +2864,7 @@
           <a:p>
             <a:fld id="{E90ED720-0104-4369-84BC-D37694168613}" type="datetimeFigureOut">
               <a:rPr kumimoji="1" lang="ja-JP" altLang="en-US" smtClean="0"/>
-              <a:t>2012/2/22</a:t>
+              <a:t>2012/2/24</a:t>
             </a:fld>
             <a:endParaRPr kumimoji="1" lang="ja-JP" altLang="en-US"/>
           </a:p>
@@ -3031,7 +3211,7 @@
           <a:p>
             <a:fld id="{E90ED720-0104-4369-84BC-D37694168613}" type="datetimeFigureOut">
               <a:rPr kumimoji="1" lang="ja-JP" altLang="en-US" smtClean="0"/>
-              <a:t>2012/2/22</a:t>
+              <a:t>2012/2/24</a:t>
             </a:fld>
             <a:endParaRPr kumimoji="1" lang="ja-JP" altLang="en-US"/>
           </a:p>
@@ -3512,7 +3692,7 @@
           <a:p>
             <a:fld id="{E90ED720-0104-4369-84BC-D37694168613}" type="datetimeFigureOut">
               <a:rPr kumimoji="1" lang="ja-JP" altLang="en-US" smtClean="0"/>
-              <a:t>2012/2/22</a:t>
+              <a:t>2012/2/24</a:t>
             </a:fld>
             <a:endParaRPr kumimoji="1" lang="ja-JP" altLang="en-US"/>
           </a:p>
@@ -3625,7 +3805,7 @@
           <a:p>
             <a:fld id="{E90ED720-0104-4369-84BC-D37694168613}" type="datetimeFigureOut">
               <a:rPr kumimoji="1" lang="ja-JP" altLang="en-US" smtClean="0"/>
-              <a:t>2012/2/22</a:t>
+              <a:t>2012/2/24</a:t>
             </a:fld>
             <a:endParaRPr kumimoji="1" lang="ja-JP" altLang="en-US"/>
           </a:p>
@@ -3715,7 +3895,7 @@
           <a:p>
             <a:fld id="{E90ED720-0104-4369-84BC-D37694168613}" type="datetimeFigureOut">
               <a:rPr kumimoji="1" lang="ja-JP" altLang="en-US" smtClean="0"/>
-              <a:t>2012/2/22</a:t>
+              <a:t>2012/2/24</a:t>
             </a:fld>
             <a:endParaRPr kumimoji="1" lang="ja-JP" altLang="en-US"/>
           </a:p>
@@ -4019,7 +4199,7 @@
           <a:p>
             <a:fld id="{E90ED720-0104-4369-84BC-D37694168613}" type="datetimeFigureOut">
               <a:rPr kumimoji="1" lang="ja-JP" altLang="en-US" smtClean="0"/>
-              <a:t>2012/2/22</a:t>
+              <a:t>2012/2/24</a:t>
             </a:fld>
             <a:endParaRPr kumimoji="1" lang="ja-JP" altLang="en-US"/>
           </a:p>
@@ -4267,7 +4447,7 @@
           <a:p>
             <a:fld id="{E90ED720-0104-4369-84BC-D37694168613}" type="datetimeFigureOut">
               <a:rPr kumimoji="1" lang="ja-JP" altLang="en-US" smtClean="0"/>
-              <a:t>2012/2/22</a:t>
+              <a:t>2012/2/24</a:t>
             </a:fld>
             <a:endParaRPr kumimoji="1" lang="ja-JP" altLang="en-US"/>
           </a:p>
@@ -4507,7 +4687,7 @@
           <a:p>
             <a:fld id="{E90ED720-0104-4369-84BC-D37694168613}" type="datetimeFigureOut">
               <a:rPr kumimoji="1" lang="ja-JP" altLang="en-US" smtClean="0"/>
-              <a:t>2012/2/22</a:t>
+              <a:t>2012/2/24</a:t>
             </a:fld>
             <a:endParaRPr kumimoji="1" lang="ja-JP" altLang="en-US"/>
           </a:p>
@@ -8488,6 +8668,1820 @@
 </file>
 
 <file path=ppt/slides/slide13.xml><?xml version="1.0" encoding="utf-8"?>
+<p:sld xmlns:a="http://schemas.openxmlformats.org/drawingml/2006/main" xmlns:r="http://schemas.openxmlformats.org/officeDocument/2006/relationships" xmlns:p="http://schemas.openxmlformats.org/presentationml/2006/main">
+  <p:cSld>
+    <p:spTree>
+      <p:nvGrpSpPr>
+        <p:cNvPr id="1" name=""/>
+        <p:cNvGrpSpPr/>
+        <p:nvPr/>
+      </p:nvGrpSpPr>
+      <p:grpSpPr>
+        <a:xfrm>
+          <a:off x="0" y="0"/>
+          <a:ext cx="0" cy="0"/>
+          <a:chOff x="0" y="0"/>
+          <a:chExt cx="0" cy="0"/>
+        </a:xfrm>
+      </p:grpSpPr>
+      <p:cxnSp>
+        <p:nvCxnSpPr>
+          <p:cNvPr id="142" name="直線矢印コネクタ 28"/>
+          <p:cNvCxnSpPr>
+            <a:stCxn id="163" idx="4"/>
+            <a:endCxn id="153" idx="0"/>
+          </p:cNvCxnSpPr>
+          <p:nvPr/>
+        </p:nvCxnSpPr>
+        <p:spPr>
+          <a:xfrm>
+            <a:off x="1169273" y="887067"/>
+            <a:ext cx="1" cy="203130"/>
+          </a:xfrm>
+          <a:prstGeom prst="straightConnector1">
+            <a:avLst/>
+          </a:prstGeom>
+          <a:ln w="19050">
+            <a:solidFill>
+              <a:schemeClr val="tx1"/>
+            </a:solidFill>
+            <a:tailEnd type="arrow"/>
+          </a:ln>
+        </p:spPr>
+        <p:style>
+          <a:lnRef idx="1">
+            <a:schemeClr val="accent1"/>
+          </a:lnRef>
+          <a:fillRef idx="0">
+            <a:schemeClr val="accent1"/>
+          </a:fillRef>
+          <a:effectRef idx="0">
+            <a:schemeClr val="accent1"/>
+          </a:effectRef>
+          <a:fontRef idx="minor">
+            <a:schemeClr val="tx1"/>
+          </a:fontRef>
+        </p:style>
+      </p:cxnSp>
+      <p:sp>
+        <p:nvSpPr>
+          <p:cNvPr id="150" name="正方形/長方形 149"/>
+          <p:cNvSpPr/>
+          <p:nvPr/>
+        </p:nvSpPr>
+        <p:spPr>
+          <a:xfrm>
+            <a:off x="141677" y="165134"/>
+            <a:ext cx="3747102" cy="1851115"/>
+          </a:xfrm>
+          <a:prstGeom prst="rect">
+            <a:avLst/>
+          </a:prstGeom>
+          <a:noFill/>
+          <a:ln w="28575">
+            <a:solidFill>
+              <a:schemeClr val="tx1"/>
+            </a:solidFill>
+          </a:ln>
+        </p:spPr>
+        <p:style>
+          <a:lnRef idx="2">
+            <a:schemeClr val="accent1">
+              <a:shade val="50000"/>
+            </a:schemeClr>
+          </a:lnRef>
+          <a:fillRef idx="1">
+            <a:schemeClr val="accent1"/>
+          </a:fillRef>
+          <a:effectRef idx="0">
+            <a:schemeClr val="accent1"/>
+          </a:effectRef>
+          <a:fontRef idx="minor">
+            <a:schemeClr val="lt1"/>
+          </a:fontRef>
+        </p:style>
+        <p:txBody>
+          <a:bodyPr lIns="91439" tIns="45720" rIns="91439" bIns="45720" rtlCol="0" anchor="ctr"/>
+          <a:lstStyle/>
+          <a:p>
+            <a:pPr algn="ctr"/>
+            <a:endParaRPr kumimoji="1" lang="ja-JP" altLang="en-US"/>
+          </a:p>
+        </p:txBody>
+      </p:sp>
+      <p:sp>
+        <p:nvSpPr>
+          <p:cNvPr id="151" name="1 つの角を切り取った四角形 150"/>
+          <p:cNvSpPr/>
+          <p:nvPr/>
+        </p:nvSpPr>
+        <p:spPr>
+          <a:xfrm flipV="1">
+            <a:off x="141677" y="173126"/>
+            <a:ext cx="1874894" cy="305136"/>
+          </a:xfrm>
+          <a:prstGeom prst="snip1Rect">
+            <a:avLst>
+              <a:gd name="adj" fmla="val 34304"/>
+            </a:avLst>
+          </a:prstGeom>
+          <a:noFill/>
+          <a:ln w="19050">
+            <a:solidFill>
+              <a:schemeClr val="tx1"/>
+            </a:solidFill>
+          </a:ln>
+        </p:spPr>
+        <p:style>
+          <a:lnRef idx="2">
+            <a:schemeClr val="accent1">
+              <a:shade val="50000"/>
+            </a:schemeClr>
+          </a:lnRef>
+          <a:fillRef idx="1">
+            <a:schemeClr val="accent1"/>
+          </a:fillRef>
+          <a:effectRef idx="0">
+            <a:schemeClr val="accent1"/>
+          </a:effectRef>
+          <a:fontRef idx="minor">
+            <a:schemeClr val="lt1"/>
+          </a:fontRef>
+        </p:style>
+        <p:txBody>
+          <a:bodyPr lIns="91439" tIns="45720" rIns="91439" bIns="45720" rtlCol="0" anchor="ctr"/>
+          <a:lstStyle/>
+          <a:p>
+            <a:pPr algn="ctr"/>
+            <a:endParaRPr kumimoji="1" lang="ja-JP" altLang="en-US" sz="1000" dirty="0"/>
+          </a:p>
+        </p:txBody>
+      </p:sp>
+      <p:sp>
+        <p:nvSpPr>
+          <p:cNvPr id="152" name="正方形/長方形 151"/>
+          <p:cNvSpPr/>
+          <p:nvPr/>
+        </p:nvSpPr>
+        <p:spPr>
+          <a:xfrm>
+            <a:off x="141678" y="153706"/>
+            <a:ext cx="1874893" cy="246221"/>
+          </a:xfrm>
+          <a:prstGeom prst="rect">
+            <a:avLst/>
+          </a:prstGeom>
+        </p:spPr>
+        <p:txBody>
+          <a:bodyPr wrap="square" lIns="91439" tIns="45720" rIns="91439" bIns="45720">
+            <a:spAutoFit/>
+          </a:bodyPr>
+          <a:lstStyle/>
+          <a:p>
+            <a:r>
+              <a:rPr lang="en-US" altLang="ja-JP" sz="1000" dirty="0" smtClean="0"/>
+              <a:t>Simple sub-machine state</a:t>
+            </a:r>
+            <a:endParaRPr lang="ja-JP" altLang="en-US" sz="1000" dirty="0"/>
+          </a:p>
+        </p:txBody>
+      </p:sp>
+      <p:sp>
+        <p:nvSpPr>
+          <p:cNvPr id="153" name="角丸四角形 152"/>
+          <p:cNvSpPr/>
+          <p:nvPr/>
+        </p:nvSpPr>
+        <p:spPr>
+          <a:xfrm>
+            <a:off x="635533" y="1090197"/>
+            <a:ext cx="1067481" cy="538736"/>
+          </a:xfrm>
+          <a:prstGeom prst="roundRect">
+            <a:avLst/>
+          </a:prstGeom>
+          <a:noFill/>
+          <a:ln w="19050">
+            <a:solidFill>
+              <a:schemeClr val="tx1"/>
+            </a:solidFill>
+          </a:ln>
+        </p:spPr>
+        <p:style>
+          <a:lnRef idx="2">
+            <a:schemeClr val="accent1">
+              <a:shade val="50000"/>
+            </a:schemeClr>
+          </a:lnRef>
+          <a:fillRef idx="1">
+            <a:schemeClr val="accent1"/>
+          </a:fillRef>
+          <a:effectRef idx="0">
+            <a:schemeClr val="accent1"/>
+          </a:effectRef>
+          <a:fontRef idx="minor">
+            <a:schemeClr val="lt1"/>
+          </a:fontRef>
+        </p:style>
+        <p:txBody>
+          <a:bodyPr lIns="91439" tIns="45720" rIns="91439" bIns="45720" rtlCol="0" anchor="t" anchorCtr="0"/>
+          <a:lstStyle/>
+          <a:p>
+            <a:pPr algn="ctr"/>
+            <a:r>
+              <a:rPr lang="en-US" altLang="ja-JP" sz="1000" dirty="0" smtClean="0">
+                <a:solidFill>
+                  <a:schemeClr val="tx1"/>
+                </a:solidFill>
+              </a:rPr>
+              <a:t>State1:StateSub</a:t>
+            </a:r>
+            <a:endParaRPr lang="ja-JP" altLang="en-US" sz="1000" dirty="0">
+              <a:solidFill>
+                <a:schemeClr val="tx1"/>
+              </a:solidFill>
+            </a:endParaRPr>
+          </a:p>
+        </p:txBody>
+      </p:sp>
+      <p:cxnSp>
+        <p:nvCxnSpPr>
+          <p:cNvPr id="154" name="直線コネクタ 153"/>
+          <p:cNvCxnSpPr/>
+          <p:nvPr/>
+        </p:nvCxnSpPr>
+        <p:spPr>
+          <a:xfrm>
+            <a:off x="640294" y="1344250"/>
+            <a:ext cx="1058562" cy="0"/>
+          </a:xfrm>
+          <a:prstGeom prst="line">
+            <a:avLst/>
+          </a:prstGeom>
+          <a:ln w="12700">
+            <a:solidFill>
+              <a:schemeClr val="tx1"/>
+            </a:solidFill>
+          </a:ln>
+        </p:spPr>
+        <p:style>
+          <a:lnRef idx="1">
+            <a:schemeClr val="accent1"/>
+          </a:lnRef>
+          <a:fillRef idx="0">
+            <a:schemeClr val="accent1"/>
+          </a:fillRef>
+          <a:effectRef idx="0">
+            <a:schemeClr val="accent1"/>
+          </a:effectRef>
+          <a:fontRef idx="minor">
+            <a:schemeClr val="tx1"/>
+          </a:fontRef>
+        </p:style>
+      </p:cxnSp>
+      <p:sp>
+        <p:nvSpPr>
+          <p:cNvPr id="163" name="フローチャート : 結合子 162"/>
+          <p:cNvSpPr/>
+          <p:nvPr/>
+        </p:nvSpPr>
+        <p:spPr>
+          <a:xfrm>
+            <a:off x="1097262" y="743047"/>
+            <a:ext cx="144021" cy="144020"/>
+          </a:xfrm>
+          <a:prstGeom prst="flowChartConnector">
+            <a:avLst/>
+          </a:prstGeom>
+          <a:solidFill>
+            <a:schemeClr val="tx1"/>
+          </a:solidFill>
+          <a:ln w="19050">
+            <a:solidFill>
+              <a:schemeClr val="tx1"/>
+            </a:solidFill>
+          </a:ln>
+        </p:spPr>
+        <p:style>
+          <a:lnRef idx="2">
+            <a:schemeClr val="accent1">
+              <a:shade val="50000"/>
+            </a:schemeClr>
+          </a:lnRef>
+          <a:fillRef idx="1">
+            <a:schemeClr val="accent1"/>
+          </a:fillRef>
+          <a:effectRef idx="0">
+            <a:schemeClr val="accent1"/>
+          </a:effectRef>
+          <a:fontRef idx="minor">
+            <a:schemeClr val="lt1"/>
+          </a:fontRef>
+        </p:style>
+        <p:txBody>
+          <a:bodyPr lIns="91439" tIns="45720" rIns="91439" bIns="45720" rtlCol="0" anchor="ctr"/>
+          <a:lstStyle/>
+          <a:p>
+            <a:pPr algn="ctr"/>
+            <a:endParaRPr lang="ja-JP" altLang="en-US" sz="1000"/>
+          </a:p>
+        </p:txBody>
+      </p:sp>
+      <p:cxnSp>
+        <p:nvCxnSpPr>
+          <p:cNvPr id="21" name="直線矢印コネクタ 28"/>
+          <p:cNvCxnSpPr>
+            <a:stCxn id="39" idx="6"/>
+            <a:endCxn id="42" idx="2"/>
+          </p:cNvCxnSpPr>
+          <p:nvPr/>
+        </p:nvCxnSpPr>
+        <p:spPr>
+          <a:xfrm flipV="1">
+            <a:off x="1775022" y="1431575"/>
+            <a:ext cx="529578" cy="2"/>
+          </a:xfrm>
+          <a:prstGeom prst="straightConnector1">
+            <a:avLst/>
+          </a:prstGeom>
+          <a:ln w="19050">
+            <a:solidFill>
+              <a:schemeClr val="tx1"/>
+            </a:solidFill>
+            <a:tailEnd type="arrow"/>
+          </a:ln>
+        </p:spPr>
+        <p:style>
+          <a:lnRef idx="1">
+            <a:schemeClr val="accent1"/>
+          </a:lnRef>
+          <a:fillRef idx="0">
+            <a:schemeClr val="accent1"/>
+          </a:fillRef>
+          <a:effectRef idx="0">
+            <a:schemeClr val="accent1"/>
+          </a:effectRef>
+          <a:fontRef idx="minor">
+            <a:schemeClr val="tx1"/>
+          </a:fontRef>
+        </p:style>
+      </p:cxnSp>
+      <p:sp>
+        <p:nvSpPr>
+          <p:cNvPr id="29" name="角丸四角形 28"/>
+          <p:cNvSpPr/>
+          <p:nvPr/>
+        </p:nvSpPr>
+        <p:spPr>
+          <a:xfrm>
+            <a:off x="2376611" y="1090197"/>
+            <a:ext cx="1067481" cy="538736"/>
+          </a:xfrm>
+          <a:prstGeom prst="roundRect">
+            <a:avLst/>
+          </a:prstGeom>
+          <a:noFill/>
+          <a:ln w="19050">
+            <a:solidFill>
+              <a:schemeClr val="tx1"/>
+            </a:solidFill>
+          </a:ln>
+        </p:spPr>
+        <p:style>
+          <a:lnRef idx="2">
+            <a:schemeClr val="accent1">
+              <a:shade val="50000"/>
+            </a:schemeClr>
+          </a:lnRef>
+          <a:fillRef idx="1">
+            <a:schemeClr val="accent1"/>
+          </a:fillRef>
+          <a:effectRef idx="0">
+            <a:schemeClr val="accent1"/>
+          </a:effectRef>
+          <a:fontRef idx="minor">
+            <a:schemeClr val="lt1"/>
+          </a:fontRef>
+        </p:style>
+        <p:txBody>
+          <a:bodyPr lIns="91439" tIns="45720" rIns="91439" bIns="45720" rtlCol="0" anchor="t" anchorCtr="0"/>
+          <a:lstStyle/>
+          <a:p>
+            <a:pPr algn="ctr"/>
+            <a:r>
+              <a:rPr lang="en-US" altLang="ja-JP" sz="1000" dirty="0" smtClean="0">
+                <a:solidFill>
+                  <a:schemeClr val="tx1"/>
+                </a:solidFill>
+              </a:rPr>
+              <a:t>State2:StateSub</a:t>
+            </a:r>
+            <a:endParaRPr lang="ja-JP" altLang="en-US" sz="1000" dirty="0">
+              <a:solidFill>
+                <a:schemeClr val="tx1"/>
+              </a:solidFill>
+            </a:endParaRPr>
+          </a:p>
+        </p:txBody>
+      </p:sp>
+      <p:cxnSp>
+        <p:nvCxnSpPr>
+          <p:cNvPr id="30" name="直線コネクタ 29"/>
+          <p:cNvCxnSpPr/>
+          <p:nvPr/>
+        </p:nvCxnSpPr>
+        <p:spPr>
+          <a:xfrm>
+            <a:off x="2381372" y="1344250"/>
+            <a:ext cx="1058562" cy="0"/>
+          </a:xfrm>
+          <a:prstGeom prst="line">
+            <a:avLst/>
+          </a:prstGeom>
+          <a:ln w="12700">
+            <a:solidFill>
+              <a:schemeClr val="tx1"/>
+            </a:solidFill>
+          </a:ln>
+        </p:spPr>
+        <p:style>
+          <a:lnRef idx="1">
+            <a:schemeClr val="accent1"/>
+          </a:lnRef>
+          <a:fillRef idx="0">
+            <a:schemeClr val="accent1"/>
+          </a:fillRef>
+          <a:effectRef idx="0">
+            <a:schemeClr val="accent1"/>
+          </a:effectRef>
+          <a:fontRef idx="minor">
+            <a:schemeClr val="tx1"/>
+          </a:fontRef>
+        </p:style>
+      </p:cxnSp>
+      <p:sp>
+        <p:nvSpPr>
+          <p:cNvPr id="33" name="フローチャート : 結合子 32"/>
+          <p:cNvSpPr/>
+          <p:nvPr/>
+        </p:nvSpPr>
+        <p:spPr>
+          <a:xfrm>
+            <a:off x="568283" y="1359565"/>
+            <a:ext cx="144021" cy="144020"/>
+          </a:xfrm>
+          <a:prstGeom prst="flowChartConnector">
+            <a:avLst/>
+          </a:prstGeom>
+          <a:solidFill>
+            <a:schemeClr val="bg1"/>
+          </a:solidFill>
+          <a:ln w="19050">
+            <a:solidFill>
+              <a:schemeClr val="tx1"/>
+            </a:solidFill>
+          </a:ln>
+        </p:spPr>
+        <p:style>
+          <a:lnRef idx="2">
+            <a:schemeClr val="accent1">
+              <a:shade val="50000"/>
+            </a:schemeClr>
+          </a:lnRef>
+          <a:fillRef idx="1">
+            <a:schemeClr val="accent1"/>
+          </a:fillRef>
+          <a:effectRef idx="0">
+            <a:schemeClr val="accent1"/>
+          </a:effectRef>
+          <a:fontRef idx="minor">
+            <a:schemeClr val="lt1"/>
+          </a:fontRef>
+        </p:style>
+        <p:txBody>
+          <a:bodyPr lIns="91439" tIns="45720" rIns="91439" bIns="45720" rtlCol="0" anchor="ctr"/>
+          <a:lstStyle/>
+          <a:p>
+            <a:pPr algn="ctr"/>
+            <a:endParaRPr lang="ja-JP" altLang="en-US" sz="1000"/>
+          </a:p>
+        </p:txBody>
+      </p:sp>
+      <p:grpSp>
+        <p:nvGrpSpPr>
+          <p:cNvPr id="38" name="グループ化 37"/>
+          <p:cNvGrpSpPr/>
+          <p:nvPr/>
+        </p:nvGrpSpPr>
+        <p:grpSpPr>
+          <a:xfrm>
+            <a:off x="1631005" y="1359569"/>
+            <a:ext cx="144017" cy="144016"/>
+            <a:chOff x="4067944" y="4720186"/>
+            <a:chExt cx="288032" cy="288032"/>
+          </a:xfrm>
+          <a:solidFill>
+            <a:schemeClr val="bg1"/>
+          </a:solidFill>
+        </p:grpSpPr>
+        <p:sp>
+          <p:nvSpPr>
+            <p:cNvPr id="39" name="フローチャート : 結合子 38"/>
+            <p:cNvSpPr/>
+            <p:nvPr/>
+          </p:nvSpPr>
+          <p:spPr>
+            <a:xfrm>
+              <a:off x="4067944" y="4720186"/>
+              <a:ext cx="288032" cy="288032"/>
+            </a:xfrm>
+            <a:prstGeom prst="flowChartConnector">
+              <a:avLst/>
+            </a:prstGeom>
+            <a:grpFill/>
+            <a:ln w="19050">
+              <a:solidFill>
+                <a:schemeClr val="tx1"/>
+              </a:solidFill>
+            </a:ln>
+          </p:spPr>
+          <p:style>
+            <a:lnRef idx="2">
+              <a:schemeClr val="accent1">
+                <a:shade val="50000"/>
+              </a:schemeClr>
+            </a:lnRef>
+            <a:fillRef idx="1">
+              <a:schemeClr val="accent1"/>
+            </a:fillRef>
+            <a:effectRef idx="0">
+              <a:schemeClr val="accent1"/>
+            </a:effectRef>
+            <a:fontRef idx="minor">
+              <a:schemeClr val="lt1"/>
+            </a:fontRef>
+          </p:style>
+          <p:txBody>
+            <a:bodyPr rtlCol="0" anchor="ctr"/>
+            <a:lstStyle/>
+            <a:p>
+              <a:pPr algn="ctr"/>
+              <a:endParaRPr lang="ja-JP" altLang="en-US" sz="1000"/>
+            </a:p>
+          </p:txBody>
+        </p:sp>
+        <p:cxnSp>
+          <p:nvCxnSpPr>
+            <p:cNvPr id="40" name="直線コネクタ 39"/>
+            <p:cNvCxnSpPr>
+              <a:stCxn id="39" idx="1"/>
+              <a:endCxn id="39" idx="5"/>
+            </p:cNvCxnSpPr>
+            <p:nvPr/>
+          </p:nvCxnSpPr>
+          <p:spPr>
+            <a:xfrm>
+              <a:off x="4110125" y="4762367"/>
+              <a:ext cx="203670" cy="203670"/>
+            </a:xfrm>
+            <a:prstGeom prst="line">
+              <a:avLst/>
+            </a:prstGeom>
+            <a:grpFill/>
+            <a:ln w="19050">
+              <a:solidFill>
+                <a:schemeClr val="tx1"/>
+              </a:solidFill>
+            </a:ln>
+          </p:spPr>
+          <p:style>
+            <a:lnRef idx="1">
+              <a:schemeClr val="accent1"/>
+            </a:lnRef>
+            <a:fillRef idx="0">
+              <a:schemeClr val="accent1"/>
+            </a:fillRef>
+            <a:effectRef idx="0">
+              <a:schemeClr val="accent1"/>
+            </a:effectRef>
+            <a:fontRef idx="minor">
+              <a:schemeClr val="tx1"/>
+            </a:fontRef>
+          </p:style>
+        </p:cxnSp>
+        <p:cxnSp>
+          <p:nvCxnSpPr>
+            <p:cNvPr id="41" name="直線コネクタ 40"/>
+            <p:cNvCxnSpPr>
+              <a:stCxn id="39" idx="7"/>
+              <a:endCxn id="39" idx="3"/>
+            </p:cNvCxnSpPr>
+            <p:nvPr/>
+          </p:nvCxnSpPr>
+          <p:spPr>
+            <a:xfrm flipH="1">
+              <a:off x="4110125" y="4762367"/>
+              <a:ext cx="203670" cy="203670"/>
+            </a:xfrm>
+            <a:prstGeom prst="line">
+              <a:avLst/>
+            </a:prstGeom>
+            <a:grpFill/>
+            <a:ln w="19050">
+              <a:solidFill>
+                <a:schemeClr val="tx1"/>
+              </a:solidFill>
+            </a:ln>
+          </p:spPr>
+          <p:style>
+            <a:lnRef idx="1">
+              <a:schemeClr val="accent1"/>
+            </a:lnRef>
+            <a:fillRef idx="0">
+              <a:schemeClr val="accent1"/>
+            </a:fillRef>
+            <a:effectRef idx="0">
+              <a:schemeClr val="accent1"/>
+            </a:effectRef>
+            <a:fontRef idx="minor">
+              <a:schemeClr val="tx1"/>
+            </a:fontRef>
+          </p:style>
+        </p:cxnSp>
+      </p:grpSp>
+      <p:sp>
+        <p:nvSpPr>
+          <p:cNvPr id="42" name="フローチャート : 結合子 41"/>
+          <p:cNvSpPr/>
+          <p:nvPr/>
+        </p:nvSpPr>
+        <p:spPr>
+          <a:xfrm>
+            <a:off x="2304600" y="1359565"/>
+            <a:ext cx="144021" cy="144020"/>
+          </a:xfrm>
+          <a:prstGeom prst="flowChartConnector">
+            <a:avLst/>
+          </a:prstGeom>
+          <a:solidFill>
+            <a:schemeClr val="bg1"/>
+          </a:solidFill>
+          <a:ln w="19050">
+            <a:solidFill>
+              <a:schemeClr val="tx1"/>
+            </a:solidFill>
+          </a:ln>
+        </p:spPr>
+        <p:style>
+          <a:lnRef idx="2">
+            <a:schemeClr val="accent1">
+              <a:shade val="50000"/>
+            </a:schemeClr>
+          </a:lnRef>
+          <a:fillRef idx="1">
+            <a:schemeClr val="accent1"/>
+          </a:fillRef>
+          <a:effectRef idx="0">
+            <a:schemeClr val="accent1"/>
+          </a:effectRef>
+          <a:fontRef idx="minor">
+            <a:schemeClr val="lt1"/>
+          </a:fontRef>
+        </p:style>
+        <p:txBody>
+          <a:bodyPr lIns="91439" tIns="45720" rIns="91439" bIns="45720" rtlCol="0" anchor="ctr"/>
+          <a:lstStyle/>
+          <a:p>
+            <a:pPr algn="ctr"/>
+            <a:endParaRPr lang="ja-JP" altLang="en-US" sz="1000"/>
+          </a:p>
+        </p:txBody>
+      </p:sp>
+      <p:grpSp>
+        <p:nvGrpSpPr>
+          <p:cNvPr id="43" name="グループ化 42"/>
+          <p:cNvGrpSpPr/>
+          <p:nvPr/>
+        </p:nvGrpSpPr>
+        <p:grpSpPr>
+          <a:xfrm>
+            <a:off x="3372083" y="1359569"/>
+            <a:ext cx="144017" cy="144016"/>
+            <a:chOff x="4067944" y="4720186"/>
+            <a:chExt cx="288032" cy="288032"/>
+          </a:xfrm>
+          <a:solidFill>
+            <a:schemeClr val="bg1"/>
+          </a:solidFill>
+        </p:grpSpPr>
+        <p:sp>
+          <p:nvSpPr>
+            <p:cNvPr id="48" name="フローチャート : 結合子 47"/>
+            <p:cNvSpPr/>
+            <p:nvPr/>
+          </p:nvSpPr>
+          <p:spPr>
+            <a:xfrm>
+              <a:off x="4067944" y="4720186"/>
+              <a:ext cx="288032" cy="288032"/>
+            </a:xfrm>
+            <a:prstGeom prst="flowChartConnector">
+              <a:avLst/>
+            </a:prstGeom>
+            <a:grpFill/>
+            <a:ln w="19050">
+              <a:solidFill>
+                <a:schemeClr val="tx1"/>
+              </a:solidFill>
+            </a:ln>
+          </p:spPr>
+          <p:style>
+            <a:lnRef idx="2">
+              <a:schemeClr val="accent1">
+                <a:shade val="50000"/>
+              </a:schemeClr>
+            </a:lnRef>
+            <a:fillRef idx="1">
+              <a:schemeClr val="accent1"/>
+            </a:fillRef>
+            <a:effectRef idx="0">
+              <a:schemeClr val="accent1"/>
+            </a:effectRef>
+            <a:fontRef idx="minor">
+              <a:schemeClr val="lt1"/>
+            </a:fontRef>
+          </p:style>
+          <p:txBody>
+            <a:bodyPr rtlCol="0" anchor="ctr"/>
+            <a:lstStyle/>
+            <a:p>
+              <a:pPr algn="ctr"/>
+              <a:endParaRPr lang="ja-JP" altLang="en-US" sz="1000"/>
+            </a:p>
+          </p:txBody>
+        </p:sp>
+        <p:cxnSp>
+          <p:nvCxnSpPr>
+            <p:cNvPr id="49" name="直線コネクタ 48"/>
+            <p:cNvCxnSpPr>
+              <a:stCxn id="48" idx="1"/>
+              <a:endCxn id="48" idx="5"/>
+            </p:cNvCxnSpPr>
+            <p:nvPr/>
+          </p:nvCxnSpPr>
+          <p:spPr>
+            <a:xfrm>
+              <a:off x="4110125" y="4762367"/>
+              <a:ext cx="203670" cy="203670"/>
+            </a:xfrm>
+            <a:prstGeom prst="line">
+              <a:avLst/>
+            </a:prstGeom>
+            <a:grpFill/>
+            <a:ln w="19050">
+              <a:solidFill>
+                <a:schemeClr val="tx1"/>
+              </a:solidFill>
+            </a:ln>
+          </p:spPr>
+          <p:style>
+            <a:lnRef idx="1">
+              <a:schemeClr val="accent1"/>
+            </a:lnRef>
+            <a:fillRef idx="0">
+              <a:schemeClr val="accent1"/>
+            </a:fillRef>
+            <a:effectRef idx="0">
+              <a:schemeClr val="accent1"/>
+            </a:effectRef>
+            <a:fontRef idx="minor">
+              <a:schemeClr val="tx1"/>
+            </a:fontRef>
+          </p:style>
+        </p:cxnSp>
+        <p:cxnSp>
+          <p:nvCxnSpPr>
+            <p:cNvPr id="50" name="直線コネクタ 49"/>
+            <p:cNvCxnSpPr>
+              <a:stCxn id="48" idx="7"/>
+              <a:endCxn id="48" idx="3"/>
+            </p:cNvCxnSpPr>
+            <p:nvPr/>
+          </p:nvCxnSpPr>
+          <p:spPr>
+            <a:xfrm flipH="1">
+              <a:off x="4110125" y="4762367"/>
+              <a:ext cx="203670" cy="203670"/>
+            </a:xfrm>
+            <a:prstGeom prst="line">
+              <a:avLst/>
+            </a:prstGeom>
+            <a:grpFill/>
+            <a:ln w="19050">
+              <a:solidFill>
+                <a:schemeClr val="tx1"/>
+              </a:solidFill>
+            </a:ln>
+          </p:spPr>
+          <p:style>
+            <a:lnRef idx="1">
+              <a:schemeClr val="accent1"/>
+            </a:lnRef>
+            <a:fillRef idx="0">
+              <a:schemeClr val="accent1"/>
+            </a:fillRef>
+            <a:effectRef idx="0">
+              <a:schemeClr val="accent1"/>
+            </a:effectRef>
+            <a:fontRef idx="minor">
+              <a:schemeClr val="tx1"/>
+            </a:fontRef>
+          </p:style>
+        </p:cxnSp>
+      </p:grpSp>
+      <p:sp>
+        <p:nvSpPr>
+          <p:cNvPr id="22" name="フリーフォーム 21"/>
+          <p:cNvSpPr/>
+          <p:nvPr/>
+        </p:nvSpPr>
+        <p:spPr>
+          <a:xfrm>
+            <a:off x="361950" y="1428750"/>
+            <a:ext cx="3378200" cy="444500"/>
+          </a:xfrm>
+          <a:custGeom>
+            <a:avLst/>
+            <a:gdLst>
+              <a:gd name="connsiteX0" fmla="*/ 3162300 w 3378200"/>
+              <a:gd name="connsiteY0" fmla="*/ 0 h 444500"/>
+              <a:gd name="connsiteX1" fmla="*/ 3378200 w 3378200"/>
+              <a:gd name="connsiteY1" fmla="*/ 0 h 444500"/>
+              <a:gd name="connsiteX2" fmla="*/ 3378200 w 3378200"/>
+              <a:gd name="connsiteY2" fmla="*/ 444500 h 444500"/>
+              <a:gd name="connsiteX3" fmla="*/ 0 w 3378200"/>
+              <a:gd name="connsiteY3" fmla="*/ 444500 h 444500"/>
+              <a:gd name="connsiteX4" fmla="*/ 0 w 3378200"/>
+              <a:gd name="connsiteY4" fmla="*/ 19050 h 444500"/>
+              <a:gd name="connsiteX5" fmla="*/ 209550 w 3378200"/>
+              <a:gd name="connsiteY5" fmla="*/ 19050 h 444500"/>
+            </a:gdLst>
+            <a:ahLst/>
+            <a:cxnLst>
+              <a:cxn ang="0">
+                <a:pos x="connsiteX0" y="connsiteY0"/>
+              </a:cxn>
+              <a:cxn ang="0">
+                <a:pos x="connsiteX1" y="connsiteY1"/>
+              </a:cxn>
+              <a:cxn ang="0">
+                <a:pos x="connsiteX2" y="connsiteY2"/>
+              </a:cxn>
+              <a:cxn ang="0">
+                <a:pos x="connsiteX3" y="connsiteY3"/>
+              </a:cxn>
+              <a:cxn ang="0">
+                <a:pos x="connsiteX4" y="connsiteY4"/>
+              </a:cxn>
+              <a:cxn ang="0">
+                <a:pos x="connsiteX5" y="connsiteY5"/>
+              </a:cxn>
+            </a:cxnLst>
+            <a:rect l="l" t="t" r="r" b="b"/>
+            <a:pathLst>
+              <a:path w="3378200" h="444500">
+                <a:moveTo>
+                  <a:pt x="3162300" y="0"/>
+                </a:moveTo>
+                <a:lnTo>
+                  <a:pt x="3378200" y="0"/>
+                </a:lnTo>
+                <a:lnTo>
+                  <a:pt x="3378200" y="444500"/>
+                </a:lnTo>
+                <a:lnTo>
+                  <a:pt x="0" y="444500"/>
+                </a:lnTo>
+                <a:lnTo>
+                  <a:pt x="0" y="19050"/>
+                </a:lnTo>
+                <a:lnTo>
+                  <a:pt x="209550" y="19050"/>
+                </a:lnTo>
+              </a:path>
+            </a:pathLst>
+          </a:custGeom>
+          <a:noFill/>
+          <a:ln w="19050">
+            <a:solidFill>
+              <a:schemeClr val="tx1"/>
+            </a:solidFill>
+            <a:headEnd type="none" w="med" len="med"/>
+            <a:tailEnd type="arrow" w="med" len="med"/>
+          </a:ln>
+        </p:spPr>
+        <p:style>
+          <a:lnRef idx="2">
+            <a:schemeClr val="accent1">
+              <a:shade val="50000"/>
+            </a:schemeClr>
+          </a:lnRef>
+          <a:fillRef idx="1">
+            <a:schemeClr val="accent1"/>
+          </a:fillRef>
+          <a:effectRef idx="0">
+            <a:schemeClr val="accent1"/>
+          </a:effectRef>
+          <a:fontRef idx="minor">
+            <a:schemeClr val="lt1"/>
+          </a:fontRef>
+        </p:style>
+        <p:txBody>
+          <a:bodyPr rtlCol="0" anchor="ctr"/>
+          <a:lstStyle/>
+          <a:p>
+            <a:pPr algn="ctr"/>
+            <a:endParaRPr kumimoji="1" lang="ja-JP" altLang="en-US"/>
+          </a:p>
+        </p:txBody>
+      </p:sp>
+    </p:spTree>
+    <p:extLst>
+      <p:ext uri="{BB962C8B-B14F-4D97-AF65-F5344CB8AC3E}">
+        <p14:creationId xmlns:p14="http://schemas.microsoft.com/office/powerpoint/2010/main" val="3165465042"/>
+      </p:ext>
+    </p:extLst>
+  </p:cSld>
+  <p:clrMapOvr>
+    <a:masterClrMapping/>
+  </p:clrMapOvr>
+  <p:timing>
+    <p:tnLst>
+      <p:par>
+        <p:cTn id="1" dur="indefinite" restart="never" nodeType="tmRoot"/>
+      </p:par>
+    </p:tnLst>
+  </p:timing>
+</p:sld>
+</file>
+
+<file path=ppt/slides/slide14.xml><?xml version="1.0" encoding="utf-8"?>
+<p:sld xmlns:a="http://schemas.openxmlformats.org/drawingml/2006/main" xmlns:r="http://schemas.openxmlformats.org/officeDocument/2006/relationships" xmlns:p="http://schemas.openxmlformats.org/presentationml/2006/main">
+  <p:cSld>
+    <p:spTree>
+      <p:nvGrpSpPr>
+        <p:cNvPr id="1" name=""/>
+        <p:cNvGrpSpPr/>
+        <p:nvPr/>
+      </p:nvGrpSpPr>
+      <p:grpSpPr>
+        <a:xfrm>
+          <a:off x="0" y="0"/>
+          <a:ext cx="0" cy="0"/>
+          <a:chOff x="0" y="0"/>
+          <a:chExt cx="0" cy="0"/>
+        </a:xfrm>
+      </p:grpSpPr>
+      <p:cxnSp>
+        <p:nvCxnSpPr>
+          <p:cNvPr id="142" name="直線矢印コネクタ 28"/>
+          <p:cNvCxnSpPr>
+            <a:stCxn id="163" idx="4"/>
+            <a:endCxn id="153" idx="0"/>
+          </p:cNvCxnSpPr>
+          <p:nvPr/>
+        </p:nvCxnSpPr>
+        <p:spPr>
+          <a:xfrm>
+            <a:off x="1967539" y="537252"/>
+            <a:ext cx="1" cy="274514"/>
+          </a:xfrm>
+          <a:prstGeom prst="straightConnector1">
+            <a:avLst/>
+          </a:prstGeom>
+          <a:ln w="19050">
+            <a:solidFill>
+              <a:schemeClr val="tx1"/>
+            </a:solidFill>
+            <a:tailEnd type="arrow"/>
+          </a:ln>
+        </p:spPr>
+        <p:style>
+          <a:lnRef idx="1">
+            <a:schemeClr val="accent1"/>
+          </a:lnRef>
+          <a:fillRef idx="0">
+            <a:schemeClr val="accent1"/>
+          </a:fillRef>
+          <a:effectRef idx="0">
+            <a:schemeClr val="accent1"/>
+          </a:effectRef>
+          <a:fontRef idx="minor">
+            <a:schemeClr val="tx1"/>
+          </a:fontRef>
+        </p:style>
+      </p:cxnSp>
+      <p:sp>
+        <p:nvSpPr>
+          <p:cNvPr id="150" name="正方形/長方形 149"/>
+          <p:cNvSpPr/>
+          <p:nvPr/>
+        </p:nvSpPr>
+        <p:spPr>
+          <a:xfrm>
+            <a:off x="506088" y="165134"/>
+            <a:ext cx="2666982" cy="2139147"/>
+          </a:xfrm>
+          <a:prstGeom prst="rect">
+            <a:avLst/>
+          </a:prstGeom>
+          <a:noFill/>
+          <a:ln w="28575">
+            <a:solidFill>
+              <a:schemeClr val="tx1"/>
+            </a:solidFill>
+          </a:ln>
+        </p:spPr>
+        <p:style>
+          <a:lnRef idx="2">
+            <a:schemeClr val="accent1">
+              <a:shade val="50000"/>
+            </a:schemeClr>
+          </a:lnRef>
+          <a:fillRef idx="1">
+            <a:schemeClr val="accent1"/>
+          </a:fillRef>
+          <a:effectRef idx="0">
+            <a:schemeClr val="accent1"/>
+          </a:effectRef>
+          <a:fontRef idx="minor">
+            <a:schemeClr val="lt1"/>
+          </a:fontRef>
+        </p:style>
+        <p:txBody>
+          <a:bodyPr lIns="91439" tIns="45720" rIns="91439" bIns="45720" rtlCol="0" anchor="ctr"/>
+          <a:lstStyle/>
+          <a:p>
+            <a:pPr algn="ctr"/>
+            <a:endParaRPr kumimoji="1" lang="ja-JP" altLang="en-US"/>
+          </a:p>
+        </p:txBody>
+      </p:sp>
+      <p:sp>
+        <p:nvSpPr>
+          <p:cNvPr id="151" name="1 つの角を切り取った四角形 150"/>
+          <p:cNvSpPr/>
+          <p:nvPr/>
+        </p:nvSpPr>
+        <p:spPr>
+          <a:xfrm flipV="1">
+            <a:off x="506088" y="173126"/>
+            <a:ext cx="866782" cy="305136"/>
+          </a:xfrm>
+          <a:prstGeom prst="snip1Rect">
+            <a:avLst>
+              <a:gd name="adj" fmla="val 34304"/>
+            </a:avLst>
+          </a:prstGeom>
+          <a:noFill/>
+          <a:ln w="19050">
+            <a:solidFill>
+              <a:schemeClr val="tx1"/>
+            </a:solidFill>
+          </a:ln>
+        </p:spPr>
+        <p:style>
+          <a:lnRef idx="2">
+            <a:schemeClr val="accent1">
+              <a:shade val="50000"/>
+            </a:schemeClr>
+          </a:lnRef>
+          <a:fillRef idx="1">
+            <a:schemeClr val="accent1"/>
+          </a:fillRef>
+          <a:effectRef idx="0">
+            <a:schemeClr val="accent1"/>
+          </a:effectRef>
+          <a:fontRef idx="minor">
+            <a:schemeClr val="lt1"/>
+          </a:fontRef>
+        </p:style>
+        <p:txBody>
+          <a:bodyPr lIns="91439" tIns="45720" rIns="91439" bIns="45720" rtlCol="0" anchor="ctr"/>
+          <a:lstStyle/>
+          <a:p>
+            <a:pPr algn="ctr"/>
+            <a:endParaRPr kumimoji="1" lang="ja-JP" altLang="en-US" sz="1000" dirty="0"/>
+          </a:p>
+        </p:txBody>
+      </p:sp>
+      <p:sp>
+        <p:nvSpPr>
+          <p:cNvPr id="152" name="正方形/長方形 151"/>
+          <p:cNvSpPr/>
+          <p:nvPr/>
+        </p:nvSpPr>
+        <p:spPr>
+          <a:xfrm>
+            <a:off x="506089" y="153706"/>
+            <a:ext cx="866781" cy="246221"/>
+          </a:xfrm>
+          <a:prstGeom prst="rect">
+            <a:avLst/>
+          </a:prstGeom>
+        </p:spPr>
+        <p:txBody>
+          <a:bodyPr wrap="square" lIns="91439" tIns="45720" rIns="91439" bIns="45720">
+            <a:spAutoFit/>
+          </a:bodyPr>
+          <a:lstStyle/>
+          <a:p>
+            <a:r>
+              <a:rPr lang="en-US" altLang="ja-JP" sz="1000" dirty="0" err="1" smtClean="0"/>
+              <a:t>StateSub</a:t>
+            </a:r>
+            <a:endParaRPr lang="ja-JP" altLang="en-US" sz="1000" dirty="0"/>
+          </a:p>
+        </p:txBody>
+      </p:sp>
+      <p:sp>
+        <p:nvSpPr>
+          <p:cNvPr id="153" name="角丸四角形 152"/>
+          <p:cNvSpPr/>
+          <p:nvPr/>
+        </p:nvSpPr>
+        <p:spPr>
+          <a:xfrm>
+            <a:off x="1433799" y="811766"/>
+            <a:ext cx="1067481" cy="538736"/>
+          </a:xfrm>
+          <a:prstGeom prst="roundRect">
+            <a:avLst/>
+          </a:prstGeom>
+          <a:noFill/>
+          <a:ln w="19050">
+            <a:solidFill>
+              <a:schemeClr val="tx1"/>
+            </a:solidFill>
+          </a:ln>
+        </p:spPr>
+        <p:style>
+          <a:lnRef idx="2">
+            <a:schemeClr val="accent1">
+              <a:shade val="50000"/>
+            </a:schemeClr>
+          </a:lnRef>
+          <a:fillRef idx="1">
+            <a:schemeClr val="accent1"/>
+          </a:fillRef>
+          <a:effectRef idx="0">
+            <a:schemeClr val="accent1"/>
+          </a:effectRef>
+          <a:fontRef idx="minor">
+            <a:schemeClr val="lt1"/>
+          </a:fontRef>
+        </p:style>
+        <p:txBody>
+          <a:bodyPr lIns="91439" tIns="45720" rIns="91439" bIns="45720" rtlCol="0" anchor="t" anchorCtr="0"/>
+          <a:lstStyle/>
+          <a:p>
+            <a:pPr algn="ctr"/>
+            <a:r>
+              <a:rPr lang="en-US" altLang="ja-JP" sz="1000" dirty="0" smtClean="0">
+                <a:solidFill>
+                  <a:schemeClr val="tx1"/>
+                </a:solidFill>
+              </a:rPr>
+              <a:t>SubState1</a:t>
+            </a:r>
+            <a:endParaRPr lang="ja-JP" altLang="en-US" sz="1000" dirty="0">
+              <a:solidFill>
+                <a:schemeClr val="tx1"/>
+              </a:solidFill>
+            </a:endParaRPr>
+          </a:p>
+        </p:txBody>
+      </p:sp>
+      <p:cxnSp>
+        <p:nvCxnSpPr>
+          <p:cNvPr id="154" name="直線コネクタ 153"/>
+          <p:cNvCxnSpPr/>
+          <p:nvPr/>
+        </p:nvCxnSpPr>
+        <p:spPr>
+          <a:xfrm>
+            <a:off x="1438560" y="1065819"/>
+            <a:ext cx="1058562" cy="0"/>
+          </a:xfrm>
+          <a:prstGeom prst="line">
+            <a:avLst/>
+          </a:prstGeom>
+          <a:ln w="12700">
+            <a:solidFill>
+              <a:schemeClr val="tx1"/>
+            </a:solidFill>
+          </a:ln>
+        </p:spPr>
+        <p:style>
+          <a:lnRef idx="1">
+            <a:schemeClr val="accent1"/>
+          </a:lnRef>
+          <a:fillRef idx="0">
+            <a:schemeClr val="accent1"/>
+          </a:fillRef>
+          <a:effectRef idx="0">
+            <a:schemeClr val="accent1"/>
+          </a:effectRef>
+          <a:fontRef idx="minor">
+            <a:schemeClr val="tx1"/>
+          </a:fontRef>
+        </p:style>
+      </p:cxnSp>
+      <p:sp>
+        <p:nvSpPr>
+          <p:cNvPr id="163" name="フローチャート : 結合子 162"/>
+          <p:cNvSpPr/>
+          <p:nvPr/>
+        </p:nvSpPr>
+        <p:spPr>
+          <a:xfrm>
+            <a:off x="1895528" y="393232"/>
+            <a:ext cx="144021" cy="144020"/>
+          </a:xfrm>
+          <a:prstGeom prst="flowChartConnector">
+            <a:avLst/>
+          </a:prstGeom>
+          <a:solidFill>
+            <a:schemeClr val="tx1"/>
+          </a:solidFill>
+          <a:ln w="19050">
+            <a:solidFill>
+              <a:schemeClr val="tx1"/>
+            </a:solidFill>
+          </a:ln>
+        </p:spPr>
+        <p:style>
+          <a:lnRef idx="2">
+            <a:schemeClr val="accent1">
+              <a:shade val="50000"/>
+            </a:schemeClr>
+          </a:lnRef>
+          <a:fillRef idx="1">
+            <a:schemeClr val="accent1"/>
+          </a:fillRef>
+          <a:effectRef idx="0">
+            <a:schemeClr val="accent1"/>
+          </a:effectRef>
+          <a:fontRef idx="minor">
+            <a:schemeClr val="lt1"/>
+          </a:fontRef>
+        </p:style>
+        <p:txBody>
+          <a:bodyPr lIns="91439" tIns="45720" rIns="91439" bIns="45720" rtlCol="0" anchor="ctr"/>
+          <a:lstStyle/>
+          <a:p>
+            <a:pPr algn="ctr"/>
+            <a:endParaRPr lang="ja-JP" altLang="en-US" sz="1000"/>
+          </a:p>
+        </p:txBody>
+      </p:sp>
+      <p:cxnSp>
+        <p:nvCxnSpPr>
+          <p:cNvPr id="21" name="直線矢印コネクタ 28"/>
+          <p:cNvCxnSpPr>
+            <a:stCxn id="33" idx="6"/>
+            <a:endCxn id="44" idx="1"/>
+          </p:cNvCxnSpPr>
+          <p:nvPr/>
+        </p:nvCxnSpPr>
+        <p:spPr>
+          <a:xfrm>
+            <a:off x="578098" y="1887548"/>
+            <a:ext cx="866780" cy="0"/>
+          </a:xfrm>
+          <a:prstGeom prst="straightConnector1">
+            <a:avLst/>
+          </a:prstGeom>
+          <a:ln w="19050">
+            <a:solidFill>
+              <a:schemeClr val="tx1"/>
+            </a:solidFill>
+            <a:tailEnd type="arrow"/>
+          </a:ln>
+        </p:spPr>
+        <p:style>
+          <a:lnRef idx="1">
+            <a:schemeClr val="accent1"/>
+          </a:lnRef>
+          <a:fillRef idx="0">
+            <a:schemeClr val="accent1"/>
+          </a:fillRef>
+          <a:effectRef idx="0">
+            <a:schemeClr val="accent1"/>
+          </a:effectRef>
+          <a:fontRef idx="minor">
+            <a:schemeClr val="tx1"/>
+          </a:fontRef>
+        </p:style>
+      </p:cxnSp>
+      <p:sp>
+        <p:nvSpPr>
+          <p:cNvPr id="33" name="フローチャート : 結合子 32"/>
+          <p:cNvSpPr/>
+          <p:nvPr/>
+        </p:nvSpPr>
+        <p:spPr>
+          <a:xfrm>
+            <a:off x="434077" y="1815538"/>
+            <a:ext cx="144021" cy="144020"/>
+          </a:xfrm>
+          <a:prstGeom prst="flowChartConnector">
+            <a:avLst/>
+          </a:prstGeom>
+          <a:solidFill>
+            <a:schemeClr val="bg1"/>
+          </a:solidFill>
+          <a:ln w="19050">
+            <a:solidFill>
+              <a:schemeClr val="tx1"/>
+            </a:solidFill>
+          </a:ln>
+        </p:spPr>
+        <p:style>
+          <a:lnRef idx="2">
+            <a:schemeClr val="accent1">
+              <a:shade val="50000"/>
+            </a:schemeClr>
+          </a:lnRef>
+          <a:fillRef idx="1">
+            <a:schemeClr val="accent1"/>
+          </a:fillRef>
+          <a:effectRef idx="0">
+            <a:schemeClr val="accent1"/>
+          </a:effectRef>
+          <a:fontRef idx="minor">
+            <a:schemeClr val="lt1"/>
+          </a:fontRef>
+        </p:style>
+        <p:txBody>
+          <a:bodyPr lIns="91439" tIns="45720" rIns="91439" bIns="45720" rtlCol="0" anchor="ctr"/>
+          <a:lstStyle/>
+          <a:p>
+            <a:pPr algn="ctr"/>
+            <a:endParaRPr lang="ja-JP" altLang="en-US" sz="1000"/>
+          </a:p>
+        </p:txBody>
+      </p:sp>
+      <p:grpSp>
+        <p:nvGrpSpPr>
+          <p:cNvPr id="38" name="グループ化 37"/>
+          <p:cNvGrpSpPr/>
+          <p:nvPr/>
+        </p:nvGrpSpPr>
+        <p:grpSpPr>
+          <a:xfrm>
+            <a:off x="3101061" y="1009126"/>
+            <a:ext cx="144017" cy="144016"/>
+            <a:chOff x="4067944" y="4720186"/>
+            <a:chExt cx="288032" cy="288032"/>
+          </a:xfrm>
+          <a:solidFill>
+            <a:schemeClr val="bg1"/>
+          </a:solidFill>
+        </p:grpSpPr>
+        <p:sp>
+          <p:nvSpPr>
+            <p:cNvPr id="39" name="フローチャート : 結合子 38"/>
+            <p:cNvSpPr/>
+            <p:nvPr/>
+          </p:nvSpPr>
+          <p:spPr>
+            <a:xfrm>
+              <a:off x="4067944" y="4720186"/>
+              <a:ext cx="288032" cy="288032"/>
+            </a:xfrm>
+            <a:prstGeom prst="flowChartConnector">
+              <a:avLst/>
+            </a:prstGeom>
+            <a:grpFill/>
+            <a:ln w="19050">
+              <a:solidFill>
+                <a:schemeClr val="tx1"/>
+              </a:solidFill>
+            </a:ln>
+          </p:spPr>
+          <p:style>
+            <a:lnRef idx="2">
+              <a:schemeClr val="accent1">
+                <a:shade val="50000"/>
+              </a:schemeClr>
+            </a:lnRef>
+            <a:fillRef idx="1">
+              <a:schemeClr val="accent1"/>
+            </a:fillRef>
+            <a:effectRef idx="0">
+              <a:schemeClr val="accent1"/>
+            </a:effectRef>
+            <a:fontRef idx="minor">
+              <a:schemeClr val="lt1"/>
+            </a:fontRef>
+          </p:style>
+          <p:txBody>
+            <a:bodyPr rtlCol="0" anchor="ctr"/>
+            <a:lstStyle/>
+            <a:p>
+              <a:pPr algn="ctr"/>
+              <a:endParaRPr lang="ja-JP" altLang="en-US" sz="1000"/>
+            </a:p>
+          </p:txBody>
+        </p:sp>
+        <p:cxnSp>
+          <p:nvCxnSpPr>
+            <p:cNvPr id="40" name="直線コネクタ 39"/>
+            <p:cNvCxnSpPr>
+              <a:stCxn id="39" idx="1"/>
+              <a:endCxn id="39" idx="5"/>
+            </p:cNvCxnSpPr>
+            <p:nvPr/>
+          </p:nvCxnSpPr>
+          <p:spPr>
+            <a:xfrm>
+              <a:off x="4110125" y="4762367"/>
+              <a:ext cx="203670" cy="203670"/>
+            </a:xfrm>
+            <a:prstGeom prst="line">
+              <a:avLst/>
+            </a:prstGeom>
+            <a:grpFill/>
+            <a:ln w="19050">
+              <a:solidFill>
+                <a:schemeClr val="tx1"/>
+              </a:solidFill>
+            </a:ln>
+          </p:spPr>
+          <p:style>
+            <a:lnRef idx="1">
+              <a:schemeClr val="accent1"/>
+            </a:lnRef>
+            <a:fillRef idx="0">
+              <a:schemeClr val="accent1"/>
+            </a:fillRef>
+            <a:effectRef idx="0">
+              <a:schemeClr val="accent1"/>
+            </a:effectRef>
+            <a:fontRef idx="minor">
+              <a:schemeClr val="tx1"/>
+            </a:fontRef>
+          </p:style>
+        </p:cxnSp>
+        <p:cxnSp>
+          <p:nvCxnSpPr>
+            <p:cNvPr id="41" name="直線コネクタ 40"/>
+            <p:cNvCxnSpPr>
+              <a:stCxn id="39" idx="7"/>
+              <a:endCxn id="39" idx="3"/>
+            </p:cNvCxnSpPr>
+            <p:nvPr/>
+          </p:nvCxnSpPr>
+          <p:spPr>
+            <a:xfrm flipH="1">
+              <a:off x="4110125" y="4762367"/>
+              <a:ext cx="203670" cy="203670"/>
+            </a:xfrm>
+            <a:prstGeom prst="line">
+              <a:avLst/>
+            </a:prstGeom>
+            <a:grpFill/>
+            <a:ln w="19050">
+              <a:solidFill>
+                <a:schemeClr val="tx1"/>
+              </a:solidFill>
+            </a:ln>
+          </p:spPr>
+          <p:style>
+            <a:lnRef idx="1">
+              <a:schemeClr val="accent1"/>
+            </a:lnRef>
+            <a:fillRef idx="0">
+              <a:schemeClr val="accent1"/>
+            </a:fillRef>
+            <a:effectRef idx="0">
+              <a:schemeClr val="accent1"/>
+            </a:effectRef>
+            <a:fontRef idx="minor">
+              <a:schemeClr val="tx1"/>
+            </a:fontRef>
+          </p:style>
+        </p:cxnSp>
+      </p:grpSp>
+      <p:cxnSp>
+        <p:nvCxnSpPr>
+          <p:cNvPr id="28" name="直線矢印コネクタ 28"/>
+          <p:cNvCxnSpPr>
+            <a:stCxn id="153" idx="3"/>
+            <a:endCxn id="39" idx="2"/>
+          </p:cNvCxnSpPr>
+          <p:nvPr/>
+        </p:nvCxnSpPr>
+        <p:spPr>
+          <a:xfrm>
+            <a:off x="2501280" y="1081134"/>
+            <a:ext cx="599781" cy="0"/>
+          </a:xfrm>
+          <a:prstGeom prst="straightConnector1">
+            <a:avLst/>
+          </a:prstGeom>
+          <a:ln w="19050">
+            <a:solidFill>
+              <a:schemeClr val="tx1"/>
+            </a:solidFill>
+            <a:tailEnd type="arrow"/>
+          </a:ln>
+        </p:spPr>
+        <p:style>
+          <a:lnRef idx="1">
+            <a:schemeClr val="accent1"/>
+          </a:lnRef>
+          <a:fillRef idx="0">
+            <a:schemeClr val="accent1"/>
+          </a:fillRef>
+          <a:effectRef idx="0">
+            <a:schemeClr val="accent1"/>
+          </a:effectRef>
+          <a:fontRef idx="minor">
+            <a:schemeClr val="tx1"/>
+          </a:fontRef>
+        </p:style>
+      </p:cxnSp>
+      <p:sp>
+        <p:nvSpPr>
+          <p:cNvPr id="31" name="正方形/長方形 30"/>
+          <p:cNvSpPr/>
+          <p:nvPr/>
+        </p:nvSpPr>
+        <p:spPr>
+          <a:xfrm>
+            <a:off x="2032" y="1887548"/>
+            <a:ext cx="670395" cy="246221"/>
+          </a:xfrm>
+          <a:prstGeom prst="rect">
+            <a:avLst/>
+          </a:prstGeom>
+        </p:spPr>
+        <p:txBody>
+          <a:bodyPr wrap="square" lIns="91439" tIns="45720" rIns="91439" bIns="45720">
+            <a:spAutoFit/>
+          </a:bodyPr>
+          <a:lstStyle/>
+          <a:p>
+            <a:r>
+              <a:rPr lang="en-US" altLang="ja-JP" sz="1000" dirty="0" smtClean="0"/>
+              <a:t>Entry1</a:t>
+            </a:r>
+            <a:endParaRPr lang="ja-JP" altLang="en-US" sz="1000" dirty="0"/>
+          </a:p>
+        </p:txBody>
+      </p:sp>
+      <p:sp>
+        <p:nvSpPr>
+          <p:cNvPr id="34" name="正方形/長方形 33"/>
+          <p:cNvSpPr/>
+          <p:nvPr/>
+        </p:nvSpPr>
+        <p:spPr>
+          <a:xfrm>
+            <a:off x="3147851" y="1062424"/>
+            <a:ext cx="502373" cy="246221"/>
+          </a:xfrm>
+          <a:prstGeom prst="rect">
+            <a:avLst/>
+          </a:prstGeom>
+        </p:spPr>
+        <p:txBody>
+          <a:bodyPr wrap="square" lIns="91439" tIns="45720" rIns="91439" bIns="45720">
+            <a:spAutoFit/>
+          </a:bodyPr>
+          <a:lstStyle/>
+          <a:p>
+            <a:r>
+              <a:rPr lang="en-US" altLang="ja-JP" sz="1000" dirty="0" smtClean="0"/>
+              <a:t>Exit1</a:t>
+            </a:r>
+            <a:endParaRPr lang="ja-JP" altLang="en-US" sz="1000" dirty="0"/>
+          </a:p>
+        </p:txBody>
+      </p:sp>
+      <p:sp>
+        <p:nvSpPr>
+          <p:cNvPr id="44" name="角丸四角形 43"/>
+          <p:cNvSpPr/>
+          <p:nvPr/>
+        </p:nvSpPr>
+        <p:spPr>
+          <a:xfrm>
+            <a:off x="1444878" y="1618180"/>
+            <a:ext cx="1067481" cy="538736"/>
+          </a:xfrm>
+          <a:prstGeom prst="roundRect">
+            <a:avLst/>
+          </a:prstGeom>
+          <a:noFill/>
+          <a:ln w="19050">
+            <a:solidFill>
+              <a:schemeClr val="tx1"/>
+            </a:solidFill>
+          </a:ln>
+        </p:spPr>
+        <p:style>
+          <a:lnRef idx="2">
+            <a:schemeClr val="accent1">
+              <a:shade val="50000"/>
+            </a:schemeClr>
+          </a:lnRef>
+          <a:fillRef idx="1">
+            <a:schemeClr val="accent1"/>
+          </a:fillRef>
+          <a:effectRef idx="0">
+            <a:schemeClr val="accent1"/>
+          </a:effectRef>
+          <a:fontRef idx="minor">
+            <a:schemeClr val="lt1"/>
+          </a:fontRef>
+        </p:style>
+        <p:txBody>
+          <a:bodyPr lIns="91439" tIns="45720" rIns="91439" bIns="45720" rtlCol="0" anchor="t" anchorCtr="0"/>
+          <a:lstStyle/>
+          <a:p>
+            <a:pPr algn="ctr"/>
+            <a:r>
+              <a:rPr lang="en-US" altLang="ja-JP" sz="1000" dirty="0" smtClean="0">
+                <a:solidFill>
+                  <a:schemeClr val="tx1"/>
+                </a:solidFill>
+              </a:rPr>
+              <a:t>SubState2</a:t>
+            </a:r>
+            <a:endParaRPr lang="ja-JP" altLang="en-US" sz="1000" dirty="0">
+              <a:solidFill>
+                <a:schemeClr val="tx1"/>
+              </a:solidFill>
+            </a:endParaRPr>
+          </a:p>
+        </p:txBody>
+      </p:sp>
+      <p:cxnSp>
+        <p:nvCxnSpPr>
+          <p:cNvPr id="45" name="直線コネクタ 44"/>
+          <p:cNvCxnSpPr/>
+          <p:nvPr/>
+        </p:nvCxnSpPr>
+        <p:spPr>
+          <a:xfrm>
+            <a:off x="1449639" y="1872233"/>
+            <a:ext cx="1058562" cy="0"/>
+          </a:xfrm>
+          <a:prstGeom prst="line">
+            <a:avLst/>
+          </a:prstGeom>
+          <a:ln w="12700">
+            <a:solidFill>
+              <a:schemeClr val="tx1"/>
+            </a:solidFill>
+          </a:ln>
+        </p:spPr>
+        <p:style>
+          <a:lnRef idx="1">
+            <a:schemeClr val="accent1"/>
+          </a:lnRef>
+          <a:fillRef idx="0">
+            <a:schemeClr val="accent1"/>
+          </a:fillRef>
+          <a:effectRef idx="0">
+            <a:schemeClr val="accent1"/>
+          </a:effectRef>
+          <a:fontRef idx="minor">
+            <a:schemeClr val="tx1"/>
+          </a:fontRef>
+        </p:style>
+      </p:cxnSp>
+      <p:cxnSp>
+        <p:nvCxnSpPr>
+          <p:cNvPr id="46" name="直線矢印コネクタ 28"/>
+          <p:cNvCxnSpPr>
+            <a:stCxn id="44" idx="3"/>
+            <a:endCxn id="39" idx="3"/>
+          </p:cNvCxnSpPr>
+          <p:nvPr/>
+        </p:nvCxnSpPr>
+        <p:spPr>
+          <a:xfrm flipV="1">
+            <a:off x="2512359" y="1132051"/>
+            <a:ext cx="609793" cy="755497"/>
+          </a:xfrm>
+          <a:prstGeom prst="straightConnector1">
+            <a:avLst/>
+          </a:prstGeom>
+          <a:ln w="19050">
+            <a:solidFill>
+              <a:schemeClr val="tx1"/>
+            </a:solidFill>
+            <a:tailEnd type="arrow"/>
+          </a:ln>
+        </p:spPr>
+        <p:style>
+          <a:lnRef idx="1">
+            <a:schemeClr val="accent1"/>
+          </a:lnRef>
+          <a:fillRef idx="0">
+            <a:schemeClr val="accent1"/>
+          </a:fillRef>
+          <a:effectRef idx="0">
+            <a:schemeClr val="accent1"/>
+          </a:effectRef>
+          <a:fontRef idx="minor">
+            <a:schemeClr val="tx1"/>
+          </a:fontRef>
+        </p:style>
+      </p:cxnSp>
+      <p:sp>
+        <p:nvSpPr>
+          <p:cNvPr id="51" name="正方形/長方形 50"/>
+          <p:cNvSpPr/>
+          <p:nvPr/>
+        </p:nvSpPr>
+        <p:spPr>
+          <a:xfrm>
+            <a:off x="2501280" y="827674"/>
+            <a:ext cx="670395" cy="246221"/>
+          </a:xfrm>
+          <a:prstGeom prst="rect">
+            <a:avLst/>
+          </a:prstGeom>
+        </p:spPr>
+        <p:txBody>
+          <a:bodyPr wrap="square" lIns="91439" tIns="45720" rIns="91439" bIns="45720">
+            <a:spAutoFit/>
+          </a:bodyPr>
+          <a:lstStyle/>
+          <a:p>
+            <a:r>
+              <a:rPr lang="en-US" altLang="ja-JP" sz="1000" dirty="0" smtClean="0"/>
+              <a:t>Event1</a:t>
+            </a:r>
+            <a:endParaRPr lang="ja-JP" altLang="en-US" sz="1000" dirty="0"/>
+          </a:p>
+        </p:txBody>
+      </p:sp>
+      <p:sp>
+        <p:nvSpPr>
+          <p:cNvPr id="52" name="正方形/長方形 51"/>
+          <p:cNvSpPr/>
+          <p:nvPr/>
+        </p:nvSpPr>
+        <p:spPr>
+          <a:xfrm>
+            <a:off x="2501280" y="1770028"/>
+            <a:ext cx="670395" cy="246221"/>
+          </a:xfrm>
+          <a:prstGeom prst="rect">
+            <a:avLst/>
+          </a:prstGeom>
+        </p:spPr>
+        <p:txBody>
+          <a:bodyPr wrap="square" lIns="91439" tIns="45720" rIns="91439" bIns="45720">
+            <a:spAutoFit/>
+          </a:bodyPr>
+          <a:lstStyle/>
+          <a:p>
+            <a:r>
+              <a:rPr lang="en-US" altLang="ja-JP" sz="1000" dirty="0" smtClean="0"/>
+              <a:t>Event1</a:t>
+            </a:r>
+            <a:endParaRPr lang="ja-JP" altLang="en-US" sz="1000" dirty="0"/>
+          </a:p>
+        </p:txBody>
+      </p:sp>
+    </p:spTree>
+    <p:extLst>
+      <p:ext uri="{BB962C8B-B14F-4D97-AF65-F5344CB8AC3E}">
+        <p14:creationId xmlns:p14="http://schemas.microsoft.com/office/powerpoint/2010/main" val="1972873865"/>
+      </p:ext>
+    </p:extLst>
+  </p:cSld>
+  <p:clrMapOvr>
+    <a:masterClrMapping/>
+  </p:clrMapOvr>
+  <p:timing>
+    <p:tnLst>
+      <p:par>
+        <p:cTn id="1" dur="indefinite" restart="never" nodeType="tmRoot"/>
+      </p:par>
+    </p:tnLst>
+  </p:timing>
+</p:sld>
+</file>
+
+<file path=ppt/slides/slide15.xml><?xml version="1.0" encoding="utf-8"?>
 <p:sld xmlns:a="http://schemas.openxmlformats.org/drawingml/2006/main" xmlns:r="http://schemas.openxmlformats.org/officeDocument/2006/relationships" xmlns:p="http://schemas.openxmlformats.org/presentationml/2006/main">
   <p:cSld>
     <p:spTree>

</xml_diff>

<commit_message>
Submachine state compile ok.
</commit_message>
<xml_diff>
--- a/boost_training/msm/fig.pptx
+++ b/boost_training/msm/fig.pptx
@@ -206,7 +206,7 @@
           <a:p>
             <a:fld id="{33E477F9-361B-4780-B227-665A41208240}" type="datetimeFigureOut">
               <a:rPr kumimoji="1" lang="ja-JP" altLang="en-US" smtClean="0"/>
-              <a:t>2012/2/24</a:t>
+              <a:t>2012/3/3</a:t>
             </a:fld>
             <a:endParaRPr kumimoji="1" lang="ja-JP" altLang="en-US"/>
           </a:p>
@@ -2022,7 +2022,7 @@
           <a:p>
             <a:fld id="{E90ED720-0104-4369-84BC-D37694168613}" type="datetimeFigureOut">
               <a:rPr kumimoji="1" lang="ja-JP" altLang="en-US" smtClean="0"/>
-              <a:t>2012/2/24</a:t>
+              <a:t>2012/3/3</a:t>
             </a:fld>
             <a:endParaRPr kumimoji="1" lang="ja-JP" altLang="en-US"/>
           </a:p>
@@ -2219,7 +2219,7 @@
           <a:p>
             <a:fld id="{E90ED720-0104-4369-84BC-D37694168613}" type="datetimeFigureOut">
               <a:rPr kumimoji="1" lang="ja-JP" altLang="en-US" smtClean="0"/>
-              <a:t>2012/2/24</a:t>
+              <a:t>2012/3/3</a:t>
             </a:fld>
             <a:endParaRPr kumimoji="1" lang="ja-JP" altLang="en-US"/>
           </a:p>
@@ -2426,7 +2426,7 @@
           <a:p>
             <a:fld id="{E90ED720-0104-4369-84BC-D37694168613}" type="datetimeFigureOut">
               <a:rPr kumimoji="1" lang="ja-JP" altLang="en-US" smtClean="0"/>
-              <a:t>2012/2/24</a:t>
+              <a:t>2012/3/3</a:t>
             </a:fld>
             <a:endParaRPr kumimoji="1" lang="ja-JP" altLang="en-US"/>
           </a:p>
@@ -2623,7 +2623,7 @@
           <a:p>
             <a:fld id="{E90ED720-0104-4369-84BC-D37694168613}" type="datetimeFigureOut">
               <a:rPr kumimoji="1" lang="ja-JP" altLang="en-US" smtClean="0"/>
-              <a:t>2012/2/24</a:t>
+              <a:t>2012/3/3</a:t>
             </a:fld>
             <a:endParaRPr kumimoji="1" lang="ja-JP" altLang="en-US"/>
           </a:p>
@@ -2864,7 +2864,7 @@
           <a:p>
             <a:fld id="{E90ED720-0104-4369-84BC-D37694168613}" type="datetimeFigureOut">
               <a:rPr kumimoji="1" lang="ja-JP" altLang="en-US" smtClean="0"/>
-              <a:t>2012/2/24</a:t>
+              <a:t>2012/3/3</a:t>
             </a:fld>
             <a:endParaRPr kumimoji="1" lang="ja-JP" altLang="en-US"/>
           </a:p>
@@ -3211,7 +3211,7 @@
           <a:p>
             <a:fld id="{E90ED720-0104-4369-84BC-D37694168613}" type="datetimeFigureOut">
               <a:rPr kumimoji="1" lang="ja-JP" altLang="en-US" smtClean="0"/>
-              <a:t>2012/2/24</a:t>
+              <a:t>2012/3/3</a:t>
             </a:fld>
             <a:endParaRPr kumimoji="1" lang="ja-JP" altLang="en-US"/>
           </a:p>
@@ -3692,7 +3692,7 @@
           <a:p>
             <a:fld id="{E90ED720-0104-4369-84BC-D37694168613}" type="datetimeFigureOut">
               <a:rPr kumimoji="1" lang="ja-JP" altLang="en-US" smtClean="0"/>
-              <a:t>2012/2/24</a:t>
+              <a:t>2012/3/3</a:t>
             </a:fld>
             <a:endParaRPr kumimoji="1" lang="ja-JP" altLang="en-US"/>
           </a:p>
@@ -3805,7 +3805,7 @@
           <a:p>
             <a:fld id="{E90ED720-0104-4369-84BC-D37694168613}" type="datetimeFigureOut">
               <a:rPr kumimoji="1" lang="ja-JP" altLang="en-US" smtClean="0"/>
-              <a:t>2012/2/24</a:t>
+              <a:t>2012/3/3</a:t>
             </a:fld>
             <a:endParaRPr kumimoji="1" lang="ja-JP" altLang="en-US"/>
           </a:p>
@@ -3895,7 +3895,7 @@
           <a:p>
             <a:fld id="{E90ED720-0104-4369-84BC-D37694168613}" type="datetimeFigureOut">
               <a:rPr kumimoji="1" lang="ja-JP" altLang="en-US" smtClean="0"/>
-              <a:t>2012/2/24</a:t>
+              <a:t>2012/3/3</a:t>
             </a:fld>
             <a:endParaRPr kumimoji="1" lang="ja-JP" altLang="en-US"/>
           </a:p>
@@ -4199,7 +4199,7 @@
           <a:p>
             <a:fld id="{E90ED720-0104-4369-84BC-D37694168613}" type="datetimeFigureOut">
               <a:rPr kumimoji="1" lang="ja-JP" altLang="en-US" smtClean="0"/>
-              <a:t>2012/2/24</a:t>
+              <a:t>2012/3/3</a:t>
             </a:fld>
             <a:endParaRPr kumimoji="1" lang="ja-JP" altLang="en-US"/>
           </a:p>
@@ -4447,7 +4447,7 @@
           <a:p>
             <a:fld id="{E90ED720-0104-4369-84BC-D37694168613}" type="datetimeFigureOut">
               <a:rPr kumimoji="1" lang="ja-JP" altLang="en-US" smtClean="0"/>
-              <a:t>2012/2/24</a:t>
+              <a:t>2012/3/3</a:t>
             </a:fld>
             <a:endParaRPr kumimoji="1" lang="ja-JP" altLang="en-US"/>
           </a:p>
@@ -4687,7 +4687,7 @@
           <a:p>
             <a:fld id="{E90ED720-0104-4369-84BC-D37694168613}" type="datetimeFigureOut">
               <a:rPr kumimoji="1" lang="ja-JP" altLang="en-US" smtClean="0"/>
-              <a:t>2012/2/24</a:t>
+              <a:t>2012/3/3</a:t>
             </a:fld>
             <a:endParaRPr kumimoji="1" lang="ja-JP" altLang="en-US"/>
           </a:p>
@@ -9602,6 +9602,122 @@
           <a:p>
             <a:pPr algn="ctr"/>
             <a:endParaRPr kumimoji="1" lang="ja-JP" altLang="en-US"/>
+          </a:p>
+        </p:txBody>
+      </p:sp>
+      <p:sp>
+        <p:nvSpPr>
+          <p:cNvPr id="23" name="正方形/長方形 22"/>
+          <p:cNvSpPr/>
+          <p:nvPr/>
+        </p:nvSpPr>
+        <p:spPr>
+          <a:xfrm>
+            <a:off x="648419" y="1368177"/>
+            <a:ext cx="670395" cy="246221"/>
+          </a:xfrm>
+          <a:prstGeom prst="rect">
+            <a:avLst/>
+          </a:prstGeom>
+        </p:spPr>
+        <p:txBody>
+          <a:bodyPr wrap="square" lIns="91439" tIns="45720" rIns="91439" bIns="45720">
+            <a:spAutoFit/>
+          </a:bodyPr>
+          <a:lstStyle/>
+          <a:p>
+            <a:r>
+              <a:rPr lang="en-US" altLang="ja-JP" sz="1000" dirty="0" smtClean="0"/>
+              <a:t>Entry1</a:t>
+            </a:r>
+            <a:endParaRPr lang="ja-JP" altLang="en-US" sz="1000" dirty="0"/>
+          </a:p>
+        </p:txBody>
+      </p:sp>
+      <p:sp>
+        <p:nvSpPr>
+          <p:cNvPr id="24" name="正方形/長方形 23"/>
+          <p:cNvSpPr/>
+          <p:nvPr/>
+        </p:nvSpPr>
+        <p:spPr>
+          <a:xfrm>
+            <a:off x="1257963" y="1368177"/>
+            <a:ext cx="502373" cy="246221"/>
+          </a:xfrm>
+          <a:prstGeom prst="rect">
+            <a:avLst/>
+          </a:prstGeom>
+        </p:spPr>
+        <p:txBody>
+          <a:bodyPr wrap="square" lIns="91439" tIns="45720" rIns="91439" bIns="45720">
+            <a:spAutoFit/>
+          </a:bodyPr>
+          <a:lstStyle/>
+          <a:p>
+            <a:r>
+              <a:rPr lang="en-US" altLang="ja-JP" sz="1000" dirty="0" smtClean="0"/>
+              <a:t>Exit1</a:t>
+            </a:r>
+            <a:endParaRPr lang="ja-JP" altLang="en-US" sz="1000" dirty="0"/>
+          </a:p>
+        </p:txBody>
+      </p:sp>
+      <p:sp>
+        <p:nvSpPr>
+          <p:cNvPr id="25" name="正方形/長方形 24"/>
+          <p:cNvSpPr/>
+          <p:nvPr/>
+        </p:nvSpPr>
+        <p:spPr>
+          <a:xfrm>
+            <a:off x="2376611" y="1368177"/>
+            <a:ext cx="670395" cy="246221"/>
+          </a:xfrm>
+          <a:prstGeom prst="rect">
+            <a:avLst/>
+          </a:prstGeom>
+        </p:spPr>
+        <p:txBody>
+          <a:bodyPr wrap="square" lIns="91439" tIns="45720" rIns="91439" bIns="45720">
+            <a:spAutoFit/>
+          </a:bodyPr>
+          <a:lstStyle/>
+          <a:p>
+            <a:r>
+              <a:rPr lang="en-US" altLang="ja-JP" sz="1000" dirty="0" smtClean="0"/>
+              <a:t>Entry1</a:t>
+            </a:r>
+            <a:endParaRPr lang="ja-JP" altLang="en-US" sz="1000" dirty="0"/>
+          </a:p>
+        </p:txBody>
+      </p:sp>
+      <p:sp>
+        <p:nvSpPr>
+          <p:cNvPr id="26" name="正方形/長方形 25"/>
+          <p:cNvSpPr/>
+          <p:nvPr/>
+        </p:nvSpPr>
+        <p:spPr>
+          <a:xfrm>
+            <a:off x="2986155" y="1368177"/>
+            <a:ext cx="502373" cy="246221"/>
+          </a:xfrm>
+          <a:prstGeom prst="rect">
+            <a:avLst/>
+          </a:prstGeom>
+        </p:spPr>
+        <p:txBody>
+          <a:bodyPr wrap="square" lIns="91439" tIns="45720" rIns="91439" bIns="45720">
+            <a:spAutoFit/>
+          </a:bodyPr>
+          <a:lstStyle/>
+          <a:p>
+            <a:r>
+              <a:rPr lang="en-US" altLang="ja-JP" sz="1000" dirty="0" smtClean="0"/>
+              <a:t>Exit1</a:t>
+            </a:r>
+            <a:endParaRPr lang="ja-JP" altLang="en-US" sz="1000" dirty="0"/>
           </a:p>
         </p:txBody>
       </p:sp>

</xml_diff>

<commit_message>
Added finger print register examples.
</commit_message>
<xml_diff>
--- a/boost_training/msm/fig.pptx
+++ b/boost_training/msm/fig.pptx
@@ -14437,6 +14437,1102 @@
           </a:p>
         </p:txBody>
       </p:sp>
+      <p:sp>
+        <p:nvSpPr>
+          <p:cNvPr id="67" name="角丸四角形 66"/>
+          <p:cNvSpPr/>
+          <p:nvPr/>
+        </p:nvSpPr>
+        <p:spPr>
+          <a:xfrm>
+            <a:off x="1651133" y="545689"/>
+            <a:ext cx="1715843" cy="538736"/>
+          </a:xfrm>
+          <a:prstGeom prst="roundRect">
+            <a:avLst/>
+          </a:prstGeom>
+          <a:noFill/>
+          <a:ln w="19050">
+            <a:solidFill>
+              <a:schemeClr val="tx1"/>
+            </a:solidFill>
+          </a:ln>
+        </p:spPr>
+        <p:style>
+          <a:lnRef idx="2">
+            <a:schemeClr val="accent1">
+              <a:shade val="50000"/>
+            </a:schemeClr>
+          </a:lnRef>
+          <a:fillRef idx="1">
+            <a:schemeClr val="accent1"/>
+          </a:fillRef>
+          <a:effectRef idx="0">
+            <a:schemeClr val="accent1"/>
+          </a:effectRef>
+          <a:fontRef idx="minor">
+            <a:schemeClr val="lt1"/>
+          </a:fontRef>
+        </p:style>
+        <p:txBody>
+          <a:bodyPr lIns="91439" tIns="45720" rIns="91439" bIns="45720" rtlCol="0" anchor="t" anchorCtr="0"/>
+          <a:lstStyle/>
+          <a:p>
+            <a:pPr algn="ctr"/>
+            <a:r>
+              <a:rPr lang="en-US" altLang="ja-JP" sz="1000" dirty="0" smtClean="0">
+                <a:solidFill>
+                  <a:schemeClr val="tx1"/>
+                </a:solidFill>
+              </a:rPr>
+              <a:t>Waiting</a:t>
+            </a:r>
+            <a:endParaRPr lang="ja-JP" altLang="en-US" sz="1000" dirty="0">
+              <a:solidFill>
+                <a:schemeClr val="tx1"/>
+              </a:solidFill>
+            </a:endParaRPr>
+          </a:p>
+        </p:txBody>
+      </p:sp>
+      <p:cxnSp>
+        <p:nvCxnSpPr>
+          <p:cNvPr id="68" name="直線コネクタ 67"/>
+          <p:cNvCxnSpPr>
+            <a:stCxn id="67" idx="1"/>
+            <a:endCxn id="67" idx="3"/>
+          </p:cNvCxnSpPr>
+          <p:nvPr/>
+        </p:nvCxnSpPr>
+        <p:spPr>
+          <a:xfrm>
+            <a:off x="1651133" y="815057"/>
+            <a:ext cx="1715843" cy="0"/>
+          </a:xfrm>
+          <a:prstGeom prst="line">
+            <a:avLst/>
+          </a:prstGeom>
+          <a:ln w="12700">
+            <a:solidFill>
+              <a:schemeClr val="tx1"/>
+            </a:solidFill>
+          </a:ln>
+        </p:spPr>
+        <p:style>
+          <a:lnRef idx="1">
+            <a:schemeClr val="accent1"/>
+          </a:lnRef>
+          <a:fillRef idx="0">
+            <a:schemeClr val="accent1"/>
+          </a:fillRef>
+          <a:effectRef idx="0">
+            <a:schemeClr val="accent1"/>
+          </a:effectRef>
+          <a:fontRef idx="minor">
+            <a:schemeClr val="tx1"/>
+          </a:fontRef>
+        </p:style>
+      </p:cxnSp>
+      <p:cxnSp>
+        <p:nvCxnSpPr>
+          <p:cNvPr id="69" name="直線矢印コネクタ 28"/>
+          <p:cNvCxnSpPr>
+            <a:endCxn id="35" idx="0"/>
+          </p:cNvCxnSpPr>
+          <p:nvPr/>
+        </p:nvCxnSpPr>
+        <p:spPr>
+          <a:xfrm>
+            <a:off x="2184873" y="1084425"/>
+            <a:ext cx="1223" cy="407527"/>
+          </a:xfrm>
+          <a:prstGeom prst="straightConnector1">
+            <a:avLst/>
+          </a:prstGeom>
+          <a:ln w="19050">
+            <a:solidFill>
+              <a:schemeClr val="tx1"/>
+            </a:solidFill>
+            <a:tailEnd type="arrow"/>
+          </a:ln>
+        </p:spPr>
+        <p:style>
+          <a:lnRef idx="1">
+            <a:schemeClr val="accent1"/>
+          </a:lnRef>
+          <a:fillRef idx="0">
+            <a:schemeClr val="accent1"/>
+          </a:fillRef>
+          <a:effectRef idx="0">
+            <a:schemeClr val="accent1"/>
+          </a:effectRef>
+          <a:fontRef idx="minor">
+            <a:schemeClr val="tx1"/>
+          </a:fontRef>
+        </p:style>
+      </p:cxnSp>
+      <p:sp>
+        <p:nvSpPr>
+          <p:cNvPr id="70" name="正方形/長方形 69"/>
+          <p:cNvSpPr/>
+          <p:nvPr/>
+        </p:nvSpPr>
+        <p:spPr>
+          <a:xfrm>
+            <a:off x="2184873" y="1080145"/>
+            <a:ext cx="1326119" cy="400110"/>
+          </a:xfrm>
+          <a:prstGeom prst="rect">
+            <a:avLst/>
+          </a:prstGeom>
+        </p:spPr>
+        <p:txBody>
+          <a:bodyPr wrap="square" lIns="91439" tIns="45720" rIns="91439" bIns="45720">
+            <a:spAutoFit/>
+          </a:bodyPr>
+          <a:lstStyle/>
+          <a:p>
+            <a:r>
+              <a:rPr lang="en-US" altLang="ja-JP" sz="1000" dirty="0" smtClean="0"/>
+              <a:t>Start Button Pressed </a:t>
+            </a:r>
+          </a:p>
+          <a:p>
+            <a:r>
+              <a:rPr lang="en-US" altLang="ja-JP" sz="1000" dirty="0" smtClean="0"/>
+              <a:t>/ “Right hand please”</a:t>
+            </a:r>
+            <a:endParaRPr lang="ja-JP" altLang="en-US" sz="1000" dirty="0"/>
+          </a:p>
+        </p:txBody>
+      </p:sp>
+      <p:sp>
+        <p:nvSpPr>
+          <p:cNvPr id="71" name="正方形/長方形 70"/>
+          <p:cNvSpPr/>
+          <p:nvPr/>
+        </p:nvSpPr>
+        <p:spPr>
+          <a:xfrm>
+            <a:off x="1746957" y="2058234"/>
+            <a:ext cx="468213" cy="246221"/>
+          </a:xfrm>
+          <a:prstGeom prst="rect">
+            <a:avLst/>
+          </a:prstGeom>
+        </p:spPr>
+        <p:txBody>
+          <a:bodyPr wrap="square" lIns="91439" tIns="45720" rIns="91439" bIns="45720">
+            <a:spAutoFit/>
+          </a:bodyPr>
+          <a:lstStyle/>
+          <a:p>
+            <a:r>
+              <a:rPr lang="en-US" altLang="ja-JP" sz="1000" dirty="0" smtClean="0"/>
+              <a:t>Exit1</a:t>
+            </a:r>
+            <a:endParaRPr lang="ja-JP" altLang="en-US" sz="1000" dirty="0"/>
+          </a:p>
+        </p:txBody>
+      </p:sp>
+      <p:sp>
+        <p:nvSpPr>
+          <p:cNvPr id="72" name="角丸四角形 71"/>
+          <p:cNvSpPr/>
+          <p:nvPr/>
+        </p:nvSpPr>
+        <p:spPr>
+          <a:xfrm>
+            <a:off x="1631539" y="2449165"/>
+            <a:ext cx="1807445" cy="538736"/>
+          </a:xfrm>
+          <a:prstGeom prst="roundRect">
+            <a:avLst/>
+          </a:prstGeom>
+          <a:noFill/>
+          <a:ln w="19050">
+            <a:solidFill>
+              <a:schemeClr val="tx1"/>
+            </a:solidFill>
+          </a:ln>
+        </p:spPr>
+        <p:style>
+          <a:lnRef idx="2">
+            <a:schemeClr val="accent1">
+              <a:shade val="50000"/>
+            </a:schemeClr>
+          </a:lnRef>
+          <a:fillRef idx="1">
+            <a:schemeClr val="accent1"/>
+          </a:fillRef>
+          <a:effectRef idx="0">
+            <a:schemeClr val="accent1"/>
+          </a:effectRef>
+          <a:fontRef idx="minor">
+            <a:schemeClr val="lt1"/>
+          </a:fontRef>
+        </p:style>
+        <p:txBody>
+          <a:bodyPr lIns="91439" tIns="45720" rIns="91439" bIns="45720" rtlCol="0" anchor="t" anchorCtr="0"/>
+          <a:lstStyle/>
+          <a:p>
+            <a:pPr algn="ctr"/>
+            <a:r>
+              <a:rPr lang="en-US" altLang="ja-JP" sz="1000" dirty="0" err="1" smtClean="0">
+                <a:solidFill>
+                  <a:schemeClr val="tx1"/>
+                </a:solidFill>
+              </a:rPr>
+              <a:t>LeftScanning:ScanFinger</a:t>
+            </a:r>
+            <a:endParaRPr lang="ja-JP" altLang="en-US" sz="1000" dirty="0">
+              <a:solidFill>
+                <a:schemeClr val="tx1"/>
+              </a:solidFill>
+            </a:endParaRPr>
+          </a:p>
+        </p:txBody>
+      </p:sp>
+      <p:cxnSp>
+        <p:nvCxnSpPr>
+          <p:cNvPr id="73" name="直線コネクタ 72"/>
+          <p:cNvCxnSpPr/>
+          <p:nvPr/>
+        </p:nvCxnSpPr>
+        <p:spPr>
+          <a:xfrm>
+            <a:off x="1636300" y="2703218"/>
+            <a:ext cx="1804936" cy="0"/>
+          </a:xfrm>
+          <a:prstGeom prst="line">
+            <a:avLst/>
+          </a:prstGeom>
+          <a:ln w="12700">
+            <a:solidFill>
+              <a:schemeClr val="tx1"/>
+            </a:solidFill>
+          </a:ln>
+        </p:spPr>
+        <p:style>
+          <a:lnRef idx="1">
+            <a:schemeClr val="accent1"/>
+          </a:lnRef>
+          <a:fillRef idx="0">
+            <a:schemeClr val="accent1"/>
+          </a:fillRef>
+          <a:effectRef idx="0">
+            <a:schemeClr val="accent1"/>
+          </a:effectRef>
+          <a:fontRef idx="minor">
+            <a:schemeClr val="tx1"/>
+          </a:fontRef>
+        </p:style>
+      </p:cxnSp>
+      <p:sp>
+        <p:nvSpPr>
+          <p:cNvPr id="74" name="フローチャート : 結合子 73"/>
+          <p:cNvSpPr/>
+          <p:nvPr/>
+        </p:nvSpPr>
+        <p:spPr>
+          <a:xfrm>
+            <a:off x="2106586" y="2377155"/>
+            <a:ext cx="144021" cy="144020"/>
+          </a:xfrm>
+          <a:prstGeom prst="flowChartConnector">
+            <a:avLst/>
+          </a:prstGeom>
+          <a:solidFill>
+            <a:schemeClr val="bg1"/>
+          </a:solidFill>
+          <a:ln w="19050">
+            <a:solidFill>
+              <a:schemeClr val="tx1"/>
+            </a:solidFill>
+          </a:ln>
+        </p:spPr>
+        <p:style>
+          <a:lnRef idx="2">
+            <a:schemeClr val="accent1">
+              <a:shade val="50000"/>
+            </a:schemeClr>
+          </a:lnRef>
+          <a:fillRef idx="1">
+            <a:schemeClr val="accent1"/>
+          </a:fillRef>
+          <a:effectRef idx="0">
+            <a:schemeClr val="accent1"/>
+          </a:effectRef>
+          <a:fontRef idx="minor">
+            <a:schemeClr val="lt1"/>
+          </a:fontRef>
+        </p:style>
+        <p:txBody>
+          <a:bodyPr lIns="91439" tIns="45720" rIns="91439" bIns="45720" rtlCol="0" anchor="ctr"/>
+          <a:lstStyle/>
+          <a:p>
+            <a:pPr algn="ctr"/>
+            <a:endParaRPr lang="ja-JP" altLang="en-US" sz="1000"/>
+          </a:p>
+        </p:txBody>
+      </p:sp>
+      <p:grpSp>
+        <p:nvGrpSpPr>
+          <p:cNvPr id="75" name="グループ化 74"/>
+          <p:cNvGrpSpPr/>
+          <p:nvPr/>
+        </p:nvGrpSpPr>
+        <p:grpSpPr>
+          <a:xfrm>
+            <a:off x="2106586" y="2915893"/>
+            <a:ext cx="144017" cy="144016"/>
+            <a:chOff x="4067944" y="4720186"/>
+            <a:chExt cx="288032" cy="288032"/>
+          </a:xfrm>
+          <a:solidFill>
+            <a:schemeClr val="bg1"/>
+          </a:solidFill>
+        </p:grpSpPr>
+        <p:sp>
+          <p:nvSpPr>
+            <p:cNvPr id="76" name="フローチャート : 結合子 75"/>
+            <p:cNvSpPr/>
+            <p:nvPr/>
+          </p:nvSpPr>
+          <p:spPr>
+            <a:xfrm>
+              <a:off x="4067944" y="4720186"/>
+              <a:ext cx="288032" cy="288032"/>
+            </a:xfrm>
+            <a:prstGeom prst="flowChartConnector">
+              <a:avLst/>
+            </a:prstGeom>
+            <a:grpFill/>
+            <a:ln w="19050">
+              <a:solidFill>
+                <a:schemeClr val="tx1"/>
+              </a:solidFill>
+            </a:ln>
+          </p:spPr>
+          <p:style>
+            <a:lnRef idx="2">
+              <a:schemeClr val="accent1">
+                <a:shade val="50000"/>
+              </a:schemeClr>
+            </a:lnRef>
+            <a:fillRef idx="1">
+              <a:schemeClr val="accent1"/>
+            </a:fillRef>
+            <a:effectRef idx="0">
+              <a:schemeClr val="accent1"/>
+            </a:effectRef>
+            <a:fontRef idx="minor">
+              <a:schemeClr val="lt1"/>
+            </a:fontRef>
+          </p:style>
+          <p:txBody>
+            <a:bodyPr rtlCol="0" anchor="ctr"/>
+            <a:lstStyle/>
+            <a:p>
+              <a:pPr algn="ctr"/>
+              <a:endParaRPr lang="ja-JP" altLang="en-US" sz="1000"/>
+            </a:p>
+          </p:txBody>
+        </p:sp>
+        <p:cxnSp>
+          <p:nvCxnSpPr>
+            <p:cNvPr id="77" name="直線コネクタ 76"/>
+            <p:cNvCxnSpPr>
+              <a:stCxn id="76" idx="1"/>
+              <a:endCxn id="76" idx="5"/>
+            </p:cNvCxnSpPr>
+            <p:nvPr/>
+          </p:nvCxnSpPr>
+          <p:spPr>
+            <a:xfrm>
+              <a:off x="4110125" y="4762367"/>
+              <a:ext cx="203670" cy="203670"/>
+            </a:xfrm>
+            <a:prstGeom prst="line">
+              <a:avLst/>
+            </a:prstGeom>
+            <a:grpFill/>
+            <a:ln w="19050">
+              <a:solidFill>
+                <a:schemeClr val="tx1"/>
+              </a:solidFill>
+            </a:ln>
+          </p:spPr>
+          <p:style>
+            <a:lnRef idx="1">
+              <a:schemeClr val="accent1"/>
+            </a:lnRef>
+            <a:fillRef idx="0">
+              <a:schemeClr val="accent1"/>
+            </a:fillRef>
+            <a:effectRef idx="0">
+              <a:schemeClr val="accent1"/>
+            </a:effectRef>
+            <a:fontRef idx="minor">
+              <a:schemeClr val="tx1"/>
+            </a:fontRef>
+          </p:style>
+        </p:cxnSp>
+        <p:cxnSp>
+          <p:nvCxnSpPr>
+            <p:cNvPr id="78" name="直線コネクタ 77"/>
+            <p:cNvCxnSpPr>
+              <a:stCxn id="76" idx="7"/>
+              <a:endCxn id="76" idx="3"/>
+            </p:cNvCxnSpPr>
+            <p:nvPr/>
+          </p:nvCxnSpPr>
+          <p:spPr>
+            <a:xfrm flipH="1">
+              <a:off x="4110125" y="4762367"/>
+              <a:ext cx="203670" cy="203670"/>
+            </a:xfrm>
+            <a:prstGeom prst="line">
+              <a:avLst/>
+            </a:prstGeom>
+            <a:grpFill/>
+            <a:ln w="19050">
+              <a:solidFill>
+                <a:schemeClr val="tx1"/>
+              </a:solidFill>
+            </a:ln>
+          </p:spPr>
+          <p:style>
+            <a:lnRef idx="1">
+              <a:schemeClr val="accent1"/>
+            </a:lnRef>
+            <a:fillRef idx="0">
+              <a:schemeClr val="accent1"/>
+            </a:fillRef>
+            <a:effectRef idx="0">
+              <a:schemeClr val="accent1"/>
+            </a:effectRef>
+            <a:fontRef idx="minor">
+              <a:schemeClr val="tx1"/>
+            </a:fontRef>
+          </p:style>
+        </p:cxnSp>
+      </p:grpSp>
+      <p:cxnSp>
+        <p:nvCxnSpPr>
+          <p:cNvPr id="80" name="直線矢印コネクタ 28"/>
+          <p:cNvCxnSpPr>
+            <a:stCxn id="37" idx="4"/>
+            <a:endCxn id="74" idx="0"/>
+          </p:cNvCxnSpPr>
+          <p:nvPr/>
+        </p:nvCxnSpPr>
+        <p:spPr>
+          <a:xfrm>
+            <a:off x="2178595" y="2174706"/>
+            <a:ext cx="2" cy="202449"/>
+          </a:xfrm>
+          <a:prstGeom prst="straightConnector1">
+            <a:avLst/>
+          </a:prstGeom>
+          <a:ln w="19050">
+            <a:solidFill>
+              <a:schemeClr val="tx1"/>
+            </a:solidFill>
+            <a:tailEnd type="arrow"/>
+          </a:ln>
+        </p:spPr>
+        <p:style>
+          <a:lnRef idx="1">
+            <a:schemeClr val="accent1"/>
+          </a:lnRef>
+          <a:fillRef idx="0">
+            <a:schemeClr val="accent1"/>
+          </a:fillRef>
+          <a:effectRef idx="0">
+            <a:schemeClr val="accent1"/>
+          </a:effectRef>
+          <a:fontRef idx="minor">
+            <a:schemeClr val="tx1"/>
+          </a:fontRef>
+        </p:style>
+      </p:cxnSp>
+      <p:sp>
+        <p:nvSpPr>
+          <p:cNvPr id="81" name="正方形/長方形 80"/>
+          <p:cNvSpPr/>
+          <p:nvPr/>
+        </p:nvSpPr>
+        <p:spPr>
+          <a:xfrm>
+            <a:off x="2184873" y="2088257"/>
+            <a:ext cx="1919930" cy="400110"/>
+          </a:xfrm>
+          <a:prstGeom prst="rect">
+            <a:avLst/>
+          </a:prstGeom>
+        </p:spPr>
+        <p:txBody>
+          <a:bodyPr wrap="square" lIns="91439" tIns="45720" rIns="91439" bIns="45720">
+            <a:spAutoFit/>
+          </a:bodyPr>
+          <a:lstStyle/>
+          <a:p>
+            <a:r>
+              <a:rPr lang="en-US" altLang="ja-JP" sz="1000" dirty="0" smtClean="0"/>
+              <a:t>Completed(result</a:t>
+            </a:r>
+            <a:r>
+              <a:rPr lang="en-US" altLang="ja-JP" sz="1000" dirty="0" smtClean="0"/>
+              <a:t>)[result == OK]</a:t>
+            </a:r>
+          </a:p>
+          <a:p>
+            <a:r>
+              <a:rPr lang="en-US" altLang="ja-JP" sz="1000" dirty="0" smtClean="0"/>
+              <a:t>/ “Left hand please”</a:t>
+            </a:r>
+            <a:endParaRPr lang="ja-JP" altLang="en-US" sz="1000" dirty="0"/>
+          </a:p>
+        </p:txBody>
+      </p:sp>
+      <p:sp>
+        <p:nvSpPr>
+          <p:cNvPr id="82" name="正方形/長方形 81"/>
+          <p:cNvSpPr/>
+          <p:nvPr/>
+        </p:nvSpPr>
+        <p:spPr>
+          <a:xfrm>
+            <a:off x="1662399" y="799742"/>
+            <a:ext cx="2730436" cy="246221"/>
+          </a:xfrm>
+          <a:prstGeom prst="rect">
+            <a:avLst/>
+          </a:prstGeom>
+        </p:spPr>
+        <p:txBody>
+          <a:bodyPr wrap="square" lIns="91439" tIns="45720" rIns="91439" bIns="45720">
+            <a:spAutoFit/>
+          </a:bodyPr>
+          <a:lstStyle/>
+          <a:p>
+            <a:r>
+              <a:rPr lang="en-US" altLang="ja-JP" sz="1000" dirty="0" smtClean="0"/>
+              <a:t>entry / “Press Start Button”</a:t>
+            </a:r>
+            <a:endParaRPr lang="ja-JP" altLang="en-US" sz="1000" dirty="0"/>
+          </a:p>
+        </p:txBody>
+      </p:sp>
+      <p:cxnSp>
+        <p:nvCxnSpPr>
+          <p:cNvPr id="83" name="直線矢印コネクタ 28"/>
+          <p:cNvCxnSpPr>
+            <a:stCxn id="76" idx="4"/>
+            <a:endCxn id="67" idx="3"/>
+          </p:cNvCxnSpPr>
+          <p:nvPr/>
+        </p:nvCxnSpPr>
+        <p:spPr>
+          <a:xfrm rot="5400000" flipH="1" flipV="1">
+            <a:off x="1650359" y="1343292"/>
+            <a:ext cx="2244852" cy="1188381"/>
+          </a:xfrm>
+          <a:prstGeom prst="bentConnector4">
+            <a:avLst>
+              <a:gd name="adj1" fmla="val -16972"/>
+              <a:gd name="adj2" fmla="val 162197"/>
+            </a:avLst>
+          </a:prstGeom>
+          <a:ln w="19050">
+            <a:solidFill>
+              <a:schemeClr val="tx1"/>
+            </a:solidFill>
+            <a:tailEnd type="arrow"/>
+          </a:ln>
+        </p:spPr>
+        <p:style>
+          <a:lnRef idx="1">
+            <a:schemeClr val="accent1"/>
+          </a:lnRef>
+          <a:fillRef idx="0">
+            <a:schemeClr val="accent1"/>
+          </a:fillRef>
+          <a:effectRef idx="0">
+            <a:schemeClr val="accent1"/>
+          </a:effectRef>
+          <a:fontRef idx="minor">
+            <a:schemeClr val="tx1"/>
+          </a:fontRef>
+        </p:style>
+      </p:cxnSp>
+      <p:sp>
+        <p:nvSpPr>
+          <p:cNvPr id="84" name="正方形/長方形 83"/>
+          <p:cNvSpPr/>
+          <p:nvPr/>
+        </p:nvSpPr>
+        <p:spPr>
+          <a:xfrm>
+            <a:off x="2166455" y="3038819"/>
+            <a:ext cx="1848593" cy="400110"/>
+          </a:xfrm>
+          <a:prstGeom prst="rect">
+            <a:avLst/>
+          </a:prstGeom>
+        </p:spPr>
+        <p:txBody>
+          <a:bodyPr wrap="square" lIns="91439" tIns="45720" rIns="91439" bIns="45720">
+            <a:spAutoFit/>
+          </a:bodyPr>
+          <a:lstStyle/>
+          <a:p>
+            <a:r>
+              <a:rPr lang="en-US" altLang="ja-JP" sz="1000" dirty="0" smtClean="0"/>
+              <a:t>Completed(result</a:t>
+            </a:r>
+            <a:r>
+              <a:rPr lang="en-US" altLang="ja-JP" sz="1000" dirty="0"/>
+              <a:t>)[result == OK]</a:t>
+            </a:r>
+          </a:p>
+          <a:p>
+            <a:r>
+              <a:rPr lang="en-US" altLang="ja-JP" sz="1000" dirty="0" smtClean="0"/>
+              <a:t>/ “Register Completed”</a:t>
+            </a:r>
+            <a:endParaRPr lang="ja-JP" altLang="en-US" sz="1000" dirty="0"/>
+          </a:p>
+        </p:txBody>
+      </p:sp>
+      <p:sp>
+        <p:nvSpPr>
+          <p:cNvPr id="92" name="正方形/長方形 91"/>
+          <p:cNvSpPr/>
+          <p:nvPr/>
+        </p:nvSpPr>
+        <p:spPr>
+          <a:xfrm>
+            <a:off x="1674949" y="2232273"/>
+            <a:ext cx="670395" cy="246221"/>
+          </a:xfrm>
+          <a:prstGeom prst="rect">
+            <a:avLst/>
+          </a:prstGeom>
+        </p:spPr>
+        <p:txBody>
+          <a:bodyPr wrap="square" lIns="91439" tIns="45720" rIns="91439" bIns="45720">
+            <a:spAutoFit/>
+          </a:bodyPr>
+          <a:lstStyle/>
+          <a:p>
+            <a:r>
+              <a:rPr lang="en-US" altLang="ja-JP" sz="1000" dirty="0" smtClean="0"/>
+              <a:t>Entry1</a:t>
+            </a:r>
+            <a:endParaRPr lang="ja-JP" altLang="en-US" sz="1000" dirty="0"/>
+          </a:p>
+        </p:txBody>
+      </p:sp>
+      <p:sp>
+        <p:nvSpPr>
+          <p:cNvPr id="93" name="正方形/長方形 92"/>
+          <p:cNvSpPr/>
+          <p:nvPr/>
+        </p:nvSpPr>
+        <p:spPr>
+          <a:xfrm>
+            <a:off x="1733437" y="2922156"/>
+            <a:ext cx="468213" cy="246221"/>
+          </a:xfrm>
+          <a:prstGeom prst="rect">
+            <a:avLst/>
+          </a:prstGeom>
+        </p:spPr>
+        <p:txBody>
+          <a:bodyPr wrap="square" lIns="91439" tIns="45720" rIns="91439" bIns="45720">
+            <a:spAutoFit/>
+          </a:bodyPr>
+          <a:lstStyle/>
+          <a:p>
+            <a:r>
+              <a:rPr lang="en-US" altLang="ja-JP" sz="1000" dirty="0" smtClean="0"/>
+              <a:t>Exit1</a:t>
+            </a:r>
+            <a:endParaRPr lang="ja-JP" altLang="en-US" sz="1000" dirty="0"/>
+          </a:p>
+        </p:txBody>
+      </p:sp>
+      <p:sp>
+        <p:nvSpPr>
+          <p:cNvPr id="94" name="正方形/長方形 93"/>
+          <p:cNvSpPr/>
+          <p:nvPr/>
+        </p:nvSpPr>
+        <p:spPr>
+          <a:xfrm>
+            <a:off x="428577" y="2959570"/>
+            <a:ext cx="1259892" cy="553998"/>
+          </a:xfrm>
+          <a:prstGeom prst="rect">
+            <a:avLst/>
+          </a:prstGeom>
+        </p:spPr>
+        <p:txBody>
+          <a:bodyPr wrap="square" lIns="91439" tIns="45720" rIns="91439" bIns="45720">
+            <a:spAutoFit/>
+          </a:bodyPr>
+          <a:lstStyle/>
+          <a:p>
+            <a:r>
+              <a:rPr lang="en-US" altLang="ja-JP" sz="1000" dirty="0" smtClean="0"/>
+              <a:t>completed(result)</a:t>
+            </a:r>
+          </a:p>
+          <a:p>
+            <a:r>
+              <a:rPr lang="en-US" altLang="ja-JP" sz="1000" dirty="0" smtClean="0"/>
+              <a:t>[</a:t>
+            </a:r>
+            <a:r>
+              <a:rPr lang="en-US" altLang="ja-JP" sz="1000" dirty="0"/>
+              <a:t>result == </a:t>
+            </a:r>
+            <a:r>
+              <a:rPr lang="en-US" altLang="ja-JP" sz="1000" dirty="0" smtClean="0"/>
+              <a:t>NG]</a:t>
+            </a:r>
+            <a:endParaRPr lang="en-US" altLang="ja-JP" sz="1000" dirty="0"/>
+          </a:p>
+          <a:p>
+            <a:r>
+              <a:rPr lang="en-US" altLang="ja-JP" sz="1000" dirty="0" smtClean="0"/>
+              <a:t>/ “Register Failed”</a:t>
+            </a:r>
+            <a:endParaRPr lang="ja-JP" altLang="en-US" sz="1000" dirty="0"/>
+          </a:p>
+        </p:txBody>
+      </p:sp>
+      <p:sp>
+        <p:nvSpPr>
+          <p:cNvPr id="95" name="正方形/長方形 94"/>
+          <p:cNvSpPr/>
+          <p:nvPr/>
+        </p:nvSpPr>
+        <p:spPr>
+          <a:xfrm>
+            <a:off x="432395" y="1656209"/>
+            <a:ext cx="1259892" cy="553998"/>
+          </a:xfrm>
+          <a:prstGeom prst="rect">
+            <a:avLst/>
+          </a:prstGeom>
+        </p:spPr>
+        <p:txBody>
+          <a:bodyPr wrap="square" lIns="91439" tIns="45720" rIns="91439" bIns="45720">
+            <a:spAutoFit/>
+          </a:bodyPr>
+          <a:lstStyle/>
+          <a:p>
+            <a:r>
+              <a:rPr lang="en-US" altLang="ja-JP" sz="1000" dirty="0" smtClean="0"/>
+              <a:t>completed(result)</a:t>
+            </a:r>
+          </a:p>
+          <a:p>
+            <a:r>
+              <a:rPr lang="en-US" altLang="ja-JP" sz="1000" dirty="0" smtClean="0"/>
+              <a:t>[</a:t>
+            </a:r>
+            <a:r>
+              <a:rPr lang="en-US" altLang="ja-JP" sz="1000" dirty="0"/>
+              <a:t>result == </a:t>
+            </a:r>
+            <a:r>
+              <a:rPr lang="en-US" altLang="ja-JP" sz="1000" dirty="0" smtClean="0"/>
+              <a:t>NG]</a:t>
+            </a:r>
+            <a:endParaRPr lang="en-US" altLang="ja-JP" sz="1000" dirty="0"/>
+          </a:p>
+          <a:p>
+            <a:r>
+              <a:rPr lang="en-US" altLang="ja-JP" sz="1000" dirty="0" smtClean="0"/>
+              <a:t>/ “Register Failed”</a:t>
+            </a:r>
+            <a:endParaRPr lang="ja-JP" altLang="en-US" sz="1000" dirty="0"/>
+          </a:p>
+        </p:txBody>
+      </p:sp>
+      <p:sp>
+        <p:nvSpPr>
+          <p:cNvPr id="7" name="フリーフォーム 6"/>
+          <p:cNvSpPr/>
+          <p:nvPr/>
+        </p:nvSpPr>
+        <p:spPr>
+          <a:xfrm>
+            <a:off x="253694" y="1013460"/>
+            <a:ext cx="1895146" cy="2256764"/>
+          </a:xfrm>
+          <a:custGeom>
+            <a:avLst/>
+            <a:gdLst>
+              <a:gd name="connsiteX0" fmla="*/ 1895146 w 1895146"/>
+              <a:gd name="connsiteY0" fmla="*/ 2057400 h 2256764"/>
+              <a:gd name="connsiteX1" fmla="*/ 1559866 w 1895146"/>
+              <a:gd name="connsiteY1" fmla="*/ 2255520 h 2256764"/>
+              <a:gd name="connsiteX2" fmla="*/ 1216966 w 1895146"/>
+              <a:gd name="connsiteY2" fmla="*/ 1973580 h 2256764"/>
+              <a:gd name="connsiteX3" fmla="*/ 233986 w 1895146"/>
+              <a:gd name="connsiteY3" fmla="*/ 1988820 h 2256764"/>
+              <a:gd name="connsiteX4" fmla="*/ 20626 w 1895146"/>
+              <a:gd name="connsiteY4" fmla="*/ 1371600 h 2256764"/>
+              <a:gd name="connsiteX5" fmla="*/ 165406 w 1895146"/>
+              <a:gd name="connsiteY5" fmla="*/ 411480 h 2256764"/>
+              <a:gd name="connsiteX6" fmla="*/ 1407466 w 1895146"/>
+              <a:gd name="connsiteY6" fmla="*/ 0 h 2256764"/>
+            </a:gdLst>
+            <a:ahLst/>
+            <a:cxnLst>
+              <a:cxn ang="0">
+                <a:pos x="connsiteX0" y="connsiteY0"/>
+              </a:cxn>
+              <a:cxn ang="0">
+                <a:pos x="connsiteX1" y="connsiteY1"/>
+              </a:cxn>
+              <a:cxn ang="0">
+                <a:pos x="connsiteX2" y="connsiteY2"/>
+              </a:cxn>
+              <a:cxn ang="0">
+                <a:pos x="connsiteX3" y="connsiteY3"/>
+              </a:cxn>
+              <a:cxn ang="0">
+                <a:pos x="connsiteX4" y="connsiteY4"/>
+              </a:cxn>
+              <a:cxn ang="0">
+                <a:pos x="connsiteX5" y="connsiteY5"/>
+              </a:cxn>
+              <a:cxn ang="0">
+                <a:pos x="connsiteX6" y="connsiteY6"/>
+              </a:cxn>
+            </a:cxnLst>
+            <a:rect l="l" t="t" r="r" b="b"/>
+            <a:pathLst>
+              <a:path w="1895146" h="2256764">
+                <a:moveTo>
+                  <a:pt x="1895146" y="2057400"/>
+                </a:moveTo>
+                <a:cubicBezTo>
+                  <a:pt x="1784021" y="2163445"/>
+                  <a:pt x="1672896" y="2269490"/>
+                  <a:pt x="1559866" y="2255520"/>
+                </a:cubicBezTo>
+                <a:cubicBezTo>
+                  <a:pt x="1446836" y="2241550"/>
+                  <a:pt x="1437946" y="2018030"/>
+                  <a:pt x="1216966" y="1973580"/>
+                </a:cubicBezTo>
+                <a:cubicBezTo>
+                  <a:pt x="995986" y="1929130"/>
+                  <a:pt x="433376" y="2089150"/>
+                  <a:pt x="233986" y="1988820"/>
+                </a:cubicBezTo>
+                <a:cubicBezTo>
+                  <a:pt x="34596" y="1888490"/>
+                  <a:pt x="32056" y="1634490"/>
+                  <a:pt x="20626" y="1371600"/>
+                </a:cubicBezTo>
+                <a:cubicBezTo>
+                  <a:pt x="9196" y="1108710"/>
+                  <a:pt x="-65734" y="640080"/>
+                  <a:pt x="165406" y="411480"/>
+                </a:cubicBezTo>
+                <a:cubicBezTo>
+                  <a:pt x="396546" y="182880"/>
+                  <a:pt x="902006" y="91440"/>
+                  <a:pt x="1407466" y="0"/>
+                </a:cubicBezTo>
+              </a:path>
+            </a:pathLst>
+          </a:custGeom>
+          <a:noFill/>
+          <a:ln w="12700">
+            <a:solidFill>
+              <a:schemeClr val="tx1"/>
+            </a:solidFill>
+            <a:headEnd type="none" w="med" len="med"/>
+            <a:tailEnd type="arrow" w="med" len="med"/>
+          </a:ln>
+        </p:spPr>
+        <p:style>
+          <a:lnRef idx="2">
+            <a:schemeClr val="accent1">
+              <a:shade val="50000"/>
+            </a:schemeClr>
+          </a:lnRef>
+          <a:fillRef idx="1">
+            <a:schemeClr val="accent1"/>
+          </a:fillRef>
+          <a:effectRef idx="0">
+            <a:schemeClr val="accent1"/>
+          </a:effectRef>
+          <a:fontRef idx="minor">
+            <a:schemeClr val="lt1"/>
+          </a:fontRef>
+        </p:style>
+        <p:txBody>
+          <a:bodyPr rtlCol="0" anchor="ctr"/>
+          <a:lstStyle/>
+          <a:p>
+            <a:pPr algn="ctr"/>
+            <a:endParaRPr kumimoji="1" lang="ja-JP" altLang="en-US"/>
+          </a:p>
+        </p:txBody>
+      </p:sp>
+      <p:sp>
+        <p:nvSpPr>
+          <p:cNvPr id="8" name="フリーフォーム 7"/>
+          <p:cNvSpPr/>
+          <p:nvPr/>
+        </p:nvSpPr>
+        <p:spPr>
+          <a:xfrm>
+            <a:off x="1503490" y="1082040"/>
+            <a:ext cx="637730" cy="1204230"/>
+          </a:xfrm>
+          <a:custGeom>
+            <a:avLst/>
+            <a:gdLst>
+              <a:gd name="connsiteX0" fmla="*/ 637730 w 637730"/>
+              <a:gd name="connsiteY0" fmla="*/ 1089660 h 1204230"/>
+              <a:gd name="connsiteX1" fmla="*/ 515810 w 637730"/>
+              <a:gd name="connsiteY1" fmla="*/ 1196340 h 1204230"/>
+              <a:gd name="connsiteX2" fmla="*/ 89090 w 637730"/>
+              <a:gd name="connsiteY2" fmla="*/ 1127760 h 1204230"/>
+              <a:gd name="connsiteX3" fmla="*/ 12890 w 637730"/>
+              <a:gd name="connsiteY3" fmla="*/ 586740 h 1204230"/>
+              <a:gd name="connsiteX4" fmla="*/ 271970 w 637730"/>
+              <a:gd name="connsiteY4" fmla="*/ 0 h 1204230"/>
+            </a:gdLst>
+            <a:ahLst/>
+            <a:cxnLst>
+              <a:cxn ang="0">
+                <a:pos x="connsiteX0" y="connsiteY0"/>
+              </a:cxn>
+              <a:cxn ang="0">
+                <a:pos x="connsiteX1" y="connsiteY1"/>
+              </a:cxn>
+              <a:cxn ang="0">
+                <a:pos x="connsiteX2" y="connsiteY2"/>
+              </a:cxn>
+              <a:cxn ang="0">
+                <a:pos x="connsiteX3" y="connsiteY3"/>
+              </a:cxn>
+              <a:cxn ang="0">
+                <a:pos x="connsiteX4" y="connsiteY4"/>
+              </a:cxn>
+            </a:cxnLst>
+            <a:rect l="l" t="t" r="r" b="b"/>
+            <a:pathLst>
+              <a:path w="637730" h="1204230">
+                <a:moveTo>
+                  <a:pt x="637730" y="1089660"/>
+                </a:moveTo>
+                <a:cubicBezTo>
+                  <a:pt x="622490" y="1139825"/>
+                  <a:pt x="607250" y="1189990"/>
+                  <a:pt x="515810" y="1196340"/>
+                </a:cubicBezTo>
+                <a:cubicBezTo>
+                  <a:pt x="424370" y="1202690"/>
+                  <a:pt x="172910" y="1229360"/>
+                  <a:pt x="89090" y="1127760"/>
+                </a:cubicBezTo>
+                <a:cubicBezTo>
+                  <a:pt x="5270" y="1026160"/>
+                  <a:pt x="-17590" y="774700"/>
+                  <a:pt x="12890" y="586740"/>
+                </a:cubicBezTo>
+                <a:cubicBezTo>
+                  <a:pt x="43370" y="398780"/>
+                  <a:pt x="157670" y="199390"/>
+                  <a:pt x="271970" y="0"/>
+                </a:cubicBezTo>
+              </a:path>
+            </a:pathLst>
+          </a:custGeom>
+          <a:noFill/>
+          <a:ln w="12700">
+            <a:solidFill>
+              <a:schemeClr val="tx1"/>
+            </a:solidFill>
+            <a:headEnd type="none" w="med" len="med"/>
+            <a:tailEnd type="arrow" w="med" len="med"/>
+          </a:ln>
+        </p:spPr>
+        <p:style>
+          <a:lnRef idx="2">
+            <a:schemeClr val="accent1">
+              <a:shade val="50000"/>
+            </a:schemeClr>
+          </a:lnRef>
+          <a:fillRef idx="1">
+            <a:schemeClr val="accent1"/>
+          </a:fillRef>
+          <a:effectRef idx="0">
+            <a:schemeClr val="accent1"/>
+          </a:effectRef>
+          <a:fontRef idx="minor">
+            <a:schemeClr val="lt1"/>
+          </a:fontRef>
+        </p:style>
+        <p:txBody>
+          <a:bodyPr rtlCol="0" anchor="ctr"/>
+          <a:lstStyle/>
+          <a:p>
+            <a:pPr algn="ctr"/>
+            <a:endParaRPr kumimoji="1" lang="ja-JP" altLang="en-US"/>
+          </a:p>
+        </p:txBody>
+      </p:sp>
+    </p:spTree>
+    <p:extLst>
+      <p:ext uri="{BB962C8B-B14F-4D97-AF65-F5344CB8AC3E}">
+        <p14:creationId xmlns:p14="http://schemas.microsoft.com/office/powerpoint/2010/main" val="524531569"/>
+      </p:ext>
+    </p:extLst>
+  </p:cSld>
+  <p:clrMapOvr>
+    <a:masterClrMapping/>
+  </p:clrMapOvr>
+  <p:timing>
+    <p:tnLst>
+      <p:par>
+        <p:cTn id="1" dur="indefinite" restart="never" nodeType="tmRoot"/>
+      </p:par>
+    </p:tnLst>
+  </p:timing>
+</p:sld>
+</file>
+
+<file path=ppt/slides/slide18.xml><?xml version="1.0" encoding="utf-8"?>
+<p:sld xmlns:a="http://schemas.openxmlformats.org/drawingml/2006/main" xmlns:r="http://schemas.openxmlformats.org/officeDocument/2006/relationships" xmlns:p="http://schemas.openxmlformats.org/presentationml/2006/main">
+  <p:cSld>
+    <p:spTree>
+      <p:nvGrpSpPr>
+        <p:cNvPr id="1" name=""/>
+        <p:cNvGrpSpPr/>
+        <p:nvPr/>
+      </p:nvGrpSpPr>
+      <p:grpSpPr>
+        <a:xfrm>
+          <a:off x="0" y="0"/>
+          <a:ext cx="0" cy="0"/>
+          <a:chOff x="0" y="0"/>
+          <a:chExt cx="0" cy="0"/>
+        </a:xfrm>
+      </p:grpSpPr>
       <p:cxnSp>
         <p:nvCxnSpPr>
           <p:cNvPr id="48" name="直線矢印コネクタ 28"/>
@@ -14448,7 +15544,7 @@
         </p:nvCxnSpPr>
         <p:spPr>
           <a:xfrm flipH="1">
-            <a:off x="1530877" y="4624465"/>
+            <a:off x="1493765" y="634656"/>
             <a:ext cx="301" cy="239453"/>
           </a:xfrm>
           <a:prstGeom prst="straightConnector1">
@@ -14484,8 +15580,8 @@
         </p:nvSpPr>
         <p:spPr>
           <a:xfrm>
-            <a:off x="541515" y="4217286"/>
-            <a:ext cx="2447003" cy="1471073"/>
+            <a:off x="504403" y="227477"/>
+            <a:ext cx="3324941" cy="1471073"/>
           </a:xfrm>
           <a:prstGeom prst="rect">
             <a:avLst/>
@@ -14530,7 +15626,7 @@
         </p:nvSpPr>
         <p:spPr>
           <a:xfrm flipV="1">
-            <a:off x="541515" y="4225278"/>
+            <a:off x="504403" y="235469"/>
             <a:ext cx="866782" cy="305136"/>
           </a:xfrm>
           <a:prstGeom prst="snip1Rect">
@@ -14578,7 +15674,7 @@
         </p:nvSpPr>
         <p:spPr>
           <a:xfrm>
-            <a:off x="541516" y="4205858"/>
+            <a:off x="504404" y="216049"/>
             <a:ext cx="866781" cy="246221"/>
           </a:xfrm>
           <a:prstGeom prst="rect">
@@ -14607,7 +15703,7 @@
         </p:nvSpPr>
         <p:spPr>
           <a:xfrm>
-            <a:off x="1459167" y="4480445"/>
+            <a:off x="1422055" y="490636"/>
             <a:ext cx="144021" cy="144020"/>
           </a:xfrm>
           <a:prstGeom prst="flowChartConnector">
@@ -14658,7 +15754,7 @@
         </p:nvCxnSpPr>
         <p:spPr>
           <a:xfrm>
-            <a:off x="613525" y="5133286"/>
+            <a:off x="576413" y="1143477"/>
             <a:ext cx="383611" cy="0"/>
           </a:xfrm>
           <a:prstGeom prst="straightConnector1">
@@ -14694,7 +15790,7 @@
         </p:nvSpPr>
         <p:spPr>
           <a:xfrm>
-            <a:off x="469504" y="5061276"/>
+            <a:off x="432392" y="1071467"/>
             <a:ext cx="144021" cy="144020"/>
           </a:xfrm>
           <a:prstGeom prst="flowChartConnector">
@@ -14742,7 +15838,7 @@
         </p:nvGrpSpPr>
         <p:grpSpPr>
           <a:xfrm>
-            <a:off x="2916509" y="5061280"/>
+            <a:off x="3760915" y="1071471"/>
             <a:ext cx="144017" cy="144016"/>
             <a:chOff x="4067944" y="4720186"/>
             <a:chExt cx="288032" cy="288032"/>
@@ -14884,7 +15980,7 @@
         </p:nvSpPr>
         <p:spPr>
           <a:xfrm>
-            <a:off x="37459" y="5133286"/>
+            <a:off x="347" y="1143477"/>
             <a:ext cx="670395" cy="246221"/>
           </a:xfrm>
           <a:prstGeom prst="rect">
@@ -14913,8 +16009,8 @@
         </p:nvSpPr>
         <p:spPr>
           <a:xfrm>
-            <a:off x="2988518" y="5133288"/>
-            <a:ext cx="788508" cy="246221"/>
+            <a:off x="3832924" y="1143479"/>
+            <a:ext cx="488251" cy="246221"/>
           </a:xfrm>
           <a:prstGeom prst="rect">
             <a:avLst/>
@@ -14927,8 +16023,8 @@
           <a:lstStyle/>
           <a:p>
             <a:r>
-              <a:rPr lang="en-US" altLang="ja-JP" sz="1000" dirty="0" err="1" smtClean="0"/>
-              <a:t>ExitSuccess</a:t>
+              <a:rPr lang="en-US" altLang="ja-JP" sz="1000" dirty="0" smtClean="0"/>
+              <a:t>Exit1</a:t>
             </a:r>
             <a:endParaRPr lang="ja-JP" altLang="en-US" sz="1000" dirty="0"/>
           </a:p>
@@ -14942,7 +16038,7 @@
         </p:nvSpPr>
         <p:spPr>
           <a:xfrm>
-            <a:off x="997136" y="4863918"/>
+            <a:off x="960024" y="874109"/>
             <a:ext cx="1067481" cy="538736"/>
           </a:xfrm>
           <a:prstGeom prst="roundRect">
@@ -15000,7 +16096,7 @@
         </p:nvCxnSpPr>
         <p:spPr>
           <a:xfrm>
-            <a:off x="1001897" y="5117971"/>
+            <a:off x="964785" y="1128162"/>
             <a:ext cx="1058562" cy="0"/>
           </a:xfrm>
           <a:prstGeom prst="line">
@@ -15038,8 +16134,8 @@
         </p:nvCxnSpPr>
         <p:spPr>
           <a:xfrm>
-            <a:off x="2064617" y="5133286"/>
-            <a:ext cx="851892" cy="2"/>
+            <a:off x="2027505" y="1143477"/>
+            <a:ext cx="1733410" cy="2"/>
           </a:xfrm>
           <a:prstGeom prst="straightConnector1">
             <a:avLst/>
@@ -15074,8 +16170,8 @@
         </p:nvSpPr>
         <p:spPr>
           <a:xfrm>
-            <a:off x="2060459" y="4866074"/>
-            <a:ext cx="1427957" cy="246221"/>
+            <a:off x="2055628" y="728052"/>
+            <a:ext cx="1828214" cy="400110"/>
           </a:xfrm>
           <a:prstGeom prst="rect">
             <a:avLst/>
@@ -15089,1844 +16185,27 @@
           <a:p>
             <a:r>
               <a:rPr lang="en-US" altLang="ja-JP" sz="1000" dirty="0" err="1" smtClean="0"/>
-              <a:t>ScanSuccess</a:t>
-            </a:r>
-            <a:endParaRPr lang="ja-JP" altLang="en-US" sz="1000" dirty="0"/>
-          </a:p>
-        </p:txBody>
-      </p:sp>
-      <p:sp>
-        <p:nvSpPr>
-          <p:cNvPr id="67" name="角丸四角形 66"/>
-          <p:cNvSpPr/>
-          <p:nvPr/>
-        </p:nvSpPr>
-        <p:spPr>
-          <a:xfrm>
-            <a:off x="1651133" y="545689"/>
-            <a:ext cx="1715843" cy="538736"/>
-          </a:xfrm>
-          <a:prstGeom prst="roundRect">
-            <a:avLst/>
-          </a:prstGeom>
-          <a:noFill/>
-          <a:ln w="19050">
-            <a:solidFill>
-              <a:schemeClr val="tx1"/>
-            </a:solidFill>
-          </a:ln>
-        </p:spPr>
-        <p:style>
-          <a:lnRef idx="2">
-            <a:schemeClr val="accent1">
-              <a:shade val="50000"/>
-            </a:schemeClr>
-          </a:lnRef>
-          <a:fillRef idx="1">
-            <a:schemeClr val="accent1"/>
-          </a:fillRef>
-          <a:effectRef idx="0">
-            <a:schemeClr val="accent1"/>
-          </a:effectRef>
-          <a:fontRef idx="minor">
-            <a:schemeClr val="lt1"/>
-          </a:fontRef>
-        </p:style>
-        <p:txBody>
-          <a:bodyPr lIns="91439" tIns="45720" rIns="91439" bIns="45720" rtlCol="0" anchor="t" anchorCtr="0"/>
-          <a:lstStyle/>
-          <a:p>
-            <a:pPr algn="ctr"/>
-            <a:r>
-              <a:rPr lang="en-US" altLang="ja-JP" sz="1000" dirty="0" smtClean="0">
-                <a:solidFill>
-                  <a:schemeClr val="tx1"/>
-                </a:solidFill>
-              </a:rPr>
-              <a:t>Waiting</a:t>
-            </a:r>
-            <a:endParaRPr lang="ja-JP" altLang="en-US" sz="1000" dirty="0">
-              <a:solidFill>
-                <a:schemeClr val="tx1"/>
-              </a:solidFill>
-            </a:endParaRPr>
-          </a:p>
-        </p:txBody>
-      </p:sp>
-      <p:cxnSp>
-        <p:nvCxnSpPr>
-          <p:cNvPr id="68" name="直線コネクタ 67"/>
-          <p:cNvCxnSpPr>
-            <a:stCxn id="67" idx="1"/>
-            <a:endCxn id="67" idx="3"/>
-          </p:cNvCxnSpPr>
-          <p:nvPr/>
-        </p:nvCxnSpPr>
-        <p:spPr>
-          <a:xfrm>
-            <a:off x="1651133" y="815057"/>
-            <a:ext cx="1715843" cy="0"/>
-          </a:xfrm>
-          <a:prstGeom prst="line">
-            <a:avLst/>
-          </a:prstGeom>
-          <a:ln w="12700">
-            <a:solidFill>
-              <a:schemeClr val="tx1"/>
-            </a:solidFill>
-          </a:ln>
-        </p:spPr>
-        <p:style>
-          <a:lnRef idx="1">
-            <a:schemeClr val="accent1"/>
-          </a:lnRef>
-          <a:fillRef idx="0">
-            <a:schemeClr val="accent1"/>
-          </a:fillRef>
-          <a:effectRef idx="0">
-            <a:schemeClr val="accent1"/>
-          </a:effectRef>
-          <a:fontRef idx="minor">
-            <a:schemeClr val="tx1"/>
-          </a:fontRef>
-        </p:style>
-      </p:cxnSp>
-      <p:cxnSp>
-        <p:nvCxnSpPr>
-          <p:cNvPr id="69" name="直線矢印コネクタ 28"/>
-          <p:cNvCxnSpPr>
-            <a:endCxn id="35" idx="0"/>
-          </p:cNvCxnSpPr>
-          <p:nvPr/>
-        </p:nvCxnSpPr>
-        <p:spPr>
-          <a:xfrm>
-            <a:off x="2184873" y="1084425"/>
-            <a:ext cx="1223" cy="407527"/>
-          </a:xfrm>
-          <a:prstGeom prst="straightConnector1">
-            <a:avLst/>
-          </a:prstGeom>
-          <a:ln w="19050">
-            <a:solidFill>
-              <a:schemeClr val="tx1"/>
-            </a:solidFill>
-            <a:tailEnd type="arrow"/>
-          </a:ln>
-        </p:spPr>
-        <p:style>
-          <a:lnRef idx="1">
-            <a:schemeClr val="accent1"/>
-          </a:lnRef>
-          <a:fillRef idx="0">
-            <a:schemeClr val="accent1"/>
-          </a:fillRef>
-          <a:effectRef idx="0">
-            <a:schemeClr val="accent1"/>
-          </a:effectRef>
-          <a:fontRef idx="minor">
-            <a:schemeClr val="tx1"/>
-          </a:fontRef>
-        </p:style>
-      </p:cxnSp>
-      <p:sp>
-        <p:nvSpPr>
-          <p:cNvPr id="70" name="正方形/長方形 69"/>
-          <p:cNvSpPr/>
-          <p:nvPr/>
-        </p:nvSpPr>
-        <p:spPr>
-          <a:xfrm>
-            <a:off x="2184873" y="1080145"/>
-            <a:ext cx="1326119" cy="400110"/>
-          </a:xfrm>
-          <a:prstGeom prst="rect">
-            <a:avLst/>
-          </a:prstGeom>
-        </p:spPr>
-        <p:txBody>
-          <a:bodyPr wrap="square" lIns="91439" tIns="45720" rIns="91439" bIns="45720">
-            <a:spAutoFit/>
-          </a:bodyPr>
-          <a:lstStyle/>
-          <a:p>
+              <a:t>ScanSucceeded</a:t>
+            </a:r>
             <a:r>
               <a:rPr lang="en-US" altLang="ja-JP" sz="1000" dirty="0" smtClean="0"/>
-              <a:t>Start Button Pressed </a:t>
-            </a:r>
-            <a:endParaRPr lang="en-US" altLang="ja-JP" sz="1000" dirty="0" smtClean="0"/>
-          </a:p>
-          <a:p>
+              <a:t> </a:t>
+            </a:r>
             <a:r>
               <a:rPr lang="en-US" altLang="ja-JP" sz="1000" dirty="0" smtClean="0"/>
               <a:t>/ </a:t>
             </a:r>
             <a:r>
+              <a:rPr lang="en-US" altLang="ja-JP" sz="1000" dirty="0" err="1" smtClean="0"/>
+              <a:t>ConvertEvent:Completed</a:t>
+            </a:r>
+            <a:r>
               <a:rPr lang="en-US" altLang="ja-JP" sz="1000" dirty="0" smtClean="0"/>
-              <a:t>“Right hand please”</a:t>
-            </a:r>
-            <a:endParaRPr lang="ja-JP" altLang="en-US" sz="1000" dirty="0"/>
-          </a:p>
-        </p:txBody>
-      </p:sp>
-      <p:sp>
-        <p:nvSpPr>
-          <p:cNvPr id="71" name="正方形/長方形 70"/>
-          <p:cNvSpPr/>
-          <p:nvPr/>
-        </p:nvSpPr>
-        <p:spPr>
-          <a:xfrm>
-            <a:off x="1746957" y="2058234"/>
-            <a:ext cx="468213" cy="246221"/>
-          </a:xfrm>
-          <a:prstGeom prst="rect">
-            <a:avLst/>
-          </a:prstGeom>
-        </p:spPr>
-        <p:txBody>
-          <a:bodyPr wrap="square" lIns="91439" tIns="45720" rIns="91439" bIns="45720">
-            <a:spAutoFit/>
-          </a:bodyPr>
-          <a:lstStyle/>
-          <a:p>
+              <a:t>(OK</a:t>
+            </a:r>
             <a:r>
               <a:rPr lang="en-US" altLang="ja-JP" sz="1000" dirty="0" smtClean="0"/>
-              <a:t>Exit1</a:t>
-            </a:r>
-            <a:endParaRPr lang="ja-JP" altLang="en-US" sz="1000" dirty="0"/>
-          </a:p>
-        </p:txBody>
-      </p:sp>
-      <p:sp>
-        <p:nvSpPr>
-          <p:cNvPr id="72" name="角丸四角形 71"/>
-          <p:cNvSpPr/>
-          <p:nvPr/>
-        </p:nvSpPr>
-        <p:spPr>
-          <a:xfrm>
-            <a:off x="1631539" y="2449165"/>
-            <a:ext cx="1807445" cy="538736"/>
-          </a:xfrm>
-          <a:prstGeom prst="roundRect">
-            <a:avLst/>
-          </a:prstGeom>
-          <a:noFill/>
-          <a:ln w="19050">
-            <a:solidFill>
-              <a:schemeClr val="tx1"/>
-            </a:solidFill>
-          </a:ln>
-        </p:spPr>
-        <p:style>
-          <a:lnRef idx="2">
-            <a:schemeClr val="accent1">
-              <a:shade val="50000"/>
-            </a:schemeClr>
-          </a:lnRef>
-          <a:fillRef idx="1">
-            <a:schemeClr val="accent1"/>
-          </a:fillRef>
-          <a:effectRef idx="0">
-            <a:schemeClr val="accent1"/>
-          </a:effectRef>
-          <a:fontRef idx="minor">
-            <a:schemeClr val="lt1"/>
-          </a:fontRef>
-        </p:style>
-        <p:txBody>
-          <a:bodyPr lIns="91439" tIns="45720" rIns="91439" bIns="45720" rtlCol="0" anchor="t" anchorCtr="0"/>
-          <a:lstStyle/>
-          <a:p>
-            <a:pPr algn="ctr"/>
-            <a:r>
-              <a:rPr lang="en-US" altLang="ja-JP" sz="1000" dirty="0" err="1" smtClean="0">
-                <a:solidFill>
-                  <a:schemeClr val="tx1"/>
-                </a:solidFill>
-              </a:rPr>
-              <a:t>LeftScanning:ScanFinger</a:t>
-            </a:r>
-            <a:endParaRPr lang="ja-JP" altLang="en-US" sz="1000" dirty="0">
-              <a:solidFill>
-                <a:schemeClr val="tx1"/>
-              </a:solidFill>
-            </a:endParaRPr>
-          </a:p>
-        </p:txBody>
-      </p:sp>
-      <p:cxnSp>
-        <p:nvCxnSpPr>
-          <p:cNvPr id="73" name="直線コネクタ 72"/>
-          <p:cNvCxnSpPr/>
-          <p:nvPr/>
-        </p:nvCxnSpPr>
-        <p:spPr>
-          <a:xfrm>
-            <a:off x="1636300" y="2703218"/>
-            <a:ext cx="1804936" cy="0"/>
-          </a:xfrm>
-          <a:prstGeom prst="line">
-            <a:avLst/>
-          </a:prstGeom>
-          <a:ln w="12700">
-            <a:solidFill>
-              <a:schemeClr val="tx1"/>
-            </a:solidFill>
-          </a:ln>
-        </p:spPr>
-        <p:style>
-          <a:lnRef idx="1">
-            <a:schemeClr val="accent1"/>
-          </a:lnRef>
-          <a:fillRef idx="0">
-            <a:schemeClr val="accent1"/>
-          </a:fillRef>
-          <a:effectRef idx="0">
-            <a:schemeClr val="accent1"/>
-          </a:effectRef>
-          <a:fontRef idx="minor">
-            <a:schemeClr val="tx1"/>
-          </a:fontRef>
-        </p:style>
-      </p:cxnSp>
-      <p:sp>
-        <p:nvSpPr>
-          <p:cNvPr id="74" name="フローチャート : 結合子 73"/>
-          <p:cNvSpPr/>
-          <p:nvPr/>
-        </p:nvSpPr>
-        <p:spPr>
-          <a:xfrm>
-            <a:off x="2106586" y="2377155"/>
-            <a:ext cx="144021" cy="144020"/>
-          </a:xfrm>
-          <a:prstGeom prst="flowChartConnector">
-            <a:avLst/>
-          </a:prstGeom>
-          <a:solidFill>
-            <a:schemeClr val="bg1"/>
-          </a:solidFill>
-          <a:ln w="19050">
-            <a:solidFill>
-              <a:schemeClr val="tx1"/>
-            </a:solidFill>
-          </a:ln>
-        </p:spPr>
-        <p:style>
-          <a:lnRef idx="2">
-            <a:schemeClr val="accent1">
-              <a:shade val="50000"/>
-            </a:schemeClr>
-          </a:lnRef>
-          <a:fillRef idx="1">
-            <a:schemeClr val="accent1"/>
-          </a:fillRef>
-          <a:effectRef idx="0">
-            <a:schemeClr val="accent1"/>
-          </a:effectRef>
-          <a:fontRef idx="minor">
-            <a:schemeClr val="lt1"/>
-          </a:fontRef>
-        </p:style>
-        <p:txBody>
-          <a:bodyPr lIns="91439" tIns="45720" rIns="91439" bIns="45720" rtlCol="0" anchor="ctr"/>
-          <a:lstStyle/>
-          <a:p>
-            <a:pPr algn="ctr"/>
-            <a:endParaRPr lang="ja-JP" altLang="en-US" sz="1000"/>
-          </a:p>
-        </p:txBody>
-      </p:sp>
-      <p:grpSp>
-        <p:nvGrpSpPr>
-          <p:cNvPr id="75" name="グループ化 74"/>
-          <p:cNvGrpSpPr/>
-          <p:nvPr/>
-        </p:nvGrpSpPr>
-        <p:grpSpPr>
-          <a:xfrm>
-            <a:off x="2106586" y="2915893"/>
-            <a:ext cx="144017" cy="144016"/>
-            <a:chOff x="4067944" y="4720186"/>
-            <a:chExt cx="288032" cy="288032"/>
-          </a:xfrm>
-          <a:solidFill>
-            <a:schemeClr val="bg1"/>
-          </a:solidFill>
-        </p:grpSpPr>
-        <p:sp>
-          <p:nvSpPr>
-            <p:cNvPr id="76" name="フローチャート : 結合子 75"/>
-            <p:cNvSpPr/>
-            <p:nvPr/>
-          </p:nvSpPr>
-          <p:spPr>
-            <a:xfrm>
-              <a:off x="4067944" y="4720186"/>
-              <a:ext cx="288032" cy="288032"/>
-            </a:xfrm>
-            <a:prstGeom prst="flowChartConnector">
-              <a:avLst/>
-            </a:prstGeom>
-            <a:grpFill/>
-            <a:ln w="19050">
-              <a:solidFill>
-                <a:schemeClr val="tx1"/>
-              </a:solidFill>
-            </a:ln>
-          </p:spPr>
-          <p:style>
-            <a:lnRef idx="2">
-              <a:schemeClr val="accent1">
-                <a:shade val="50000"/>
-              </a:schemeClr>
-            </a:lnRef>
-            <a:fillRef idx="1">
-              <a:schemeClr val="accent1"/>
-            </a:fillRef>
-            <a:effectRef idx="0">
-              <a:schemeClr val="accent1"/>
-            </a:effectRef>
-            <a:fontRef idx="minor">
-              <a:schemeClr val="lt1"/>
-            </a:fontRef>
-          </p:style>
-          <p:txBody>
-            <a:bodyPr rtlCol="0" anchor="ctr"/>
-            <a:lstStyle/>
-            <a:p>
-              <a:pPr algn="ctr"/>
-              <a:endParaRPr lang="ja-JP" altLang="en-US" sz="1000"/>
-            </a:p>
-          </p:txBody>
-        </p:sp>
-        <p:cxnSp>
-          <p:nvCxnSpPr>
-            <p:cNvPr id="77" name="直線コネクタ 76"/>
-            <p:cNvCxnSpPr>
-              <a:stCxn id="76" idx="1"/>
-              <a:endCxn id="76" idx="5"/>
-            </p:cNvCxnSpPr>
-            <p:nvPr/>
-          </p:nvCxnSpPr>
-          <p:spPr>
-            <a:xfrm>
-              <a:off x="4110125" y="4762367"/>
-              <a:ext cx="203670" cy="203670"/>
-            </a:xfrm>
-            <a:prstGeom prst="line">
-              <a:avLst/>
-            </a:prstGeom>
-            <a:grpFill/>
-            <a:ln w="19050">
-              <a:solidFill>
-                <a:schemeClr val="tx1"/>
-              </a:solidFill>
-            </a:ln>
-          </p:spPr>
-          <p:style>
-            <a:lnRef idx="1">
-              <a:schemeClr val="accent1"/>
-            </a:lnRef>
-            <a:fillRef idx="0">
-              <a:schemeClr val="accent1"/>
-            </a:fillRef>
-            <a:effectRef idx="0">
-              <a:schemeClr val="accent1"/>
-            </a:effectRef>
-            <a:fontRef idx="minor">
-              <a:schemeClr val="tx1"/>
-            </a:fontRef>
-          </p:style>
-        </p:cxnSp>
-        <p:cxnSp>
-          <p:nvCxnSpPr>
-            <p:cNvPr id="78" name="直線コネクタ 77"/>
-            <p:cNvCxnSpPr>
-              <a:stCxn id="76" idx="7"/>
-              <a:endCxn id="76" idx="3"/>
-            </p:cNvCxnSpPr>
-            <p:nvPr/>
-          </p:nvCxnSpPr>
-          <p:spPr>
-            <a:xfrm flipH="1">
-              <a:off x="4110125" y="4762367"/>
-              <a:ext cx="203670" cy="203670"/>
-            </a:xfrm>
-            <a:prstGeom prst="line">
-              <a:avLst/>
-            </a:prstGeom>
-            <a:grpFill/>
-            <a:ln w="19050">
-              <a:solidFill>
-                <a:schemeClr val="tx1"/>
-              </a:solidFill>
-            </a:ln>
-          </p:spPr>
-          <p:style>
-            <a:lnRef idx="1">
-              <a:schemeClr val="accent1"/>
-            </a:lnRef>
-            <a:fillRef idx="0">
-              <a:schemeClr val="accent1"/>
-            </a:fillRef>
-            <a:effectRef idx="0">
-              <a:schemeClr val="accent1"/>
-            </a:effectRef>
-            <a:fontRef idx="minor">
-              <a:schemeClr val="tx1"/>
-            </a:fontRef>
-          </p:style>
-        </p:cxnSp>
-      </p:grpSp>
-      <p:cxnSp>
-        <p:nvCxnSpPr>
-          <p:cNvPr id="80" name="直線矢印コネクタ 28"/>
-          <p:cNvCxnSpPr>
-            <a:stCxn id="37" idx="4"/>
-            <a:endCxn id="74" idx="0"/>
-          </p:cNvCxnSpPr>
-          <p:nvPr/>
-        </p:nvCxnSpPr>
-        <p:spPr>
-          <a:xfrm>
-            <a:off x="2178595" y="2174706"/>
-            <a:ext cx="2" cy="202449"/>
-          </a:xfrm>
-          <a:prstGeom prst="straightConnector1">
-            <a:avLst/>
-          </a:prstGeom>
-          <a:ln w="19050">
-            <a:solidFill>
-              <a:schemeClr val="tx1"/>
-            </a:solidFill>
-            <a:tailEnd type="arrow"/>
-          </a:ln>
-        </p:spPr>
-        <p:style>
-          <a:lnRef idx="1">
-            <a:schemeClr val="accent1"/>
-          </a:lnRef>
-          <a:fillRef idx="0">
-            <a:schemeClr val="accent1"/>
-          </a:fillRef>
-          <a:effectRef idx="0">
-            <a:schemeClr val="accent1"/>
-          </a:effectRef>
-          <a:fontRef idx="minor">
-            <a:schemeClr val="tx1"/>
-          </a:fontRef>
-        </p:style>
-      </p:cxnSp>
-      <p:sp>
-        <p:nvSpPr>
-          <p:cNvPr id="81" name="正方形/長方形 80"/>
-          <p:cNvSpPr/>
-          <p:nvPr/>
-        </p:nvSpPr>
-        <p:spPr>
-          <a:xfrm>
-            <a:off x="2184873" y="2088257"/>
-            <a:ext cx="1830175" cy="400110"/>
-          </a:xfrm>
-          <a:prstGeom prst="rect">
-            <a:avLst/>
-          </a:prstGeom>
-        </p:spPr>
-        <p:txBody>
-          <a:bodyPr wrap="square" lIns="91439" tIns="45720" rIns="91439" bIns="45720">
-            <a:spAutoFit/>
-          </a:bodyPr>
-          <a:lstStyle/>
-          <a:p>
-            <a:r>
-              <a:rPr lang="en-US" altLang="ja-JP" sz="1000" dirty="0" smtClean="0"/>
-              <a:t>completed(result)[result == OK]</a:t>
-            </a:r>
-          </a:p>
-          <a:p>
-            <a:r>
-              <a:rPr lang="en-US" altLang="ja-JP" sz="1000" dirty="0" smtClean="0"/>
-              <a:t>/ </a:t>
-            </a:r>
-            <a:r>
-              <a:rPr lang="en-US" altLang="ja-JP" sz="1000" dirty="0" smtClean="0"/>
-              <a:t>“Left hand please”</a:t>
-            </a:r>
-            <a:endParaRPr lang="ja-JP" altLang="en-US" sz="1000" dirty="0"/>
-          </a:p>
-        </p:txBody>
-      </p:sp>
-      <p:sp>
-        <p:nvSpPr>
-          <p:cNvPr id="82" name="正方形/長方形 81"/>
-          <p:cNvSpPr/>
-          <p:nvPr/>
-        </p:nvSpPr>
-        <p:spPr>
-          <a:xfrm>
-            <a:off x="1662399" y="799742"/>
-            <a:ext cx="2730436" cy="246221"/>
-          </a:xfrm>
-          <a:prstGeom prst="rect">
-            <a:avLst/>
-          </a:prstGeom>
-        </p:spPr>
-        <p:txBody>
-          <a:bodyPr wrap="square" lIns="91439" tIns="45720" rIns="91439" bIns="45720">
-            <a:spAutoFit/>
-          </a:bodyPr>
-          <a:lstStyle/>
-          <a:p>
-            <a:r>
-              <a:rPr lang="en-US" altLang="ja-JP" sz="1000" dirty="0" smtClean="0"/>
-              <a:t>entry / “Press Start Button”</a:t>
-            </a:r>
-            <a:endParaRPr lang="ja-JP" altLang="en-US" sz="1000" dirty="0"/>
-          </a:p>
-        </p:txBody>
-      </p:sp>
-      <p:cxnSp>
-        <p:nvCxnSpPr>
-          <p:cNvPr id="83" name="直線矢印コネクタ 28"/>
-          <p:cNvCxnSpPr>
-            <a:stCxn id="76" idx="4"/>
-            <a:endCxn id="67" idx="3"/>
-          </p:cNvCxnSpPr>
-          <p:nvPr/>
-        </p:nvCxnSpPr>
-        <p:spPr>
-          <a:xfrm rot="5400000" flipH="1" flipV="1">
-            <a:off x="1650359" y="1343292"/>
-            <a:ext cx="2244852" cy="1188381"/>
-          </a:xfrm>
-          <a:prstGeom prst="bentConnector4">
-            <a:avLst>
-              <a:gd name="adj1" fmla="val -16972"/>
-              <a:gd name="adj2" fmla="val 162197"/>
-            </a:avLst>
-          </a:prstGeom>
-          <a:ln w="19050">
-            <a:solidFill>
-              <a:schemeClr val="tx1"/>
-            </a:solidFill>
-            <a:tailEnd type="arrow"/>
-          </a:ln>
-        </p:spPr>
-        <p:style>
-          <a:lnRef idx="1">
-            <a:schemeClr val="accent1"/>
-          </a:lnRef>
-          <a:fillRef idx="0">
-            <a:schemeClr val="accent1"/>
-          </a:fillRef>
-          <a:effectRef idx="0">
-            <a:schemeClr val="accent1"/>
-          </a:effectRef>
-          <a:fontRef idx="minor">
-            <a:schemeClr val="tx1"/>
-          </a:fontRef>
-        </p:style>
-      </p:cxnSp>
-      <p:sp>
-        <p:nvSpPr>
-          <p:cNvPr id="84" name="正方形/長方形 83"/>
-          <p:cNvSpPr/>
-          <p:nvPr/>
-        </p:nvSpPr>
-        <p:spPr>
-          <a:xfrm>
-            <a:off x="2166455" y="3038819"/>
-            <a:ext cx="1848593" cy="400110"/>
-          </a:xfrm>
-          <a:prstGeom prst="rect">
-            <a:avLst/>
-          </a:prstGeom>
-        </p:spPr>
-        <p:txBody>
-          <a:bodyPr wrap="square" lIns="91439" tIns="45720" rIns="91439" bIns="45720">
-            <a:spAutoFit/>
-          </a:bodyPr>
-          <a:lstStyle/>
-          <a:p>
-            <a:r>
-              <a:rPr lang="en-US" altLang="ja-JP" sz="1000" dirty="0" smtClean="0"/>
-              <a:t>completed(result</a:t>
-            </a:r>
-            <a:r>
-              <a:rPr lang="en-US" altLang="ja-JP" sz="1000" dirty="0"/>
-              <a:t>)[result == OK]</a:t>
-            </a:r>
-          </a:p>
-          <a:p>
-            <a:r>
-              <a:rPr lang="en-US" altLang="ja-JP" sz="1000" dirty="0" smtClean="0"/>
-              <a:t>/ </a:t>
-            </a:r>
-            <a:r>
-              <a:rPr lang="en-US" altLang="ja-JP" sz="1000" dirty="0" smtClean="0"/>
-              <a:t>“Register Completed”</a:t>
-            </a:r>
-            <a:endParaRPr lang="ja-JP" altLang="en-US" sz="1000" dirty="0"/>
-          </a:p>
-        </p:txBody>
-      </p:sp>
-      <p:sp>
-        <p:nvSpPr>
-          <p:cNvPr id="91" name="角丸四角形 90"/>
-          <p:cNvSpPr/>
-          <p:nvPr/>
-        </p:nvSpPr>
-        <p:spPr>
-          <a:xfrm>
-            <a:off x="1425432" y="5184303"/>
-            <a:ext cx="1059030" cy="172627"/>
-          </a:xfrm>
-          <a:prstGeom prst="roundRect">
-            <a:avLst/>
-          </a:prstGeom>
-        </p:spPr>
-        <p:style>
-          <a:lnRef idx="1">
-            <a:schemeClr val="accent2"/>
-          </a:lnRef>
-          <a:fillRef idx="2">
-            <a:schemeClr val="accent2"/>
-          </a:fillRef>
-          <a:effectRef idx="1">
-            <a:schemeClr val="accent2"/>
-          </a:effectRef>
-          <a:fontRef idx="minor">
-            <a:schemeClr val="dk1"/>
-          </a:fontRef>
-        </p:style>
-        <p:txBody>
-          <a:bodyPr rtlCol="0" anchor="ctr"/>
-          <a:lstStyle/>
-          <a:p>
-            <a:pPr algn="ctr"/>
-            <a:r>
-              <a:rPr lang="en-US" altLang="ja-JP" dirty="0" smtClean="0"/>
-              <a:t>Omit details</a:t>
-            </a:r>
-            <a:endParaRPr kumimoji="1" lang="ja-JP" altLang="en-US" dirty="0"/>
-          </a:p>
-        </p:txBody>
-      </p:sp>
-      <p:sp>
-        <p:nvSpPr>
-          <p:cNvPr id="92" name="正方形/長方形 91"/>
-          <p:cNvSpPr/>
-          <p:nvPr/>
-        </p:nvSpPr>
-        <p:spPr>
-          <a:xfrm>
-            <a:off x="1674949" y="2232273"/>
-            <a:ext cx="670395" cy="246221"/>
-          </a:xfrm>
-          <a:prstGeom prst="rect">
-            <a:avLst/>
-          </a:prstGeom>
-        </p:spPr>
-        <p:txBody>
-          <a:bodyPr wrap="square" lIns="91439" tIns="45720" rIns="91439" bIns="45720">
-            <a:spAutoFit/>
-          </a:bodyPr>
-          <a:lstStyle/>
-          <a:p>
-            <a:r>
-              <a:rPr lang="en-US" altLang="ja-JP" sz="1000" dirty="0" smtClean="0"/>
-              <a:t>Entry1</a:t>
-            </a:r>
-            <a:endParaRPr lang="ja-JP" altLang="en-US" sz="1000" dirty="0"/>
-          </a:p>
-        </p:txBody>
-      </p:sp>
-      <p:sp>
-        <p:nvSpPr>
-          <p:cNvPr id="93" name="正方形/長方形 92"/>
-          <p:cNvSpPr/>
-          <p:nvPr/>
-        </p:nvSpPr>
-        <p:spPr>
-          <a:xfrm>
-            <a:off x="1733437" y="2922156"/>
-            <a:ext cx="468213" cy="246221"/>
-          </a:xfrm>
-          <a:prstGeom prst="rect">
-            <a:avLst/>
-          </a:prstGeom>
-        </p:spPr>
-        <p:txBody>
-          <a:bodyPr wrap="square" lIns="91439" tIns="45720" rIns="91439" bIns="45720">
-            <a:spAutoFit/>
-          </a:bodyPr>
-          <a:lstStyle/>
-          <a:p>
-            <a:r>
-              <a:rPr lang="en-US" altLang="ja-JP" sz="1000" dirty="0" smtClean="0"/>
-              <a:t>Exit1</a:t>
-            </a:r>
-            <a:endParaRPr lang="ja-JP" altLang="en-US" sz="1000" dirty="0"/>
-          </a:p>
-        </p:txBody>
-      </p:sp>
-      <p:sp>
-        <p:nvSpPr>
-          <p:cNvPr id="94" name="正方形/長方形 93"/>
-          <p:cNvSpPr/>
-          <p:nvPr/>
-        </p:nvSpPr>
-        <p:spPr>
-          <a:xfrm>
-            <a:off x="428577" y="2959570"/>
-            <a:ext cx="1259892" cy="553998"/>
-          </a:xfrm>
-          <a:prstGeom prst="rect">
-            <a:avLst/>
-          </a:prstGeom>
-        </p:spPr>
-        <p:txBody>
-          <a:bodyPr wrap="square" lIns="91439" tIns="45720" rIns="91439" bIns="45720">
-            <a:spAutoFit/>
-          </a:bodyPr>
-          <a:lstStyle/>
-          <a:p>
-            <a:r>
-              <a:rPr lang="en-US" altLang="ja-JP" sz="1000" dirty="0" smtClean="0"/>
-              <a:t>completed(result)</a:t>
-            </a:r>
-          </a:p>
-          <a:p>
-            <a:r>
-              <a:rPr lang="en-US" altLang="ja-JP" sz="1000" dirty="0" smtClean="0"/>
-              <a:t>[</a:t>
-            </a:r>
-            <a:r>
-              <a:rPr lang="en-US" altLang="ja-JP" sz="1000" dirty="0"/>
-              <a:t>result == </a:t>
-            </a:r>
-            <a:r>
-              <a:rPr lang="en-US" altLang="ja-JP" sz="1000" dirty="0" smtClean="0"/>
-              <a:t>NG]</a:t>
-            </a:r>
-            <a:endParaRPr lang="en-US" altLang="ja-JP" sz="1000" dirty="0"/>
-          </a:p>
-          <a:p>
-            <a:r>
-              <a:rPr lang="en-US" altLang="ja-JP" sz="1000" dirty="0" smtClean="0"/>
-              <a:t>/ </a:t>
-            </a:r>
-            <a:r>
-              <a:rPr lang="en-US" altLang="ja-JP" sz="1000" dirty="0" smtClean="0"/>
-              <a:t>“Register </a:t>
-            </a:r>
-            <a:r>
-              <a:rPr lang="en-US" altLang="ja-JP" sz="1000" dirty="0" smtClean="0"/>
-              <a:t>Failed”</a:t>
-            </a:r>
-            <a:endParaRPr lang="ja-JP" altLang="en-US" sz="1000" dirty="0"/>
-          </a:p>
-        </p:txBody>
-      </p:sp>
-      <p:sp>
-        <p:nvSpPr>
-          <p:cNvPr id="95" name="正方形/長方形 94"/>
-          <p:cNvSpPr/>
-          <p:nvPr/>
-        </p:nvSpPr>
-        <p:spPr>
-          <a:xfrm>
-            <a:off x="432395" y="1656209"/>
-            <a:ext cx="1259892" cy="553998"/>
-          </a:xfrm>
-          <a:prstGeom prst="rect">
-            <a:avLst/>
-          </a:prstGeom>
-        </p:spPr>
-        <p:txBody>
-          <a:bodyPr wrap="square" lIns="91439" tIns="45720" rIns="91439" bIns="45720">
-            <a:spAutoFit/>
-          </a:bodyPr>
-          <a:lstStyle/>
-          <a:p>
-            <a:r>
-              <a:rPr lang="en-US" altLang="ja-JP" sz="1000" dirty="0" smtClean="0"/>
-              <a:t>completed(result)</a:t>
-            </a:r>
-          </a:p>
-          <a:p>
-            <a:r>
-              <a:rPr lang="en-US" altLang="ja-JP" sz="1000" dirty="0" smtClean="0"/>
-              <a:t>[</a:t>
-            </a:r>
-            <a:r>
-              <a:rPr lang="en-US" altLang="ja-JP" sz="1000" dirty="0"/>
-              <a:t>result == </a:t>
-            </a:r>
-            <a:r>
-              <a:rPr lang="en-US" altLang="ja-JP" sz="1000" dirty="0" smtClean="0"/>
-              <a:t>NG]</a:t>
-            </a:r>
-            <a:endParaRPr lang="en-US" altLang="ja-JP" sz="1000" dirty="0"/>
-          </a:p>
-          <a:p>
-            <a:r>
-              <a:rPr lang="en-US" altLang="ja-JP" sz="1000" dirty="0" smtClean="0"/>
-              <a:t>/ </a:t>
-            </a:r>
-            <a:r>
-              <a:rPr lang="en-US" altLang="ja-JP" sz="1000" dirty="0" smtClean="0"/>
-              <a:t>“Register </a:t>
-            </a:r>
-            <a:r>
-              <a:rPr lang="en-US" altLang="ja-JP" sz="1000" dirty="0" smtClean="0"/>
-              <a:t>Failed”</a:t>
-            </a:r>
-            <a:endParaRPr lang="ja-JP" altLang="en-US" sz="1000" dirty="0"/>
-          </a:p>
-        </p:txBody>
-      </p:sp>
-      <p:sp>
-        <p:nvSpPr>
-          <p:cNvPr id="7" name="フリーフォーム 6"/>
-          <p:cNvSpPr/>
-          <p:nvPr/>
-        </p:nvSpPr>
-        <p:spPr>
-          <a:xfrm>
-            <a:off x="253694" y="1013460"/>
-            <a:ext cx="1895146" cy="2256764"/>
-          </a:xfrm>
-          <a:custGeom>
-            <a:avLst/>
-            <a:gdLst>
-              <a:gd name="connsiteX0" fmla="*/ 1895146 w 1895146"/>
-              <a:gd name="connsiteY0" fmla="*/ 2057400 h 2256764"/>
-              <a:gd name="connsiteX1" fmla="*/ 1559866 w 1895146"/>
-              <a:gd name="connsiteY1" fmla="*/ 2255520 h 2256764"/>
-              <a:gd name="connsiteX2" fmla="*/ 1216966 w 1895146"/>
-              <a:gd name="connsiteY2" fmla="*/ 1973580 h 2256764"/>
-              <a:gd name="connsiteX3" fmla="*/ 233986 w 1895146"/>
-              <a:gd name="connsiteY3" fmla="*/ 1988820 h 2256764"/>
-              <a:gd name="connsiteX4" fmla="*/ 20626 w 1895146"/>
-              <a:gd name="connsiteY4" fmla="*/ 1371600 h 2256764"/>
-              <a:gd name="connsiteX5" fmla="*/ 165406 w 1895146"/>
-              <a:gd name="connsiteY5" fmla="*/ 411480 h 2256764"/>
-              <a:gd name="connsiteX6" fmla="*/ 1407466 w 1895146"/>
-              <a:gd name="connsiteY6" fmla="*/ 0 h 2256764"/>
-            </a:gdLst>
-            <a:ahLst/>
-            <a:cxnLst>
-              <a:cxn ang="0">
-                <a:pos x="connsiteX0" y="connsiteY0"/>
-              </a:cxn>
-              <a:cxn ang="0">
-                <a:pos x="connsiteX1" y="connsiteY1"/>
-              </a:cxn>
-              <a:cxn ang="0">
-                <a:pos x="connsiteX2" y="connsiteY2"/>
-              </a:cxn>
-              <a:cxn ang="0">
-                <a:pos x="connsiteX3" y="connsiteY3"/>
-              </a:cxn>
-              <a:cxn ang="0">
-                <a:pos x="connsiteX4" y="connsiteY4"/>
-              </a:cxn>
-              <a:cxn ang="0">
-                <a:pos x="connsiteX5" y="connsiteY5"/>
-              </a:cxn>
-              <a:cxn ang="0">
-                <a:pos x="connsiteX6" y="connsiteY6"/>
-              </a:cxn>
-            </a:cxnLst>
-            <a:rect l="l" t="t" r="r" b="b"/>
-            <a:pathLst>
-              <a:path w="1895146" h="2256764">
-                <a:moveTo>
-                  <a:pt x="1895146" y="2057400"/>
-                </a:moveTo>
-                <a:cubicBezTo>
-                  <a:pt x="1784021" y="2163445"/>
-                  <a:pt x="1672896" y="2269490"/>
-                  <a:pt x="1559866" y="2255520"/>
-                </a:cubicBezTo>
-                <a:cubicBezTo>
-                  <a:pt x="1446836" y="2241550"/>
-                  <a:pt x="1437946" y="2018030"/>
-                  <a:pt x="1216966" y="1973580"/>
-                </a:cubicBezTo>
-                <a:cubicBezTo>
-                  <a:pt x="995986" y="1929130"/>
-                  <a:pt x="433376" y="2089150"/>
-                  <a:pt x="233986" y="1988820"/>
-                </a:cubicBezTo>
-                <a:cubicBezTo>
-                  <a:pt x="34596" y="1888490"/>
-                  <a:pt x="32056" y="1634490"/>
-                  <a:pt x="20626" y="1371600"/>
-                </a:cubicBezTo>
-                <a:cubicBezTo>
-                  <a:pt x="9196" y="1108710"/>
-                  <a:pt x="-65734" y="640080"/>
-                  <a:pt x="165406" y="411480"/>
-                </a:cubicBezTo>
-                <a:cubicBezTo>
-                  <a:pt x="396546" y="182880"/>
-                  <a:pt x="902006" y="91440"/>
-                  <a:pt x="1407466" y="0"/>
-                </a:cubicBezTo>
-              </a:path>
-            </a:pathLst>
-          </a:custGeom>
-          <a:noFill/>
-          <a:ln w="12700">
-            <a:solidFill>
-              <a:schemeClr val="tx1"/>
-            </a:solidFill>
-            <a:headEnd type="none" w="med" len="med"/>
-            <a:tailEnd type="arrow" w="med" len="med"/>
-          </a:ln>
-        </p:spPr>
-        <p:style>
-          <a:lnRef idx="2">
-            <a:schemeClr val="accent1">
-              <a:shade val="50000"/>
-            </a:schemeClr>
-          </a:lnRef>
-          <a:fillRef idx="1">
-            <a:schemeClr val="accent1"/>
-          </a:fillRef>
-          <a:effectRef idx="0">
-            <a:schemeClr val="accent1"/>
-          </a:effectRef>
-          <a:fontRef idx="minor">
-            <a:schemeClr val="lt1"/>
-          </a:fontRef>
-        </p:style>
-        <p:txBody>
-          <a:bodyPr rtlCol="0" anchor="ctr"/>
-          <a:lstStyle/>
-          <a:p>
-            <a:pPr algn="ctr"/>
-            <a:endParaRPr kumimoji="1" lang="ja-JP" altLang="en-US"/>
-          </a:p>
-        </p:txBody>
-      </p:sp>
-      <p:sp>
-        <p:nvSpPr>
-          <p:cNvPr id="8" name="フリーフォーム 7"/>
-          <p:cNvSpPr/>
-          <p:nvPr/>
-        </p:nvSpPr>
-        <p:spPr>
-          <a:xfrm>
-            <a:off x="1503490" y="1082040"/>
-            <a:ext cx="637730" cy="1204230"/>
-          </a:xfrm>
-          <a:custGeom>
-            <a:avLst/>
-            <a:gdLst>
-              <a:gd name="connsiteX0" fmla="*/ 637730 w 637730"/>
-              <a:gd name="connsiteY0" fmla="*/ 1089660 h 1204230"/>
-              <a:gd name="connsiteX1" fmla="*/ 515810 w 637730"/>
-              <a:gd name="connsiteY1" fmla="*/ 1196340 h 1204230"/>
-              <a:gd name="connsiteX2" fmla="*/ 89090 w 637730"/>
-              <a:gd name="connsiteY2" fmla="*/ 1127760 h 1204230"/>
-              <a:gd name="connsiteX3" fmla="*/ 12890 w 637730"/>
-              <a:gd name="connsiteY3" fmla="*/ 586740 h 1204230"/>
-              <a:gd name="connsiteX4" fmla="*/ 271970 w 637730"/>
-              <a:gd name="connsiteY4" fmla="*/ 0 h 1204230"/>
-            </a:gdLst>
-            <a:ahLst/>
-            <a:cxnLst>
-              <a:cxn ang="0">
-                <a:pos x="connsiteX0" y="connsiteY0"/>
-              </a:cxn>
-              <a:cxn ang="0">
-                <a:pos x="connsiteX1" y="connsiteY1"/>
-              </a:cxn>
-              <a:cxn ang="0">
-                <a:pos x="connsiteX2" y="connsiteY2"/>
-              </a:cxn>
-              <a:cxn ang="0">
-                <a:pos x="connsiteX3" y="connsiteY3"/>
-              </a:cxn>
-              <a:cxn ang="0">
-                <a:pos x="connsiteX4" y="connsiteY4"/>
-              </a:cxn>
-            </a:cxnLst>
-            <a:rect l="l" t="t" r="r" b="b"/>
-            <a:pathLst>
-              <a:path w="637730" h="1204230">
-                <a:moveTo>
-                  <a:pt x="637730" y="1089660"/>
-                </a:moveTo>
-                <a:cubicBezTo>
-                  <a:pt x="622490" y="1139825"/>
-                  <a:pt x="607250" y="1189990"/>
-                  <a:pt x="515810" y="1196340"/>
-                </a:cubicBezTo>
-                <a:cubicBezTo>
-                  <a:pt x="424370" y="1202690"/>
-                  <a:pt x="172910" y="1229360"/>
-                  <a:pt x="89090" y="1127760"/>
-                </a:cubicBezTo>
-                <a:cubicBezTo>
-                  <a:pt x="5270" y="1026160"/>
-                  <a:pt x="-17590" y="774700"/>
-                  <a:pt x="12890" y="586740"/>
-                </a:cubicBezTo>
-                <a:cubicBezTo>
-                  <a:pt x="43370" y="398780"/>
-                  <a:pt x="157670" y="199390"/>
-                  <a:pt x="271970" y="0"/>
-                </a:cubicBezTo>
-              </a:path>
-            </a:pathLst>
-          </a:custGeom>
-          <a:noFill/>
-          <a:ln w="12700">
-            <a:solidFill>
-              <a:schemeClr val="tx1"/>
-            </a:solidFill>
-            <a:headEnd type="none" w="med" len="med"/>
-            <a:tailEnd type="arrow" w="med" len="med"/>
-          </a:ln>
-        </p:spPr>
-        <p:style>
-          <a:lnRef idx="2">
-            <a:schemeClr val="accent1">
-              <a:shade val="50000"/>
-            </a:schemeClr>
-          </a:lnRef>
-          <a:fillRef idx="1">
-            <a:schemeClr val="accent1"/>
-          </a:fillRef>
-          <a:effectRef idx="0">
-            <a:schemeClr val="accent1"/>
-          </a:effectRef>
-          <a:fontRef idx="minor">
-            <a:schemeClr val="lt1"/>
-          </a:fontRef>
-        </p:style>
-        <p:txBody>
-          <a:bodyPr rtlCol="0" anchor="ctr"/>
-          <a:lstStyle/>
-          <a:p>
-            <a:pPr algn="ctr"/>
-            <a:endParaRPr kumimoji="1" lang="ja-JP" altLang="en-US"/>
-          </a:p>
-        </p:txBody>
-      </p:sp>
-    </p:spTree>
-    <p:extLst>
-      <p:ext uri="{BB962C8B-B14F-4D97-AF65-F5344CB8AC3E}">
-        <p14:creationId xmlns:p14="http://schemas.microsoft.com/office/powerpoint/2010/main" val="524531569"/>
-      </p:ext>
-    </p:extLst>
-  </p:cSld>
-  <p:clrMapOvr>
-    <a:masterClrMapping/>
-  </p:clrMapOvr>
-  <p:timing>
-    <p:tnLst>
-      <p:par>
-        <p:cTn id="1" dur="indefinite" restart="never" nodeType="tmRoot"/>
-      </p:par>
-    </p:tnLst>
-  </p:timing>
-</p:sld>
-</file>
-
-<file path=ppt/slides/slide18.xml><?xml version="1.0" encoding="utf-8"?>
-<p:sld xmlns:a="http://schemas.openxmlformats.org/drawingml/2006/main" xmlns:r="http://schemas.openxmlformats.org/officeDocument/2006/relationships" xmlns:p="http://schemas.openxmlformats.org/presentationml/2006/main">
-  <p:cSld>
-    <p:spTree>
-      <p:nvGrpSpPr>
-        <p:cNvPr id="1" name=""/>
-        <p:cNvGrpSpPr/>
-        <p:nvPr/>
-      </p:nvGrpSpPr>
-      <p:grpSpPr>
-        <a:xfrm>
-          <a:off x="0" y="0"/>
-          <a:ext cx="0" cy="0"/>
-          <a:chOff x="0" y="0"/>
-          <a:chExt cx="0" cy="0"/>
-        </a:xfrm>
-      </p:grpSpPr>
-      <p:cxnSp>
-        <p:nvCxnSpPr>
-          <p:cNvPr id="48" name="直線矢印コネクタ 28"/>
-          <p:cNvCxnSpPr>
-            <a:stCxn id="54" idx="4"/>
-            <a:endCxn id="63" idx="0"/>
-          </p:cNvCxnSpPr>
-          <p:nvPr/>
-        </p:nvCxnSpPr>
-        <p:spPr>
-          <a:xfrm flipH="1">
-            <a:off x="1493765" y="634656"/>
-            <a:ext cx="301" cy="239453"/>
-          </a:xfrm>
-          <a:prstGeom prst="straightConnector1">
-            <a:avLst/>
-          </a:prstGeom>
-          <a:ln w="19050">
-            <a:solidFill>
-              <a:schemeClr val="tx1"/>
-            </a:solidFill>
-            <a:tailEnd type="arrow"/>
-          </a:ln>
-        </p:spPr>
-        <p:style>
-          <a:lnRef idx="1">
-            <a:schemeClr val="accent1"/>
-          </a:lnRef>
-          <a:fillRef idx="0">
-            <a:schemeClr val="accent1"/>
-          </a:fillRef>
-          <a:effectRef idx="0">
-            <a:schemeClr val="accent1"/>
-          </a:effectRef>
-          <a:fontRef idx="minor">
-            <a:schemeClr val="tx1"/>
-          </a:fontRef>
-        </p:style>
-      </p:cxnSp>
-      <p:sp>
-        <p:nvSpPr>
-          <p:cNvPr id="49" name="正方形/長方形 48"/>
-          <p:cNvSpPr/>
-          <p:nvPr/>
-        </p:nvSpPr>
-        <p:spPr>
-          <a:xfrm>
-            <a:off x="504403" y="227477"/>
-            <a:ext cx="3324941" cy="1471073"/>
-          </a:xfrm>
-          <a:prstGeom prst="rect">
-            <a:avLst/>
-          </a:prstGeom>
-          <a:noFill/>
-          <a:ln w="28575">
-            <a:solidFill>
-              <a:schemeClr val="tx1"/>
-            </a:solidFill>
-          </a:ln>
-        </p:spPr>
-        <p:style>
-          <a:lnRef idx="2">
-            <a:schemeClr val="accent1">
-              <a:shade val="50000"/>
-            </a:schemeClr>
-          </a:lnRef>
-          <a:fillRef idx="1">
-            <a:schemeClr val="accent1"/>
-          </a:fillRef>
-          <a:effectRef idx="0">
-            <a:schemeClr val="accent1"/>
-          </a:effectRef>
-          <a:fontRef idx="minor">
-            <a:schemeClr val="lt1"/>
-          </a:fontRef>
-        </p:style>
-        <p:txBody>
-          <a:bodyPr lIns="91439" tIns="45720" rIns="91439" bIns="45720" rtlCol="0" anchor="ctr"/>
-          <a:lstStyle/>
-          <a:p>
-            <a:pPr algn="ctr"/>
-            <a:endParaRPr kumimoji="1" lang="ja-JP" altLang="en-US"/>
-          </a:p>
-        </p:txBody>
-      </p:sp>
-      <p:sp>
-        <p:nvSpPr>
-          <p:cNvPr id="50" name="1 つの角を切り取った四角形 49"/>
-          <p:cNvSpPr/>
-          <p:nvPr/>
-        </p:nvSpPr>
-        <p:spPr>
-          <a:xfrm flipV="1">
-            <a:off x="504403" y="235469"/>
-            <a:ext cx="866782" cy="305136"/>
-          </a:xfrm>
-          <a:prstGeom prst="snip1Rect">
-            <a:avLst>
-              <a:gd name="adj" fmla="val 34304"/>
-            </a:avLst>
-          </a:prstGeom>
-          <a:noFill/>
-          <a:ln w="19050">
-            <a:solidFill>
-              <a:schemeClr val="tx1"/>
-            </a:solidFill>
-          </a:ln>
-        </p:spPr>
-        <p:style>
-          <a:lnRef idx="2">
-            <a:schemeClr val="accent1">
-              <a:shade val="50000"/>
-            </a:schemeClr>
-          </a:lnRef>
-          <a:fillRef idx="1">
-            <a:schemeClr val="accent1"/>
-          </a:fillRef>
-          <a:effectRef idx="0">
-            <a:schemeClr val="accent1"/>
-          </a:effectRef>
-          <a:fontRef idx="minor">
-            <a:schemeClr val="lt1"/>
-          </a:fontRef>
-        </p:style>
-        <p:txBody>
-          <a:bodyPr lIns="91439" tIns="45720" rIns="91439" bIns="45720" rtlCol="0" anchor="ctr"/>
-          <a:lstStyle/>
-          <a:p>
-            <a:pPr algn="ctr"/>
-            <a:endParaRPr kumimoji="1" lang="ja-JP" altLang="en-US" sz="1000" dirty="0"/>
-          </a:p>
-        </p:txBody>
-      </p:sp>
-      <p:sp>
-        <p:nvSpPr>
-          <p:cNvPr id="53" name="正方形/長方形 52"/>
-          <p:cNvSpPr/>
-          <p:nvPr/>
-        </p:nvSpPr>
-        <p:spPr>
-          <a:xfrm>
-            <a:off x="504404" y="216049"/>
-            <a:ext cx="866781" cy="246221"/>
-          </a:xfrm>
-          <a:prstGeom prst="rect">
-            <a:avLst/>
-          </a:prstGeom>
-        </p:spPr>
-        <p:txBody>
-          <a:bodyPr wrap="square" lIns="91439" tIns="45720" rIns="91439" bIns="45720">
-            <a:spAutoFit/>
-          </a:bodyPr>
-          <a:lstStyle/>
-          <a:p>
-            <a:r>
-              <a:rPr lang="en-US" altLang="ja-JP" sz="1000" dirty="0" err="1" smtClean="0"/>
-              <a:t>ScanFinger</a:t>
-            </a:r>
-            <a:endParaRPr lang="ja-JP" altLang="en-US" sz="1000" dirty="0"/>
-          </a:p>
-        </p:txBody>
-      </p:sp>
-      <p:sp>
-        <p:nvSpPr>
-          <p:cNvPr id="54" name="フローチャート : 結合子 53"/>
-          <p:cNvSpPr/>
-          <p:nvPr/>
-        </p:nvSpPr>
-        <p:spPr>
-          <a:xfrm>
-            <a:off x="1422055" y="490636"/>
-            <a:ext cx="144021" cy="144020"/>
-          </a:xfrm>
-          <a:prstGeom prst="flowChartConnector">
-            <a:avLst/>
-          </a:prstGeom>
-          <a:solidFill>
-            <a:schemeClr val="tx1"/>
-          </a:solidFill>
-          <a:ln w="19050">
-            <a:solidFill>
-              <a:schemeClr val="tx1"/>
-            </a:solidFill>
-          </a:ln>
-        </p:spPr>
-        <p:style>
-          <a:lnRef idx="2">
-            <a:schemeClr val="accent1">
-              <a:shade val="50000"/>
-            </a:schemeClr>
-          </a:lnRef>
-          <a:fillRef idx="1">
-            <a:schemeClr val="accent1"/>
-          </a:fillRef>
-          <a:effectRef idx="0">
-            <a:schemeClr val="accent1"/>
-          </a:effectRef>
-          <a:fontRef idx="minor">
-            <a:schemeClr val="lt1"/>
-          </a:fontRef>
-        </p:style>
-        <p:txBody>
-          <a:bodyPr lIns="91439" tIns="45720" rIns="91439" bIns="45720" rtlCol="0" anchor="ctr"/>
-          <a:lstStyle/>
-          <a:p>
-            <a:pPr algn="ctr"/>
-            <a:endParaRPr lang="ja-JP" altLang="en-US" sz="1000"/>
-          </a:p>
-        </p:txBody>
-      </p:sp>
-      <p:cxnSp>
-        <p:nvCxnSpPr>
-          <p:cNvPr id="55" name="直線矢印コネクタ 28"/>
-          <p:cNvCxnSpPr>
-            <a:stCxn id="56" idx="6"/>
-            <a:endCxn id="63" idx="1"/>
-          </p:cNvCxnSpPr>
-          <p:nvPr/>
-        </p:nvCxnSpPr>
-        <p:spPr>
-          <a:xfrm>
-            <a:off x="576413" y="1143477"/>
-            <a:ext cx="383611" cy="0"/>
-          </a:xfrm>
-          <a:prstGeom prst="straightConnector1">
-            <a:avLst/>
-          </a:prstGeom>
-          <a:ln w="19050">
-            <a:solidFill>
-              <a:schemeClr val="tx1"/>
-            </a:solidFill>
-            <a:tailEnd type="arrow"/>
-          </a:ln>
-        </p:spPr>
-        <p:style>
-          <a:lnRef idx="1">
-            <a:schemeClr val="accent1"/>
-          </a:lnRef>
-          <a:fillRef idx="0">
-            <a:schemeClr val="accent1"/>
-          </a:fillRef>
-          <a:effectRef idx="0">
-            <a:schemeClr val="accent1"/>
-          </a:effectRef>
-          <a:fontRef idx="minor">
-            <a:schemeClr val="tx1"/>
-          </a:fontRef>
-        </p:style>
-      </p:cxnSp>
-      <p:sp>
-        <p:nvSpPr>
-          <p:cNvPr id="56" name="フローチャート : 結合子 55"/>
-          <p:cNvSpPr/>
-          <p:nvPr/>
-        </p:nvSpPr>
-        <p:spPr>
-          <a:xfrm>
-            <a:off x="432392" y="1071467"/>
-            <a:ext cx="144021" cy="144020"/>
-          </a:xfrm>
-          <a:prstGeom prst="flowChartConnector">
-            <a:avLst/>
-          </a:prstGeom>
-          <a:solidFill>
-            <a:schemeClr val="bg1"/>
-          </a:solidFill>
-          <a:ln w="19050">
-            <a:solidFill>
-              <a:schemeClr val="tx1"/>
-            </a:solidFill>
-          </a:ln>
-        </p:spPr>
-        <p:style>
-          <a:lnRef idx="2">
-            <a:schemeClr val="accent1">
-              <a:shade val="50000"/>
-            </a:schemeClr>
-          </a:lnRef>
-          <a:fillRef idx="1">
-            <a:schemeClr val="accent1"/>
-          </a:fillRef>
-          <a:effectRef idx="0">
-            <a:schemeClr val="accent1"/>
-          </a:effectRef>
-          <a:fontRef idx="minor">
-            <a:schemeClr val="lt1"/>
-          </a:fontRef>
-        </p:style>
-        <p:txBody>
-          <a:bodyPr lIns="91439" tIns="45720" rIns="91439" bIns="45720" rtlCol="0" anchor="ctr"/>
-          <a:lstStyle/>
-          <a:p>
-            <a:pPr algn="ctr"/>
-            <a:endParaRPr lang="ja-JP" altLang="en-US" sz="1000"/>
-          </a:p>
-        </p:txBody>
-      </p:sp>
-      <p:grpSp>
-        <p:nvGrpSpPr>
-          <p:cNvPr id="57" name="グループ化 56"/>
-          <p:cNvGrpSpPr/>
-          <p:nvPr/>
-        </p:nvGrpSpPr>
-        <p:grpSpPr>
-          <a:xfrm>
-            <a:off x="3760915" y="1071471"/>
-            <a:ext cx="144017" cy="144016"/>
-            <a:chOff x="4067944" y="4720186"/>
-            <a:chExt cx="288032" cy="288032"/>
-          </a:xfrm>
-          <a:solidFill>
-            <a:schemeClr val="bg1"/>
-          </a:solidFill>
-        </p:grpSpPr>
-        <p:sp>
-          <p:nvSpPr>
-            <p:cNvPr id="58" name="フローチャート : 結合子 57"/>
-            <p:cNvSpPr/>
-            <p:nvPr/>
-          </p:nvSpPr>
-          <p:spPr>
-            <a:xfrm>
-              <a:off x="4067944" y="4720186"/>
-              <a:ext cx="288032" cy="288032"/>
-            </a:xfrm>
-            <a:prstGeom prst="flowChartConnector">
-              <a:avLst/>
-            </a:prstGeom>
-            <a:grpFill/>
-            <a:ln w="19050">
-              <a:solidFill>
-                <a:schemeClr val="tx1"/>
-              </a:solidFill>
-            </a:ln>
-          </p:spPr>
-          <p:style>
-            <a:lnRef idx="2">
-              <a:schemeClr val="accent1">
-                <a:shade val="50000"/>
-              </a:schemeClr>
-            </a:lnRef>
-            <a:fillRef idx="1">
-              <a:schemeClr val="accent1"/>
-            </a:fillRef>
-            <a:effectRef idx="0">
-              <a:schemeClr val="accent1"/>
-            </a:effectRef>
-            <a:fontRef idx="minor">
-              <a:schemeClr val="lt1"/>
-            </a:fontRef>
-          </p:style>
-          <p:txBody>
-            <a:bodyPr rtlCol="0" anchor="ctr"/>
-            <a:lstStyle/>
-            <a:p>
-              <a:pPr algn="ctr"/>
-              <a:endParaRPr lang="ja-JP" altLang="en-US" sz="1000"/>
-            </a:p>
-          </p:txBody>
-        </p:sp>
-        <p:cxnSp>
-          <p:nvCxnSpPr>
-            <p:cNvPr id="59" name="直線コネクタ 58"/>
-            <p:cNvCxnSpPr>
-              <a:stCxn id="58" idx="1"/>
-              <a:endCxn id="58" idx="5"/>
-            </p:cNvCxnSpPr>
-            <p:nvPr/>
-          </p:nvCxnSpPr>
-          <p:spPr>
-            <a:xfrm>
-              <a:off x="4110125" y="4762367"/>
-              <a:ext cx="203670" cy="203670"/>
-            </a:xfrm>
-            <a:prstGeom prst="line">
-              <a:avLst/>
-            </a:prstGeom>
-            <a:grpFill/>
-            <a:ln w="19050">
-              <a:solidFill>
-                <a:schemeClr val="tx1"/>
-              </a:solidFill>
-            </a:ln>
-          </p:spPr>
-          <p:style>
-            <a:lnRef idx="1">
-              <a:schemeClr val="accent1"/>
-            </a:lnRef>
-            <a:fillRef idx="0">
-              <a:schemeClr val="accent1"/>
-            </a:fillRef>
-            <a:effectRef idx="0">
-              <a:schemeClr val="accent1"/>
-            </a:effectRef>
-            <a:fontRef idx="minor">
-              <a:schemeClr val="tx1"/>
-            </a:fontRef>
-          </p:style>
-        </p:cxnSp>
-        <p:cxnSp>
-          <p:nvCxnSpPr>
-            <p:cNvPr id="60" name="直線コネクタ 59"/>
-            <p:cNvCxnSpPr>
-              <a:stCxn id="58" idx="7"/>
-              <a:endCxn id="58" idx="3"/>
-            </p:cNvCxnSpPr>
-            <p:nvPr/>
-          </p:nvCxnSpPr>
-          <p:spPr>
-            <a:xfrm flipH="1">
-              <a:off x="4110125" y="4762367"/>
-              <a:ext cx="203670" cy="203670"/>
-            </a:xfrm>
-            <a:prstGeom prst="line">
-              <a:avLst/>
-            </a:prstGeom>
-            <a:grpFill/>
-            <a:ln w="19050">
-              <a:solidFill>
-                <a:schemeClr val="tx1"/>
-              </a:solidFill>
-            </a:ln>
-          </p:spPr>
-          <p:style>
-            <a:lnRef idx="1">
-              <a:schemeClr val="accent1"/>
-            </a:lnRef>
-            <a:fillRef idx="0">
-              <a:schemeClr val="accent1"/>
-            </a:fillRef>
-            <a:effectRef idx="0">
-              <a:schemeClr val="accent1"/>
-            </a:effectRef>
-            <a:fontRef idx="minor">
-              <a:schemeClr val="tx1"/>
-            </a:fontRef>
-          </p:style>
-        </p:cxnSp>
-      </p:grpSp>
-      <p:sp>
-        <p:nvSpPr>
-          <p:cNvPr id="61" name="正方形/長方形 60"/>
-          <p:cNvSpPr/>
-          <p:nvPr/>
-        </p:nvSpPr>
-        <p:spPr>
-          <a:xfrm>
-            <a:off x="347" y="1143477"/>
-            <a:ext cx="670395" cy="246221"/>
-          </a:xfrm>
-          <a:prstGeom prst="rect">
-            <a:avLst/>
-          </a:prstGeom>
-        </p:spPr>
-        <p:txBody>
-          <a:bodyPr wrap="square" lIns="91439" tIns="45720" rIns="91439" bIns="45720">
-            <a:spAutoFit/>
-          </a:bodyPr>
-          <a:lstStyle/>
-          <a:p>
-            <a:r>
-              <a:rPr lang="en-US" altLang="ja-JP" sz="1000" dirty="0" smtClean="0"/>
-              <a:t>Entry1</a:t>
-            </a:r>
-            <a:endParaRPr lang="ja-JP" altLang="en-US" sz="1000" dirty="0"/>
-          </a:p>
-        </p:txBody>
-      </p:sp>
-      <p:sp>
-        <p:nvSpPr>
-          <p:cNvPr id="62" name="正方形/長方形 61"/>
-          <p:cNvSpPr/>
-          <p:nvPr/>
-        </p:nvSpPr>
-        <p:spPr>
-          <a:xfrm>
-            <a:off x="3832924" y="1143479"/>
-            <a:ext cx="488251" cy="246221"/>
-          </a:xfrm>
-          <a:prstGeom prst="rect">
-            <a:avLst/>
-          </a:prstGeom>
-        </p:spPr>
-        <p:txBody>
-          <a:bodyPr wrap="square" lIns="91439" tIns="45720" rIns="91439" bIns="45720">
-            <a:spAutoFit/>
-          </a:bodyPr>
-          <a:lstStyle/>
-          <a:p>
-            <a:r>
-              <a:rPr lang="en-US" altLang="ja-JP" sz="1000" dirty="0" smtClean="0"/>
-              <a:t>Exit1</a:t>
-            </a:r>
-            <a:endParaRPr lang="ja-JP" altLang="en-US" sz="1000" dirty="0"/>
-          </a:p>
-        </p:txBody>
-      </p:sp>
-      <p:sp>
-        <p:nvSpPr>
-          <p:cNvPr id="63" name="角丸四角形 62"/>
-          <p:cNvSpPr/>
-          <p:nvPr/>
-        </p:nvSpPr>
-        <p:spPr>
-          <a:xfrm>
-            <a:off x="960024" y="874109"/>
-            <a:ext cx="1067481" cy="538736"/>
-          </a:xfrm>
-          <a:prstGeom prst="roundRect">
-            <a:avLst/>
-          </a:prstGeom>
-          <a:noFill/>
-          <a:ln w="19050">
-            <a:solidFill>
-              <a:schemeClr val="tx1"/>
-            </a:solidFill>
-          </a:ln>
-        </p:spPr>
-        <p:style>
-          <a:lnRef idx="2">
-            <a:schemeClr val="accent1">
-              <a:shade val="50000"/>
-            </a:schemeClr>
-          </a:lnRef>
-          <a:fillRef idx="1">
-            <a:schemeClr val="accent1"/>
-          </a:fillRef>
-          <a:effectRef idx="0">
-            <a:schemeClr val="accent1"/>
-          </a:effectRef>
-          <a:fontRef idx="minor">
-            <a:schemeClr val="lt1"/>
-          </a:fontRef>
-        </p:style>
-        <p:txBody>
-          <a:bodyPr lIns="91439" tIns="45720" rIns="91439" bIns="45720" rtlCol="0" anchor="t" anchorCtr="0"/>
-          <a:lstStyle/>
-          <a:p>
-            <a:pPr algn="ctr"/>
-            <a:r>
-              <a:rPr lang="en-US" altLang="ja-JP" sz="1000" dirty="0" err="1" smtClean="0">
-                <a:solidFill>
-                  <a:schemeClr val="tx1"/>
-                </a:solidFill>
-              </a:rPr>
-              <a:t>Scanninng</a:t>
-            </a:r>
-            <a:endParaRPr lang="ja-JP" altLang="en-US" sz="1000" dirty="0">
-              <a:solidFill>
-                <a:schemeClr val="tx1"/>
-              </a:solidFill>
-            </a:endParaRPr>
-          </a:p>
-        </p:txBody>
-      </p:sp>
-      <p:cxnSp>
-        <p:nvCxnSpPr>
-          <p:cNvPr id="64" name="直線コネクタ 63"/>
-          <p:cNvCxnSpPr/>
-          <p:nvPr/>
-        </p:nvCxnSpPr>
-        <p:spPr>
-          <a:xfrm>
-            <a:off x="964785" y="1128162"/>
-            <a:ext cx="1058562" cy="0"/>
-          </a:xfrm>
-          <a:prstGeom prst="line">
-            <a:avLst/>
-          </a:prstGeom>
-          <a:ln w="12700">
-            <a:solidFill>
-              <a:schemeClr val="tx1"/>
-            </a:solidFill>
-          </a:ln>
-        </p:spPr>
-        <p:style>
-          <a:lnRef idx="1">
-            <a:schemeClr val="accent1"/>
-          </a:lnRef>
-          <a:fillRef idx="0">
-            <a:schemeClr val="accent1"/>
-          </a:fillRef>
-          <a:effectRef idx="0">
-            <a:schemeClr val="accent1"/>
-          </a:effectRef>
-          <a:fontRef idx="minor">
-            <a:schemeClr val="tx1"/>
-          </a:fontRef>
-        </p:style>
-      </p:cxnSp>
-      <p:cxnSp>
-        <p:nvCxnSpPr>
-          <p:cNvPr id="65" name="直線矢印コネクタ 28"/>
-          <p:cNvCxnSpPr>
-            <a:stCxn id="63" idx="3"/>
-            <a:endCxn id="58" idx="2"/>
-          </p:cNvCxnSpPr>
-          <p:nvPr/>
-        </p:nvCxnSpPr>
-        <p:spPr>
-          <a:xfrm>
-            <a:off x="2027505" y="1143477"/>
-            <a:ext cx="1733410" cy="2"/>
-          </a:xfrm>
-          <a:prstGeom prst="straightConnector1">
-            <a:avLst/>
-          </a:prstGeom>
-          <a:ln w="19050">
-            <a:solidFill>
-              <a:schemeClr val="tx1"/>
-            </a:solidFill>
-            <a:tailEnd type="arrow"/>
-          </a:ln>
-        </p:spPr>
-        <p:style>
-          <a:lnRef idx="1">
-            <a:schemeClr val="accent1"/>
-          </a:lnRef>
-          <a:fillRef idx="0">
-            <a:schemeClr val="accent1"/>
-          </a:fillRef>
-          <a:effectRef idx="0">
-            <a:schemeClr val="accent1"/>
-          </a:effectRef>
-          <a:fontRef idx="minor">
-            <a:schemeClr val="tx1"/>
-          </a:fontRef>
-        </p:style>
-      </p:cxnSp>
-      <p:sp>
-        <p:nvSpPr>
-          <p:cNvPr id="66" name="正方形/長方形 65"/>
-          <p:cNvSpPr/>
-          <p:nvPr/>
-        </p:nvSpPr>
-        <p:spPr>
-          <a:xfrm>
-            <a:off x="2055628" y="728052"/>
-            <a:ext cx="1828214" cy="400110"/>
-          </a:xfrm>
-          <a:prstGeom prst="rect">
-            <a:avLst/>
-          </a:prstGeom>
-        </p:spPr>
-        <p:txBody>
-          <a:bodyPr wrap="square" lIns="91439" tIns="45720" rIns="91439" bIns="45720">
-            <a:spAutoFit/>
-          </a:bodyPr>
-          <a:lstStyle/>
-          <a:p>
-            <a:r>
-              <a:rPr lang="en-US" altLang="ja-JP" sz="1000" dirty="0" err="1" smtClean="0"/>
-              <a:t>ScanSuccess</a:t>
-            </a:r>
-            <a:r>
-              <a:rPr lang="en-US" altLang="ja-JP" sz="1000" dirty="0" smtClean="0"/>
-              <a:t> / </a:t>
-            </a:r>
-            <a:r>
-              <a:rPr lang="en-US" altLang="ja-JP" sz="1000" dirty="0" err="1" smtClean="0"/>
-              <a:t>SendEvent</a:t>
-            </a:r>
-            <a:r>
-              <a:rPr lang="en-US" altLang="ja-JP" sz="1000" dirty="0" err="1" smtClean="0"/>
-              <a:t>:completed</a:t>
-            </a:r>
-            <a:r>
-              <a:rPr lang="en-US" altLang="ja-JP" sz="1000" dirty="0" smtClean="0"/>
-              <a:t>(OK)</a:t>
+              <a:t>)</a:t>
             </a:r>
             <a:endParaRPr lang="ja-JP" altLang="en-US" sz="1000" dirty="0"/>
           </a:p>
@@ -17037,23 +16316,27 @@
           <a:p>
             <a:r>
               <a:rPr lang="en-US" altLang="ja-JP" sz="1000" dirty="0" err="1" smtClean="0"/>
-              <a:t>ScanFailure</a:t>
+              <a:t>ScanFailed</a:t>
             </a:r>
             <a:r>
               <a:rPr lang="en-US" altLang="ja-JP" sz="1000" dirty="0" smtClean="0"/>
-              <a:t> / </a:t>
+              <a:t> </a:t>
+            </a:r>
+            <a:r>
+              <a:rPr lang="en-US" altLang="ja-JP" sz="1000" dirty="0" smtClean="0"/>
+              <a:t>/ </a:t>
             </a:r>
             <a:r>
               <a:rPr lang="en-US" altLang="ja-JP" sz="1000" dirty="0" err="1" smtClean="0"/>
-              <a:t>SendEvent</a:t>
-            </a:r>
-            <a:r>
-              <a:rPr lang="en-US" altLang="ja-JP" sz="1000" dirty="0" err="1" smtClean="0"/>
-              <a:t>:completed</a:t>
+              <a:t>ConvertEvent:Completed</a:t>
             </a:r>
             <a:r>
               <a:rPr lang="en-US" altLang="ja-JP" sz="1000" dirty="0" smtClean="0"/>
-              <a:t>(NG)</a:t>
+              <a:t>(NG</a:t>
+            </a:r>
+            <a:r>
+              <a:rPr lang="en-US" altLang="ja-JP" sz="1000" dirty="0" smtClean="0"/>
+              <a:t>)</a:t>
             </a:r>
             <a:endParaRPr lang="ja-JP" altLang="en-US" sz="1000" dirty="0"/>
           </a:p>

</xml_diff>

<commit_message>
Added alive checking status on finger print example.
</commit_message>
<xml_diff>
--- a/boost_training/msm/fig.pptx
+++ b/boost_training/msm/fig.pptx
@@ -220,7 +220,7 @@
           <a:p>
             <a:fld id="{33E477F9-361B-4780-B227-665A41208240}" type="datetimeFigureOut">
               <a:rPr kumimoji="1" lang="ja-JP" altLang="en-US" smtClean="0"/>
-              <a:t>2012/5/30</a:t>
+              <a:t>2012/5/31</a:t>
             </a:fld>
             <a:endParaRPr kumimoji="1" lang="ja-JP" altLang="en-US"/>
           </a:p>
@@ -3282,7 +3282,7 @@
           <a:p>
             <a:fld id="{E90ED720-0104-4369-84BC-D37694168613}" type="datetimeFigureOut">
               <a:rPr kumimoji="1" lang="ja-JP" altLang="en-US" smtClean="0"/>
-              <a:t>2012/5/30</a:t>
+              <a:t>2012/5/31</a:t>
             </a:fld>
             <a:endParaRPr kumimoji="1" lang="ja-JP" altLang="en-US"/>
           </a:p>
@@ -3479,7 +3479,7 @@
           <a:p>
             <a:fld id="{E90ED720-0104-4369-84BC-D37694168613}" type="datetimeFigureOut">
               <a:rPr kumimoji="1" lang="ja-JP" altLang="en-US" smtClean="0"/>
-              <a:t>2012/5/30</a:t>
+              <a:t>2012/5/31</a:t>
             </a:fld>
             <a:endParaRPr kumimoji="1" lang="ja-JP" altLang="en-US"/>
           </a:p>
@@ -3686,7 +3686,7 @@
           <a:p>
             <a:fld id="{E90ED720-0104-4369-84BC-D37694168613}" type="datetimeFigureOut">
               <a:rPr kumimoji="1" lang="ja-JP" altLang="en-US" smtClean="0"/>
-              <a:t>2012/5/30</a:t>
+              <a:t>2012/5/31</a:t>
             </a:fld>
             <a:endParaRPr kumimoji="1" lang="ja-JP" altLang="en-US"/>
           </a:p>
@@ -3883,7 +3883,7 @@
           <a:p>
             <a:fld id="{E90ED720-0104-4369-84BC-D37694168613}" type="datetimeFigureOut">
               <a:rPr kumimoji="1" lang="ja-JP" altLang="en-US" smtClean="0"/>
-              <a:t>2012/5/30</a:t>
+              <a:t>2012/5/31</a:t>
             </a:fld>
             <a:endParaRPr kumimoji="1" lang="ja-JP" altLang="en-US"/>
           </a:p>
@@ -4124,7 +4124,7 @@
           <a:p>
             <a:fld id="{E90ED720-0104-4369-84BC-D37694168613}" type="datetimeFigureOut">
               <a:rPr kumimoji="1" lang="ja-JP" altLang="en-US" smtClean="0"/>
-              <a:t>2012/5/30</a:t>
+              <a:t>2012/5/31</a:t>
             </a:fld>
             <a:endParaRPr kumimoji="1" lang="ja-JP" altLang="en-US"/>
           </a:p>
@@ -4471,7 +4471,7 @@
           <a:p>
             <a:fld id="{E90ED720-0104-4369-84BC-D37694168613}" type="datetimeFigureOut">
               <a:rPr kumimoji="1" lang="ja-JP" altLang="en-US" smtClean="0"/>
-              <a:t>2012/5/30</a:t>
+              <a:t>2012/5/31</a:t>
             </a:fld>
             <a:endParaRPr kumimoji="1" lang="ja-JP" altLang="en-US"/>
           </a:p>
@@ -4952,7 +4952,7 @@
           <a:p>
             <a:fld id="{E90ED720-0104-4369-84BC-D37694168613}" type="datetimeFigureOut">
               <a:rPr kumimoji="1" lang="ja-JP" altLang="en-US" smtClean="0"/>
-              <a:t>2012/5/30</a:t>
+              <a:t>2012/5/31</a:t>
             </a:fld>
             <a:endParaRPr kumimoji="1" lang="ja-JP" altLang="en-US"/>
           </a:p>
@@ -5065,7 +5065,7 @@
           <a:p>
             <a:fld id="{E90ED720-0104-4369-84BC-D37694168613}" type="datetimeFigureOut">
               <a:rPr kumimoji="1" lang="ja-JP" altLang="en-US" smtClean="0"/>
-              <a:t>2012/5/30</a:t>
+              <a:t>2012/5/31</a:t>
             </a:fld>
             <a:endParaRPr kumimoji="1" lang="ja-JP" altLang="en-US"/>
           </a:p>
@@ -5155,7 +5155,7 @@
           <a:p>
             <a:fld id="{E90ED720-0104-4369-84BC-D37694168613}" type="datetimeFigureOut">
               <a:rPr kumimoji="1" lang="ja-JP" altLang="en-US" smtClean="0"/>
-              <a:t>2012/5/30</a:t>
+              <a:t>2012/5/31</a:t>
             </a:fld>
             <a:endParaRPr kumimoji="1" lang="ja-JP" altLang="en-US"/>
           </a:p>
@@ -5459,7 +5459,7 @@
           <a:p>
             <a:fld id="{E90ED720-0104-4369-84BC-D37694168613}" type="datetimeFigureOut">
               <a:rPr kumimoji="1" lang="ja-JP" altLang="en-US" smtClean="0"/>
-              <a:t>2012/5/30</a:t>
+              <a:t>2012/5/31</a:t>
             </a:fld>
             <a:endParaRPr kumimoji="1" lang="ja-JP" altLang="en-US"/>
           </a:p>
@@ -5707,7 +5707,7 @@
           <a:p>
             <a:fld id="{E90ED720-0104-4369-84BC-D37694168613}" type="datetimeFigureOut">
               <a:rPr kumimoji="1" lang="ja-JP" altLang="en-US" smtClean="0"/>
-              <a:t>2012/5/30</a:t>
+              <a:t>2012/5/31</a:t>
             </a:fld>
             <a:endParaRPr kumimoji="1" lang="ja-JP" altLang="en-US"/>
           </a:p>
@@ -5947,7 +5947,7 @@
           <a:p>
             <a:fld id="{E90ED720-0104-4369-84BC-D37694168613}" type="datetimeFigureOut">
               <a:rPr kumimoji="1" lang="ja-JP" altLang="en-US" smtClean="0"/>
-              <a:t>2012/5/30</a:t>
+              <a:t>2012/5/31</a:t>
             </a:fld>
             <a:endParaRPr kumimoji="1" lang="ja-JP" altLang="en-US"/>
           </a:p>
@@ -14237,7 +14237,10 @@
           </a:solidFill>
           <a:ln w="19050">
             <a:solidFill>
-              <a:schemeClr val="tx1"/>
+              <a:schemeClr val="tx2">
+                <a:lumMod val="60000"/>
+                <a:lumOff val="40000"/>
+              </a:schemeClr>
             </a:solidFill>
           </a:ln>
         </p:spPr>
@@ -14300,7 +14303,10 @@
             <a:grpFill/>
             <a:ln w="19050">
               <a:solidFill>
-                <a:schemeClr val="tx1"/>
+                <a:schemeClr val="tx2">
+                  <a:lumMod val="60000"/>
+                  <a:lumOff val="40000"/>
+                </a:schemeClr>
               </a:solidFill>
             </a:ln>
           </p:spPr>
@@ -14349,7 +14355,10 @@
             <a:grpFill/>
             <a:ln w="19050">
               <a:solidFill>
-                <a:schemeClr val="tx1"/>
+                <a:schemeClr val="tx2">
+                  <a:lumMod val="60000"/>
+                  <a:lumOff val="40000"/>
+                </a:schemeClr>
               </a:solidFill>
             </a:ln>
           </p:spPr>
@@ -14388,7 +14397,10 @@
             <a:grpFill/>
             <a:ln w="19050">
               <a:solidFill>
-                <a:schemeClr val="tx1"/>
+                <a:schemeClr val="tx2">
+                  <a:lumMod val="60000"/>
+                  <a:lumOff val="40000"/>
+                </a:schemeClr>
               </a:solidFill>
             </a:ln>
           </p:spPr>
@@ -14416,7 +14428,7 @@
         </p:nvSpPr>
         <p:spPr>
           <a:xfrm>
-            <a:off x="1688469" y="1368351"/>
+            <a:off x="1512515" y="1368351"/>
             <a:ext cx="670395" cy="246221"/>
           </a:xfrm>
           <a:prstGeom prst="rect">
@@ -14430,10 +14442,24 @@
           <a:lstStyle/>
           <a:p>
             <a:r>
-              <a:rPr lang="en-US" altLang="ja-JP" sz="1000" dirty="0" smtClean="0"/>
-              <a:t>Entry1</a:t>
-            </a:r>
-            <a:endParaRPr lang="ja-JP" altLang="en-US" sz="1000" dirty="0"/>
+              <a:rPr lang="en-US" altLang="ja-JP" sz="1000" dirty="0" err="1" smtClean="0">
+                <a:solidFill>
+                  <a:schemeClr val="tx2">
+                    <a:lumMod val="60000"/>
+                    <a:lumOff val="40000"/>
+                  </a:schemeClr>
+                </a:solidFill>
+              </a:rPr>
+              <a:t>ScanOnly</a:t>
+            </a:r>
+            <a:endParaRPr lang="ja-JP" altLang="en-US" sz="1000" dirty="0">
+              <a:solidFill>
+                <a:schemeClr val="tx2">
+                  <a:lumMod val="60000"/>
+                  <a:lumOff val="40000"/>
+                </a:schemeClr>
+              </a:solidFill>
+            </a:endParaRPr>
           </a:p>
         </p:txBody>
       </p:sp>
@@ -14628,10 +14654,24 @@
           <a:lstStyle/>
           <a:p>
             <a:r>
-              <a:rPr lang="en-US" altLang="ja-JP" sz="1000" dirty="0" smtClean="0"/>
+              <a:rPr lang="en-US" altLang="ja-JP" sz="1000" dirty="0" smtClean="0">
+                <a:solidFill>
+                  <a:schemeClr val="tx2">
+                    <a:lumMod val="60000"/>
+                    <a:lumOff val="40000"/>
+                  </a:schemeClr>
+                </a:solidFill>
+              </a:rPr>
               <a:t>Exit1</a:t>
             </a:r>
-            <a:endParaRPr lang="ja-JP" altLang="en-US" sz="1000" dirty="0"/>
+            <a:endParaRPr lang="ja-JP" altLang="en-US" sz="1000" dirty="0">
+              <a:solidFill>
+                <a:schemeClr val="tx2">
+                  <a:lumMod val="60000"/>
+                  <a:lumOff val="40000"/>
+                </a:schemeClr>
+              </a:solidFill>
+            </a:endParaRPr>
           </a:p>
         </p:txBody>
       </p:sp>
@@ -14747,7 +14787,10 @@
           </a:solidFill>
           <a:ln w="19050">
             <a:solidFill>
-              <a:schemeClr val="tx1"/>
+              <a:schemeClr val="tx2">
+                <a:lumMod val="60000"/>
+                <a:lumOff val="40000"/>
+              </a:schemeClr>
             </a:solidFill>
           </a:ln>
         </p:spPr>
@@ -14810,7 +14853,10 @@
             <a:grpFill/>
             <a:ln w="19050">
               <a:solidFill>
-                <a:schemeClr val="tx1"/>
+                <a:schemeClr val="tx2">
+                  <a:lumMod val="60000"/>
+                  <a:lumOff val="40000"/>
+                </a:schemeClr>
               </a:solidFill>
             </a:ln>
           </p:spPr>
@@ -14859,7 +14905,10 @@
             <a:grpFill/>
             <a:ln w="19050">
               <a:solidFill>
-                <a:schemeClr val="tx1"/>
+                <a:schemeClr val="tx2">
+                  <a:lumMod val="60000"/>
+                  <a:lumOff val="40000"/>
+                </a:schemeClr>
               </a:solidFill>
             </a:ln>
           </p:spPr>
@@ -14898,7 +14947,10 @@
             <a:grpFill/>
             <a:ln w="19050">
               <a:solidFill>
-                <a:schemeClr val="tx1"/>
+                <a:schemeClr val="tx2">
+                  <a:lumMod val="60000"/>
+                  <a:lumOff val="40000"/>
+                </a:schemeClr>
               </a:solidFill>
             </a:ln>
           </p:spPr>
@@ -14959,45 +15011,6 @@
       </p:cxnSp>
       <p:sp>
         <p:nvSpPr>
-          <p:cNvPr id="81" name="正方形/長方形 80"/>
-          <p:cNvSpPr/>
-          <p:nvPr/>
-        </p:nvSpPr>
-        <p:spPr>
-          <a:xfrm>
-            <a:off x="2184873" y="2088257"/>
-            <a:ext cx="1919930" cy="400110"/>
-          </a:xfrm>
-          <a:prstGeom prst="rect">
-            <a:avLst/>
-          </a:prstGeom>
-        </p:spPr>
-        <p:txBody>
-          <a:bodyPr wrap="square" lIns="91439" tIns="45720" rIns="91439" bIns="45720">
-            <a:spAutoFit/>
-          </a:bodyPr>
-          <a:lstStyle/>
-          <a:p>
-            <a:r>
-              <a:rPr lang="en-US" altLang="ja-JP" sz="1000" dirty="0" smtClean="0"/>
-              <a:t>Completed(result</a:t>
-            </a:r>
-            <a:r>
-              <a:rPr lang="en-US" altLang="ja-JP" sz="1000" dirty="0" smtClean="0"/>
-              <a:t>)[result == OK]</a:t>
-            </a:r>
-          </a:p>
-          <a:p>
-            <a:r>
-              <a:rPr lang="en-US" altLang="ja-JP" sz="1000" dirty="0" smtClean="0"/>
-              <a:t>/ “Left hand please”</a:t>
-            </a:r>
-            <a:endParaRPr lang="ja-JP" altLang="en-US" sz="1000" dirty="0"/>
-          </a:p>
-        </p:txBody>
-      </p:sp>
-      <p:sp>
-        <p:nvSpPr>
           <p:cNvPr id="82" name="正方形/長方形 81"/>
           <p:cNvSpPr/>
           <p:nvPr/>
@@ -15108,14 +15121,14 @@
       </p:sp>
       <p:sp>
         <p:nvSpPr>
-          <p:cNvPr id="92" name="正方形/長方形 91"/>
-          <p:cNvSpPr/>
-          <p:nvPr/>
-        </p:nvSpPr>
-        <p:spPr>
-          <a:xfrm>
-            <a:off x="1674949" y="2232273"/>
-            <a:ext cx="670395" cy="246221"/>
+          <p:cNvPr id="93" name="正方形/長方形 92"/>
+          <p:cNvSpPr/>
+          <p:nvPr/>
+        </p:nvSpPr>
+        <p:spPr>
+          <a:xfrm>
+            <a:off x="1733437" y="2922156"/>
+            <a:ext cx="468213" cy="246221"/>
           </a:xfrm>
           <a:prstGeom prst="rect">
             <a:avLst/>
@@ -15128,39 +15141,24 @@
           <a:lstStyle/>
           <a:p>
             <a:r>
-              <a:rPr lang="en-US" altLang="ja-JP" sz="1000" dirty="0" smtClean="0"/>
-              <a:t>Entry1</a:t>
-            </a:r>
-            <a:endParaRPr lang="ja-JP" altLang="en-US" sz="1000" dirty="0"/>
-          </a:p>
-        </p:txBody>
-      </p:sp>
-      <p:sp>
-        <p:nvSpPr>
-          <p:cNvPr id="93" name="正方形/長方形 92"/>
-          <p:cNvSpPr/>
-          <p:nvPr/>
-        </p:nvSpPr>
-        <p:spPr>
-          <a:xfrm>
-            <a:off x="1733437" y="2922156"/>
-            <a:ext cx="468213" cy="246221"/>
-          </a:xfrm>
-          <a:prstGeom prst="rect">
-            <a:avLst/>
-          </a:prstGeom>
-        </p:spPr>
-        <p:txBody>
-          <a:bodyPr wrap="square" lIns="91439" tIns="45720" rIns="91439" bIns="45720">
-            <a:spAutoFit/>
-          </a:bodyPr>
-          <a:lstStyle/>
-          <a:p>
-            <a:r>
-              <a:rPr lang="en-US" altLang="ja-JP" sz="1000" dirty="0" smtClean="0"/>
+              <a:rPr lang="en-US" altLang="ja-JP" sz="1000" dirty="0" smtClean="0">
+                <a:solidFill>
+                  <a:schemeClr val="tx2">
+                    <a:lumMod val="60000"/>
+                    <a:lumOff val="40000"/>
+                  </a:schemeClr>
+                </a:solidFill>
+              </a:rPr>
               <a:t>Exit1</a:t>
             </a:r>
-            <a:endParaRPr lang="ja-JP" altLang="en-US" sz="1000" dirty="0"/>
+            <a:endParaRPr lang="ja-JP" altLang="en-US" sz="1000" dirty="0">
+              <a:solidFill>
+                <a:schemeClr val="tx2">
+                  <a:lumMod val="60000"/>
+                  <a:lumOff val="40000"/>
+                </a:schemeClr>
+              </a:solidFill>
+            </a:endParaRPr>
           </a:p>
         </p:txBody>
       </p:sp>
@@ -15496,6 +15494,84 @@
           </a:p>
         </p:txBody>
       </p:sp>
+      <p:sp>
+        <p:nvSpPr>
+          <p:cNvPr id="38" name="正方形/長方形 37"/>
+          <p:cNvSpPr/>
+          <p:nvPr/>
+        </p:nvSpPr>
+        <p:spPr>
+          <a:xfrm>
+            <a:off x="1512515" y="2232273"/>
+            <a:ext cx="670395" cy="246221"/>
+          </a:xfrm>
+          <a:prstGeom prst="rect">
+            <a:avLst/>
+          </a:prstGeom>
+        </p:spPr>
+        <p:txBody>
+          <a:bodyPr wrap="square" lIns="91439" tIns="45720" rIns="91439" bIns="45720">
+            <a:spAutoFit/>
+          </a:bodyPr>
+          <a:lstStyle/>
+          <a:p>
+            <a:r>
+              <a:rPr lang="en-US" altLang="ja-JP" sz="1000" dirty="0" err="1" smtClean="0">
+                <a:solidFill>
+                  <a:schemeClr val="tx2">
+                    <a:lumMod val="60000"/>
+                    <a:lumOff val="40000"/>
+                  </a:schemeClr>
+                </a:solidFill>
+              </a:rPr>
+              <a:t>ScanOnly</a:t>
+            </a:r>
+            <a:endParaRPr lang="ja-JP" altLang="en-US" sz="1000" dirty="0">
+              <a:solidFill>
+                <a:schemeClr val="tx2">
+                  <a:lumMod val="60000"/>
+                  <a:lumOff val="40000"/>
+                </a:schemeClr>
+              </a:solidFill>
+            </a:endParaRPr>
+          </a:p>
+        </p:txBody>
+      </p:sp>
+      <p:sp>
+        <p:nvSpPr>
+          <p:cNvPr id="81" name="正方形/長方形 80"/>
+          <p:cNvSpPr/>
+          <p:nvPr/>
+        </p:nvSpPr>
+        <p:spPr>
+          <a:xfrm>
+            <a:off x="2184873" y="2088257"/>
+            <a:ext cx="1919930" cy="400110"/>
+          </a:xfrm>
+          <a:prstGeom prst="rect">
+            <a:avLst/>
+          </a:prstGeom>
+        </p:spPr>
+        <p:txBody>
+          <a:bodyPr wrap="square" lIns="91439" tIns="45720" rIns="91439" bIns="45720">
+            <a:spAutoFit/>
+          </a:bodyPr>
+          <a:lstStyle/>
+          <a:p>
+            <a:r>
+              <a:rPr lang="en-US" altLang="ja-JP" sz="1000" dirty="0" smtClean="0"/>
+              <a:t>Completed(result)[result == OK]</a:t>
+            </a:r>
+          </a:p>
+          <a:p>
+            <a:r>
+              <a:rPr lang="en-US" altLang="ja-JP" sz="1000" dirty="0" smtClean="0"/>
+              <a:t>/ “Left hand please”</a:t>
+            </a:r>
+            <a:endParaRPr lang="ja-JP" altLang="en-US" sz="1000" dirty="0"/>
+          </a:p>
+        </p:txBody>
+      </p:sp>
     </p:spTree>
     <p:extLst>
       <p:ext uri="{BB962C8B-B14F-4D97-AF65-F5344CB8AC3E}">
@@ -15533,6 +15609,98 @@
           <a:chExt cx="0" cy="0"/>
         </a:xfrm>
       </p:grpSpPr>
+      <p:sp>
+        <p:nvSpPr>
+          <p:cNvPr id="49" name="正方形/長方形 48"/>
+          <p:cNvSpPr/>
+          <p:nvPr/>
+        </p:nvSpPr>
+        <p:spPr>
+          <a:xfrm>
+            <a:off x="576063" y="227477"/>
+            <a:ext cx="3324941" cy="2652868"/>
+          </a:xfrm>
+          <a:prstGeom prst="rect">
+            <a:avLst/>
+          </a:prstGeom>
+          <a:noFill/>
+          <a:ln w="28575">
+            <a:solidFill>
+              <a:schemeClr val="tx1"/>
+            </a:solidFill>
+          </a:ln>
+        </p:spPr>
+        <p:style>
+          <a:lnRef idx="2">
+            <a:schemeClr val="accent1">
+              <a:shade val="50000"/>
+            </a:schemeClr>
+          </a:lnRef>
+          <a:fillRef idx="1">
+            <a:schemeClr val="accent1"/>
+          </a:fillRef>
+          <a:effectRef idx="0">
+            <a:schemeClr val="accent1"/>
+          </a:effectRef>
+          <a:fontRef idx="minor">
+            <a:schemeClr val="lt1"/>
+          </a:fontRef>
+        </p:style>
+        <p:txBody>
+          <a:bodyPr lIns="91439" tIns="45720" rIns="91439" bIns="45720" rtlCol="0" anchor="ctr"/>
+          <a:lstStyle/>
+          <a:p>
+            <a:pPr algn="ctr"/>
+            <a:endParaRPr kumimoji="1" lang="ja-JP" altLang="en-US"/>
+          </a:p>
+        </p:txBody>
+      </p:sp>
+      <p:sp>
+        <p:nvSpPr>
+          <p:cNvPr id="41" name="角丸四角形吹き出し 40"/>
+          <p:cNvSpPr/>
+          <p:nvPr/>
+        </p:nvSpPr>
+        <p:spPr>
+          <a:xfrm>
+            <a:off x="504052" y="3159978"/>
+            <a:ext cx="1440163" cy="288032"/>
+          </a:xfrm>
+          <a:prstGeom prst="wedgeRoundRectCallout">
+            <a:avLst>
+              <a:gd name="adj1" fmla="val -29828"/>
+              <a:gd name="adj2" fmla="val -327276"/>
+              <a:gd name="adj3" fmla="val 16667"/>
+            </a:avLst>
+          </a:prstGeom>
+        </p:spPr>
+        <p:style>
+          <a:lnRef idx="1">
+            <a:schemeClr val="accent6"/>
+          </a:lnRef>
+          <a:fillRef idx="2">
+            <a:schemeClr val="accent6"/>
+          </a:fillRef>
+          <a:effectRef idx="1">
+            <a:schemeClr val="accent6"/>
+          </a:effectRef>
+          <a:fontRef idx="minor">
+            <a:schemeClr val="dk1"/>
+          </a:fontRef>
+        </p:style>
+        <p:txBody>
+          <a:bodyPr rtlCol="0" anchor="ctr"/>
+          <a:lstStyle/>
+          <a:p>
+            <a:pPr algn="ctr"/>
+            <a:r>
+              <a:rPr kumimoji="1" lang="en-US" altLang="ja-JP" dirty="0" smtClean="0"/>
+              <a:t>Event as a template parameter Entry1Event.</a:t>
+            </a:r>
+            <a:endParaRPr kumimoji="1" lang="ja-JP" altLang="en-US" dirty="0"/>
+          </a:p>
+        </p:txBody>
+      </p:sp>
       <p:cxnSp>
         <p:nvCxnSpPr>
           <p:cNvPr id="48" name="直線矢印コネクタ 28"/>
@@ -15544,7 +15712,7 @@
         </p:nvCxnSpPr>
         <p:spPr>
           <a:xfrm flipH="1">
-            <a:off x="1493765" y="634656"/>
+            <a:off x="1565425" y="634656"/>
             <a:ext cx="301" cy="239453"/>
           </a:xfrm>
           <a:prstGeom prst="straightConnector1">
@@ -15574,20 +15742,22 @@
       </p:cxnSp>
       <p:sp>
         <p:nvSpPr>
-          <p:cNvPr id="49" name="正方形/長方形 48"/>
-          <p:cNvSpPr/>
-          <p:nvPr/>
-        </p:nvSpPr>
-        <p:spPr>
-          <a:xfrm>
-            <a:off x="504403" y="227477"/>
-            <a:ext cx="3324941" cy="1471073"/>
-          </a:xfrm>
-          <a:prstGeom prst="rect">
-            <a:avLst/>
+          <p:cNvPr id="50" name="1 つの角を切り取った四角形 49"/>
+          <p:cNvSpPr/>
+          <p:nvPr/>
+        </p:nvSpPr>
+        <p:spPr>
+          <a:xfrm flipV="1">
+            <a:off x="576063" y="235469"/>
+            <a:ext cx="866782" cy="305136"/>
+          </a:xfrm>
+          <a:prstGeom prst="snip1Rect">
+            <a:avLst>
+              <a:gd name="adj" fmla="val 34304"/>
+            </a:avLst>
           </a:prstGeom>
           <a:noFill/>
-          <a:ln w="28575">
+          <a:ln w="19050">
             <a:solidFill>
               <a:schemeClr val="tx1"/>
             </a:solidFill>
@@ -15614,27 +15784,56 @@
           <a:lstStyle/>
           <a:p>
             <a:pPr algn="ctr"/>
-            <a:endParaRPr kumimoji="1" lang="ja-JP" altLang="en-US"/>
-          </a:p>
-        </p:txBody>
-      </p:sp>
-      <p:sp>
-        <p:nvSpPr>
-          <p:cNvPr id="50" name="1 つの角を切り取った四角形 49"/>
-          <p:cNvSpPr/>
-          <p:nvPr/>
-        </p:nvSpPr>
-        <p:spPr>
-          <a:xfrm flipV="1">
-            <a:off x="504403" y="235469"/>
-            <a:ext cx="866782" cy="305136"/>
-          </a:xfrm>
-          <a:prstGeom prst="snip1Rect">
-            <a:avLst>
-              <a:gd name="adj" fmla="val 34304"/>
-            </a:avLst>
-          </a:prstGeom>
-          <a:noFill/>
+            <a:endParaRPr kumimoji="1" lang="ja-JP" altLang="en-US" sz="1000" dirty="0"/>
+          </a:p>
+        </p:txBody>
+      </p:sp>
+      <p:sp>
+        <p:nvSpPr>
+          <p:cNvPr id="53" name="正方形/長方形 52"/>
+          <p:cNvSpPr/>
+          <p:nvPr/>
+        </p:nvSpPr>
+        <p:spPr>
+          <a:xfrm>
+            <a:off x="576064" y="216049"/>
+            <a:ext cx="866781" cy="246221"/>
+          </a:xfrm>
+          <a:prstGeom prst="rect">
+            <a:avLst/>
+          </a:prstGeom>
+        </p:spPr>
+        <p:txBody>
+          <a:bodyPr wrap="square" lIns="91439" tIns="45720" rIns="91439" bIns="45720">
+            <a:spAutoFit/>
+          </a:bodyPr>
+          <a:lstStyle/>
+          <a:p>
+            <a:r>
+              <a:rPr lang="en-US" altLang="ja-JP" sz="1000" dirty="0" err="1" smtClean="0"/>
+              <a:t>ScanFinger</a:t>
+            </a:r>
+            <a:endParaRPr lang="ja-JP" altLang="en-US" sz="1000" dirty="0"/>
+          </a:p>
+        </p:txBody>
+      </p:sp>
+      <p:sp>
+        <p:nvSpPr>
+          <p:cNvPr id="54" name="フローチャート : 結合子 53"/>
+          <p:cNvSpPr/>
+          <p:nvPr/>
+        </p:nvSpPr>
+        <p:spPr>
+          <a:xfrm>
+            <a:off x="1493715" y="490636"/>
+            <a:ext cx="144021" cy="144020"/>
+          </a:xfrm>
+          <a:prstGeom prst="flowChartConnector">
+            <a:avLst/>
+          </a:prstGeom>
+          <a:solidFill>
+            <a:schemeClr val="tx1"/>
+          </a:solidFill>
           <a:ln w="19050">
             <a:solidFill>
               <a:schemeClr val="tx1"/>
@@ -15662,56 +15861,25 @@
           <a:lstStyle/>
           <a:p>
             <a:pPr algn="ctr"/>
-            <a:endParaRPr kumimoji="1" lang="ja-JP" altLang="en-US" sz="1000" dirty="0"/>
-          </a:p>
-        </p:txBody>
-      </p:sp>
-      <p:sp>
-        <p:nvSpPr>
-          <p:cNvPr id="53" name="正方形/長方形 52"/>
-          <p:cNvSpPr/>
-          <p:nvPr/>
-        </p:nvSpPr>
-        <p:spPr>
-          <a:xfrm>
-            <a:off x="504404" y="216049"/>
-            <a:ext cx="866781" cy="246221"/>
-          </a:xfrm>
-          <a:prstGeom prst="rect">
-            <a:avLst/>
-          </a:prstGeom>
-        </p:spPr>
-        <p:txBody>
-          <a:bodyPr wrap="square" lIns="91439" tIns="45720" rIns="91439" bIns="45720">
-            <a:spAutoFit/>
-          </a:bodyPr>
-          <a:lstStyle/>
-          <a:p>
-            <a:r>
-              <a:rPr lang="en-US" altLang="ja-JP" sz="1000" dirty="0" err="1" smtClean="0"/>
-              <a:t>ScanFinger</a:t>
-            </a:r>
-            <a:endParaRPr lang="ja-JP" altLang="en-US" sz="1000" dirty="0"/>
-          </a:p>
-        </p:txBody>
-      </p:sp>
-      <p:sp>
-        <p:nvSpPr>
-          <p:cNvPr id="54" name="フローチャート : 結合子 53"/>
-          <p:cNvSpPr/>
-          <p:nvPr/>
-        </p:nvSpPr>
-        <p:spPr>
-          <a:xfrm>
-            <a:off x="1422055" y="490636"/>
-            <a:ext cx="144021" cy="144020"/>
-          </a:xfrm>
-          <a:prstGeom prst="flowChartConnector">
-            <a:avLst/>
-          </a:prstGeom>
-          <a:solidFill>
-            <a:schemeClr val="tx1"/>
-          </a:solidFill>
+            <a:endParaRPr lang="ja-JP" altLang="en-US" sz="1000"/>
+          </a:p>
+        </p:txBody>
+      </p:sp>
+      <p:sp>
+        <p:nvSpPr>
+          <p:cNvPr id="63" name="角丸四角形 62"/>
+          <p:cNvSpPr/>
+          <p:nvPr/>
+        </p:nvSpPr>
+        <p:spPr>
+          <a:xfrm>
+            <a:off x="1031684" y="874109"/>
+            <a:ext cx="1067481" cy="538736"/>
+          </a:xfrm>
+          <a:prstGeom prst="roundRect">
+            <a:avLst/>
+          </a:prstGeom>
+          <a:noFill/>
           <a:ln w="19050">
             <a:solidFill>
               <a:schemeClr val="tx1"/>
@@ -15735,26 +15903,73 @@
           </a:fontRef>
         </p:style>
         <p:txBody>
-          <a:bodyPr lIns="91439" tIns="45720" rIns="91439" bIns="45720" rtlCol="0" anchor="ctr"/>
+          <a:bodyPr lIns="91439" tIns="45720" rIns="91439" bIns="45720" rtlCol="0" anchor="t" anchorCtr="0"/>
           <a:lstStyle/>
           <a:p>
             <a:pPr algn="ctr"/>
-            <a:endParaRPr lang="ja-JP" altLang="en-US" sz="1000"/>
+            <a:r>
+              <a:rPr lang="en-US" altLang="ja-JP" sz="1000" dirty="0" err="1" smtClean="0">
+                <a:solidFill>
+                  <a:schemeClr val="tx1"/>
+                </a:solidFill>
+              </a:rPr>
+              <a:t>AliveChecking</a:t>
+            </a:r>
+            <a:endParaRPr lang="ja-JP" altLang="en-US" sz="1000" dirty="0">
+              <a:solidFill>
+                <a:schemeClr val="tx1"/>
+              </a:solidFill>
+            </a:endParaRPr>
           </a:p>
         </p:txBody>
       </p:sp>
       <p:cxnSp>
         <p:nvCxnSpPr>
-          <p:cNvPr id="55" name="直線矢印コネクタ 28"/>
+          <p:cNvPr id="64" name="直線コネクタ 63"/>
+          <p:cNvCxnSpPr/>
+          <p:nvPr/>
+        </p:nvCxnSpPr>
+        <p:spPr>
+          <a:xfrm>
+            <a:off x="1036445" y="1128162"/>
+            <a:ext cx="1058562" cy="0"/>
+          </a:xfrm>
+          <a:prstGeom prst="line">
+            <a:avLst/>
+          </a:prstGeom>
+          <a:ln w="12700">
+            <a:solidFill>
+              <a:schemeClr val="tx1"/>
+            </a:solidFill>
+          </a:ln>
+        </p:spPr>
+        <p:style>
+          <a:lnRef idx="1">
+            <a:schemeClr val="accent1"/>
+          </a:lnRef>
+          <a:fillRef idx="0">
+            <a:schemeClr val="accent1"/>
+          </a:fillRef>
+          <a:effectRef idx="0">
+            <a:schemeClr val="accent1"/>
+          </a:effectRef>
+          <a:fontRef idx="minor">
+            <a:schemeClr val="tx1"/>
+          </a:fontRef>
+        </p:style>
+      </p:cxnSp>
+      <p:cxnSp>
+        <p:nvCxnSpPr>
+          <p:cNvPr id="23" name="直線矢印コネクタ 28"/>
           <p:cNvCxnSpPr>
-            <a:stCxn id="56" idx="6"/>
-            <a:endCxn id="63" idx="1"/>
+            <a:stCxn id="24" idx="6"/>
+            <a:endCxn id="30" idx="1"/>
           </p:cNvCxnSpPr>
           <p:nvPr/>
         </p:nvCxnSpPr>
         <p:spPr>
           <a:xfrm>
-            <a:off x="576413" y="1143477"/>
+            <a:off x="648073" y="2339077"/>
             <a:ext cx="383611" cy="0"/>
           </a:xfrm>
           <a:prstGeom prst="straightConnector1">
@@ -15784,13 +15999,13 @@
       </p:cxnSp>
       <p:sp>
         <p:nvSpPr>
-          <p:cNvPr id="56" name="フローチャート : 結合子 55"/>
-          <p:cNvSpPr/>
-          <p:nvPr/>
-        </p:nvSpPr>
-        <p:spPr>
-          <a:xfrm>
-            <a:off x="432392" y="1071467"/>
+          <p:cNvPr id="24" name="フローチャート : 結合子 23"/>
+          <p:cNvSpPr/>
+          <p:nvPr/>
+        </p:nvSpPr>
+        <p:spPr>
+          <a:xfrm>
+            <a:off x="504052" y="2267067"/>
             <a:ext cx="144021" cy="144020"/>
           </a:xfrm>
           <a:prstGeom prst="flowChartConnector">
@@ -15801,7 +16016,10 @@
           </a:solidFill>
           <a:ln w="19050">
             <a:solidFill>
-              <a:schemeClr val="tx1"/>
+              <a:schemeClr val="tx2">
+                <a:lumMod val="60000"/>
+                <a:lumOff val="40000"/>
+              </a:schemeClr>
             </a:solidFill>
           </a:ln>
         </p:spPr>
@@ -15832,13 +16050,13 @@
       </p:sp>
       <p:grpSp>
         <p:nvGrpSpPr>
-          <p:cNvPr id="57" name="グループ化 56"/>
+          <p:cNvPr id="25" name="グループ化 24"/>
           <p:cNvGrpSpPr/>
           <p:nvPr/>
         </p:nvGrpSpPr>
         <p:grpSpPr>
           <a:xfrm>
-            <a:off x="3760915" y="1071471"/>
+            <a:off x="3832575" y="2267071"/>
             <a:ext cx="144017" cy="144016"/>
             <a:chOff x="4067944" y="4720186"/>
             <a:chExt cx="288032" cy="288032"/>
@@ -15849,7 +16067,7 @@
         </p:grpSpPr>
         <p:sp>
           <p:nvSpPr>
-            <p:cNvPr id="58" name="フローチャート : 結合子 57"/>
+            <p:cNvPr id="26" name="フローチャート : 結合子 25"/>
             <p:cNvSpPr/>
             <p:nvPr/>
           </p:nvSpPr>
@@ -15864,7 +16082,10 @@
             <a:grpFill/>
             <a:ln w="19050">
               <a:solidFill>
-                <a:schemeClr val="tx1"/>
+                <a:schemeClr val="tx2">
+                  <a:lumMod val="60000"/>
+                  <a:lumOff val="40000"/>
+                </a:schemeClr>
               </a:solidFill>
             </a:ln>
           </p:spPr>
@@ -15895,10 +16116,10 @@
         </p:sp>
         <p:cxnSp>
           <p:nvCxnSpPr>
-            <p:cNvPr id="59" name="直線コネクタ 58"/>
+            <p:cNvPr id="27" name="直線コネクタ 26"/>
             <p:cNvCxnSpPr>
-              <a:stCxn id="58" idx="1"/>
-              <a:endCxn id="58" idx="5"/>
+              <a:stCxn id="26" idx="1"/>
+              <a:endCxn id="26" idx="5"/>
             </p:cNvCxnSpPr>
             <p:nvPr/>
           </p:nvCxnSpPr>
@@ -15913,7 +16134,10 @@
             <a:grpFill/>
             <a:ln w="19050">
               <a:solidFill>
-                <a:schemeClr val="tx1"/>
+                <a:schemeClr val="tx2">
+                  <a:lumMod val="60000"/>
+                  <a:lumOff val="40000"/>
+                </a:schemeClr>
               </a:solidFill>
             </a:ln>
           </p:spPr>
@@ -15934,10 +16158,10 @@
         </p:cxnSp>
         <p:cxnSp>
           <p:nvCxnSpPr>
-            <p:cNvPr id="60" name="直線コネクタ 59"/>
+            <p:cNvPr id="28" name="直線コネクタ 27"/>
             <p:cNvCxnSpPr>
-              <a:stCxn id="58" idx="7"/>
-              <a:endCxn id="58" idx="3"/>
+              <a:stCxn id="26" idx="7"/>
+              <a:endCxn id="26" idx="3"/>
             </p:cNvCxnSpPr>
             <p:nvPr/>
           </p:nvCxnSpPr>
@@ -15952,7 +16176,10 @@
             <a:grpFill/>
             <a:ln w="19050">
               <a:solidFill>
-                <a:schemeClr val="tx1"/>
+                <a:schemeClr val="tx2">
+                  <a:lumMod val="60000"/>
+                  <a:lumOff val="40000"/>
+                </a:schemeClr>
               </a:solidFill>
             </a:ln>
           </p:spPr>
@@ -15974,14 +16201,14 @@
       </p:grpSp>
       <p:sp>
         <p:nvSpPr>
-          <p:cNvPr id="61" name="正方形/長方形 60"/>
-          <p:cNvSpPr/>
-          <p:nvPr/>
-        </p:nvSpPr>
-        <p:spPr>
-          <a:xfrm>
-            <a:off x="347" y="1143477"/>
-            <a:ext cx="670395" cy="246221"/>
+          <p:cNvPr id="29" name="正方形/長方形 28"/>
+          <p:cNvSpPr/>
+          <p:nvPr/>
+        </p:nvSpPr>
+        <p:spPr>
+          <a:xfrm>
+            <a:off x="3904584" y="2339079"/>
+            <a:ext cx="488251" cy="246221"/>
           </a:xfrm>
           <a:prstGeom prst="rect">
             <a:avLst/>
@@ -15994,51 +16221,36 @@
           <a:lstStyle/>
           <a:p>
             <a:r>
-              <a:rPr lang="en-US" altLang="ja-JP" sz="1000" dirty="0" smtClean="0"/>
-              <a:t>Entry1</a:t>
-            </a:r>
-            <a:endParaRPr lang="ja-JP" altLang="en-US" sz="1000" dirty="0"/>
-          </a:p>
-        </p:txBody>
-      </p:sp>
-      <p:sp>
-        <p:nvSpPr>
-          <p:cNvPr id="62" name="正方形/長方形 61"/>
-          <p:cNvSpPr/>
-          <p:nvPr/>
-        </p:nvSpPr>
-        <p:spPr>
-          <a:xfrm>
-            <a:off x="3832924" y="1143479"/>
-            <a:ext cx="488251" cy="246221"/>
-          </a:xfrm>
-          <a:prstGeom prst="rect">
-            <a:avLst/>
-          </a:prstGeom>
-        </p:spPr>
-        <p:txBody>
-          <a:bodyPr wrap="square" lIns="91439" tIns="45720" rIns="91439" bIns="45720">
-            <a:spAutoFit/>
-          </a:bodyPr>
-          <a:lstStyle/>
-          <a:p>
-            <a:r>
-              <a:rPr lang="en-US" altLang="ja-JP" sz="1000" dirty="0" smtClean="0"/>
+              <a:rPr lang="en-US" altLang="ja-JP" sz="1000" dirty="0" smtClean="0">
+                <a:solidFill>
+                  <a:schemeClr val="tx2">
+                    <a:lumMod val="60000"/>
+                    <a:lumOff val="40000"/>
+                  </a:schemeClr>
+                </a:solidFill>
+              </a:rPr>
               <a:t>Exit1</a:t>
             </a:r>
-            <a:endParaRPr lang="ja-JP" altLang="en-US" sz="1000" dirty="0"/>
-          </a:p>
-        </p:txBody>
-      </p:sp>
-      <p:sp>
-        <p:nvSpPr>
-          <p:cNvPr id="63" name="角丸四角形 62"/>
-          <p:cNvSpPr/>
-          <p:nvPr/>
-        </p:nvSpPr>
-        <p:spPr>
-          <a:xfrm>
-            <a:off x="960024" y="874109"/>
+            <a:endParaRPr lang="ja-JP" altLang="en-US" sz="1000" dirty="0">
+              <a:solidFill>
+                <a:schemeClr val="tx2">
+                  <a:lumMod val="60000"/>
+                  <a:lumOff val="40000"/>
+                </a:schemeClr>
+              </a:solidFill>
+            </a:endParaRPr>
+          </a:p>
+        </p:txBody>
+      </p:sp>
+      <p:sp>
+        <p:nvSpPr>
+          <p:cNvPr id="30" name="角丸四角形 29"/>
+          <p:cNvSpPr/>
+          <p:nvPr/>
+        </p:nvSpPr>
+        <p:spPr>
+          <a:xfrm>
+            <a:off x="1031684" y="2069709"/>
             <a:ext cx="1067481" cy="538736"/>
           </a:xfrm>
           <a:prstGeom prst="roundRect">
@@ -16090,13 +16302,13 @@
       </p:sp>
       <p:cxnSp>
         <p:nvCxnSpPr>
-          <p:cNvPr id="64" name="直線コネクタ 63"/>
+          <p:cNvPr id="31" name="直線コネクタ 30"/>
           <p:cNvCxnSpPr/>
           <p:nvPr/>
         </p:nvCxnSpPr>
         <p:spPr>
           <a:xfrm>
-            <a:off x="964785" y="1128162"/>
+            <a:off x="1036445" y="2323762"/>
             <a:ext cx="1058562" cy="0"/>
           </a:xfrm>
           <a:prstGeom prst="line">
@@ -16125,16 +16337,16 @@
       </p:cxnSp>
       <p:cxnSp>
         <p:nvCxnSpPr>
-          <p:cNvPr id="65" name="直線矢印コネクタ 28"/>
+          <p:cNvPr id="32" name="直線矢印コネクタ 28"/>
           <p:cNvCxnSpPr>
-            <a:stCxn id="63" idx="3"/>
-            <a:endCxn id="58" idx="2"/>
+            <a:stCxn id="30" idx="3"/>
+            <a:endCxn id="26" idx="2"/>
           </p:cNvCxnSpPr>
           <p:nvPr/>
         </p:nvCxnSpPr>
         <p:spPr>
           <a:xfrm>
-            <a:off x="2027505" y="1143477"/>
+            <a:off x="2099165" y="2339077"/>
             <a:ext cx="1733410" cy="2"/>
           </a:xfrm>
           <a:prstGeom prst="straightConnector1">
@@ -16164,13 +16376,13 @@
       </p:cxnSp>
       <p:sp>
         <p:nvSpPr>
-          <p:cNvPr id="66" name="正方形/長方形 65"/>
-          <p:cNvSpPr/>
-          <p:nvPr/>
-        </p:nvSpPr>
-        <p:spPr>
-          <a:xfrm>
-            <a:off x="2055628" y="728052"/>
+          <p:cNvPr id="33" name="正方形/長方形 32"/>
+          <p:cNvSpPr/>
+          <p:nvPr/>
+        </p:nvSpPr>
+        <p:spPr>
+          <a:xfrm>
+            <a:off x="2016571" y="1976179"/>
             <a:ext cx="1828214" cy="400110"/>
           </a:xfrm>
           <a:prstGeom prst="rect">
@@ -16189,11 +16401,7 @@
             </a:r>
             <a:r>
               <a:rPr lang="en-US" altLang="ja-JP" sz="1000" dirty="0" smtClean="0"/>
-              <a:t> </a:t>
-            </a:r>
-            <a:r>
-              <a:rPr lang="en-US" altLang="ja-JP" sz="1000" dirty="0" smtClean="0"/>
-              <a:t>/ </a:t>
+              <a:t> / </a:t>
             </a:r>
             <a:r>
               <a:rPr lang="en-US" altLang="ja-JP" sz="1000" dirty="0" err="1" smtClean="0"/>
@@ -16201,11 +16409,7 @@
             </a:r>
             <a:r>
               <a:rPr lang="en-US" altLang="ja-JP" sz="1000" dirty="0" smtClean="0"/>
-              <a:t>(OK</a:t>
-            </a:r>
-            <a:r>
-              <a:rPr lang="en-US" altLang="ja-JP" sz="1000" dirty="0" smtClean="0"/>
-              <a:t>)</a:t>
+              <a:t>(OK)</a:t>
             </a:r>
             <a:endParaRPr lang="ja-JP" altLang="en-US" sz="1000" dirty="0"/>
           </a:p>
@@ -16213,13 +16417,13 @@
       </p:sp>
       <p:sp>
         <p:nvSpPr>
-          <p:cNvPr id="4" name="フリーフォーム 3"/>
-          <p:cNvSpPr/>
-          <p:nvPr/>
-        </p:nvSpPr>
-        <p:spPr>
-          <a:xfrm>
-            <a:off x="2034540" y="1219200"/>
+          <p:cNvPr id="34" name="フリーフォーム 33"/>
+          <p:cNvSpPr/>
+          <p:nvPr/>
+        </p:nvSpPr>
+        <p:spPr>
+          <a:xfrm>
+            <a:off x="2106200" y="2414800"/>
             <a:ext cx="1767840" cy="106680"/>
           </a:xfrm>
           <a:custGeom>
@@ -16295,13 +16499,13 @@
       </p:sp>
       <p:sp>
         <p:nvSpPr>
-          <p:cNvPr id="79" name="正方形/長方形 78"/>
-          <p:cNvSpPr/>
-          <p:nvPr/>
-        </p:nvSpPr>
-        <p:spPr>
-          <a:xfrm>
-            <a:off x="2055628" y="1272540"/>
+          <p:cNvPr id="35" name="正方形/長方形 34"/>
+          <p:cNvSpPr/>
+          <p:nvPr/>
+        </p:nvSpPr>
+        <p:spPr>
+          <a:xfrm>
+            <a:off x="2016571" y="2468140"/>
             <a:ext cx="1828214" cy="400110"/>
           </a:xfrm>
           <a:prstGeom prst="rect">
@@ -16320,6 +16524,158 @@
             </a:r>
             <a:r>
               <a:rPr lang="en-US" altLang="ja-JP" sz="1000" dirty="0" smtClean="0"/>
+              <a:t> / </a:t>
+            </a:r>
+            <a:r>
+              <a:rPr lang="en-US" altLang="ja-JP" sz="1000" dirty="0" err="1" smtClean="0"/>
+              <a:t>ConvertEvent:Completed</a:t>
+            </a:r>
+            <a:r>
+              <a:rPr lang="en-US" altLang="ja-JP" sz="1000" dirty="0" smtClean="0"/>
+              <a:t>(NG)</a:t>
+            </a:r>
+            <a:endParaRPr lang="ja-JP" altLang="en-US" sz="1000" dirty="0"/>
+          </a:p>
+        </p:txBody>
+      </p:sp>
+      <p:sp>
+        <p:nvSpPr>
+          <p:cNvPr id="36" name="正方形/長方形 35"/>
+          <p:cNvSpPr/>
+          <p:nvPr/>
+        </p:nvSpPr>
+        <p:spPr>
+          <a:xfrm>
+            <a:off x="-71661" y="2421974"/>
+            <a:ext cx="670395" cy="246221"/>
+          </a:xfrm>
+          <a:prstGeom prst="rect">
+            <a:avLst/>
+          </a:prstGeom>
+        </p:spPr>
+        <p:txBody>
+          <a:bodyPr wrap="square" lIns="91439" tIns="45720" rIns="91439" bIns="45720">
+            <a:spAutoFit/>
+          </a:bodyPr>
+          <a:lstStyle/>
+          <a:p>
+            <a:r>
+              <a:rPr lang="en-US" altLang="ja-JP" sz="1000" dirty="0" err="1" smtClean="0">
+                <a:solidFill>
+                  <a:schemeClr val="tx2">
+                    <a:lumMod val="60000"/>
+                    <a:lumOff val="40000"/>
+                  </a:schemeClr>
+                </a:solidFill>
+              </a:rPr>
+              <a:t>ScanOnly</a:t>
+            </a:r>
+            <a:endParaRPr lang="ja-JP" altLang="en-US" sz="1000" dirty="0">
+              <a:solidFill>
+                <a:schemeClr val="tx2">
+                  <a:lumMod val="60000"/>
+                  <a:lumOff val="40000"/>
+                </a:schemeClr>
+              </a:solidFill>
+            </a:endParaRPr>
+          </a:p>
+        </p:txBody>
+      </p:sp>
+      <p:cxnSp>
+        <p:nvCxnSpPr>
+          <p:cNvPr id="37" name="直線矢印コネクタ 28"/>
+          <p:cNvCxnSpPr>
+            <a:stCxn id="63" idx="2"/>
+            <a:endCxn id="30" idx="0"/>
+          </p:cNvCxnSpPr>
+          <p:nvPr/>
+        </p:nvCxnSpPr>
+        <p:spPr>
+          <a:xfrm>
+            <a:off x="1565425" y="1412845"/>
+            <a:ext cx="0" cy="656864"/>
+          </a:xfrm>
+          <a:prstGeom prst="straightConnector1">
+            <a:avLst/>
+          </a:prstGeom>
+          <a:ln w="19050">
+            <a:solidFill>
+              <a:schemeClr val="tx1"/>
+            </a:solidFill>
+            <a:tailEnd type="arrow"/>
+          </a:ln>
+        </p:spPr>
+        <p:style>
+          <a:lnRef idx="1">
+            <a:schemeClr val="accent1"/>
+          </a:lnRef>
+          <a:fillRef idx="0">
+            <a:schemeClr val="accent1"/>
+          </a:fillRef>
+          <a:effectRef idx="0">
+            <a:schemeClr val="accent1"/>
+          </a:effectRef>
+          <a:fontRef idx="minor">
+            <a:schemeClr val="tx1"/>
+          </a:fontRef>
+        </p:style>
+      </p:cxnSp>
+      <p:sp>
+        <p:nvSpPr>
+          <p:cNvPr id="40" name="正方形/長方形 39"/>
+          <p:cNvSpPr/>
+          <p:nvPr/>
+        </p:nvSpPr>
+        <p:spPr>
+          <a:xfrm>
+            <a:off x="1512515" y="1511714"/>
+            <a:ext cx="1828214" cy="246221"/>
+          </a:xfrm>
+          <a:prstGeom prst="rect">
+            <a:avLst/>
+          </a:prstGeom>
+        </p:spPr>
+        <p:txBody>
+          <a:bodyPr wrap="square" lIns="91439" tIns="45720" rIns="91439" bIns="45720">
+            <a:spAutoFit/>
+          </a:bodyPr>
+          <a:lstStyle/>
+          <a:p>
+            <a:r>
+              <a:rPr lang="en-US" altLang="ja-JP" sz="1000" dirty="0" err="1" smtClean="0"/>
+              <a:t>CheckSucceeded</a:t>
+            </a:r>
+            <a:endParaRPr lang="ja-JP" altLang="en-US" sz="1000" dirty="0"/>
+          </a:p>
+        </p:txBody>
+      </p:sp>
+      <p:sp>
+        <p:nvSpPr>
+          <p:cNvPr id="42" name="正方形/長方形 41"/>
+          <p:cNvSpPr/>
+          <p:nvPr/>
+        </p:nvSpPr>
+        <p:spPr>
+          <a:xfrm>
+            <a:off x="2127288" y="864121"/>
+            <a:ext cx="1828214" cy="400110"/>
+          </a:xfrm>
+          <a:prstGeom prst="rect">
+            <a:avLst/>
+          </a:prstGeom>
+        </p:spPr>
+        <p:txBody>
+          <a:bodyPr wrap="square" lIns="91439" tIns="45720" rIns="91439" bIns="45720">
+            <a:spAutoFit/>
+          </a:bodyPr>
+          <a:lstStyle/>
+          <a:p>
+            <a:r>
+              <a:rPr lang="en-US" altLang="ja-JP" sz="1000" dirty="0" err="1" smtClean="0"/>
+              <a:t>CheckFailed</a:t>
+            </a:r>
+            <a:r>
+              <a:rPr lang="en-US" altLang="ja-JP" sz="1000" dirty="0" smtClean="0"/>
               <a:t> </a:t>
             </a:r>
             <a:r>
@@ -16332,62 +16688,51 @@
             </a:r>
             <a:r>
               <a:rPr lang="en-US" altLang="ja-JP" sz="1000" dirty="0" smtClean="0"/>
-              <a:t>(NG</a:t>
-            </a:r>
-            <a:r>
-              <a:rPr lang="en-US" altLang="ja-JP" sz="1000" dirty="0" smtClean="0"/>
-              <a:t>)</a:t>
+              <a:t>(NG)</a:t>
             </a:r>
             <a:endParaRPr lang="ja-JP" altLang="en-US" sz="1000" dirty="0"/>
           </a:p>
         </p:txBody>
       </p:sp>
-      <p:sp>
-        <p:nvSpPr>
-          <p:cNvPr id="5" name="角丸四角形吹き出し 4"/>
-          <p:cNvSpPr/>
-          <p:nvPr/>
-        </p:nvSpPr>
-        <p:spPr>
-          <a:xfrm>
-            <a:off x="432392" y="1944241"/>
-            <a:ext cx="1440163" cy="288032"/>
-          </a:xfrm>
-          <a:prstGeom prst="wedgeRoundRectCallout">
-            <a:avLst>
-              <a:gd name="adj1" fmla="val -29828"/>
-              <a:gd name="adj2" fmla="val -316694"/>
-              <a:gd name="adj3" fmla="val 16667"/>
-            </a:avLst>
-          </a:prstGeom>
+      <p:cxnSp>
+        <p:nvCxnSpPr>
+          <p:cNvPr id="43" name="直線矢印コネクタ 28"/>
+          <p:cNvCxnSpPr>
+            <a:stCxn id="63" idx="3"/>
+            <a:endCxn id="26" idx="1"/>
+          </p:cNvCxnSpPr>
+          <p:nvPr/>
+        </p:nvCxnSpPr>
+        <p:spPr>
+          <a:xfrm>
+            <a:off x="2099165" y="1143477"/>
+            <a:ext cx="1754501" cy="1144685"/>
+          </a:xfrm>
+          <a:prstGeom prst="straightConnector1">
+            <a:avLst/>
+          </a:prstGeom>
+          <a:ln w="19050">
+            <a:solidFill>
+              <a:schemeClr val="tx1"/>
+            </a:solidFill>
+            <a:tailEnd type="arrow"/>
+          </a:ln>
         </p:spPr>
         <p:style>
           <a:lnRef idx="1">
-            <a:schemeClr val="accent6"/>
-          </a:lnRef>
-          <a:fillRef idx="2">
-            <a:schemeClr val="accent6"/>
-          </a:fillRef>
-          <a:effectRef idx="1">
-            <a:schemeClr val="accent6"/>
-          </a:effectRef>
-          <a:fontRef idx="minor">
-            <a:schemeClr val="dk1"/>
-          </a:fontRef>
-        </p:style>
-        <p:txBody>
-          <a:bodyPr rtlCol="0" anchor="ctr"/>
-          <a:lstStyle/>
-          <a:p>
-            <a:pPr algn="ctr"/>
-            <a:r>
-              <a:rPr kumimoji="1" lang="en-US" altLang="ja-JP" dirty="0" smtClean="0"/>
-              <a:t>Event as a template parameter Entry1Event.</a:t>
-            </a:r>
-            <a:endParaRPr kumimoji="1" lang="ja-JP" altLang="en-US" dirty="0"/>
-          </a:p>
-        </p:txBody>
-      </p:sp>
+            <a:schemeClr val="accent1"/>
+          </a:lnRef>
+          <a:fillRef idx="0">
+            <a:schemeClr val="accent1"/>
+          </a:fillRef>
+          <a:effectRef idx="0">
+            <a:schemeClr val="accent1"/>
+          </a:effectRef>
+          <a:fontRef idx="minor">
+            <a:schemeClr val="tx1"/>
+          </a:fontRef>
+        </p:style>
+      </p:cxnSp>
     </p:spTree>
     <p:extLst>
       <p:ext uri="{BB962C8B-B14F-4D97-AF65-F5344CB8AC3E}">

</xml_diff>

<commit_message>
Added explicitly specified event handler.
</commit_message>
<xml_diff>
--- a/boost_training/msm/fig.pptx
+++ b/boost_training/msm/fig.pptx
@@ -5,7 +5,7 @@
     <p:sldMasterId id="2147483648" r:id="rId1"/>
   </p:sldMasterIdLst>
   <p:notesMasterIdLst>
-    <p:notesMasterId r:id="rId37"/>
+    <p:notesMasterId r:id="rId38"/>
   </p:notesMasterIdLst>
   <p:sldIdLst>
     <p:sldId id="257" r:id="rId2"/>
@@ -33,16 +33,17 @@
     <p:sldId id="302" r:id="rId24"/>
     <p:sldId id="292" r:id="rId25"/>
     <p:sldId id="279" r:id="rId26"/>
-    <p:sldId id="273" r:id="rId27"/>
-    <p:sldId id="280" r:id="rId28"/>
-    <p:sldId id="281" r:id="rId29"/>
-    <p:sldId id="274" r:id="rId30"/>
-    <p:sldId id="283" r:id="rId31"/>
-    <p:sldId id="275" r:id="rId32"/>
-    <p:sldId id="278" r:id="rId33"/>
-    <p:sldId id="276" r:id="rId34"/>
-    <p:sldId id="277" r:id="rId35"/>
-    <p:sldId id="258" r:id="rId36"/>
+    <p:sldId id="303" r:id="rId27"/>
+    <p:sldId id="273" r:id="rId28"/>
+    <p:sldId id="280" r:id="rId29"/>
+    <p:sldId id="281" r:id="rId30"/>
+    <p:sldId id="274" r:id="rId31"/>
+    <p:sldId id="283" r:id="rId32"/>
+    <p:sldId id="275" r:id="rId33"/>
+    <p:sldId id="278" r:id="rId34"/>
+    <p:sldId id="276" r:id="rId35"/>
+    <p:sldId id="277" r:id="rId36"/>
+    <p:sldId id="258" r:id="rId37"/>
   </p:sldIdLst>
   <p:sldSz cx="4321175" cy="3600450"/>
   <p:notesSz cx="6858000" cy="9144000"/>
@@ -171,6 +172,7 @@
             <p14:sldId id="302"/>
             <p14:sldId id="292"/>
             <p14:sldId id="279"/>
+            <p14:sldId id="303"/>
             <p14:sldId id="273"/>
             <p14:sldId id="280"/>
             <p14:sldId id="281"/>
@@ -271,7 +273,7 @@
           <a:p>
             <a:fld id="{33E477F9-361B-4780-B227-665A41208240}" type="datetimeFigureOut">
               <a:rPr kumimoji="1" lang="ja-JP" altLang="en-US" smtClean="0"/>
-              <a:t>2012/6/5</a:t>
+              <a:t>2012/6/6</a:t>
             </a:fld>
             <a:endParaRPr kumimoji="1" lang="ja-JP" altLang="en-US"/>
           </a:p>
@@ -3152,6 +3154,95 @@
 </p:notes>
 </file>
 
+<file path=ppt/notesSlides/notesSlide36.xml><?xml version="1.0" encoding="utf-8"?>
+<p:notes xmlns:a="http://schemas.openxmlformats.org/drawingml/2006/main" xmlns:r="http://schemas.openxmlformats.org/officeDocument/2006/relationships" xmlns:p="http://schemas.openxmlformats.org/presentationml/2006/main">
+  <p:cSld>
+    <p:spTree>
+      <p:nvGrpSpPr>
+        <p:cNvPr id="1" name=""/>
+        <p:cNvGrpSpPr/>
+        <p:nvPr/>
+      </p:nvGrpSpPr>
+      <p:grpSpPr>
+        <a:xfrm>
+          <a:off x="0" y="0"/>
+          <a:ext cx="0" cy="0"/>
+          <a:chOff x="0" y="0"/>
+          <a:chExt cx="0" cy="0"/>
+        </a:xfrm>
+      </p:grpSpPr>
+      <p:sp>
+        <p:nvSpPr>
+          <p:cNvPr id="2" name="スライド イメージ プレースホルダー 1"/>
+          <p:cNvSpPr>
+            <a:spLocks noGrp="1" noRot="1" noChangeAspect="1"/>
+          </p:cNvSpPr>
+          <p:nvPr>
+            <p:ph type="sldImg"/>
+          </p:nvPr>
+        </p:nvSpPr>
+        <p:spPr>
+          <a:xfrm>
+            <a:off x="1371600" y="685800"/>
+            <a:ext cx="4114800" cy="3429000"/>
+          </a:xfrm>
+        </p:spPr>
+      </p:sp>
+      <p:sp>
+        <p:nvSpPr>
+          <p:cNvPr id="3" name="ノート プレースホルダー 2"/>
+          <p:cNvSpPr>
+            <a:spLocks noGrp="1"/>
+          </p:cNvSpPr>
+          <p:nvPr>
+            <p:ph type="body" idx="1"/>
+          </p:nvPr>
+        </p:nvSpPr>
+        <p:spPr/>
+        <p:txBody>
+          <a:bodyPr/>
+          <a:lstStyle/>
+          <a:p>
+            <a:endParaRPr kumimoji="1" lang="ja-JP" altLang="en-US" dirty="0"/>
+          </a:p>
+        </p:txBody>
+      </p:sp>
+      <p:sp>
+        <p:nvSpPr>
+          <p:cNvPr id="4" name="スライド番号プレースホルダー 3"/>
+          <p:cNvSpPr>
+            <a:spLocks noGrp="1"/>
+          </p:cNvSpPr>
+          <p:nvPr>
+            <p:ph type="sldNum" sz="quarter" idx="10"/>
+          </p:nvPr>
+        </p:nvSpPr>
+        <p:spPr/>
+        <p:txBody>
+          <a:bodyPr/>
+          <a:lstStyle/>
+          <a:p>
+            <a:fld id="{528CE6EB-F52D-476C-B1B9-A71D981A6739}" type="slidenum">
+              <a:rPr kumimoji="1" lang="ja-JP" altLang="en-US" smtClean="0"/>
+              <a:t>36</a:t>
+            </a:fld>
+            <a:endParaRPr kumimoji="1" lang="ja-JP" altLang="en-US" dirty="0"/>
+          </a:p>
+        </p:txBody>
+      </p:sp>
+    </p:spTree>
+    <p:extLst>
+      <p:ext uri="{BB962C8B-B14F-4D97-AF65-F5344CB8AC3E}">
+        <p14:creationId xmlns:p14="http://schemas.microsoft.com/office/powerpoint/2010/main" val="421502639"/>
+      </p:ext>
+    </p:extLst>
+  </p:cSld>
+  <p:clrMapOvr>
+    <a:masterClrMapping/>
+  </p:clrMapOvr>
+</p:notes>
+</file>
+
 <file path=ppt/notesSlides/notesSlide4.xml><?xml version="1.0" encoding="utf-8"?>
 <p:notes xmlns:a="http://schemas.openxmlformats.org/drawingml/2006/main" xmlns:r="http://schemas.openxmlformats.org/officeDocument/2006/relationships" xmlns:p="http://schemas.openxmlformats.org/presentationml/2006/main">
   <p:cSld>
@@ -3867,7 +3958,7 @@
           <a:p>
             <a:fld id="{E90ED720-0104-4369-84BC-D37694168613}" type="datetimeFigureOut">
               <a:rPr kumimoji="1" lang="ja-JP" altLang="en-US" smtClean="0"/>
-              <a:t>2012/6/5</a:t>
+              <a:t>2012/6/6</a:t>
             </a:fld>
             <a:endParaRPr kumimoji="1" lang="ja-JP" altLang="en-US"/>
           </a:p>
@@ -4064,7 +4155,7 @@
           <a:p>
             <a:fld id="{E90ED720-0104-4369-84BC-D37694168613}" type="datetimeFigureOut">
               <a:rPr kumimoji="1" lang="ja-JP" altLang="en-US" smtClean="0"/>
-              <a:t>2012/6/5</a:t>
+              <a:t>2012/6/6</a:t>
             </a:fld>
             <a:endParaRPr kumimoji="1" lang="ja-JP" altLang="en-US"/>
           </a:p>
@@ -4271,7 +4362,7 @@
           <a:p>
             <a:fld id="{E90ED720-0104-4369-84BC-D37694168613}" type="datetimeFigureOut">
               <a:rPr kumimoji="1" lang="ja-JP" altLang="en-US" smtClean="0"/>
-              <a:t>2012/6/5</a:t>
+              <a:t>2012/6/6</a:t>
             </a:fld>
             <a:endParaRPr kumimoji="1" lang="ja-JP" altLang="en-US"/>
           </a:p>
@@ -4468,7 +4559,7 @@
           <a:p>
             <a:fld id="{E90ED720-0104-4369-84BC-D37694168613}" type="datetimeFigureOut">
               <a:rPr kumimoji="1" lang="ja-JP" altLang="en-US" smtClean="0"/>
-              <a:t>2012/6/5</a:t>
+              <a:t>2012/6/6</a:t>
             </a:fld>
             <a:endParaRPr kumimoji="1" lang="ja-JP" altLang="en-US"/>
           </a:p>
@@ -4709,7 +4800,7 @@
           <a:p>
             <a:fld id="{E90ED720-0104-4369-84BC-D37694168613}" type="datetimeFigureOut">
               <a:rPr kumimoji="1" lang="ja-JP" altLang="en-US" smtClean="0"/>
-              <a:t>2012/6/5</a:t>
+              <a:t>2012/6/6</a:t>
             </a:fld>
             <a:endParaRPr kumimoji="1" lang="ja-JP" altLang="en-US"/>
           </a:p>
@@ -5056,7 +5147,7 @@
           <a:p>
             <a:fld id="{E90ED720-0104-4369-84BC-D37694168613}" type="datetimeFigureOut">
               <a:rPr kumimoji="1" lang="ja-JP" altLang="en-US" smtClean="0"/>
-              <a:t>2012/6/5</a:t>
+              <a:t>2012/6/6</a:t>
             </a:fld>
             <a:endParaRPr kumimoji="1" lang="ja-JP" altLang="en-US"/>
           </a:p>
@@ -5537,7 +5628,7 @@
           <a:p>
             <a:fld id="{E90ED720-0104-4369-84BC-D37694168613}" type="datetimeFigureOut">
               <a:rPr kumimoji="1" lang="ja-JP" altLang="en-US" smtClean="0"/>
-              <a:t>2012/6/5</a:t>
+              <a:t>2012/6/6</a:t>
             </a:fld>
             <a:endParaRPr kumimoji="1" lang="ja-JP" altLang="en-US"/>
           </a:p>
@@ -5650,7 +5741,7 @@
           <a:p>
             <a:fld id="{E90ED720-0104-4369-84BC-D37694168613}" type="datetimeFigureOut">
               <a:rPr kumimoji="1" lang="ja-JP" altLang="en-US" smtClean="0"/>
-              <a:t>2012/6/5</a:t>
+              <a:t>2012/6/6</a:t>
             </a:fld>
             <a:endParaRPr kumimoji="1" lang="ja-JP" altLang="en-US"/>
           </a:p>
@@ -5740,7 +5831,7 @@
           <a:p>
             <a:fld id="{E90ED720-0104-4369-84BC-D37694168613}" type="datetimeFigureOut">
               <a:rPr kumimoji="1" lang="ja-JP" altLang="en-US" smtClean="0"/>
-              <a:t>2012/6/5</a:t>
+              <a:t>2012/6/6</a:t>
             </a:fld>
             <a:endParaRPr kumimoji="1" lang="ja-JP" altLang="en-US"/>
           </a:p>
@@ -6044,7 +6135,7 @@
           <a:p>
             <a:fld id="{E90ED720-0104-4369-84BC-D37694168613}" type="datetimeFigureOut">
               <a:rPr kumimoji="1" lang="ja-JP" altLang="en-US" smtClean="0"/>
-              <a:t>2012/6/5</a:t>
+              <a:t>2012/6/6</a:t>
             </a:fld>
             <a:endParaRPr kumimoji="1" lang="ja-JP" altLang="en-US"/>
           </a:p>
@@ -6292,7 +6383,7 @@
           <a:p>
             <a:fld id="{E90ED720-0104-4369-84BC-D37694168613}" type="datetimeFigureOut">
               <a:rPr kumimoji="1" lang="ja-JP" altLang="en-US" smtClean="0"/>
-              <a:t>2012/6/5</a:t>
+              <a:t>2012/6/6</a:t>
             </a:fld>
             <a:endParaRPr kumimoji="1" lang="ja-JP" altLang="en-US"/>
           </a:p>
@@ -6532,7 +6623,7 @@
           <a:p>
             <a:fld id="{E90ED720-0104-4369-84BC-D37694168613}" type="datetimeFigureOut">
               <a:rPr kumimoji="1" lang="ja-JP" altLang="en-US" smtClean="0"/>
-              <a:t>2012/6/5</a:t>
+              <a:t>2012/6/6</a:t>
             </a:fld>
             <a:endParaRPr kumimoji="1" lang="ja-JP" altLang="en-US"/>
           </a:p>
@@ -23639,7 +23730,7 @@
         </p:nvCxnSpPr>
         <p:spPr>
           <a:xfrm>
-            <a:off x="1967545" y="632502"/>
+            <a:off x="1607505" y="416478"/>
             <a:ext cx="1" cy="179264"/>
           </a:xfrm>
           <a:prstGeom prst="straightConnector1">
@@ -23675,8 +23766,8 @@
         </p:nvSpPr>
         <p:spPr>
           <a:xfrm>
-            <a:off x="506088" y="165135"/>
-            <a:ext cx="2666982" cy="2355171"/>
+            <a:off x="506088" y="165136"/>
+            <a:ext cx="1870523" cy="2211154"/>
           </a:xfrm>
           <a:prstGeom prst="rect">
             <a:avLst/>
@@ -23770,7 +23861,7 @@
         <p:spPr>
           <a:xfrm>
             <a:off x="506095" y="153709"/>
-            <a:ext cx="866781" cy="246221"/>
+            <a:ext cx="1006420" cy="246221"/>
           </a:xfrm>
           <a:prstGeom prst="rect">
             <a:avLst/>
@@ -23783,8 +23874,8 @@
           <a:lstStyle/>
           <a:p>
             <a:r>
-              <a:rPr lang="en-US" altLang="ja-JP" sz="1000" dirty="0" smtClean="0"/>
-              <a:t>State</a:t>
+              <a:rPr lang="en-US" altLang="ja-JP" sz="1000" dirty="0" err="1" smtClean="0"/>
+              <a:t>StateMachine</a:t>
             </a:r>
             <a:endParaRPr lang="ja-JP" altLang="en-US" sz="1000" dirty="0"/>
           </a:p>
@@ -23798,7 +23889,7 @@
         </p:nvSpPr>
         <p:spPr>
           <a:xfrm>
-            <a:off x="1433805" y="811766"/>
+            <a:off x="1073765" y="595742"/>
             <a:ext cx="1067481" cy="538736"/>
           </a:xfrm>
           <a:prstGeom prst="roundRect">
@@ -23856,7 +23947,7 @@
         </p:nvCxnSpPr>
         <p:spPr>
           <a:xfrm>
-            <a:off x="1438560" y="1065819"/>
+            <a:off x="1078520" y="849795"/>
             <a:ext cx="1058562" cy="0"/>
           </a:xfrm>
           <a:prstGeom prst="line">
@@ -23891,7 +23982,7 @@
         </p:nvSpPr>
         <p:spPr>
           <a:xfrm>
-            <a:off x="1895534" y="488483"/>
+            <a:off x="1535494" y="272459"/>
             <a:ext cx="144021" cy="144020"/>
           </a:xfrm>
           <a:prstGeom prst="flowChartConnector">
@@ -23939,8 +24030,8 @@
         </p:nvSpPr>
         <p:spPr>
           <a:xfrm>
-            <a:off x="1433803" y="1800225"/>
-            <a:ext cx="1067481" cy="538736"/>
+            <a:off x="1073763" y="1584201"/>
+            <a:ext cx="1067481" cy="648072"/>
           </a:xfrm>
           <a:prstGeom prst="roundRect">
             <a:avLst/>
@@ -23979,7 +24070,7 @@
                   <a:schemeClr val="tx1"/>
                 </a:solidFill>
               </a:rPr>
-              <a:t>State2:StateSub</a:t>
+              <a:t>State2</a:t>
             </a:r>
             <a:endParaRPr lang="ja-JP" altLang="en-US" sz="1000" dirty="0">
               <a:solidFill>
@@ -23997,7 +24088,7 @@
         </p:nvCxnSpPr>
         <p:spPr>
           <a:xfrm>
-            <a:off x="1449639" y="2097523"/>
+            <a:off x="1089599" y="1881499"/>
             <a:ext cx="1058562" cy="0"/>
           </a:xfrm>
           <a:prstGeom prst="line">
@@ -24027,15 +24118,12 @@
       <p:cxnSp>
         <p:nvCxnSpPr>
           <p:cNvPr id="23" name="直線矢印コネクタ 28"/>
-          <p:cNvCxnSpPr>
-            <a:stCxn id="153" idx="2"/>
-            <a:endCxn id="44" idx="0"/>
-          </p:cNvCxnSpPr>
+          <p:cNvCxnSpPr/>
           <p:nvPr/>
         </p:nvCxnSpPr>
         <p:spPr>
           <a:xfrm flipH="1">
-            <a:off x="1967538" y="1350505"/>
+            <a:off x="1440507" y="1134478"/>
             <a:ext cx="2" cy="449723"/>
           </a:xfrm>
           <a:prstGeom prst="straightConnector1">
@@ -24071,7 +24159,7 @@
         </p:nvSpPr>
         <p:spPr>
           <a:xfrm>
-            <a:off x="1462143" y="1436228"/>
+            <a:off x="864443" y="1220204"/>
             <a:ext cx="866781" cy="246221"/>
           </a:xfrm>
           <a:prstGeom prst="rect">
@@ -24092,6 +24180,167 @@
           </a:p>
         </p:txBody>
       </p:sp>
+      <p:sp>
+        <p:nvSpPr>
+          <p:cNvPr id="13" name="テキスト ボックス 12"/>
+          <p:cNvSpPr txBox="1"/>
+          <p:nvPr/>
+        </p:nvSpPr>
+        <p:spPr>
+          <a:xfrm>
+            <a:off x="1038709" y="792113"/>
+            <a:ext cx="1481918" cy="400110"/>
+          </a:xfrm>
+          <a:prstGeom prst="rect">
+            <a:avLst/>
+          </a:prstGeom>
+          <a:noFill/>
+          <a:ln>
+            <a:noFill/>
+          </a:ln>
+        </p:spPr>
+        <p:txBody>
+          <a:bodyPr wrap="square" lIns="91439" tIns="45720" rIns="91439" bIns="45720" rtlCol="0">
+            <a:spAutoFit/>
+          </a:bodyPr>
+          <a:lstStyle/>
+          <a:p>
+            <a:r>
+              <a:rPr lang="en-US" altLang="ja-JP" sz="1000" dirty="0"/>
+              <a:t>entry / </a:t>
+            </a:r>
+            <a:r>
+              <a:rPr lang="en-US" altLang="ja-JP" sz="1000" dirty="0" err="1" smtClean="0"/>
+              <a:t>on_entry</a:t>
+            </a:r>
+            <a:endParaRPr lang="en-US" altLang="ja-JP" sz="1000" dirty="0" smtClean="0"/>
+          </a:p>
+          <a:p>
+            <a:r>
+              <a:rPr lang="en-US" altLang="ja-JP" sz="1000" dirty="0" smtClean="0"/>
+              <a:t>exit / </a:t>
+            </a:r>
+            <a:r>
+              <a:rPr lang="en-US" altLang="ja-JP" sz="1000" dirty="0" err="1" smtClean="0"/>
+              <a:t>on_exit</a:t>
+            </a:r>
+            <a:endParaRPr lang="en-US" altLang="ja-JP" sz="1000" dirty="0"/>
+          </a:p>
+        </p:txBody>
+      </p:sp>
+      <p:sp>
+        <p:nvSpPr>
+          <p:cNvPr id="14" name="テキスト ボックス 13"/>
+          <p:cNvSpPr txBox="1"/>
+          <p:nvPr/>
+        </p:nvSpPr>
+        <p:spPr>
+          <a:xfrm>
+            <a:off x="1038709" y="1832163"/>
+            <a:ext cx="1481918" cy="400110"/>
+          </a:xfrm>
+          <a:prstGeom prst="rect">
+            <a:avLst/>
+          </a:prstGeom>
+          <a:noFill/>
+          <a:ln>
+            <a:noFill/>
+          </a:ln>
+        </p:spPr>
+        <p:txBody>
+          <a:bodyPr wrap="square" lIns="91439" tIns="45720" rIns="91439" bIns="45720" rtlCol="0">
+            <a:spAutoFit/>
+          </a:bodyPr>
+          <a:lstStyle/>
+          <a:p>
+            <a:r>
+              <a:rPr lang="en-US" altLang="ja-JP" sz="1000" dirty="0"/>
+              <a:t>entry / </a:t>
+            </a:r>
+            <a:r>
+              <a:rPr lang="en-US" altLang="ja-JP" sz="1000" dirty="0" err="1" smtClean="0"/>
+              <a:t>on_entry</a:t>
+            </a:r>
+            <a:endParaRPr lang="en-US" altLang="ja-JP" sz="1000" dirty="0" smtClean="0"/>
+          </a:p>
+          <a:p>
+            <a:r>
+              <a:rPr lang="en-US" altLang="ja-JP" sz="1000" dirty="0" smtClean="0"/>
+              <a:t>exit / </a:t>
+            </a:r>
+            <a:r>
+              <a:rPr lang="en-US" altLang="ja-JP" sz="1000" dirty="0" err="1" smtClean="0"/>
+              <a:t>on_exit</a:t>
+            </a:r>
+            <a:endParaRPr lang="en-US" altLang="ja-JP" sz="1000" dirty="0"/>
+          </a:p>
+        </p:txBody>
+      </p:sp>
+      <p:sp>
+        <p:nvSpPr>
+          <p:cNvPr id="16" name="正方形/長方形 15"/>
+          <p:cNvSpPr/>
+          <p:nvPr/>
+        </p:nvSpPr>
+        <p:spPr>
+          <a:xfrm>
+            <a:off x="1725854" y="1220204"/>
+            <a:ext cx="866781" cy="246221"/>
+          </a:xfrm>
+          <a:prstGeom prst="rect">
+            <a:avLst/>
+          </a:prstGeom>
+        </p:spPr>
+        <p:txBody>
+          <a:bodyPr wrap="square" lIns="91439" tIns="45720" rIns="91439" bIns="45720">
+            <a:spAutoFit/>
+          </a:bodyPr>
+          <a:lstStyle/>
+          <a:p>
+            <a:r>
+              <a:rPr lang="en-US" altLang="ja-JP" sz="1000" dirty="0" smtClean="0"/>
+              <a:t>Event2</a:t>
+            </a:r>
+            <a:endParaRPr lang="ja-JP" altLang="en-US" sz="1000" dirty="0"/>
+          </a:p>
+        </p:txBody>
+      </p:sp>
+      <p:cxnSp>
+        <p:nvCxnSpPr>
+          <p:cNvPr id="17" name="直線矢印コネクタ 28"/>
+          <p:cNvCxnSpPr/>
+          <p:nvPr/>
+        </p:nvCxnSpPr>
+        <p:spPr>
+          <a:xfrm flipH="1" flipV="1">
+            <a:off x="1728537" y="1134478"/>
+            <a:ext cx="2" cy="449723"/>
+          </a:xfrm>
+          <a:prstGeom prst="straightConnector1">
+            <a:avLst/>
+          </a:prstGeom>
+          <a:ln w="19050">
+            <a:solidFill>
+              <a:schemeClr val="tx1"/>
+            </a:solidFill>
+            <a:tailEnd type="arrow"/>
+          </a:ln>
+        </p:spPr>
+        <p:style>
+          <a:lnRef idx="1">
+            <a:schemeClr val="accent1"/>
+          </a:lnRef>
+          <a:fillRef idx="0">
+            <a:schemeClr val="accent1"/>
+          </a:fillRef>
+          <a:effectRef idx="0">
+            <a:schemeClr val="accent1"/>
+          </a:effectRef>
+          <a:fontRef idx="minor">
+            <a:schemeClr val="tx1"/>
+          </a:fontRef>
+        </p:style>
+      </p:cxnSp>
     </p:spTree>
     <p:extLst>
       <p:ext uri="{BB962C8B-B14F-4D97-AF65-F5344CB8AC3E}">
@@ -24284,8 +24533,8 @@
           <a:lstStyle/>
           <a:p>
             <a:r>
-              <a:rPr lang="en-US" altLang="ja-JP" sz="1000" dirty="0" err="1" smtClean="0"/>
-              <a:t>StateSub</a:t>
+              <a:rPr lang="en-US" altLang="ja-JP" sz="1000" dirty="0" smtClean="0"/>
+              <a:t>State</a:t>
             </a:r>
             <a:endParaRPr lang="ja-JP" altLang="en-US" sz="1000" dirty="0"/>
           </a:p>
@@ -24339,7 +24588,7 @@
                   <a:schemeClr val="tx1"/>
                 </a:solidFill>
               </a:rPr>
-              <a:t>SubState1</a:t>
+              <a:t>State1</a:t>
             </a:r>
             <a:endParaRPr lang="ja-JP" altLang="en-US" sz="1000" dirty="0">
               <a:solidFill>
@@ -24440,7 +24689,7 @@
         </p:nvSpPr>
         <p:spPr>
           <a:xfrm>
-            <a:off x="1444884" y="1843471"/>
+            <a:off x="1433803" y="1800225"/>
             <a:ext cx="1067481" cy="538736"/>
           </a:xfrm>
           <a:prstGeom prst="roundRect">
@@ -24480,7 +24729,7 @@
                   <a:schemeClr val="tx1"/>
                 </a:solidFill>
               </a:rPr>
-              <a:t>SubState2</a:t>
+              <a:t>State2:StateSub</a:t>
             </a:r>
             <a:endParaRPr lang="ja-JP" altLang="en-US" sz="1000" dirty="0">
               <a:solidFill>
@@ -24529,15 +24778,15 @@
         <p:nvCxnSpPr>
           <p:cNvPr id="23" name="直線矢印コネクタ 28"/>
           <p:cNvCxnSpPr>
-            <a:stCxn id="24" idx="4"/>
+            <a:stCxn id="153" idx="2"/>
             <a:endCxn id="44" idx="0"/>
           </p:cNvCxnSpPr>
           <p:nvPr/>
         </p:nvCxnSpPr>
         <p:spPr>
           <a:xfrm flipH="1">
-            <a:off x="1978623" y="1645156"/>
-            <a:ext cx="301" cy="198314"/>
+            <a:off x="1967538" y="1350505"/>
+            <a:ext cx="2" cy="449723"/>
           </a:xfrm>
           <a:prstGeom prst="straightConnector1">
             <a:avLst/>
@@ -24566,100 +24815,14 @@
       </p:cxnSp>
       <p:sp>
         <p:nvSpPr>
-          <p:cNvPr id="24" name="フローチャート : 結合子 23"/>
-          <p:cNvSpPr/>
-          <p:nvPr/>
-        </p:nvSpPr>
-        <p:spPr>
-          <a:xfrm>
-            <a:off x="1906915" y="1501136"/>
-            <a:ext cx="144021" cy="144020"/>
-          </a:xfrm>
-          <a:prstGeom prst="flowChartConnector">
-            <a:avLst/>
-          </a:prstGeom>
-          <a:solidFill>
-            <a:schemeClr val="tx1"/>
-          </a:solidFill>
-          <a:ln w="19050">
-            <a:solidFill>
-              <a:schemeClr val="tx1"/>
-            </a:solidFill>
-          </a:ln>
-        </p:spPr>
-        <p:style>
-          <a:lnRef idx="2">
-            <a:schemeClr val="accent1">
-              <a:shade val="50000"/>
-            </a:schemeClr>
-          </a:lnRef>
-          <a:fillRef idx="1">
-            <a:schemeClr val="accent1"/>
-          </a:fillRef>
-          <a:effectRef idx="0">
-            <a:schemeClr val="accent1"/>
-          </a:effectRef>
-          <a:fontRef idx="minor">
-            <a:schemeClr val="lt1"/>
-          </a:fontRef>
-        </p:style>
-        <p:txBody>
-          <a:bodyPr lIns="91439" tIns="45720" rIns="91439" bIns="45720" rtlCol="0" anchor="ctr"/>
-          <a:lstStyle/>
-          <a:p>
-            <a:pPr algn="ctr"/>
-            <a:endParaRPr lang="ja-JP" altLang="en-US" sz="1000"/>
-          </a:p>
-        </p:txBody>
-      </p:sp>
-      <p:cxnSp>
-        <p:nvCxnSpPr>
-          <p:cNvPr id="35" name="直線矢印コネクタ 28"/>
-          <p:cNvCxnSpPr/>
-          <p:nvPr/>
-        </p:nvCxnSpPr>
-        <p:spPr>
-          <a:xfrm>
-            <a:off x="506090" y="1424936"/>
-            <a:ext cx="2666980" cy="0"/>
-          </a:xfrm>
-          <a:prstGeom prst="straightConnector1">
-            <a:avLst/>
-          </a:prstGeom>
-          <a:ln w="19050">
-            <a:solidFill>
-              <a:schemeClr val="tx1"/>
-            </a:solidFill>
-            <a:prstDash val="dash"/>
-            <a:headEnd type="none" w="med" len="med"/>
-            <a:tailEnd type="none" w="med" len="med"/>
-          </a:ln>
-        </p:spPr>
-        <p:style>
-          <a:lnRef idx="1">
-            <a:schemeClr val="accent1"/>
-          </a:lnRef>
-          <a:fillRef idx="0">
-            <a:schemeClr val="accent1"/>
-          </a:fillRef>
-          <a:effectRef idx="0">
-            <a:schemeClr val="accent1"/>
-          </a:effectRef>
-          <a:fontRef idx="minor">
-            <a:schemeClr val="tx1"/>
-          </a:fontRef>
-        </p:style>
-      </p:cxnSp>
-      <p:sp>
-        <p:nvSpPr>
-          <p:cNvPr id="43" name="正方形/長方形 42"/>
-          <p:cNvSpPr/>
-          <p:nvPr/>
-        </p:nvSpPr>
-        <p:spPr>
-          <a:xfrm>
-            <a:off x="604287" y="834916"/>
-            <a:ext cx="670395" cy="246221"/>
+          <p:cNvPr id="18" name="正方形/長方形 17"/>
+          <p:cNvSpPr/>
+          <p:nvPr/>
+        </p:nvSpPr>
+        <p:spPr>
+          <a:xfrm>
+            <a:off x="1462143" y="1436228"/>
+            <a:ext cx="866781" cy="246221"/>
           </a:xfrm>
           <a:prstGeom prst="rect">
             <a:avLst/>
@@ -24673,36 +24836,7 @@
           <a:p>
             <a:r>
               <a:rPr lang="en-US" altLang="ja-JP" sz="1000" dirty="0" smtClean="0"/>
-              <a:t>Region0</a:t>
-            </a:r>
-            <a:endParaRPr lang="ja-JP" altLang="en-US" sz="1000" dirty="0"/>
-          </a:p>
-        </p:txBody>
-      </p:sp>
-      <p:sp>
-        <p:nvSpPr>
-          <p:cNvPr id="47" name="正方形/長方形 46"/>
-          <p:cNvSpPr/>
-          <p:nvPr/>
-        </p:nvSpPr>
-        <p:spPr>
-          <a:xfrm>
-            <a:off x="604287" y="1573149"/>
-            <a:ext cx="670395" cy="246221"/>
-          </a:xfrm>
-          <a:prstGeom prst="rect">
-            <a:avLst/>
-          </a:prstGeom>
-        </p:spPr>
-        <p:txBody>
-          <a:bodyPr wrap="square" lIns="91439" tIns="45720" rIns="91439" bIns="45720">
-            <a:spAutoFit/>
-          </a:bodyPr>
-          <a:lstStyle/>
-          <a:p>
-            <a:r>
-              <a:rPr lang="en-US" altLang="ja-JP" sz="1000" smtClean="0"/>
-              <a:t>Region1</a:t>
+              <a:t>Event1</a:t>
             </a:r>
             <a:endParaRPr lang="ja-JP" altLang="en-US" sz="1000" dirty="0"/>
           </a:p>
@@ -24711,7 +24845,7 @@
     </p:spTree>
     <p:extLst>
       <p:ext uri="{BB962C8B-B14F-4D97-AF65-F5344CB8AC3E}">
-        <p14:creationId xmlns:p14="http://schemas.microsoft.com/office/powerpoint/2010/main" val="2957654480"/>
+        <p14:creationId xmlns:p14="http://schemas.microsoft.com/office/powerpoint/2010/main" val="322636346"/>
       </p:ext>
     </p:extLst>
   </p:cSld>
@@ -25317,6 +25451,622 @@
           <a:lstStyle/>
           <a:p>
             <a:r>
+              <a:rPr lang="en-US" altLang="ja-JP" sz="1000" smtClean="0"/>
+              <a:t>Region1</a:t>
+            </a:r>
+            <a:endParaRPr lang="ja-JP" altLang="en-US" sz="1000" dirty="0"/>
+          </a:p>
+        </p:txBody>
+      </p:sp>
+    </p:spTree>
+    <p:extLst>
+      <p:ext uri="{BB962C8B-B14F-4D97-AF65-F5344CB8AC3E}">
+        <p14:creationId xmlns:p14="http://schemas.microsoft.com/office/powerpoint/2010/main" val="2957654480"/>
+      </p:ext>
+    </p:extLst>
+  </p:cSld>
+  <p:clrMapOvr>
+    <a:masterClrMapping/>
+  </p:clrMapOvr>
+  <p:timing>
+    <p:tnLst>
+      <p:par>
+        <p:cTn id="1" dur="indefinite" restart="never" nodeType="tmRoot"/>
+      </p:par>
+    </p:tnLst>
+  </p:timing>
+</p:sld>
+</file>
+
+<file path=ppt/slides/slide28.xml><?xml version="1.0" encoding="utf-8"?>
+<p:sld xmlns:a="http://schemas.openxmlformats.org/drawingml/2006/main" xmlns:r="http://schemas.openxmlformats.org/officeDocument/2006/relationships" xmlns:p="http://schemas.openxmlformats.org/presentationml/2006/main">
+  <p:cSld>
+    <p:spTree>
+      <p:nvGrpSpPr>
+        <p:cNvPr id="1" name=""/>
+        <p:cNvGrpSpPr/>
+        <p:nvPr/>
+      </p:nvGrpSpPr>
+      <p:grpSpPr>
+        <a:xfrm>
+          <a:off x="0" y="0"/>
+          <a:ext cx="0" cy="0"/>
+          <a:chOff x="0" y="0"/>
+          <a:chExt cx="0" cy="0"/>
+        </a:xfrm>
+      </p:grpSpPr>
+      <p:cxnSp>
+        <p:nvCxnSpPr>
+          <p:cNvPr id="142" name="直線矢印コネクタ 28"/>
+          <p:cNvCxnSpPr>
+            <a:stCxn id="163" idx="4"/>
+            <a:endCxn id="153" idx="0"/>
+          </p:cNvCxnSpPr>
+          <p:nvPr/>
+        </p:nvCxnSpPr>
+        <p:spPr>
+          <a:xfrm>
+            <a:off x="1967545" y="632502"/>
+            <a:ext cx="1" cy="179264"/>
+          </a:xfrm>
+          <a:prstGeom prst="straightConnector1">
+            <a:avLst/>
+          </a:prstGeom>
+          <a:ln w="19050">
+            <a:solidFill>
+              <a:schemeClr val="tx1"/>
+            </a:solidFill>
+            <a:tailEnd type="arrow"/>
+          </a:ln>
+        </p:spPr>
+        <p:style>
+          <a:lnRef idx="1">
+            <a:schemeClr val="accent1"/>
+          </a:lnRef>
+          <a:fillRef idx="0">
+            <a:schemeClr val="accent1"/>
+          </a:fillRef>
+          <a:effectRef idx="0">
+            <a:schemeClr val="accent1"/>
+          </a:effectRef>
+          <a:fontRef idx="minor">
+            <a:schemeClr val="tx1"/>
+          </a:fontRef>
+        </p:style>
+      </p:cxnSp>
+      <p:sp>
+        <p:nvSpPr>
+          <p:cNvPr id="150" name="正方形/長方形 149"/>
+          <p:cNvSpPr/>
+          <p:nvPr/>
+        </p:nvSpPr>
+        <p:spPr>
+          <a:xfrm>
+            <a:off x="506088" y="165135"/>
+            <a:ext cx="2666982" cy="2355171"/>
+          </a:xfrm>
+          <a:prstGeom prst="rect">
+            <a:avLst/>
+          </a:prstGeom>
+          <a:noFill/>
+          <a:ln w="28575">
+            <a:solidFill>
+              <a:schemeClr val="tx1"/>
+            </a:solidFill>
+          </a:ln>
+        </p:spPr>
+        <p:style>
+          <a:lnRef idx="2">
+            <a:schemeClr val="accent1">
+              <a:shade val="50000"/>
+            </a:schemeClr>
+          </a:lnRef>
+          <a:fillRef idx="1">
+            <a:schemeClr val="accent1"/>
+          </a:fillRef>
+          <a:effectRef idx="0">
+            <a:schemeClr val="accent1"/>
+          </a:effectRef>
+          <a:fontRef idx="minor">
+            <a:schemeClr val="lt1"/>
+          </a:fontRef>
+        </p:style>
+        <p:txBody>
+          <a:bodyPr lIns="91439" tIns="45720" rIns="91439" bIns="45720" rtlCol="0" anchor="ctr"/>
+          <a:lstStyle/>
+          <a:p>
+            <a:pPr algn="ctr"/>
+            <a:endParaRPr kumimoji="1" lang="ja-JP" altLang="en-US"/>
+          </a:p>
+        </p:txBody>
+      </p:sp>
+      <p:sp>
+        <p:nvSpPr>
+          <p:cNvPr id="151" name="1 つの角を切り取った四角形 150"/>
+          <p:cNvSpPr/>
+          <p:nvPr/>
+        </p:nvSpPr>
+        <p:spPr>
+          <a:xfrm flipV="1">
+            <a:off x="506088" y="173127"/>
+            <a:ext cx="866782" cy="305136"/>
+          </a:xfrm>
+          <a:prstGeom prst="snip1Rect">
+            <a:avLst>
+              <a:gd name="adj" fmla="val 34304"/>
+            </a:avLst>
+          </a:prstGeom>
+          <a:noFill/>
+          <a:ln w="19050">
+            <a:solidFill>
+              <a:schemeClr val="tx1"/>
+            </a:solidFill>
+          </a:ln>
+        </p:spPr>
+        <p:style>
+          <a:lnRef idx="2">
+            <a:schemeClr val="accent1">
+              <a:shade val="50000"/>
+            </a:schemeClr>
+          </a:lnRef>
+          <a:fillRef idx="1">
+            <a:schemeClr val="accent1"/>
+          </a:fillRef>
+          <a:effectRef idx="0">
+            <a:schemeClr val="accent1"/>
+          </a:effectRef>
+          <a:fontRef idx="minor">
+            <a:schemeClr val="lt1"/>
+          </a:fontRef>
+        </p:style>
+        <p:txBody>
+          <a:bodyPr lIns="91439" tIns="45720" rIns="91439" bIns="45720" rtlCol="0" anchor="ctr"/>
+          <a:lstStyle/>
+          <a:p>
+            <a:pPr algn="ctr"/>
+            <a:endParaRPr kumimoji="1" lang="ja-JP" altLang="en-US" sz="1000" dirty="0"/>
+          </a:p>
+        </p:txBody>
+      </p:sp>
+      <p:sp>
+        <p:nvSpPr>
+          <p:cNvPr id="152" name="正方形/長方形 151"/>
+          <p:cNvSpPr/>
+          <p:nvPr/>
+        </p:nvSpPr>
+        <p:spPr>
+          <a:xfrm>
+            <a:off x="506095" y="153709"/>
+            <a:ext cx="866781" cy="246221"/>
+          </a:xfrm>
+          <a:prstGeom prst="rect">
+            <a:avLst/>
+          </a:prstGeom>
+        </p:spPr>
+        <p:txBody>
+          <a:bodyPr wrap="square" lIns="91439" tIns="45720" rIns="91439" bIns="45720">
+            <a:spAutoFit/>
+          </a:bodyPr>
+          <a:lstStyle/>
+          <a:p>
+            <a:r>
+              <a:rPr lang="en-US" altLang="ja-JP" sz="1000" dirty="0" err="1" smtClean="0"/>
+              <a:t>StateSub</a:t>
+            </a:r>
+            <a:endParaRPr lang="ja-JP" altLang="en-US" sz="1000" dirty="0"/>
+          </a:p>
+        </p:txBody>
+      </p:sp>
+      <p:sp>
+        <p:nvSpPr>
+          <p:cNvPr id="153" name="角丸四角形 152"/>
+          <p:cNvSpPr/>
+          <p:nvPr/>
+        </p:nvSpPr>
+        <p:spPr>
+          <a:xfrm>
+            <a:off x="1433805" y="811766"/>
+            <a:ext cx="1067481" cy="538736"/>
+          </a:xfrm>
+          <a:prstGeom prst="roundRect">
+            <a:avLst/>
+          </a:prstGeom>
+          <a:noFill/>
+          <a:ln w="19050">
+            <a:solidFill>
+              <a:schemeClr val="tx1"/>
+            </a:solidFill>
+          </a:ln>
+        </p:spPr>
+        <p:style>
+          <a:lnRef idx="2">
+            <a:schemeClr val="accent1">
+              <a:shade val="50000"/>
+            </a:schemeClr>
+          </a:lnRef>
+          <a:fillRef idx="1">
+            <a:schemeClr val="accent1"/>
+          </a:fillRef>
+          <a:effectRef idx="0">
+            <a:schemeClr val="accent1"/>
+          </a:effectRef>
+          <a:fontRef idx="minor">
+            <a:schemeClr val="lt1"/>
+          </a:fontRef>
+        </p:style>
+        <p:txBody>
+          <a:bodyPr lIns="91439" tIns="45720" rIns="91439" bIns="45720" rtlCol="0" anchor="t" anchorCtr="0"/>
+          <a:lstStyle/>
+          <a:p>
+            <a:pPr algn="ctr"/>
+            <a:r>
+              <a:rPr lang="en-US" altLang="ja-JP" sz="1000" dirty="0" smtClean="0">
+                <a:solidFill>
+                  <a:schemeClr val="tx1"/>
+                </a:solidFill>
+              </a:rPr>
+              <a:t>SubState1</a:t>
+            </a:r>
+            <a:endParaRPr lang="ja-JP" altLang="en-US" sz="1000" dirty="0">
+              <a:solidFill>
+                <a:schemeClr val="tx1"/>
+              </a:solidFill>
+            </a:endParaRPr>
+          </a:p>
+        </p:txBody>
+      </p:sp>
+      <p:cxnSp>
+        <p:nvCxnSpPr>
+          <p:cNvPr id="154" name="直線コネクタ 153"/>
+          <p:cNvCxnSpPr/>
+          <p:nvPr/>
+        </p:nvCxnSpPr>
+        <p:spPr>
+          <a:xfrm>
+            <a:off x="1438560" y="1065819"/>
+            <a:ext cx="1058562" cy="0"/>
+          </a:xfrm>
+          <a:prstGeom prst="line">
+            <a:avLst/>
+          </a:prstGeom>
+          <a:ln w="12700">
+            <a:solidFill>
+              <a:schemeClr val="tx1"/>
+            </a:solidFill>
+          </a:ln>
+        </p:spPr>
+        <p:style>
+          <a:lnRef idx="1">
+            <a:schemeClr val="accent1"/>
+          </a:lnRef>
+          <a:fillRef idx="0">
+            <a:schemeClr val="accent1"/>
+          </a:fillRef>
+          <a:effectRef idx="0">
+            <a:schemeClr val="accent1"/>
+          </a:effectRef>
+          <a:fontRef idx="minor">
+            <a:schemeClr val="tx1"/>
+          </a:fontRef>
+        </p:style>
+      </p:cxnSp>
+      <p:sp>
+        <p:nvSpPr>
+          <p:cNvPr id="163" name="フローチャート : 結合子 162"/>
+          <p:cNvSpPr/>
+          <p:nvPr/>
+        </p:nvSpPr>
+        <p:spPr>
+          <a:xfrm>
+            <a:off x="1895534" y="488483"/>
+            <a:ext cx="144021" cy="144020"/>
+          </a:xfrm>
+          <a:prstGeom prst="flowChartConnector">
+            <a:avLst/>
+          </a:prstGeom>
+          <a:solidFill>
+            <a:schemeClr val="tx1"/>
+          </a:solidFill>
+          <a:ln w="19050">
+            <a:solidFill>
+              <a:schemeClr val="tx1"/>
+            </a:solidFill>
+          </a:ln>
+        </p:spPr>
+        <p:style>
+          <a:lnRef idx="2">
+            <a:schemeClr val="accent1">
+              <a:shade val="50000"/>
+            </a:schemeClr>
+          </a:lnRef>
+          <a:fillRef idx="1">
+            <a:schemeClr val="accent1"/>
+          </a:fillRef>
+          <a:effectRef idx="0">
+            <a:schemeClr val="accent1"/>
+          </a:effectRef>
+          <a:fontRef idx="minor">
+            <a:schemeClr val="lt1"/>
+          </a:fontRef>
+        </p:style>
+        <p:txBody>
+          <a:bodyPr lIns="91439" tIns="45720" rIns="91439" bIns="45720" rtlCol="0" anchor="ctr"/>
+          <a:lstStyle/>
+          <a:p>
+            <a:pPr algn="ctr"/>
+            <a:endParaRPr lang="ja-JP" altLang="en-US" sz="1000"/>
+          </a:p>
+        </p:txBody>
+      </p:sp>
+      <p:sp>
+        <p:nvSpPr>
+          <p:cNvPr id="44" name="角丸四角形 43"/>
+          <p:cNvSpPr/>
+          <p:nvPr/>
+        </p:nvSpPr>
+        <p:spPr>
+          <a:xfrm>
+            <a:off x="1444884" y="1843471"/>
+            <a:ext cx="1067481" cy="538736"/>
+          </a:xfrm>
+          <a:prstGeom prst="roundRect">
+            <a:avLst/>
+          </a:prstGeom>
+          <a:noFill/>
+          <a:ln w="19050">
+            <a:solidFill>
+              <a:schemeClr val="tx1"/>
+            </a:solidFill>
+          </a:ln>
+        </p:spPr>
+        <p:style>
+          <a:lnRef idx="2">
+            <a:schemeClr val="accent1">
+              <a:shade val="50000"/>
+            </a:schemeClr>
+          </a:lnRef>
+          <a:fillRef idx="1">
+            <a:schemeClr val="accent1"/>
+          </a:fillRef>
+          <a:effectRef idx="0">
+            <a:schemeClr val="accent1"/>
+          </a:effectRef>
+          <a:fontRef idx="minor">
+            <a:schemeClr val="lt1"/>
+          </a:fontRef>
+        </p:style>
+        <p:txBody>
+          <a:bodyPr lIns="91439" tIns="45720" rIns="91439" bIns="45720" rtlCol="0" anchor="t" anchorCtr="0"/>
+          <a:lstStyle/>
+          <a:p>
+            <a:pPr algn="ctr"/>
+            <a:r>
+              <a:rPr lang="en-US" altLang="ja-JP" sz="1000" dirty="0" smtClean="0">
+                <a:solidFill>
+                  <a:schemeClr val="tx1"/>
+                </a:solidFill>
+              </a:rPr>
+              <a:t>SubState2</a:t>
+            </a:r>
+            <a:endParaRPr lang="ja-JP" altLang="en-US" sz="1000" dirty="0">
+              <a:solidFill>
+                <a:schemeClr val="tx1"/>
+              </a:solidFill>
+            </a:endParaRPr>
+          </a:p>
+        </p:txBody>
+      </p:sp>
+      <p:cxnSp>
+        <p:nvCxnSpPr>
+          <p:cNvPr id="45" name="直線コネクタ 44"/>
+          <p:cNvCxnSpPr/>
+          <p:nvPr/>
+        </p:nvCxnSpPr>
+        <p:spPr>
+          <a:xfrm>
+            <a:off x="1449639" y="2097523"/>
+            <a:ext cx="1058562" cy="0"/>
+          </a:xfrm>
+          <a:prstGeom prst="line">
+            <a:avLst/>
+          </a:prstGeom>
+          <a:ln w="12700">
+            <a:solidFill>
+              <a:schemeClr val="tx1"/>
+            </a:solidFill>
+          </a:ln>
+        </p:spPr>
+        <p:style>
+          <a:lnRef idx="1">
+            <a:schemeClr val="accent1"/>
+          </a:lnRef>
+          <a:fillRef idx="0">
+            <a:schemeClr val="accent1"/>
+          </a:fillRef>
+          <a:effectRef idx="0">
+            <a:schemeClr val="accent1"/>
+          </a:effectRef>
+          <a:fontRef idx="minor">
+            <a:schemeClr val="tx1"/>
+          </a:fontRef>
+        </p:style>
+      </p:cxnSp>
+      <p:cxnSp>
+        <p:nvCxnSpPr>
+          <p:cNvPr id="23" name="直線矢印コネクタ 28"/>
+          <p:cNvCxnSpPr>
+            <a:stCxn id="24" idx="4"/>
+            <a:endCxn id="44" idx="0"/>
+          </p:cNvCxnSpPr>
+          <p:nvPr/>
+        </p:nvCxnSpPr>
+        <p:spPr>
+          <a:xfrm flipH="1">
+            <a:off x="1978623" y="1645156"/>
+            <a:ext cx="301" cy="198314"/>
+          </a:xfrm>
+          <a:prstGeom prst="straightConnector1">
+            <a:avLst/>
+          </a:prstGeom>
+          <a:ln w="19050">
+            <a:solidFill>
+              <a:schemeClr val="tx1"/>
+            </a:solidFill>
+            <a:tailEnd type="arrow"/>
+          </a:ln>
+        </p:spPr>
+        <p:style>
+          <a:lnRef idx="1">
+            <a:schemeClr val="accent1"/>
+          </a:lnRef>
+          <a:fillRef idx="0">
+            <a:schemeClr val="accent1"/>
+          </a:fillRef>
+          <a:effectRef idx="0">
+            <a:schemeClr val="accent1"/>
+          </a:effectRef>
+          <a:fontRef idx="minor">
+            <a:schemeClr val="tx1"/>
+          </a:fontRef>
+        </p:style>
+      </p:cxnSp>
+      <p:sp>
+        <p:nvSpPr>
+          <p:cNvPr id="24" name="フローチャート : 結合子 23"/>
+          <p:cNvSpPr/>
+          <p:nvPr/>
+        </p:nvSpPr>
+        <p:spPr>
+          <a:xfrm>
+            <a:off x="1906915" y="1501136"/>
+            <a:ext cx="144021" cy="144020"/>
+          </a:xfrm>
+          <a:prstGeom prst="flowChartConnector">
+            <a:avLst/>
+          </a:prstGeom>
+          <a:solidFill>
+            <a:schemeClr val="tx1"/>
+          </a:solidFill>
+          <a:ln w="19050">
+            <a:solidFill>
+              <a:schemeClr val="tx1"/>
+            </a:solidFill>
+          </a:ln>
+        </p:spPr>
+        <p:style>
+          <a:lnRef idx="2">
+            <a:schemeClr val="accent1">
+              <a:shade val="50000"/>
+            </a:schemeClr>
+          </a:lnRef>
+          <a:fillRef idx="1">
+            <a:schemeClr val="accent1"/>
+          </a:fillRef>
+          <a:effectRef idx="0">
+            <a:schemeClr val="accent1"/>
+          </a:effectRef>
+          <a:fontRef idx="minor">
+            <a:schemeClr val="lt1"/>
+          </a:fontRef>
+        </p:style>
+        <p:txBody>
+          <a:bodyPr lIns="91439" tIns="45720" rIns="91439" bIns="45720" rtlCol="0" anchor="ctr"/>
+          <a:lstStyle/>
+          <a:p>
+            <a:pPr algn="ctr"/>
+            <a:endParaRPr lang="ja-JP" altLang="en-US" sz="1000"/>
+          </a:p>
+        </p:txBody>
+      </p:sp>
+      <p:cxnSp>
+        <p:nvCxnSpPr>
+          <p:cNvPr id="35" name="直線矢印コネクタ 28"/>
+          <p:cNvCxnSpPr/>
+          <p:nvPr/>
+        </p:nvCxnSpPr>
+        <p:spPr>
+          <a:xfrm>
+            <a:off x="506090" y="1424936"/>
+            <a:ext cx="2666980" cy="0"/>
+          </a:xfrm>
+          <a:prstGeom prst="straightConnector1">
+            <a:avLst/>
+          </a:prstGeom>
+          <a:ln w="19050">
+            <a:solidFill>
+              <a:schemeClr val="tx1"/>
+            </a:solidFill>
+            <a:prstDash val="dash"/>
+            <a:headEnd type="none" w="med" len="med"/>
+            <a:tailEnd type="none" w="med" len="med"/>
+          </a:ln>
+        </p:spPr>
+        <p:style>
+          <a:lnRef idx="1">
+            <a:schemeClr val="accent1"/>
+          </a:lnRef>
+          <a:fillRef idx="0">
+            <a:schemeClr val="accent1"/>
+          </a:fillRef>
+          <a:effectRef idx="0">
+            <a:schemeClr val="accent1"/>
+          </a:effectRef>
+          <a:fontRef idx="minor">
+            <a:schemeClr val="tx1"/>
+          </a:fontRef>
+        </p:style>
+      </p:cxnSp>
+      <p:sp>
+        <p:nvSpPr>
+          <p:cNvPr id="43" name="正方形/長方形 42"/>
+          <p:cNvSpPr/>
+          <p:nvPr/>
+        </p:nvSpPr>
+        <p:spPr>
+          <a:xfrm>
+            <a:off x="604287" y="834916"/>
+            <a:ext cx="670395" cy="246221"/>
+          </a:xfrm>
+          <a:prstGeom prst="rect">
+            <a:avLst/>
+          </a:prstGeom>
+        </p:spPr>
+        <p:txBody>
+          <a:bodyPr wrap="square" lIns="91439" tIns="45720" rIns="91439" bIns="45720">
+            <a:spAutoFit/>
+          </a:bodyPr>
+          <a:lstStyle/>
+          <a:p>
+            <a:r>
+              <a:rPr lang="en-US" altLang="ja-JP" sz="1000" dirty="0" smtClean="0"/>
+              <a:t>Region0</a:t>
+            </a:r>
+            <a:endParaRPr lang="ja-JP" altLang="en-US" sz="1000" dirty="0"/>
+          </a:p>
+        </p:txBody>
+      </p:sp>
+      <p:sp>
+        <p:nvSpPr>
+          <p:cNvPr id="47" name="正方形/長方形 46"/>
+          <p:cNvSpPr/>
+          <p:nvPr/>
+        </p:nvSpPr>
+        <p:spPr>
+          <a:xfrm>
+            <a:off x="604287" y="1573149"/>
+            <a:ext cx="670395" cy="246221"/>
+          </a:xfrm>
+          <a:prstGeom prst="rect">
+            <a:avLst/>
+          </a:prstGeom>
+        </p:spPr>
+        <p:txBody>
+          <a:bodyPr wrap="square" lIns="91439" tIns="45720" rIns="91439" bIns="45720">
+            <a:spAutoFit/>
+          </a:bodyPr>
+          <a:lstStyle/>
+          <a:p>
+            <a:r>
               <a:rPr lang="en-US" altLang="ja-JP" sz="1000" dirty="0" smtClean="0"/>
               <a:t>Region1</a:t>
             </a:r>
@@ -25462,7 +26212,7 @@
 </p:sld>
 </file>
 
-<file path=ppt/slides/slide28.xml><?xml version="1.0" encoding="utf-8"?>
+<file path=ppt/slides/slide29.xml><?xml version="1.0" encoding="utf-8"?>
 <p:sld xmlns:a="http://schemas.openxmlformats.org/drawingml/2006/main" xmlns:r="http://schemas.openxmlformats.org/officeDocument/2006/relationships" xmlns:p="http://schemas.openxmlformats.org/presentationml/2006/main">
   <p:cSld>
     <p:spTree>
@@ -26252,7 +27002,631 @@
 </p:sld>
 </file>
 
-<file path=ppt/slides/slide29.xml><?xml version="1.0" encoding="utf-8"?>
+<file path=ppt/slides/slide3.xml><?xml version="1.0" encoding="utf-8"?>
+<p:sld xmlns:a="http://schemas.openxmlformats.org/drawingml/2006/main" xmlns:r="http://schemas.openxmlformats.org/officeDocument/2006/relationships" xmlns:p="http://schemas.openxmlformats.org/presentationml/2006/main">
+  <p:cSld>
+    <p:spTree>
+      <p:nvGrpSpPr>
+        <p:cNvPr id="1" name=""/>
+        <p:cNvGrpSpPr/>
+        <p:nvPr/>
+      </p:nvGrpSpPr>
+      <p:grpSpPr>
+        <a:xfrm>
+          <a:off x="0" y="0"/>
+          <a:ext cx="0" cy="0"/>
+          <a:chOff x="0" y="0"/>
+          <a:chExt cx="0" cy="0"/>
+        </a:xfrm>
+      </p:grpSpPr>
+      <p:cxnSp>
+        <p:nvCxnSpPr>
+          <p:cNvPr id="142" name="直線矢印コネクタ 28"/>
+          <p:cNvCxnSpPr>
+            <a:stCxn id="163" idx="4"/>
+            <a:endCxn id="153" idx="0"/>
+          </p:cNvCxnSpPr>
+          <p:nvPr/>
+        </p:nvCxnSpPr>
+        <p:spPr>
+          <a:xfrm flipH="1">
+            <a:off x="1554697" y="399927"/>
+            <a:ext cx="2380" cy="203130"/>
+          </a:xfrm>
+          <a:prstGeom prst="straightConnector1">
+            <a:avLst/>
+          </a:prstGeom>
+          <a:ln w="19050">
+            <a:solidFill>
+              <a:schemeClr val="tx1"/>
+            </a:solidFill>
+            <a:tailEnd type="arrow"/>
+          </a:ln>
+        </p:spPr>
+        <p:style>
+          <a:lnRef idx="1">
+            <a:schemeClr val="accent1"/>
+          </a:lnRef>
+          <a:fillRef idx="0">
+            <a:schemeClr val="accent1"/>
+          </a:fillRef>
+          <a:effectRef idx="0">
+            <a:schemeClr val="accent1"/>
+          </a:effectRef>
+          <a:fontRef idx="minor">
+            <a:schemeClr val="tx1"/>
+          </a:fontRef>
+        </p:style>
+      </p:cxnSp>
+      <p:sp>
+        <p:nvSpPr>
+          <p:cNvPr id="150" name="正方形/長方形 149"/>
+          <p:cNvSpPr/>
+          <p:nvPr/>
+        </p:nvSpPr>
+        <p:spPr>
+          <a:xfrm>
+            <a:off x="141682" y="165137"/>
+            <a:ext cx="2378949" cy="2787219"/>
+          </a:xfrm>
+          <a:prstGeom prst="rect">
+            <a:avLst/>
+          </a:prstGeom>
+          <a:noFill/>
+          <a:ln w="28575">
+            <a:solidFill>
+              <a:schemeClr val="tx1"/>
+            </a:solidFill>
+          </a:ln>
+        </p:spPr>
+        <p:style>
+          <a:lnRef idx="2">
+            <a:schemeClr val="accent1">
+              <a:shade val="50000"/>
+            </a:schemeClr>
+          </a:lnRef>
+          <a:fillRef idx="1">
+            <a:schemeClr val="accent1"/>
+          </a:fillRef>
+          <a:effectRef idx="0">
+            <a:schemeClr val="accent1"/>
+          </a:effectRef>
+          <a:fontRef idx="minor">
+            <a:schemeClr val="lt1"/>
+          </a:fontRef>
+        </p:style>
+        <p:txBody>
+          <a:bodyPr lIns="91439" tIns="45720" rIns="91439" bIns="45720" rtlCol="0" anchor="ctr"/>
+          <a:lstStyle/>
+          <a:p>
+            <a:pPr algn="ctr"/>
+            <a:endParaRPr kumimoji="1" lang="ja-JP" altLang="en-US"/>
+          </a:p>
+        </p:txBody>
+      </p:sp>
+      <p:sp>
+        <p:nvSpPr>
+          <p:cNvPr id="151" name="1 つの角を切り取った四角形 150"/>
+          <p:cNvSpPr/>
+          <p:nvPr/>
+        </p:nvSpPr>
+        <p:spPr>
+          <a:xfrm flipV="1">
+            <a:off x="141678" y="173127"/>
+            <a:ext cx="680940" cy="305136"/>
+          </a:xfrm>
+          <a:prstGeom prst="snip1Rect">
+            <a:avLst>
+              <a:gd name="adj" fmla="val 34304"/>
+            </a:avLst>
+          </a:prstGeom>
+          <a:noFill/>
+          <a:ln w="19050">
+            <a:solidFill>
+              <a:schemeClr val="tx1"/>
+            </a:solidFill>
+          </a:ln>
+        </p:spPr>
+        <p:style>
+          <a:lnRef idx="2">
+            <a:schemeClr val="accent1">
+              <a:shade val="50000"/>
+            </a:schemeClr>
+          </a:lnRef>
+          <a:fillRef idx="1">
+            <a:schemeClr val="accent1"/>
+          </a:fillRef>
+          <a:effectRef idx="0">
+            <a:schemeClr val="accent1"/>
+          </a:effectRef>
+          <a:fontRef idx="minor">
+            <a:schemeClr val="lt1"/>
+          </a:fontRef>
+        </p:style>
+        <p:txBody>
+          <a:bodyPr lIns="91439" tIns="45720" rIns="91439" bIns="45720" rtlCol="0" anchor="ctr"/>
+          <a:lstStyle/>
+          <a:p>
+            <a:pPr algn="ctr"/>
+            <a:endParaRPr kumimoji="1" lang="ja-JP" altLang="en-US" sz="1000" dirty="0"/>
+          </a:p>
+        </p:txBody>
+      </p:sp>
+      <p:sp>
+        <p:nvSpPr>
+          <p:cNvPr id="152" name="正方形/長方形 151"/>
+          <p:cNvSpPr/>
+          <p:nvPr/>
+        </p:nvSpPr>
+        <p:spPr>
+          <a:xfrm>
+            <a:off x="141684" y="153709"/>
+            <a:ext cx="689537" cy="246221"/>
+          </a:xfrm>
+          <a:prstGeom prst="rect">
+            <a:avLst/>
+          </a:prstGeom>
+        </p:spPr>
+        <p:txBody>
+          <a:bodyPr wrap="square" lIns="91439" tIns="45720" rIns="91439" bIns="45720">
+            <a:spAutoFit/>
+          </a:bodyPr>
+          <a:lstStyle/>
+          <a:p>
+            <a:r>
+              <a:rPr lang="en-US" altLang="ja-JP" sz="1000" dirty="0" err="1" smtClean="0"/>
+              <a:t>InitAction</a:t>
+            </a:r>
+            <a:endParaRPr lang="ja-JP" altLang="en-US" sz="1000" dirty="0"/>
+          </a:p>
+        </p:txBody>
+      </p:sp>
+      <p:sp>
+        <p:nvSpPr>
+          <p:cNvPr id="153" name="角丸四角形 152"/>
+          <p:cNvSpPr/>
+          <p:nvPr/>
+        </p:nvSpPr>
+        <p:spPr>
+          <a:xfrm>
+            <a:off x="811363" y="603058"/>
+            <a:ext cx="1486679" cy="720080"/>
+          </a:xfrm>
+          <a:prstGeom prst="roundRect">
+            <a:avLst/>
+          </a:prstGeom>
+          <a:noFill/>
+          <a:ln w="19050">
+            <a:solidFill>
+              <a:schemeClr val="tx1"/>
+            </a:solidFill>
+          </a:ln>
+        </p:spPr>
+        <p:style>
+          <a:lnRef idx="2">
+            <a:schemeClr val="accent1">
+              <a:shade val="50000"/>
+            </a:schemeClr>
+          </a:lnRef>
+          <a:fillRef idx="1">
+            <a:schemeClr val="accent1"/>
+          </a:fillRef>
+          <a:effectRef idx="0">
+            <a:schemeClr val="accent1"/>
+          </a:effectRef>
+          <a:fontRef idx="minor">
+            <a:schemeClr val="lt1"/>
+          </a:fontRef>
+        </p:style>
+        <p:txBody>
+          <a:bodyPr lIns="91439" tIns="45720" rIns="91439" bIns="45720" rtlCol="0" anchor="t" anchorCtr="0"/>
+          <a:lstStyle/>
+          <a:p>
+            <a:pPr algn="ctr"/>
+            <a:r>
+              <a:rPr lang="en-US" altLang="ja-JP" sz="1000" dirty="0" err="1" smtClean="0">
+                <a:solidFill>
+                  <a:schemeClr val="tx1"/>
+                </a:solidFill>
+              </a:rPr>
+              <a:t>Init</a:t>
+            </a:r>
+            <a:endParaRPr lang="ja-JP" altLang="en-US" sz="1000" dirty="0">
+              <a:solidFill>
+                <a:schemeClr val="tx1"/>
+              </a:solidFill>
+            </a:endParaRPr>
+          </a:p>
+        </p:txBody>
+      </p:sp>
+      <p:cxnSp>
+        <p:nvCxnSpPr>
+          <p:cNvPr id="154" name="直線コネクタ 153"/>
+          <p:cNvCxnSpPr/>
+          <p:nvPr/>
+        </p:nvCxnSpPr>
+        <p:spPr>
+          <a:xfrm>
+            <a:off x="816124" y="857110"/>
+            <a:ext cx="1478787" cy="0"/>
+          </a:xfrm>
+          <a:prstGeom prst="line">
+            <a:avLst/>
+          </a:prstGeom>
+          <a:ln w="12700">
+            <a:solidFill>
+              <a:schemeClr val="tx1"/>
+            </a:solidFill>
+          </a:ln>
+        </p:spPr>
+        <p:style>
+          <a:lnRef idx="1">
+            <a:schemeClr val="accent1"/>
+          </a:lnRef>
+          <a:fillRef idx="0">
+            <a:schemeClr val="accent1"/>
+          </a:fillRef>
+          <a:effectRef idx="0">
+            <a:schemeClr val="accent1"/>
+          </a:effectRef>
+          <a:fontRef idx="minor">
+            <a:schemeClr val="tx1"/>
+          </a:fontRef>
+        </p:style>
+      </p:cxnSp>
+      <p:sp>
+        <p:nvSpPr>
+          <p:cNvPr id="163" name="フローチャート : 結合子 162"/>
+          <p:cNvSpPr/>
+          <p:nvPr/>
+        </p:nvSpPr>
+        <p:spPr>
+          <a:xfrm>
+            <a:off x="1485072" y="255908"/>
+            <a:ext cx="144021" cy="144020"/>
+          </a:xfrm>
+          <a:prstGeom prst="flowChartConnector">
+            <a:avLst/>
+          </a:prstGeom>
+          <a:solidFill>
+            <a:schemeClr val="tx1"/>
+          </a:solidFill>
+          <a:ln w="19050">
+            <a:solidFill>
+              <a:schemeClr val="tx1"/>
+            </a:solidFill>
+          </a:ln>
+        </p:spPr>
+        <p:style>
+          <a:lnRef idx="2">
+            <a:schemeClr val="accent1">
+              <a:shade val="50000"/>
+            </a:schemeClr>
+          </a:lnRef>
+          <a:fillRef idx="1">
+            <a:schemeClr val="accent1"/>
+          </a:fillRef>
+          <a:effectRef idx="0">
+            <a:schemeClr val="accent1"/>
+          </a:effectRef>
+          <a:fontRef idx="minor">
+            <a:schemeClr val="lt1"/>
+          </a:fontRef>
+        </p:style>
+        <p:txBody>
+          <a:bodyPr lIns="91439" tIns="45720" rIns="91439" bIns="45720" rtlCol="0" anchor="ctr"/>
+          <a:lstStyle/>
+          <a:p>
+            <a:pPr algn="ctr"/>
+            <a:endParaRPr lang="ja-JP" altLang="en-US" sz="1000"/>
+          </a:p>
+        </p:txBody>
+      </p:sp>
+      <p:sp>
+        <p:nvSpPr>
+          <p:cNvPr id="164" name="正方形/長方形 163"/>
+          <p:cNvSpPr/>
+          <p:nvPr/>
+        </p:nvSpPr>
+        <p:spPr>
+          <a:xfrm>
+            <a:off x="1589832" y="2448300"/>
+            <a:ext cx="724930" cy="246221"/>
+          </a:xfrm>
+          <a:prstGeom prst="rect">
+            <a:avLst/>
+          </a:prstGeom>
+        </p:spPr>
+        <p:txBody>
+          <a:bodyPr wrap="square" lIns="91439" tIns="45720" rIns="91439" bIns="45720">
+            <a:spAutoFit/>
+          </a:bodyPr>
+          <a:lstStyle/>
+          <a:p>
+            <a:r>
+              <a:rPr lang="en-US" altLang="ja-JP" sz="1000" dirty="0" smtClean="0"/>
+              <a:t>Event1</a:t>
+            </a:r>
+            <a:endParaRPr lang="ja-JP" altLang="en-US" sz="1000" dirty="0"/>
+          </a:p>
+        </p:txBody>
+      </p:sp>
+      <p:cxnSp>
+        <p:nvCxnSpPr>
+          <p:cNvPr id="21" name="直線矢印コネクタ 28"/>
+          <p:cNvCxnSpPr>
+            <a:stCxn id="153" idx="2"/>
+            <a:endCxn id="14" idx="0"/>
+          </p:cNvCxnSpPr>
+          <p:nvPr/>
+        </p:nvCxnSpPr>
+        <p:spPr>
+          <a:xfrm>
+            <a:off x="1554697" y="1323137"/>
+            <a:ext cx="2380" cy="405080"/>
+          </a:xfrm>
+          <a:prstGeom prst="straightConnector1">
+            <a:avLst/>
+          </a:prstGeom>
+          <a:ln w="19050">
+            <a:solidFill>
+              <a:schemeClr val="tx1"/>
+            </a:solidFill>
+            <a:tailEnd type="arrow"/>
+          </a:ln>
+        </p:spPr>
+        <p:style>
+          <a:lnRef idx="1">
+            <a:schemeClr val="accent1"/>
+          </a:lnRef>
+          <a:fillRef idx="0">
+            <a:schemeClr val="accent1"/>
+          </a:fillRef>
+          <a:effectRef idx="0">
+            <a:schemeClr val="accent1"/>
+          </a:effectRef>
+          <a:fontRef idx="minor">
+            <a:schemeClr val="tx1"/>
+          </a:fontRef>
+        </p:style>
+      </p:cxnSp>
+      <p:sp>
+        <p:nvSpPr>
+          <p:cNvPr id="18" name="正方形/長方形 17"/>
+          <p:cNvSpPr/>
+          <p:nvPr/>
+        </p:nvSpPr>
+        <p:spPr>
+          <a:xfrm>
+            <a:off x="1629087" y="1402569"/>
+            <a:ext cx="819532" cy="246221"/>
+          </a:xfrm>
+          <a:prstGeom prst="rect">
+            <a:avLst/>
+          </a:prstGeom>
+        </p:spPr>
+        <p:txBody>
+          <a:bodyPr wrap="square" lIns="91439" tIns="45720" rIns="91439" bIns="45720">
+            <a:spAutoFit/>
+          </a:bodyPr>
+          <a:lstStyle/>
+          <a:p>
+            <a:r>
+              <a:rPr lang="en-US" altLang="ja-JP" sz="1000" dirty="0" smtClean="0"/>
+              <a:t>/</a:t>
+            </a:r>
+            <a:r>
+              <a:rPr lang="en-US" altLang="ja-JP" sz="1000" dirty="0" err="1" smtClean="0"/>
+              <a:t>InitAction</a:t>
+            </a:r>
+            <a:endParaRPr lang="ja-JP" altLang="en-US" sz="1000" dirty="0"/>
+          </a:p>
+        </p:txBody>
+      </p:sp>
+      <p:sp>
+        <p:nvSpPr>
+          <p:cNvPr id="14" name="角丸四角形 13"/>
+          <p:cNvSpPr/>
+          <p:nvPr/>
+        </p:nvSpPr>
+        <p:spPr>
+          <a:xfrm>
+            <a:off x="813743" y="1728217"/>
+            <a:ext cx="1486679" cy="720080"/>
+          </a:xfrm>
+          <a:prstGeom prst="roundRect">
+            <a:avLst/>
+          </a:prstGeom>
+          <a:noFill/>
+          <a:ln w="19050">
+            <a:solidFill>
+              <a:schemeClr val="tx1"/>
+            </a:solidFill>
+          </a:ln>
+        </p:spPr>
+        <p:style>
+          <a:lnRef idx="2">
+            <a:schemeClr val="accent1">
+              <a:shade val="50000"/>
+            </a:schemeClr>
+          </a:lnRef>
+          <a:fillRef idx="1">
+            <a:schemeClr val="accent1"/>
+          </a:fillRef>
+          <a:effectRef idx="0">
+            <a:schemeClr val="accent1"/>
+          </a:effectRef>
+          <a:fontRef idx="minor">
+            <a:schemeClr val="lt1"/>
+          </a:fontRef>
+        </p:style>
+        <p:txBody>
+          <a:bodyPr lIns="91439" tIns="45720" rIns="91439" bIns="45720" rtlCol="0" anchor="t" anchorCtr="0"/>
+          <a:lstStyle/>
+          <a:p>
+            <a:pPr algn="ctr"/>
+            <a:r>
+              <a:rPr lang="en-US" altLang="ja-JP" sz="1000" dirty="0" smtClean="0">
+                <a:solidFill>
+                  <a:schemeClr val="tx1"/>
+                </a:solidFill>
+              </a:rPr>
+              <a:t>State1</a:t>
+            </a:r>
+            <a:endParaRPr lang="ja-JP" altLang="en-US" sz="1000" dirty="0">
+              <a:solidFill>
+                <a:schemeClr val="tx1"/>
+              </a:solidFill>
+            </a:endParaRPr>
+          </a:p>
+        </p:txBody>
+      </p:sp>
+      <p:cxnSp>
+        <p:nvCxnSpPr>
+          <p:cNvPr id="15" name="直線コネクタ 14"/>
+          <p:cNvCxnSpPr/>
+          <p:nvPr/>
+        </p:nvCxnSpPr>
+        <p:spPr>
+          <a:xfrm>
+            <a:off x="811360" y="1978553"/>
+            <a:ext cx="1478787" cy="0"/>
+          </a:xfrm>
+          <a:prstGeom prst="line">
+            <a:avLst/>
+          </a:prstGeom>
+          <a:ln w="12700">
+            <a:solidFill>
+              <a:schemeClr val="tx1"/>
+            </a:solidFill>
+          </a:ln>
+        </p:spPr>
+        <p:style>
+          <a:lnRef idx="1">
+            <a:schemeClr val="accent1"/>
+          </a:lnRef>
+          <a:fillRef idx="0">
+            <a:schemeClr val="accent1"/>
+          </a:fillRef>
+          <a:effectRef idx="0">
+            <a:schemeClr val="accent1"/>
+          </a:effectRef>
+          <a:fontRef idx="minor">
+            <a:schemeClr val="tx1"/>
+          </a:fontRef>
+        </p:style>
+      </p:cxnSp>
+      <p:sp>
+        <p:nvSpPr>
+          <p:cNvPr id="16" name="テキスト ボックス 15"/>
+          <p:cNvSpPr txBox="1"/>
+          <p:nvPr/>
+        </p:nvSpPr>
+        <p:spPr>
+          <a:xfrm>
+            <a:off x="808226" y="1978553"/>
+            <a:ext cx="1481918" cy="400110"/>
+          </a:xfrm>
+          <a:prstGeom prst="rect">
+            <a:avLst/>
+          </a:prstGeom>
+          <a:noFill/>
+          <a:ln>
+            <a:noFill/>
+          </a:ln>
+        </p:spPr>
+        <p:txBody>
+          <a:bodyPr wrap="square" lIns="91439" tIns="45720" rIns="91439" bIns="45720" rtlCol="0">
+            <a:spAutoFit/>
+          </a:bodyPr>
+          <a:lstStyle/>
+          <a:p>
+            <a:r>
+              <a:rPr lang="en-US" altLang="ja-JP" sz="1000" dirty="0"/>
+              <a:t>entry / </a:t>
+            </a:r>
+            <a:r>
+              <a:rPr lang="en-US" altLang="ja-JP" sz="1000" dirty="0" err="1" smtClean="0"/>
+              <a:t>on_entry</a:t>
+            </a:r>
+            <a:endParaRPr lang="en-US" altLang="ja-JP" sz="1000" dirty="0" smtClean="0"/>
+          </a:p>
+          <a:p>
+            <a:r>
+              <a:rPr lang="en-US" altLang="ja-JP" sz="1000" dirty="0" smtClean="0"/>
+              <a:t>exit / </a:t>
+            </a:r>
+            <a:r>
+              <a:rPr lang="en-US" altLang="ja-JP" sz="1000" dirty="0" err="1" smtClean="0"/>
+              <a:t>on_exit</a:t>
+            </a:r>
+            <a:endParaRPr lang="en-US" altLang="ja-JP" sz="1000" dirty="0"/>
+          </a:p>
+        </p:txBody>
+      </p:sp>
+      <p:cxnSp>
+        <p:nvCxnSpPr>
+          <p:cNvPr id="17" name="直線矢印コネクタ 28"/>
+          <p:cNvCxnSpPr>
+            <a:stCxn id="14" idx="2"/>
+            <a:endCxn id="14" idx="1"/>
+          </p:cNvCxnSpPr>
+          <p:nvPr/>
+        </p:nvCxnSpPr>
+        <p:spPr>
+          <a:xfrm rot="5400000" flipH="1">
+            <a:off x="1005388" y="1896607"/>
+            <a:ext cx="360040" cy="743340"/>
+          </a:xfrm>
+          <a:prstGeom prst="bentConnector4">
+            <a:avLst>
+              <a:gd name="adj1" fmla="val -63493"/>
+              <a:gd name="adj2" fmla="val 130753"/>
+            </a:avLst>
+          </a:prstGeom>
+          <a:ln w="19050">
+            <a:solidFill>
+              <a:schemeClr val="tx1"/>
+            </a:solidFill>
+            <a:tailEnd type="arrow"/>
+          </a:ln>
+        </p:spPr>
+        <p:style>
+          <a:lnRef idx="1">
+            <a:schemeClr val="accent1"/>
+          </a:lnRef>
+          <a:fillRef idx="0">
+            <a:schemeClr val="accent1"/>
+          </a:fillRef>
+          <a:effectRef idx="0">
+            <a:schemeClr val="accent1"/>
+          </a:effectRef>
+          <a:fontRef idx="minor">
+            <a:schemeClr val="tx1"/>
+          </a:fontRef>
+        </p:style>
+      </p:cxnSp>
+    </p:spTree>
+    <p:extLst>
+      <p:ext uri="{BB962C8B-B14F-4D97-AF65-F5344CB8AC3E}">
+        <p14:creationId xmlns:p14="http://schemas.microsoft.com/office/powerpoint/2010/main" val="1769230038"/>
+      </p:ext>
+    </p:extLst>
+  </p:cSld>
+  <p:clrMapOvr>
+    <a:masterClrMapping/>
+  </p:clrMapOvr>
+  <p:timing>
+    <p:tnLst>
+      <p:par>
+        <p:cTn id="1" dur="indefinite" restart="never" nodeType="tmRoot"/>
+      </p:par>
+    </p:tnLst>
+  </p:timing>
+</p:sld>
+</file>
+
+<file path=ppt/slides/slide30.xml><?xml version="1.0" encoding="utf-8"?>
 <p:sld xmlns:a="http://schemas.openxmlformats.org/drawingml/2006/main" xmlns:r="http://schemas.openxmlformats.org/officeDocument/2006/relationships" xmlns:p="http://schemas.openxmlformats.org/presentationml/2006/main">
   <p:cSld>
     <p:spTree>
@@ -27382,631 +28756,7 @@
 </p:sld>
 </file>
 
-<file path=ppt/slides/slide3.xml><?xml version="1.0" encoding="utf-8"?>
-<p:sld xmlns:a="http://schemas.openxmlformats.org/drawingml/2006/main" xmlns:r="http://schemas.openxmlformats.org/officeDocument/2006/relationships" xmlns:p="http://schemas.openxmlformats.org/presentationml/2006/main">
-  <p:cSld>
-    <p:spTree>
-      <p:nvGrpSpPr>
-        <p:cNvPr id="1" name=""/>
-        <p:cNvGrpSpPr/>
-        <p:nvPr/>
-      </p:nvGrpSpPr>
-      <p:grpSpPr>
-        <a:xfrm>
-          <a:off x="0" y="0"/>
-          <a:ext cx="0" cy="0"/>
-          <a:chOff x="0" y="0"/>
-          <a:chExt cx="0" cy="0"/>
-        </a:xfrm>
-      </p:grpSpPr>
-      <p:cxnSp>
-        <p:nvCxnSpPr>
-          <p:cNvPr id="142" name="直線矢印コネクタ 28"/>
-          <p:cNvCxnSpPr>
-            <a:stCxn id="163" idx="4"/>
-            <a:endCxn id="153" idx="0"/>
-          </p:cNvCxnSpPr>
-          <p:nvPr/>
-        </p:nvCxnSpPr>
-        <p:spPr>
-          <a:xfrm flipH="1">
-            <a:off x="1554697" y="399927"/>
-            <a:ext cx="2380" cy="203130"/>
-          </a:xfrm>
-          <a:prstGeom prst="straightConnector1">
-            <a:avLst/>
-          </a:prstGeom>
-          <a:ln w="19050">
-            <a:solidFill>
-              <a:schemeClr val="tx1"/>
-            </a:solidFill>
-            <a:tailEnd type="arrow"/>
-          </a:ln>
-        </p:spPr>
-        <p:style>
-          <a:lnRef idx="1">
-            <a:schemeClr val="accent1"/>
-          </a:lnRef>
-          <a:fillRef idx="0">
-            <a:schemeClr val="accent1"/>
-          </a:fillRef>
-          <a:effectRef idx="0">
-            <a:schemeClr val="accent1"/>
-          </a:effectRef>
-          <a:fontRef idx="minor">
-            <a:schemeClr val="tx1"/>
-          </a:fontRef>
-        </p:style>
-      </p:cxnSp>
-      <p:sp>
-        <p:nvSpPr>
-          <p:cNvPr id="150" name="正方形/長方形 149"/>
-          <p:cNvSpPr/>
-          <p:nvPr/>
-        </p:nvSpPr>
-        <p:spPr>
-          <a:xfrm>
-            <a:off x="141682" y="165137"/>
-            <a:ext cx="2378949" cy="2787219"/>
-          </a:xfrm>
-          <a:prstGeom prst="rect">
-            <a:avLst/>
-          </a:prstGeom>
-          <a:noFill/>
-          <a:ln w="28575">
-            <a:solidFill>
-              <a:schemeClr val="tx1"/>
-            </a:solidFill>
-          </a:ln>
-        </p:spPr>
-        <p:style>
-          <a:lnRef idx="2">
-            <a:schemeClr val="accent1">
-              <a:shade val="50000"/>
-            </a:schemeClr>
-          </a:lnRef>
-          <a:fillRef idx="1">
-            <a:schemeClr val="accent1"/>
-          </a:fillRef>
-          <a:effectRef idx="0">
-            <a:schemeClr val="accent1"/>
-          </a:effectRef>
-          <a:fontRef idx="minor">
-            <a:schemeClr val="lt1"/>
-          </a:fontRef>
-        </p:style>
-        <p:txBody>
-          <a:bodyPr lIns="91439" tIns="45720" rIns="91439" bIns="45720" rtlCol="0" anchor="ctr"/>
-          <a:lstStyle/>
-          <a:p>
-            <a:pPr algn="ctr"/>
-            <a:endParaRPr kumimoji="1" lang="ja-JP" altLang="en-US"/>
-          </a:p>
-        </p:txBody>
-      </p:sp>
-      <p:sp>
-        <p:nvSpPr>
-          <p:cNvPr id="151" name="1 つの角を切り取った四角形 150"/>
-          <p:cNvSpPr/>
-          <p:nvPr/>
-        </p:nvSpPr>
-        <p:spPr>
-          <a:xfrm flipV="1">
-            <a:off x="141678" y="173127"/>
-            <a:ext cx="680940" cy="305136"/>
-          </a:xfrm>
-          <a:prstGeom prst="snip1Rect">
-            <a:avLst>
-              <a:gd name="adj" fmla="val 34304"/>
-            </a:avLst>
-          </a:prstGeom>
-          <a:noFill/>
-          <a:ln w="19050">
-            <a:solidFill>
-              <a:schemeClr val="tx1"/>
-            </a:solidFill>
-          </a:ln>
-        </p:spPr>
-        <p:style>
-          <a:lnRef idx="2">
-            <a:schemeClr val="accent1">
-              <a:shade val="50000"/>
-            </a:schemeClr>
-          </a:lnRef>
-          <a:fillRef idx="1">
-            <a:schemeClr val="accent1"/>
-          </a:fillRef>
-          <a:effectRef idx="0">
-            <a:schemeClr val="accent1"/>
-          </a:effectRef>
-          <a:fontRef idx="minor">
-            <a:schemeClr val="lt1"/>
-          </a:fontRef>
-        </p:style>
-        <p:txBody>
-          <a:bodyPr lIns="91439" tIns="45720" rIns="91439" bIns="45720" rtlCol="0" anchor="ctr"/>
-          <a:lstStyle/>
-          <a:p>
-            <a:pPr algn="ctr"/>
-            <a:endParaRPr kumimoji="1" lang="ja-JP" altLang="en-US" sz="1000" dirty="0"/>
-          </a:p>
-        </p:txBody>
-      </p:sp>
-      <p:sp>
-        <p:nvSpPr>
-          <p:cNvPr id="152" name="正方形/長方形 151"/>
-          <p:cNvSpPr/>
-          <p:nvPr/>
-        </p:nvSpPr>
-        <p:spPr>
-          <a:xfrm>
-            <a:off x="141684" y="153709"/>
-            <a:ext cx="689537" cy="246221"/>
-          </a:xfrm>
-          <a:prstGeom prst="rect">
-            <a:avLst/>
-          </a:prstGeom>
-        </p:spPr>
-        <p:txBody>
-          <a:bodyPr wrap="square" lIns="91439" tIns="45720" rIns="91439" bIns="45720">
-            <a:spAutoFit/>
-          </a:bodyPr>
-          <a:lstStyle/>
-          <a:p>
-            <a:r>
-              <a:rPr lang="en-US" altLang="ja-JP" sz="1000" dirty="0" err="1" smtClean="0"/>
-              <a:t>InitAction</a:t>
-            </a:r>
-            <a:endParaRPr lang="ja-JP" altLang="en-US" sz="1000" dirty="0"/>
-          </a:p>
-        </p:txBody>
-      </p:sp>
-      <p:sp>
-        <p:nvSpPr>
-          <p:cNvPr id="153" name="角丸四角形 152"/>
-          <p:cNvSpPr/>
-          <p:nvPr/>
-        </p:nvSpPr>
-        <p:spPr>
-          <a:xfrm>
-            <a:off x="811363" y="603058"/>
-            <a:ext cx="1486679" cy="720080"/>
-          </a:xfrm>
-          <a:prstGeom prst="roundRect">
-            <a:avLst/>
-          </a:prstGeom>
-          <a:noFill/>
-          <a:ln w="19050">
-            <a:solidFill>
-              <a:schemeClr val="tx1"/>
-            </a:solidFill>
-          </a:ln>
-        </p:spPr>
-        <p:style>
-          <a:lnRef idx="2">
-            <a:schemeClr val="accent1">
-              <a:shade val="50000"/>
-            </a:schemeClr>
-          </a:lnRef>
-          <a:fillRef idx="1">
-            <a:schemeClr val="accent1"/>
-          </a:fillRef>
-          <a:effectRef idx="0">
-            <a:schemeClr val="accent1"/>
-          </a:effectRef>
-          <a:fontRef idx="minor">
-            <a:schemeClr val="lt1"/>
-          </a:fontRef>
-        </p:style>
-        <p:txBody>
-          <a:bodyPr lIns="91439" tIns="45720" rIns="91439" bIns="45720" rtlCol="0" anchor="t" anchorCtr="0"/>
-          <a:lstStyle/>
-          <a:p>
-            <a:pPr algn="ctr"/>
-            <a:r>
-              <a:rPr lang="en-US" altLang="ja-JP" sz="1000" dirty="0" err="1" smtClean="0">
-                <a:solidFill>
-                  <a:schemeClr val="tx1"/>
-                </a:solidFill>
-              </a:rPr>
-              <a:t>Init</a:t>
-            </a:r>
-            <a:endParaRPr lang="ja-JP" altLang="en-US" sz="1000" dirty="0">
-              <a:solidFill>
-                <a:schemeClr val="tx1"/>
-              </a:solidFill>
-            </a:endParaRPr>
-          </a:p>
-        </p:txBody>
-      </p:sp>
-      <p:cxnSp>
-        <p:nvCxnSpPr>
-          <p:cNvPr id="154" name="直線コネクタ 153"/>
-          <p:cNvCxnSpPr/>
-          <p:nvPr/>
-        </p:nvCxnSpPr>
-        <p:spPr>
-          <a:xfrm>
-            <a:off x="816124" y="857110"/>
-            <a:ext cx="1478787" cy="0"/>
-          </a:xfrm>
-          <a:prstGeom prst="line">
-            <a:avLst/>
-          </a:prstGeom>
-          <a:ln w="12700">
-            <a:solidFill>
-              <a:schemeClr val="tx1"/>
-            </a:solidFill>
-          </a:ln>
-        </p:spPr>
-        <p:style>
-          <a:lnRef idx="1">
-            <a:schemeClr val="accent1"/>
-          </a:lnRef>
-          <a:fillRef idx="0">
-            <a:schemeClr val="accent1"/>
-          </a:fillRef>
-          <a:effectRef idx="0">
-            <a:schemeClr val="accent1"/>
-          </a:effectRef>
-          <a:fontRef idx="minor">
-            <a:schemeClr val="tx1"/>
-          </a:fontRef>
-        </p:style>
-      </p:cxnSp>
-      <p:sp>
-        <p:nvSpPr>
-          <p:cNvPr id="163" name="フローチャート : 結合子 162"/>
-          <p:cNvSpPr/>
-          <p:nvPr/>
-        </p:nvSpPr>
-        <p:spPr>
-          <a:xfrm>
-            <a:off x="1485072" y="255908"/>
-            <a:ext cx="144021" cy="144020"/>
-          </a:xfrm>
-          <a:prstGeom prst="flowChartConnector">
-            <a:avLst/>
-          </a:prstGeom>
-          <a:solidFill>
-            <a:schemeClr val="tx1"/>
-          </a:solidFill>
-          <a:ln w="19050">
-            <a:solidFill>
-              <a:schemeClr val="tx1"/>
-            </a:solidFill>
-          </a:ln>
-        </p:spPr>
-        <p:style>
-          <a:lnRef idx="2">
-            <a:schemeClr val="accent1">
-              <a:shade val="50000"/>
-            </a:schemeClr>
-          </a:lnRef>
-          <a:fillRef idx="1">
-            <a:schemeClr val="accent1"/>
-          </a:fillRef>
-          <a:effectRef idx="0">
-            <a:schemeClr val="accent1"/>
-          </a:effectRef>
-          <a:fontRef idx="minor">
-            <a:schemeClr val="lt1"/>
-          </a:fontRef>
-        </p:style>
-        <p:txBody>
-          <a:bodyPr lIns="91439" tIns="45720" rIns="91439" bIns="45720" rtlCol="0" anchor="ctr"/>
-          <a:lstStyle/>
-          <a:p>
-            <a:pPr algn="ctr"/>
-            <a:endParaRPr lang="ja-JP" altLang="en-US" sz="1000"/>
-          </a:p>
-        </p:txBody>
-      </p:sp>
-      <p:sp>
-        <p:nvSpPr>
-          <p:cNvPr id="164" name="正方形/長方形 163"/>
-          <p:cNvSpPr/>
-          <p:nvPr/>
-        </p:nvSpPr>
-        <p:spPr>
-          <a:xfrm>
-            <a:off x="1589832" y="2448300"/>
-            <a:ext cx="724930" cy="246221"/>
-          </a:xfrm>
-          <a:prstGeom prst="rect">
-            <a:avLst/>
-          </a:prstGeom>
-        </p:spPr>
-        <p:txBody>
-          <a:bodyPr wrap="square" lIns="91439" tIns="45720" rIns="91439" bIns="45720">
-            <a:spAutoFit/>
-          </a:bodyPr>
-          <a:lstStyle/>
-          <a:p>
-            <a:r>
-              <a:rPr lang="en-US" altLang="ja-JP" sz="1000" dirty="0" smtClean="0"/>
-              <a:t>Event1</a:t>
-            </a:r>
-            <a:endParaRPr lang="ja-JP" altLang="en-US" sz="1000" dirty="0"/>
-          </a:p>
-        </p:txBody>
-      </p:sp>
-      <p:cxnSp>
-        <p:nvCxnSpPr>
-          <p:cNvPr id="21" name="直線矢印コネクタ 28"/>
-          <p:cNvCxnSpPr>
-            <a:stCxn id="153" idx="2"/>
-            <a:endCxn id="14" idx="0"/>
-          </p:cNvCxnSpPr>
-          <p:nvPr/>
-        </p:nvCxnSpPr>
-        <p:spPr>
-          <a:xfrm>
-            <a:off x="1554697" y="1323137"/>
-            <a:ext cx="2380" cy="405080"/>
-          </a:xfrm>
-          <a:prstGeom prst="straightConnector1">
-            <a:avLst/>
-          </a:prstGeom>
-          <a:ln w="19050">
-            <a:solidFill>
-              <a:schemeClr val="tx1"/>
-            </a:solidFill>
-            <a:tailEnd type="arrow"/>
-          </a:ln>
-        </p:spPr>
-        <p:style>
-          <a:lnRef idx="1">
-            <a:schemeClr val="accent1"/>
-          </a:lnRef>
-          <a:fillRef idx="0">
-            <a:schemeClr val="accent1"/>
-          </a:fillRef>
-          <a:effectRef idx="0">
-            <a:schemeClr val="accent1"/>
-          </a:effectRef>
-          <a:fontRef idx="minor">
-            <a:schemeClr val="tx1"/>
-          </a:fontRef>
-        </p:style>
-      </p:cxnSp>
-      <p:sp>
-        <p:nvSpPr>
-          <p:cNvPr id="18" name="正方形/長方形 17"/>
-          <p:cNvSpPr/>
-          <p:nvPr/>
-        </p:nvSpPr>
-        <p:spPr>
-          <a:xfrm>
-            <a:off x="1629087" y="1402569"/>
-            <a:ext cx="819532" cy="246221"/>
-          </a:xfrm>
-          <a:prstGeom prst="rect">
-            <a:avLst/>
-          </a:prstGeom>
-        </p:spPr>
-        <p:txBody>
-          <a:bodyPr wrap="square" lIns="91439" tIns="45720" rIns="91439" bIns="45720">
-            <a:spAutoFit/>
-          </a:bodyPr>
-          <a:lstStyle/>
-          <a:p>
-            <a:r>
-              <a:rPr lang="en-US" altLang="ja-JP" sz="1000" dirty="0" smtClean="0"/>
-              <a:t>/</a:t>
-            </a:r>
-            <a:r>
-              <a:rPr lang="en-US" altLang="ja-JP" sz="1000" dirty="0" err="1" smtClean="0"/>
-              <a:t>InitAction</a:t>
-            </a:r>
-            <a:endParaRPr lang="ja-JP" altLang="en-US" sz="1000" dirty="0"/>
-          </a:p>
-        </p:txBody>
-      </p:sp>
-      <p:sp>
-        <p:nvSpPr>
-          <p:cNvPr id="14" name="角丸四角形 13"/>
-          <p:cNvSpPr/>
-          <p:nvPr/>
-        </p:nvSpPr>
-        <p:spPr>
-          <a:xfrm>
-            <a:off x="813743" y="1728217"/>
-            <a:ext cx="1486679" cy="720080"/>
-          </a:xfrm>
-          <a:prstGeom prst="roundRect">
-            <a:avLst/>
-          </a:prstGeom>
-          <a:noFill/>
-          <a:ln w="19050">
-            <a:solidFill>
-              <a:schemeClr val="tx1"/>
-            </a:solidFill>
-          </a:ln>
-        </p:spPr>
-        <p:style>
-          <a:lnRef idx="2">
-            <a:schemeClr val="accent1">
-              <a:shade val="50000"/>
-            </a:schemeClr>
-          </a:lnRef>
-          <a:fillRef idx="1">
-            <a:schemeClr val="accent1"/>
-          </a:fillRef>
-          <a:effectRef idx="0">
-            <a:schemeClr val="accent1"/>
-          </a:effectRef>
-          <a:fontRef idx="minor">
-            <a:schemeClr val="lt1"/>
-          </a:fontRef>
-        </p:style>
-        <p:txBody>
-          <a:bodyPr lIns="91439" tIns="45720" rIns="91439" bIns="45720" rtlCol="0" anchor="t" anchorCtr="0"/>
-          <a:lstStyle/>
-          <a:p>
-            <a:pPr algn="ctr"/>
-            <a:r>
-              <a:rPr lang="en-US" altLang="ja-JP" sz="1000" dirty="0" smtClean="0">
-                <a:solidFill>
-                  <a:schemeClr val="tx1"/>
-                </a:solidFill>
-              </a:rPr>
-              <a:t>State1</a:t>
-            </a:r>
-            <a:endParaRPr lang="ja-JP" altLang="en-US" sz="1000" dirty="0">
-              <a:solidFill>
-                <a:schemeClr val="tx1"/>
-              </a:solidFill>
-            </a:endParaRPr>
-          </a:p>
-        </p:txBody>
-      </p:sp>
-      <p:cxnSp>
-        <p:nvCxnSpPr>
-          <p:cNvPr id="15" name="直線コネクタ 14"/>
-          <p:cNvCxnSpPr/>
-          <p:nvPr/>
-        </p:nvCxnSpPr>
-        <p:spPr>
-          <a:xfrm>
-            <a:off x="811360" y="1978553"/>
-            <a:ext cx="1478787" cy="0"/>
-          </a:xfrm>
-          <a:prstGeom prst="line">
-            <a:avLst/>
-          </a:prstGeom>
-          <a:ln w="12700">
-            <a:solidFill>
-              <a:schemeClr val="tx1"/>
-            </a:solidFill>
-          </a:ln>
-        </p:spPr>
-        <p:style>
-          <a:lnRef idx="1">
-            <a:schemeClr val="accent1"/>
-          </a:lnRef>
-          <a:fillRef idx="0">
-            <a:schemeClr val="accent1"/>
-          </a:fillRef>
-          <a:effectRef idx="0">
-            <a:schemeClr val="accent1"/>
-          </a:effectRef>
-          <a:fontRef idx="minor">
-            <a:schemeClr val="tx1"/>
-          </a:fontRef>
-        </p:style>
-      </p:cxnSp>
-      <p:sp>
-        <p:nvSpPr>
-          <p:cNvPr id="16" name="テキスト ボックス 15"/>
-          <p:cNvSpPr txBox="1"/>
-          <p:nvPr/>
-        </p:nvSpPr>
-        <p:spPr>
-          <a:xfrm>
-            <a:off x="808226" y="1978553"/>
-            <a:ext cx="1481918" cy="400110"/>
-          </a:xfrm>
-          <a:prstGeom prst="rect">
-            <a:avLst/>
-          </a:prstGeom>
-          <a:noFill/>
-          <a:ln>
-            <a:noFill/>
-          </a:ln>
-        </p:spPr>
-        <p:txBody>
-          <a:bodyPr wrap="square" lIns="91439" tIns="45720" rIns="91439" bIns="45720" rtlCol="0">
-            <a:spAutoFit/>
-          </a:bodyPr>
-          <a:lstStyle/>
-          <a:p>
-            <a:r>
-              <a:rPr lang="en-US" altLang="ja-JP" sz="1000" dirty="0"/>
-              <a:t>entry / </a:t>
-            </a:r>
-            <a:r>
-              <a:rPr lang="en-US" altLang="ja-JP" sz="1000" dirty="0" err="1" smtClean="0"/>
-              <a:t>on_entry</a:t>
-            </a:r>
-            <a:endParaRPr lang="en-US" altLang="ja-JP" sz="1000" dirty="0" smtClean="0"/>
-          </a:p>
-          <a:p>
-            <a:r>
-              <a:rPr lang="en-US" altLang="ja-JP" sz="1000" dirty="0" smtClean="0"/>
-              <a:t>exit / </a:t>
-            </a:r>
-            <a:r>
-              <a:rPr lang="en-US" altLang="ja-JP" sz="1000" dirty="0" err="1" smtClean="0"/>
-              <a:t>on_exit</a:t>
-            </a:r>
-            <a:endParaRPr lang="en-US" altLang="ja-JP" sz="1000" dirty="0"/>
-          </a:p>
-        </p:txBody>
-      </p:sp>
-      <p:cxnSp>
-        <p:nvCxnSpPr>
-          <p:cNvPr id="17" name="直線矢印コネクタ 28"/>
-          <p:cNvCxnSpPr>
-            <a:stCxn id="14" idx="2"/>
-            <a:endCxn id="14" idx="1"/>
-          </p:cNvCxnSpPr>
-          <p:nvPr/>
-        </p:nvCxnSpPr>
-        <p:spPr>
-          <a:xfrm rot="5400000" flipH="1">
-            <a:off x="1005388" y="1896607"/>
-            <a:ext cx="360040" cy="743340"/>
-          </a:xfrm>
-          <a:prstGeom prst="bentConnector4">
-            <a:avLst>
-              <a:gd name="adj1" fmla="val -63493"/>
-              <a:gd name="adj2" fmla="val 130753"/>
-            </a:avLst>
-          </a:prstGeom>
-          <a:ln w="19050">
-            <a:solidFill>
-              <a:schemeClr val="tx1"/>
-            </a:solidFill>
-            <a:tailEnd type="arrow"/>
-          </a:ln>
-        </p:spPr>
-        <p:style>
-          <a:lnRef idx="1">
-            <a:schemeClr val="accent1"/>
-          </a:lnRef>
-          <a:fillRef idx="0">
-            <a:schemeClr val="accent1"/>
-          </a:fillRef>
-          <a:effectRef idx="0">
-            <a:schemeClr val="accent1"/>
-          </a:effectRef>
-          <a:fontRef idx="minor">
-            <a:schemeClr val="tx1"/>
-          </a:fontRef>
-        </p:style>
-      </p:cxnSp>
-    </p:spTree>
-    <p:extLst>
-      <p:ext uri="{BB962C8B-B14F-4D97-AF65-F5344CB8AC3E}">
-        <p14:creationId xmlns:p14="http://schemas.microsoft.com/office/powerpoint/2010/main" val="1769230038"/>
-      </p:ext>
-    </p:extLst>
-  </p:cSld>
-  <p:clrMapOvr>
-    <a:masterClrMapping/>
-  </p:clrMapOvr>
-  <p:timing>
-    <p:tnLst>
-      <p:par>
-        <p:cTn id="1" dur="indefinite" restart="never" nodeType="tmRoot"/>
-      </p:par>
-    </p:tnLst>
-  </p:timing>
-</p:sld>
-</file>
-
-<file path=ppt/slides/slide30.xml><?xml version="1.0" encoding="utf-8"?>
+<file path=ppt/slides/slide31.xml><?xml version="1.0" encoding="utf-8"?>
 <p:sld xmlns:a="http://schemas.openxmlformats.org/drawingml/2006/main" xmlns:r="http://schemas.openxmlformats.org/officeDocument/2006/relationships" xmlns:p="http://schemas.openxmlformats.org/presentationml/2006/main">
   <p:cSld>
     <p:spTree>
@@ -28943,7 +29693,7 @@
 </p:sld>
 </file>
 
-<file path=ppt/slides/slide31.xml><?xml version="1.0" encoding="utf-8"?>
+<file path=ppt/slides/slide32.xml><?xml version="1.0" encoding="utf-8"?>
 <p:sld xmlns:a="http://schemas.openxmlformats.org/drawingml/2006/main" xmlns:r="http://schemas.openxmlformats.org/officeDocument/2006/relationships" xmlns:p="http://schemas.openxmlformats.org/presentationml/2006/main">
   <p:cSld>
     <p:spTree>
@@ -29858,7 +30608,7 @@
 </p:sld>
 </file>
 
-<file path=ppt/slides/slide32.xml><?xml version="1.0" encoding="utf-8"?>
+<file path=ppt/slides/slide33.xml><?xml version="1.0" encoding="utf-8"?>
 <p:sld xmlns:a="http://schemas.openxmlformats.org/drawingml/2006/main" xmlns:r="http://schemas.openxmlformats.org/officeDocument/2006/relationships" xmlns:p="http://schemas.openxmlformats.org/presentationml/2006/main">
   <p:cSld>
     <p:spTree>
@@ -30937,7 +31687,7 @@
 </p:sld>
 </file>
 
-<file path=ppt/slides/slide33.xml><?xml version="1.0" encoding="utf-8"?>
+<file path=ppt/slides/slide34.xml><?xml version="1.0" encoding="utf-8"?>
 <p:sld xmlns:a="http://schemas.openxmlformats.org/drawingml/2006/main" xmlns:r="http://schemas.openxmlformats.org/officeDocument/2006/relationships" xmlns:p="http://schemas.openxmlformats.org/presentationml/2006/main">
   <p:cSld>
     <p:spTree>
@@ -32246,7 +32996,7 @@
 </p:sld>
 </file>
 
-<file path=ppt/slides/slide34.xml><?xml version="1.0" encoding="utf-8"?>
+<file path=ppt/slides/slide35.xml><?xml version="1.0" encoding="utf-8"?>
 <p:sld xmlns:a="http://schemas.openxmlformats.org/drawingml/2006/main" xmlns:r="http://schemas.openxmlformats.org/officeDocument/2006/relationships" xmlns:p="http://schemas.openxmlformats.org/presentationml/2006/main">
   <p:cSld>
     <p:spTree>
@@ -33394,7 +34144,7 @@
 </p:sld>
 </file>
 
-<file path=ppt/slides/slide35.xml><?xml version="1.0" encoding="utf-8"?>
+<file path=ppt/slides/slide36.xml><?xml version="1.0" encoding="utf-8"?>
 <p:sld xmlns:a="http://schemas.openxmlformats.org/drawingml/2006/main" xmlns:r="http://schemas.openxmlformats.org/officeDocument/2006/relationships" xmlns:p="http://schemas.openxmlformats.org/presentationml/2006/main">
   <p:cSld>
     <p:spTree>

</xml_diff>

<commit_message>
Added explicit event handler example.
</commit_message>
<xml_diff>
--- a/boost_training/msm/fig.pptx
+++ b/boost_training/msm/fig.pptx
@@ -273,7 +273,7 @@
           <a:p>
             <a:fld id="{33E477F9-361B-4780-B227-665A41208240}" type="datetimeFigureOut">
               <a:rPr kumimoji="1" lang="ja-JP" altLang="en-US" smtClean="0"/>
-              <a:t>2012/6/6</a:t>
+              <a:t>2012/6/7</a:t>
             </a:fld>
             <a:endParaRPr kumimoji="1" lang="ja-JP" altLang="en-US"/>
           </a:p>
@@ -3958,7 +3958,7 @@
           <a:p>
             <a:fld id="{E90ED720-0104-4369-84BC-D37694168613}" type="datetimeFigureOut">
               <a:rPr kumimoji="1" lang="ja-JP" altLang="en-US" smtClean="0"/>
-              <a:t>2012/6/6</a:t>
+              <a:t>2012/6/7</a:t>
             </a:fld>
             <a:endParaRPr kumimoji="1" lang="ja-JP" altLang="en-US"/>
           </a:p>
@@ -4155,7 +4155,7 @@
           <a:p>
             <a:fld id="{E90ED720-0104-4369-84BC-D37694168613}" type="datetimeFigureOut">
               <a:rPr kumimoji="1" lang="ja-JP" altLang="en-US" smtClean="0"/>
-              <a:t>2012/6/6</a:t>
+              <a:t>2012/6/7</a:t>
             </a:fld>
             <a:endParaRPr kumimoji="1" lang="ja-JP" altLang="en-US"/>
           </a:p>
@@ -4362,7 +4362,7 @@
           <a:p>
             <a:fld id="{E90ED720-0104-4369-84BC-D37694168613}" type="datetimeFigureOut">
               <a:rPr kumimoji="1" lang="ja-JP" altLang="en-US" smtClean="0"/>
-              <a:t>2012/6/6</a:t>
+              <a:t>2012/6/7</a:t>
             </a:fld>
             <a:endParaRPr kumimoji="1" lang="ja-JP" altLang="en-US"/>
           </a:p>
@@ -4559,7 +4559,7 @@
           <a:p>
             <a:fld id="{E90ED720-0104-4369-84BC-D37694168613}" type="datetimeFigureOut">
               <a:rPr kumimoji="1" lang="ja-JP" altLang="en-US" smtClean="0"/>
-              <a:t>2012/6/6</a:t>
+              <a:t>2012/6/7</a:t>
             </a:fld>
             <a:endParaRPr kumimoji="1" lang="ja-JP" altLang="en-US"/>
           </a:p>
@@ -4800,7 +4800,7 @@
           <a:p>
             <a:fld id="{E90ED720-0104-4369-84BC-D37694168613}" type="datetimeFigureOut">
               <a:rPr kumimoji="1" lang="ja-JP" altLang="en-US" smtClean="0"/>
-              <a:t>2012/6/6</a:t>
+              <a:t>2012/6/7</a:t>
             </a:fld>
             <a:endParaRPr kumimoji="1" lang="ja-JP" altLang="en-US"/>
           </a:p>
@@ -5147,7 +5147,7 @@
           <a:p>
             <a:fld id="{E90ED720-0104-4369-84BC-D37694168613}" type="datetimeFigureOut">
               <a:rPr kumimoji="1" lang="ja-JP" altLang="en-US" smtClean="0"/>
-              <a:t>2012/6/6</a:t>
+              <a:t>2012/6/7</a:t>
             </a:fld>
             <a:endParaRPr kumimoji="1" lang="ja-JP" altLang="en-US"/>
           </a:p>
@@ -5628,7 +5628,7 @@
           <a:p>
             <a:fld id="{E90ED720-0104-4369-84BC-D37694168613}" type="datetimeFigureOut">
               <a:rPr kumimoji="1" lang="ja-JP" altLang="en-US" smtClean="0"/>
-              <a:t>2012/6/6</a:t>
+              <a:t>2012/6/7</a:t>
             </a:fld>
             <a:endParaRPr kumimoji="1" lang="ja-JP" altLang="en-US"/>
           </a:p>
@@ -5741,7 +5741,7 @@
           <a:p>
             <a:fld id="{E90ED720-0104-4369-84BC-D37694168613}" type="datetimeFigureOut">
               <a:rPr kumimoji="1" lang="ja-JP" altLang="en-US" smtClean="0"/>
-              <a:t>2012/6/6</a:t>
+              <a:t>2012/6/7</a:t>
             </a:fld>
             <a:endParaRPr kumimoji="1" lang="ja-JP" altLang="en-US"/>
           </a:p>
@@ -5831,7 +5831,7 @@
           <a:p>
             <a:fld id="{E90ED720-0104-4369-84BC-D37694168613}" type="datetimeFigureOut">
               <a:rPr kumimoji="1" lang="ja-JP" altLang="en-US" smtClean="0"/>
-              <a:t>2012/6/6</a:t>
+              <a:t>2012/6/7</a:t>
             </a:fld>
             <a:endParaRPr kumimoji="1" lang="ja-JP" altLang="en-US"/>
           </a:p>
@@ -6135,7 +6135,7 @@
           <a:p>
             <a:fld id="{E90ED720-0104-4369-84BC-D37694168613}" type="datetimeFigureOut">
               <a:rPr kumimoji="1" lang="ja-JP" altLang="en-US" smtClean="0"/>
-              <a:t>2012/6/6</a:t>
+              <a:t>2012/6/7</a:t>
             </a:fld>
             <a:endParaRPr kumimoji="1" lang="ja-JP" altLang="en-US"/>
           </a:p>
@@ -6383,7 +6383,7 @@
           <a:p>
             <a:fld id="{E90ED720-0104-4369-84BC-D37694168613}" type="datetimeFigureOut">
               <a:rPr kumimoji="1" lang="ja-JP" altLang="en-US" smtClean="0"/>
-              <a:t>2012/6/6</a:t>
+              <a:t>2012/6/7</a:t>
             </a:fld>
             <a:endParaRPr kumimoji="1" lang="ja-JP" altLang="en-US"/>
           </a:p>
@@ -6623,7 +6623,7 @@
           <a:p>
             <a:fld id="{E90ED720-0104-4369-84BC-D37694168613}" type="datetimeFigureOut">
               <a:rPr kumimoji="1" lang="ja-JP" altLang="en-US" smtClean="0"/>
-              <a:t>2012/6/6</a:t>
+              <a:t>2012/6/7</a:t>
             </a:fld>
             <a:endParaRPr kumimoji="1" lang="ja-JP" altLang="en-US"/>
           </a:p>
@@ -23730,7 +23730,7 @@
         </p:nvCxnSpPr>
         <p:spPr>
           <a:xfrm>
-            <a:off x="1607505" y="416478"/>
+            <a:off x="2295342" y="416478"/>
             <a:ext cx="1" cy="179264"/>
           </a:xfrm>
           <a:prstGeom prst="straightConnector1">
@@ -23767,7 +23767,7 @@
         <p:spPr>
           <a:xfrm>
             <a:off x="506088" y="165136"/>
-            <a:ext cx="1870523" cy="2211154"/>
+            <a:ext cx="3589451" cy="2211153"/>
           </a:xfrm>
           <a:prstGeom prst="rect">
             <a:avLst/>
@@ -23889,7 +23889,7 @@
         </p:nvSpPr>
         <p:spPr>
           <a:xfrm>
-            <a:off x="1073765" y="595742"/>
+            <a:off x="1761602" y="595742"/>
             <a:ext cx="1067481" cy="538736"/>
           </a:xfrm>
           <a:prstGeom prst="roundRect">
@@ -23947,7 +23947,7 @@
         </p:nvCxnSpPr>
         <p:spPr>
           <a:xfrm>
-            <a:off x="1078520" y="849795"/>
+            <a:off x="1766357" y="849795"/>
             <a:ext cx="1058562" cy="0"/>
           </a:xfrm>
           <a:prstGeom prst="line">
@@ -23982,7 +23982,7 @@
         </p:nvSpPr>
         <p:spPr>
           <a:xfrm>
-            <a:off x="1535494" y="272459"/>
+            <a:off x="2223331" y="272459"/>
             <a:ext cx="144021" cy="144020"/>
           </a:xfrm>
           <a:prstGeom prst="flowChartConnector">
@@ -24030,7 +24030,7 @@
         </p:nvSpPr>
         <p:spPr>
           <a:xfrm>
-            <a:off x="1073763" y="1584201"/>
+            <a:off x="1761600" y="1584201"/>
             <a:ext cx="1067481" cy="648072"/>
           </a:xfrm>
           <a:prstGeom prst="roundRect">
@@ -24088,7 +24088,7 @@
         </p:nvCxnSpPr>
         <p:spPr>
           <a:xfrm>
-            <a:off x="1089599" y="1881499"/>
+            <a:off x="1777436" y="1881499"/>
             <a:ext cx="1058562" cy="0"/>
           </a:xfrm>
           <a:prstGeom prst="line">
@@ -24123,7 +24123,7 @@
         </p:nvCxnSpPr>
         <p:spPr>
           <a:xfrm flipH="1">
-            <a:off x="1440507" y="1134478"/>
+            <a:off x="2128344" y="1134478"/>
             <a:ext cx="2" cy="449723"/>
           </a:xfrm>
           <a:prstGeom prst="straightConnector1">
@@ -24159,8 +24159,8 @@
         </p:nvSpPr>
         <p:spPr>
           <a:xfrm>
-            <a:off x="864443" y="1220204"/>
-            <a:ext cx="866781" cy="246221"/>
+            <a:off x="1440507" y="1220204"/>
+            <a:ext cx="782824" cy="246221"/>
           </a:xfrm>
           <a:prstGeom prst="rect">
             <a:avLst/>
@@ -24174,7 +24174,7 @@
           <a:p>
             <a:r>
               <a:rPr lang="en-US" altLang="ja-JP" sz="1000" dirty="0" smtClean="0"/>
-              <a:t>Event1</a:t>
+              <a:t>E2[G1]/A1</a:t>
             </a:r>
             <a:endParaRPr lang="ja-JP" altLang="en-US" sz="1000" dirty="0"/>
           </a:p>
@@ -24188,8 +24188,8 @@
         </p:nvSpPr>
         <p:spPr>
           <a:xfrm>
-            <a:off x="1038709" y="792113"/>
-            <a:ext cx="1481918" cy="400110"/>
+            <a:off x="1726546" y="792113"/>
+            <a:ext cx="1098373" cy="400110"/>
           </a:xfrm>
           <a:prstGeom prst="rect">
             <a:avLst/>
@@ -24236,8 +24236,8 @@
         </p:nvSpPr>
         <p:spPr>
           <a:xfrm>
-            <a:off x="1038709" y="1832163"/>
-            <a:ext cx="1481918" cy="400110"/>
+            <a:off x="1726546" y="1832163"/>
+            <a:ext cx="1098373" cy="400110"/>
           </a:xfrm>
           <a:prstGeom prst="rect">
             <a:avLst/>
@@ -24273,35 +24273,6 @@
               <a:t>on_exit</a:t>
             </a:r>
             <a:endParaRPr lang="en-US" altLang="ja-JP" sz="1000" dirty="0"/>
-          </a:p>
-        </p:txBody>
-      </p:sp>
-      <p:sp>
-        <p:nvSpPr>
-          <p:cNvPr id="16" name="正方形/長方形 15"/>
-          <p:cNvSpPr/>
-          <p:nvPr/>
-        </p:nvSpPr>
-        <p:spPr>
-          <a:xfrm>
-            <a:off x="1725854" y="1220204"/>
-            <a:ext cx="866781" cy="246221"/>
-          </a:xfrm>
-          <a:prstGeom prst="rect">
-            <a:avLst/>
-          </a:prstGeom>
-        </p:spPr>
-        <p:txBody>
-          <a:bodyPr wrap="square" lIns="91439" tIns="45720" rIns="91439" bIns="45720">
-            <a:spAutoFit/>
-          </a:bodyPr>
-          <a:lstStyle/>
-          <a:p>
-            <a:r>
-              <a:rPr lang="en-US" altLang="ja-JP" sz="1000" dirty="0" smtClean="0"/>
-              <a:t>Event2</a:t>
-            </a:r>
-            <a:endParaRPr lang="ja-JP" altLang="en-US" sz="1000" dirty="0"/>
           </a:p>
         </p:txBody>
       </p:sp>
@@ -24313,7 +24284,7 @@
         </p:nvCxnSpPr>
         <p:spPr>
           <a:xfrm flipH="1" flipV="1">
-            <a:off x="1728537" y="1134478"/>
+            <a:off x="2416374" y="1134478"/>
             <a:ext cx="2" cy="449723"/>
           </a:xfrm>
           <a:prstGeom prst="straightConnector1">
@@ -24341,6 +24312,309 @@
           </a:fontRef>
         </p:style>
       </p:cxnSp>
+      <p:sp>
+        <p:nvSpPr>
+          <p:cNvPr id="55" name="正方形/長方形 54"/>
+          <p:cNvSpPr/>
+          <p:nvPr/>
+        </p:nvSpPr>
+        <p:spPr>
+          <a:xfrm>
+            <a:off x="2376611" y="1220204"/>
+            <a:ext cx="782824" cy="246221"/>
+          </a:xfrm>
+          <a:prstGeom prst="rect">
+            <a:avLst/>
+          </a:prstGeom>
+        </p:spPr>
+        <p:txBody>
+          <a:bodyPr wrap="square" lIns="91439" tIns="45720" rIns="91439" bIns="45720">
+            <a:spAutoFit/>
+          </a:bodyPr>
+          <a:lstStyle/>
+          <a:p>
+            <a:r>
+              <a:rPr lang="en-US" altLang="ja-JP" sz="1000" dirty="0" smtClean="0"/>
+              <a:t>E1[G1]/A1</a:t>
+            </a:r>
+            <a:endParaRPr lang="ja-JP" altLang="en-US" sz="1000" dirty="0"/>
+          </a:p>
+        </p:txBody>
+      </p:sp>
+      <p:cxnSp>
+        <p:nvCxnSpPr>
+          <p:cNvPr id="48" name="直線コネクタ 47"/>
+          <p:cNvCxnSpPr>
+            <a:stCxn id="44" idx="3"/>
+          </p:cNvCxnSpPr>
+          <p:nvPr/>
+        </p:nvCxnSpPr>
+        <p:spPr>
+          <a:xfrm>
+            <a:off x="2829081" y="1908237"/>
+            <a:ext cx="483634" cy="0"/>
+          </a:xfrm>
+          <a:prstGeom prst="line">
+            <a:avLst/>
+          </a:prstGeom>
+          <a:ln w="19050">
+            <a:solidFill>
+              <a:schemeClr val="tx1"/>
+            </a:solidFill>
+          </a:ln>
+        </p:spPr>
+        <p:style>
+          <a:lnRef idx="1">
+            <a:schemeClr val="accent1"/>
+          </a:lnRef>
+          <a:fillRef idx="0">
+            <a:schemeClr val="accent1"/>
+          </a:fillRef>
+          <a:effectRef idx="0">
+            <a:schemeClr val="accent1"/>
+          </a:effectRef>
+          <a:fontRef idx="minor">
+            <a:schemeClr val="tx1"/>
+          </a:fontRef>
+        </p:style>
+      </p:cxnSp>
+      <p:cxnSp>
+        <p:nvCxnSpPr>
+          <p:cNvPr id="60" name="直線コネクタ 59"/>
+          <p:cNvCxnSpPr/>
+          <p:nvPr/>
+        </p:nvCxnSpPr>
+        <p:spPr>
+          <a:xfrm flipV="1">
+            <a:off x="3312715" y="849795"/>
+            <a:ext cx="0" cy="1058443"/>
+          </a:xfrm>
+          <a:prstGeom prst="line">
+            <a:avLst/>
+          </a:prstGeom>
+          <a:ln w="19050">
+            <a:solidFill>
+              <a:schemeClr val="tx1"/>
+            </a:solidFill>
+          </a:ln>
+        </p:spPr>
+        <p:style>
+          <a:lnRef idx="1">
+            <a:schemeClr val="accent1"/>
+          </a:lnRef>
+          <a:fillRef idx="0">
+            <a:schemeClr val="accent1"/>
+          </a:fillRef>
+          <a:effectRef idx="0">
+            <a:schemeClr val="accent1"/>
+          </a:effectRef>
+          <a:fontRef idx="minor">
+            <a:schemeClr val="tx1"/>
+          </a:fontRef>
+        </p:style>
+      </p:cxnSp>
+      <p:cxnSp>
+        <p:nvCxnSpPr>
+          <p:cNvPr id="63" name="直線コネクタ 62"/>
+          <p:cNvCxnSpPr/>
+          <p:nvPr/>
+        </p:nvCxnSpPr>
+        <p:spPr>
+          <a:xfrm>
+            <a:off x="2829081" y="859516"/>
+            <a:ext cx="483634" cy="0"/>
+          </a:xfrm>
+          <a:prstGeom prst="line">
+            <a:avLst/>
+          </a:prstGeom>
+          <a:ln w="19050">
+            <a:solidFill>
+              <a:schemeClr val="tx1"/>
+            </a:solidFill>
+            <a:headEnd type="arrow" w="med" len="med"/>
+            <a:tailEnd type="none" w="med" len="med"/>
+          </a:ln>
+        </p:spPr>
+        <p:style>
+          <a:lnRef idx="1">
+            <a:schemeClr val="accent1"/>
+          </a:lnRef>
+          <a:fillRef idx="0">
+            <a:schemeClr val="accent1"/>
+          </a:fillRef>
+          <a:effectRef idx="0">
+            <a:schemeClr val="accent1"/>
+          </a:effectRef>
+          <a:fontRef idx="minor">
+            <a:schemeClr val="tx1"/>
+          </a:fontRef>
+        </p:style>
+      </p:cxnSp>
+      <p:cxnSp>
+        <p:nvCxnSpPr>
+          <p:cNvPr id="64" name="直線コネクタ 63"/>
+          <p:cNvCxnSpPr/>
+          <p:nvPr/>
+        </p:nvCxnSpPr>
+        <p:spPr>
+          <a:xfrm>
+            <a:off x="1270698" y="849795"/>
+            <a:ext cx="483634" cy="0"/>
+          </a:xfrm>
+          <a:prstGeom prst="line">
+            <a:avLst/>
+          </a:prstGeom>
+          <a:ln w="19050">
+            <a:solidFill>
+              <a:schemeClr val="tx1"/>
+            </a:solidFill>
+          </a:ln>
+        </p:spPr>
+        <p:style>
+          <a:lnRef idx="1">
+            <a:schemeClr val="accent1"/>
+          </a:lnRef>
+          <a:fillRef idx="0">
+            <a:schemeClr val="accent1"/>
+          </a:fillRef>
+          <a:effectRef idx="0">
+            <a:schemeClr val="accent1"/>
+          </a:effectRef>
+          <a:fontRef idx="minor">
+            <a:schemeClr val="tx1"/>
+          </a:fontRef>
+        </p:style>
+      </p:cxnSp>
+      <p:cxnSp>
+        <p:nvCxnSpPr>
+          <p:cNvPr id="65" name="直線コネクタ 64"/>
+          <p:cNvCxnSpPr/>
+          <p:nvPr/>
+        </p:nvCxnSpPr>
+        <p:spPr>
+          <a:xfrm flipV="1">
+            <a:off x="1270698" y="850162"/>
+            <a:ext cx="0" cy="1058443"/>
+          </a:xfrm>
+          <a:prstGeom prst="line">
+            <a:avLst/>
+          </a:prstGeom>
+          <a:ln w="19050">
+            <a:solidFill>
+              <a:schemeClr val="tx1"/>
+            </a:solidFill>
+          </a:ln>
+        </p:spPr>
+        <p:style>
+          <a:lnRef idx="1">
+            <a:schemeClr val="accent1"/>
+          </a:lnRef>
+          <a:fillRef idx="0">
+            <a:schemeClr val="accent1"/>
+          </a:fillRef>
+          <a:effectRef idx="0">
+            <a:schemeClr val="accent1"/>
+          </a:effectRef>
+          <a:fontRef idx="minor">
+            <a:schemeClr val="tx1"/>
+          </a:fontRef>
+        </p:style>
+      </p:cxnSp>
+      <p:cxnSp>
+        <p:nvCxnSpPr>
+          <p:cNvPr id="66" name="直線コネクタ 65"/>
+          <p:cNvCxnSpPr/>
+          <p:nvPr/>
+        </p:nvCxnSpPr>
+        <p:spPr>
+          <a:xfrm flipH="1">
+            <a:off x="1270698" y="1908605"/>
+            <a:ext cx="483634" cy="0"/>
+          </a:xfrm>
+          <a:prstGeom prst="line">
+            <a:avLst/>
+          </a:prstGeom>
+          <a:ln w="19050">
+            <a:solidFill>
+              <a:schemeClr val="tx1"/>
+            </a:solidFill>
+            <a:headEnd type="arrow" w="med" len="med"/>
+            <a:tailEnd type="none" w="med" len="med"/>
+          </a:ln>
+        </p:spPr>
+        <p:style>
+          <a:lnRef idx="1">
+            <a:schemeClr val="accent1"/>
+          </a:lnRef>
+          <a:fillRef idx="0">
+            <a:schemeClr val="accent1"/>
+          </a:fillRef>
+          <a:effectRef idx="0">
+            <a:schemeClr val="accent1"/>
+          </a:effectRef>
+          <a:fontRef idx="minor">
+            <a:schemeClr val="tx1"/>
+          </a:fontRef>
+        </p:style>
+      </p:cxnSp>
+      <p:sp>
+        <p:nvSpPr>
+          <p:cNvPr id="67" name="正方形/長方形 66"/>
+          <p:cNvSpPr/>
+          <p:nvPr/>
+        </p:nvSpPr>
+        <p:spPr>
+          <a:xfrm>
+            <a:off x="585675" y="1220204"/>
+            <a:ext cx="782824" cy="246221"/>
+          </a:xfrm>
+          <a:prstGeom prst="rect">
+            <a:avLst/>
+          </a:prstGeom>
+        </p:spPr>
+        <p:txBody>
+          <a:bodyPr wrap="square" lIns="91439" tIns="45720" rIns="91439" bIns="45720">
+            <a:spAutoFit/>
+          </a:bodyPr>
+          <a:lstStyle/>
+          <a:p>
+            <a:r>
+              <a:rPr lang="en-US" altLang="ja-JP" sz="1000" dirty="0" smtClean="0"/>
+              <a:t>E1[G1]/A1</a:t>
+            </a:r>
+            <a:endParaRPr lang="ja-JP" altLang="en-US" sz="1000" dirty="0"/>
+          </a:p>
+        </p:txBody>
+      </p:sp>
+      <p:sp>
+        <p:nvSpPr>
+          <p:cNvPr id="68" name="正方形/長方形 67"/>
+          <p:cNvSpPr/>
+          <p:nvPr/>
+        </p:nvSpPr>
+        <p:spPr>
+          <a:xfrm>
+            <a:off x="3249971" y="1220204"/>
+            <a:ext cx="782824" cy="246221"/>
+          </a:xfrm>
+          <a:prstGeom prst="rect">
+            <a:avLst/>
+          </a:prstGeom>
+        </p:spPr>
+        <p:txBody>
+          <a:bodyPr wrap="square" lIns="91439" tIns="45720" rIns="91439" bIns="45720">
+            <a:spAutoFit/>
+          </a:bodyPr>
+          <a:lstStyle/>
+          <a:p>
+            <a:r>
+              <a:rPr lang="en-US" altLang="ja-JP" sz="1000" dirty="0" smtClean="0"/>
+              <a:t>E2[G1]/A1</a:t>
+            </a:r>
+            <a:endParaRPr lang="ja-JP" altLang="en-US" sz="1000" dirty="0"/>
+          </a:p>
+        </p:txBody>
+      </p:sp>
     </p:spTree>
     <p:extLst>
       <p:ext uri="{BB962C8B-B14F-4D97-AF65-F5344CB8AC3E}">

</xml_diff>